<commit_message>
Organization of dataframe to be ndarrays and changing code that relied on dataframes
</commit_message>
<xml_diff>
--- a/Audio Dog Bark Identification.pptx
+++ b/Audio Dog Bark Identification.pptx
@@ -4,6 +4,9 @@
   <p:sldMasterIdLst>
     <p:sldMasterId id="2147483660" r:id="rId1"/>
   </p:sldMasterIdLst>
+  <p:notesMasterIdLst>
+    <p:notesMasterId r:id="rId11"/>
+  </p:notesMasterIdLst>
   <p:sldIdLst>
     <p:sldId id="256" r:id="rId2"/>
     <p:sldId id="258" r:id="rId3"/>
@@ -128,7 +131,7 @@
     <p1510:client id="{50466BB6-A36A-4840-8042-2568C71ECAF1}" v="24" dt="2020-05-09T21:13:44.269"/>
     <p1510:client id="{5A7429CA-5897-425C-883B-77C9F7C46FCC}" v="298" dt="2020-05-09T20:54:17.669"/>
     <p1510:client id="{5E92D238-FBDD-49B1-A334-FD695E37C85F}" v="653" dt="2020-05-09T22:22:54.770"/>
-    <p1510:client id="{956F202B-8045-4161-BB6C-AE63D5442B16}" v="298" dt="2020-05-10T19:15:37.367"/>
+    <p1510:client id="{956F202B-8045-4161-BB6C-AE63D5442B16}" v="323" dt="2020-05-10T20:00:23.677"/>
   </p1510:revLst>
 </p1510:revInfo>
 </file>
@@ -136,44 +139,1579 @@
 <file path=ppt/changesInfos/changesInfo1.xml><?xml version="1.0" encoding="utf-8"?>
 <pc:chgInfo xmlns:a="http://schemas.openxmlformats.org/drawingml/2006/main" xmlns:r="http://schemas.openxmlformats.org/officeDocument/2006/relationships" xmlns:ac="http://schemas.microsoft.com/office/drawing/2013/main/command" xmlns:pc="http://schemas.microsoft.com/office/powerpoint/2013/main/command">
   <pc:docChgLst>
-    <pc:chgData name="Pawel Juda" userId="f6ddb2cecf310bfe" providerId="Windows Live" clId="Web-{1BB566C2-5DB8-4F38-9573-BB226982695B}"/>
-    <pc:docChg chg="modSld">
-      <pc:chgData name="Pawel Juda" userId="f6ddb2cecf310bfe" providerId="Windows Live" clId="Web-{1BB566C2-5DB8-4F38-9573-BB226982695B}" dt="2020-05-09T20:42:49.667" v="127"/>
+    <pc:chgData name="Bryan Khuu" userId="db4bb5bc1a416b49" providerId="Windows Live" clId="Web-{956F202B-8045-4161-BB6C-AE63D5442B16}"/>
+    <pc:docChg chg="addSld modSld">
+      <pc:chgData name="Bryan Khuu" userId="db4bb5bc1a416b49" providerId="Windows Live" clId="Web-{956F202B-8045-4161-BB6C-AE63D5442B16}" dt="2020-05-10T20:00:23.677" v="315" actId="1076"/>
       <pc:docMkLst>
         <pc:docMk/>
       </pc:docMkLst>
-      <pc:sldChg chg="addSp delSp modSp mod setBg setClrOvrMap">
-        <pc:chgData name="Pawel Juda" userId="f6ddb2cecf310bfe" providerId="Windows Live" clId="Web-{1BB566C2-5DB8-4F38-9573-BB226982695B}" dt="2020-05-09T20:42:49.667" v="127"/>
+      <pc:sldChg chg="modSp">
+        <pc:chgData name="Bryan Khuu" userId="db4bb5bc1a416b49" providerId="Windows Live" clId="Web-{956F202B-8045-4161-BB6C-AE63D5442B16}" dt="2020-05-09T22:30:09.074" v="18"/>
+        <pc:sldMkLst>
+          <pc:docMk/>
+          <pc:sldMk cId="466311876" sldId="257"/>
+        </pc:sldMkLst>
+        <pc:spChg chg="mod">
+          <ac:chgData name="Bryan Khuu" userId="db4bb5bc1a416b49" providerId="Windows Live" clId="Web-{956F202B-8045-4161-BB6C-AE63D5442B16}" dt="2020-05-09T22:25:20.510" v="13" actId="20577"/>
+          <ac:spMkLst>
+            <pc:docMk/>
+            <pc:sldMk cId="466311876" sldId="257"/>
+            <ac:spMk id="2" creationId="{A2841FE9-55B0-4DB0-85A4-E7ABC878C8AE}"/>
+          </ac:spMkLst>
+        </pc:spChg>
+        <pc:graphicFrameChg chg="modGraphic">
+          <ac:chgData name="Bryan Khuu" userId="db4bb5bc1a416b49" providerId="Windows Live" clId="Web-{956F202B-8045-4161-BB6C-AE63D5442B16}" dt="2020-05-09T22:30:09.074" v="18"/>
+          <ac:graphicFrameMkLst>
+            <pc:docMk/>
+            <pc:sldMk cId="466311876" sldId="257"/>
+            <ac:graphicFrameMk id="5" creationId="{91169D42-FB2F-4AEC-861C-B7503AD50942}"/>
+          </ac:graphicFrameMkLst>
+        </pc:graphicFrameChg>
+      </pc:sldChg>
+      <pc:sldChg chg="addSp delSp modSp">
+        <pc:chgData name="Bryan Khuu" userId="db4bb5bc1a416b49" providerId="Windows Live" clId="Web-{956F202B-8045-4161-BB6C-AE63D5442B16}" dt="2020-05-09T23:04:01.810" v="108" actId="20577"/>
+        <pc:sldMkLst>
+          <pc:docMk/>
+          <pc:sldMk cId="3876366827" sldId="260"/>
+        </pc:sldMkLst>
+        <pc:spChg chg="mod">
+          <ac:chgData name="Bryan Khuu" userId="db4bb5bc1a416b49" providerId="Windows Live" clId="Web-{956F202B-8045-4161-BB6C-AE63D5442B16}" dt="2020-05-09T23:04:01.810" v="108" actId="20577"/>
+          <ac:spMkLst>
+            <pc:docMk/>
+            <pc:sldMk cId="3876366827" sldId="260"/>
+            <ac:spMk id="3" creationId="{FA7E6979-AB9C-4EC2-B1A7-83CFAF2AD994}"/>
+          </ac:spMkLst>
+        </pc:spChg>
+        <pc:spChg chg="add del mod">
+          <ac:chgData name="Bryan Khuu" userId="db4bb5bc1a416b49" providerId="Windows Live" clId="Web-{956F202B-8045-4161-BB6C-AE63D5442B16}" dt="2020-05-09T22:54:27.969" v="21"/>
+          <ac:spMkLst>
+            <pc:docMk/>
+            <pc:sldMk cId="3876366827" sldId="260"/>
+            <ac:spMk id="5" creationId="{DD9559C4-2E72-460D-8EF7-D8B17A2A7478}"/>
+          </ac:spMkLst>
+        </pc:spChg>
+        <pc:picChg chg="del">
+          <ac:chgData name="Bryan Khuu" userId="db4bb5bc1a416b49" providerId="Windows Live" clId="Web-{956F202B-8045-4161-BB6C-AE63D5442B16}" dt="2020-05-09T22:54:27.250" v="20"/>
+          <ac:picMkLst>
+            <pc:docMk/>
+            <pc:sldMk cId="3876366827" sldId="260"/>
+            <ac:picMk id="4" creationId="{1C779644-2880-48A0-B7ED-BC65315AC221}"/>
+          </ac:picMkLst>
+        </pc:picChg>
+        <pc:picChg chg="del">
+          <ac:chgData name="Bryan Khuu" userId="db4bb5bc1a416b49" providerId="Windows Live" clId="Web-{956F202B-8045-4161-BB6C-AE63D5442B16}" dt="2020-05-09T22:54:30.704" v="23"/>
+          <ac:picMkLst>
+            <pc:docMk/>
+            <pc:sldMk cId="3876366827" sldId="260"/>
+            <ac:picMk id="6" creationId="{18FCD283-6F3B-46B1-ABD3-4B677E8895AF}"/>
+          </ac:picMkLst>
+        </pc:picChg>
+        <pc:picChg chg="add mod ord">
+          <ac:chgData name="Bryan Khuu" userId="db4bb5bc1a416b49" providerId="Windows Live" clId="Web-{956F202B-8045-4161-BB6C-AE63D5442B16}" dt="2020-05-09T22:55:13.471" v="36" actId="1076"/>
+          <ac:picMkLst>
+            <pc:docMk/>
+            <pc:sldMk cId="3876366827" sldId="260"/>
+            <ac:picMk id="7" creationId="{807DC4DE-CC3E-45D1-989D-D69BD55EB1DC}"/>
+          </ac:picMkLst>
+        </pc:picChg>
+        <pc:picChg chg="add mod">
+          <ac:chgData name="Bryan Khuu" userId="db4bb5bc1a416b49" providerId="Windows Live" clId="Web-{956F202B-8045-4161-BB6C-AE63D5442B16}" dt="2020-05-09T22:55:19.878" v="37" actId="1076"/>
+          <ac:picMkLst>
+            <pc:docMk/>
+            <pc:sldMk cId="3876366827" sldId="260"/>
+            <ac:picMk id="9" creationId="{B8469DE2-5BD4-4878-A7AB-05BBA0E7BAA1}"/>
+          </ac:picMkLst>
+        </pc:picChg>
+      </pc:sldChg>
+      <pc:sldChg chg="addSp delSp modSp mod setBg">
+        <pc:chgData name="Bryan Khuu" userId="db4bb5bc1a416b49" providerId="Windows Live" clId="Web-{956F202B-8045-4161-BB6C-AE63D5442B16}" dt="2020-05-09T22:57:34.182" v="91" actId="20577"/>
+        <pc:sldMkLst>
+          <pc:docMk/>
+          <pc:sldMk cId="2127869669" sldId="261"/>
+        </pc:sldMkLst>
+        <pc:spChg chg="mod">
+          <ac:chgData name="Bryan Khuu" userId="db4bb5bc1a416b49" providerId="Windows Live" clId="Web-{956F202B-8045-4161-BB6C-AE63D5442B16}" dt="2020-05-09T22:57:34.182" v="91" actId="20577"/>
+          <ac:spMkLst>
+            <pc:docMk/>
+            <pc:sldMk cId="2127869669" sldId="261"/>
+            <ac:spMk id="2" creationId="{D168774E-B68F-4891-8DD8-A6AF537C5F93}"/>
+          </ac:spMkLst>
+        </pc:spChg>
+        <pc:spChg chg="add del mod">
+          <ac:chgData name="Bryan Khuu" userId="db4bb5bc1a416b49" providerId="Windows Live" clId="Web-{956F202B-8045-4161-BB6C-AE63D5442B16}" dt="2020-05-09T22:56:25.272" v="42"/>
+          <ac:spMkLst>
+            <pc:docMk/>
+            <pc:sldMk cId="2127869669" sldId="261"/>
+            <ac:spMk id="4" creationId="{2A07450C-6D62-4D39-B09D-BD9F2D507F69}"/>
+          </ac:spMkLst>
+        </pc:spChg>
+        <pc:spChg chg="add mod">
+          <ac:chgData name="Bryan Khuu" userId="db4bb5bc1a416b49" providerId="Windows Live" clId="Web-{956F202B-8045-4161-BB6C-AE63D5442B16}" dt="2020-05-09T22:56:49.273" v="48"/>
+          <ac:spMkLst>
+            <pc:docMk/>
+            <pc:sldMk cId="2127869669" sldId="261"/>
+            <ac:spMk id="9" creationId="{D300AE92-41B7-49B9-B10F-322B7E438D30}"/>
+          </ac:spMkLst>
+        </pc:spChg>
+        <pc:picChg chg="add del mod ord">
+          <ac:chgData name="Bryan Khuu" userId="db4bb5bc1a416b49" providerId="Windows Live" clId="Web-{956F202B-8045-4161-BB6C-AE63D5442B16}" dt="2020-05-09T22:56:49.273" v="48"/>
+          <ac:picMkLst>
+            <pc:docMk/>
+            <pc:sldMk cId="2127869669" sldId="261"/>
+            <ac:picMk id="5" creationId="{FE76271D-742B-4242-8CDD-E75AE1BD4E68}"/>
+          </ac:picMkLst>
+        </pc:picChg>
+        <pc:picChg chg="del">
+          <ac:chgData name="Bryan Khuu" userId="db4bb5bc1a416b49" providerId="Windows Live" clId="Web-{956F202B-8045-4161-BB6C-AE63D5442B16}" dt="2020-05-09T22:56:23.100" v="41"/>
+          <ac:picMkLst>
+            <pc:docMk/>
+            <pc:sldMk cId="2127869669" sldId="261"/>
+            <ac:picMk id="6" creationId="{B9457002-F5E2-401C-B7E6-0F02D7298594}"/>
+          </ac:picMkLst>
+        </pc:picChg>
+        <pc:picChg chg="del">
+          <ac:chgData name="Bryan Khuu" userId="db4bb5bc1a416b49" providerId="Windows Live" clId="Web-{956F202B-8045-4161-BB6C-AE63D5442B16}" dt="2020-05-09T22:56:20.787" v="40"/>
+          <ac:picMkLst>
+            <pc:docMk/>
+            <pc:sldMk cId="2127869669" sldId="261"/>
+            <ac:picMk id="10" creationId="{81337A89-EF35-4F29-BBA1-142B06FF1E82}"/>
+          </ac:picMkLst>
+        </pc:picChg>
+      </pc:sldChg>
+      <pc:sldChg chg="addSp delSp modSp new mod setBg">
+        <pc:chgData name="Bryan Khuu" userId="db4bb5bc1a416b49" providerId="Windows Live" clId="Web-{956F202B-8045-4161-BB6C-AE63D5442B16}" dt="2020-05-10T03:26:19.198" v="190" actId="1076"/>
+        <pc:sldMkLst>
+          <pc:docMk/>
+          <pc:sldMk cId="323867955" sldId="262"/>
+        </pc:sldMkLst>
+        <pc:spChg chg="mod">
+          <ac:chgData name="Bryan Khuu" userId="db4bb5bc1a416b49" providerId="Windows Live" clId="Web-{956F202B-8045-4161-BB6C-AE63D5442B16}" dt="2020-05-10T03:25:49.683" v="173" actId="20577"/>
+          <ac:spMkLst>
+            <pc:docMk/>
+            <pc:sldMk cId="323867955" sldId="262"/>
+            <ac:spMk id="2" creationId="{4879E7A6-7C20-46C5-9E20-5E772C5A0FF6}"/>
+          </ac:spMkLst>
+        </pc:spChg>
+        <pc:spChg chg="del">
+          <ac:chgData name="Bryan Khuu" userId="db4bb5bc1a416b49" providerId="Windows Live" clId="Web-{956F202B-8045-4161-BB6C-AE63D5442B16}" dt="2020-05-09T22:56:11.334" v="38"/>
+          <ac:spMkLst>
+            <pc:docMk/>
+            <pc:sldMk cId="323867955" sldId="262"/>
+            <ac:spMk id="3" creationId="{FEEB0D63-B07C-4AFA-9FE3-D2CA9C12E032}"/>
+          </ac:spMkLst>
+        </pc:spChg>
+        <pc:spChg chg="add mod">
+          <ac:chgData name="Bryan Khuu" userId="db4bb5bc1a416b49" providerId="Windows Live" clId="Web-{956F202B-8045-4161-BB6C-AE63D5442B16}" dt="2020-05-10T03:26:19.198" v="190" actId="1076"/>
+          <ac:spMkLst>
+            <pc:docMk/>
+            <pc:sldMk cId="323867955" sldId="262"/>
+            <ac:spMk id="5" creationId="{D4959F9D-8FBA-4D87-852B-13C313B58531}"/>
+          </ac:spMkLst>
+        </pc:spChg>
+        <pc:spChg chg="add del mod">
+          <ac:chgData name="Bryan Khuu" userId="db4bb5bc1a416b49" providerId="Windows Live" clId="Web-{956F202B-8045-4161-BB6C-AE63D5442B16}" dt="2020-05-10T03:15:01.287" v="111"/>
+          <ac:spMkLst>
+            <pc:docMk/>
+            <pc:sldMk cId="323867955" sldId="262"/>
+            <ac:spMk id="7" creationId="{B803AE0E-2880-4DDA-A630-468E4CE33F27}"/>
+          </ac:spMkLst>
+        </pc:spChg>
+        <pc:spChg chg="add">
+          <ac:chgData name="Bryan Khuu" userId="db4bb5bc1a416b49" providerId="Windows Live" clId="Web-{956F202B-8045-4161-BB6C-AE63D5442B16}" dt="2020-05-10T03:15:20.818" v="114"/>
+          <ac:spMkLst>
+            <pc:docMk/>
+            <pc:sldMk cId="323867955" sldId="262"/>
+            <ac:spMk id="8" creationId="{419501C6-F015-4273-AF88-E0F6C853899F}"/>
+          </ac:spMkLst>
+        </pc:spChg>
+        <pc:spChg chg="add">
+          <ac:chgData name="Bryan Khuu" userId="db4bb5bc1a416b49" providerId="Windows Live" clId="Web-{956F202B-8045-4161-BB6C-AE63D5442B16}" dt="2020-05-10T03:15:20.818" v="114"/>
+          <ac:spMkLst>
+            <pc:docMk/>
+            <pc:sldMk cId="323867955" sldId="262"/>
+            <ac:spMk id="10" creationId="{CA677DB7-5829-45BD-9754-5EC484CC4253}"/>
+          </ac:spMkLst>
+        </pc:spChg>
+        <pc:picChg chg="add mod ord">
+          <ac:chgData name="Bryan Khuu" userId="db4bb5bc1a416b49" providerId="Windows Live" clId="Web-{956F202B-8045-4161-BB6C-AE63D5442B16}" dt="2020-05-10T03:15:37.569" v="116" actId="1076"/>
+          <ac:picMkLst>
+            <pc:docMk/>
+            <pc:sldMk cId="323867955" sldId="262"/>
+            <ac:picMk id="3" creationId="{7995945E-9C91-4FA8-96A9-6ED47C774959}"/>
+          </ac:picMkLst>
+        </pc:picChg>
+        <pc:picChg chg="add del mod ord">
+          <ac:chgData name="Bryan Khuu" userId="db4bb5bc1a416b49" providerId="Windows Live" clId="Web-{956F202B-8045-4161-BB6C-AE63D5442B16}" dt="2020-05-09T22:56:15.490" v="39"/>
+          <ac:picMkLst>
+            <pc:docMk/>
+            <pc:sldMk cId="323867955" sldId="262"/>
+            <ac:picMk id="4" creationId="{0EAA1EC3-2F10-4929-83B5-AC0BC299B9A1}"/>
+          </ac:picMkLst>
+        </pc:picChg>
+      </pc:sldChg>
+      <pc:sldChg chg="addSp delSp modSp new modNotes">
+        <pc:chgData name="Bryan Khuu" userId="db4bb5bc1a416b49" providerId="Windows Live" clId="Web-{956F202B-8045-4161-BB6C-AE63D5442B16}" dt="2020-05-10T20:00:23.677" v="315" actId="1076"/>
+        <pc:sldMkLst>
+          <pc:docMk/>
+          <pc:sldMk cId="1265264582" sldId="263"/>
+        </pc:sldMkLst>
+        <pc:spChg chg="mod">
+          <ac:chgData name="Bryan Khuu" userId="db4bb5bc1a416b49" providerId="Windows Live" clId="Web-{956F202B-8045-4161-BB6C-AE63D5442B16}" dt="2020-05-10T20:00:12.989" v="312" actId="1076"/>
+          <ac:spMkLst>
+            <pc:docMk/>
+            <pc:sldMk cId="1265264582" sldId="263"/>
+            <ac:spMk id="2" creationId="{CEF05482-E9DA-4A86-9FFF-CEF2E39DD2D9}"/>
+          </ac:spMkLst>
+        </pc:spChg>
+        <pc:spChg chg="del">
+          <ac:chgData name="Bryan Khuu" userId="db4bb5bc1a416b49" providerId="Windows Live" clId="Web-{956F202B-8045-4161-BB6C-AE63D5442B16}" dt="2020-05-10T18:36:12.722" v="289"/>
+          <ac:spMkLst>
+            <pc:docMk/>
+            <pc:sldMk cId="1265264582" sldId="263"/>
+            <ac:spMk id="3" creationId="{1C71977E-C499-4AEB-B8A4-2EC057D58DC5}"/>
+          </ac:spMkLst>
+        </pc:spChg>
+        <pc:picChg chg="add del mod">
+          <ac:chgData name="Bryan Khuu" userId="db4bb5bc1a416b49" providerId="Windows Live" clId="Web-{956F202B-8045-4161-BB6C-AE63D5442B16}" dt="2020-05-10T19:58:25.192" v="300"/>
+          <ac:picMkLst>
+            <pc:docMk/>
+            <pc:sldMk cId="1265264582" sldId="263"/>
+            <ac:picMk id="3" creationId="{8F8E699D-4469-4A55-B3C3-631B501E7565}"/>
+          </ac:picMkLst>
+        </pc:picChg>
+        <pc:picChg chg="add mod">
+          <ac:chgData name="Bryan Khuu" userId="db4bb5bc1a416b49" providerId="Windows Live" clId="Web-{956F202B-8045-4161-BB6C-AE63D5442B16}" dt="2020-05-10T20:00:23.677" v="315" actId="1076"/>
+          <ac:picMkLst>
+            <pc:docMk/>
+            <pc:sldMk cId="1265264582" sldId="263"/>
+            <ac:picMk id="5" creationId="{A1448429-C12A-48E3-B82E-33F6B3F51509}"/>
+          </ac:picMkLst>
+        </pc:picChg>
+        <pc:picChg chg="add mod">
+          <ac:chgData name="Bryan Khuu" userId="db4bb5bc1a416b49" providerId="Windows Live" clId="Web-{956F202B-8045-4161-BB6C-AE63D5442B16}" dt="2020-05-10T20:00:20.771" v="314" actId="1076"/>
+          <ac:picMkLst>
+            <pc:docMk/>
+            <pc:sldMk cId="1265264582" sldId="263"/>
+            <ac:picMk id="7" creationId="{1C9D8948-70BC-4317-A8AC-6F6E9C16F053}"/>
+          </ac:picMkLst>
+        </pc:picChg>
+      </pc:sldChg>
+      <pc:sldChg chg="new">
+        <pc:chgData name="Bryan Khuu" userId="db4bb5bc1a416b49" providerId="Windows Live" clId="Web-{956F202B-8045-4161-BB6C-AE63D5442B16}" dt="2020-05-10T19:15:37.367" v="291"/>
+        <pc:sldMkLst>
+          <pc:docMk/>
+          <pc:sldMk cId="253110941" sldId="264"/>
+        </pc:sldMkLst>
+      </pc:sldChg>
+    </pc:docChg>
+  </pc:docChgLst>
+  <pc:docChgLst>
+    <pc:chgData name="Bryan Khuu" userId="db4bb5bc1a416b49" providerId="Windows Live" clId="Web-{5E92D238-FBDD-49B1-A334-FD695E37C85F}"/>
+    <pc:docChg chg="addSld modSld">
+      <pc:chgData name="Bryan Khuu" userId="db4bb5bc1a416b49" providerId="Windows Live" clId="Web-{5E92D238-FBDD-49B1-A334-FD695E37C85F}" dt="2020-05-09T22:22:54.739" v="735"/>
+      <pc:docMkLst>
+        <pc:docMk/>
+      </pc:docMkLst>
+      <pc:sldChg chg="addSp delSp modSp mod setBg">
+        <pc:chgData name="Bryan Khuu" userId="db4bb5bc1a416b49" providerId="Windows Live" clId="Web-{5E92D238-FBDD-49B1-A334-FD695E37C85F}" dt="2020-05-09T22:13:33.937" v="692" actId="20577"/>
+        <pc:sldMkLst>
+          <pc:docMk/>
+          <pc:sldMk cId="466311876" sldId="257"/>
+        </pc:sldMkLst>
+        <pc:spChg chg="mod">
+          <ac:chgData name="Bryan Khuu" userId="db4bb5bc1a416b49" providerId="Windows Live" clId="Web-{5E92D238-FBDD-49B1-A334-FD695E37C85F}" dt="2020-05-09T22:10:37.665" v="669"/>
+          <ac:spMkLst>
+            <pc:docMk/>
+            <pc:sldMk cId="466311876" sldId="257"/>
+            <ac:spMk id="2" creationId="{A2841FE9-55B0-4DB0-85A4-E7ABC878C8AE}"/>
+          </ac:spMkLst>
+        </pc:spChg>
+        <pc:spChg chg="del mod">
+          <ac:chgData name="Bryan Khuu" userId="db4bb5bc1a416b49" providerId="Windows Live" clId="Web-{5E92D238-FBDD-49B1-A334-FD695E37C85F}" dt="2020-05-09T22:10:37.665" v="669"/>
+          <ac:spMkLst>
+            <pc:docMk/>
+            <pc:sldMk cId="466311876" sldId="257"/>
+            <ac:spMk id="3" creationId="{802F4C48-DE4A-4384-8D1B-6888BF9B917E}"/>
+          </ac:spMkLst>
+        </pc:spChg>
+        <pc:graphicFrameChg chg="add modGraphic">
+          <ac:chgData name="Bryan Khuu" userId="db4bb5bc1a416b49" providerId="Windows Live" clId="Web-{5E92D238-FBDD-49B1-A334-FD695E37C85F}" dt="2020-05-09T22:13:33.937" v="692" actId="20577"/>
+          <ac:graphicFrameMkLst>
+            <pc:docMk/>
+            <pc:sldMk cId="466311876" sldId="257"/>
+            <ac:graphicFrameMk id="5" creationId="{91169D42-FB2F-4AEC-861C-B7503AD50942}"/>
+          </ac:graphicFrameMkLst>
+        </pc:graphicFrameChg>
+      </pc:sldChg>
+      <pc:sldChg chg="addSp delSp modSp mod setBg">
+        <pc:chgData name="Bryan Khuu" userId="db4bb5bc1a416b49" providerId="Windows Live" clId="Web-{5E92D238-FBDD-49B1-A334-FD695E37C85F}" dt="2020-05-09T22:02:01.864" v="552" actId="1076"/>
+        <pc:sldMkLst>
+          <pc:docMk/>
+          <pc:sldMk cId="3964110441" sldId="258"/>
+        </pc:sldMkLst>
+        <pc:spChg chg="mod ord">
+          <ac:chgData name="Bryan Khuu" userId="db4bb5bc1a416b49" providerId="Windows Live" clId="Web-{5E92D238-FBDD-49B1-A334-FD695E37C85F}" dt="2020-05-09T21:29:38.600" v="383" actId="20577"/>
+          <ac:spMkLst>
+            <pc:docMk/>
+            <pc:sldMk cId="3964110441" sldId="258"/>
+            <ac:spMk id="2" creationId="{91ABE8C2-D87A-4AE1-ACC5-77F1BB1766D7}"/>
+          </ac:spMkLst>
+        </pc:spChg>
+        <pc:spChg chg="mod ord">
+          <ac:chgData name="Bryan Khuu" userId="db4bb5bc1a416b49" providerId="Windows Live" clId="Web-{5E92D238-FBDD-49B1-A334-FD695E37C85F}" dt="2020-05-09T22:01:26.175" v="547" actId="20577"/>
+          <ac:spMkLst>
+            <pc:docMk/>
+            <pc:sldMk cId="3964110441" sldId="258"/>
+            <ac:spMk id="13" creationId="{6144181C-0323-471E-B002-4C0BA47780C0}"/>
+          </ac:spMkLst>
+        </pc:spChg>
+        <pc:spChg chg="add del">
+          <ac:chgData name="Bryan Khuu" userId="db4bb5bc1a416b49" providerId="Windows Live" clId="Web-{5E92D238-FBDD-49B1-A334-FD695E37C85F}" dt="2020-05-09T21:13:47.475" v="55"/>
+          <ac:spMkLst>
+            <pc:docMk/>
+            <pc:sldMk cId="3964110441" sldId="258"/>
+            <ac:spMk id="15" creationId="{98D49316-27CF-4C3D-BE8C-042F06B89148}"/>
+          </ac:spMkLst>
+        </pc:spChg>
+        <pc:spChg chg="add del">
+          <ac:chgData name="Bryan Khuu" userId="db4bb5bc1a416b49" providerId="Windows Live" clId="Web-{5E92D238-FBDD-49B1-A334-FD695E37C85F}" dt="2020-05-09T21:10:41.694" v="11"/>
+          <ac:spMkLst>
+            <pc:docMk/>
+            <pc:sldMk cId="3964110441" sldId="258"/>
+            <ac:spMk id="16" creationId="{1660E788-AFA9-4A1B-9991-6AA74632A15B}"/>
+          </ac:spMkLst>
+        </pc:spChg>
+        <pc:spChg chg="add del">
+          <ac:chgData name="Bryan Khuu" userId="db4bb5bc1a416b49" providerId="Windows Live" clId="Web-{5E92D238-FBDD-49B1-A334-FD695E37C85F}" dt="2020-05-09T21:14:37.288" v="71"/>
+          <ac:spMkLst>
+            <pc:docMk/>
+            <pc:sldMk cId="3964110441" sldId="258"/>
+            <ac:spMk id="17" creationId="{BA4C5437-838C-45F6-BFC8-3AF0ADE30FFB}"/>
+          </ac:spMkLst>
+        </pc:spChg>
+        <pc:spChg chg="add del">
+          <ac:chgData name="Bryan Khuu" userId="db4bb5bc1a416b49" providerId="Windows Live" clId="Web-{5E92D238-FBDD-49B1-A334-FD695E37C85F}" dt="2020-05-09T21:10:41.694" v="11"/>
+          <ac:spMkLst>
+            <pc:docMk/>
+            <pc:sldMk cId="3964110441" sldId="258"/>
+            <ac:spMk id="18" creationId="{867D4867-5BA7-4462-B2F6-A23F4A622AA7}"/>
+          </ac:spMkLst>
+        </pc:spChg>
+        <pc:spChg chg="add del">
+          <ac:chgData name="Bryan Khuu" userId="db4bb5bc1a416b49" providerId="Windows Live" clId="Web-{5E92D238-FBDD-49B1-A334-FD695E37C85F}" dt="2020-05-09T21:14:37.288" v="71"/>
+          <ac:spMkLst>
+            <pc:docMk/>
+            <pc:sldMk cId="3964110441" sldId="258"/>
+            <ac:spMk id="19" creationId="{FACBD493-E381-4822-8F8F-A4194DFDB109}"/>
+          </ac:spMkLst>
+        </pc:spChg>
+        <pc:spChg chg="add del">
+          <ac:chgData name="Bryan Khuu" userId="db4bb5bc1a416b49" providerId="Windows Live" clId="Web-{5E92D238-FBDD-49B1-A334-FD695E37C85F}" dt="2020-05-09T21:10:40.694" v="8"/>
+          <ac:spMkLst>
+            <pc:docMk/>
+            <pc:sldMk cId="3964110441" sldId="258"/>
+            <ac:spMk id="20" creationId="{4088F942-5192-4329-9236-6B9F5E9E87C8}"/>
+          </ac:spMkLst>
+        </pc:spChg>
+        <pc:spChg chg="add del">
+          <ac:chgData name="Bryan Khuu" userId="db4bb5bc1a416b49" providerId="Windows Live" clId="Web-{5E92D238-FBDD-49B1-A334-FD695E37C85F}" dt="2020-05-09T21:11:42.850" v="19"/>
+          <ac:spMkLst>
+            <pc:docMk/>
+            <pc:sldMk cId="3964110441" sldId="258"/>
+            <ac:spMk id="21" creationId="{4088F942-5192-4329-9236-6B9F5E9E87C8}"/>
+          </ac:spMkLst>
+        </pc:spChg>
+        <pc:spChg chg="add del">
+          <ac:chgData name="Bryan Khuu" userId="db4bb5bc1a416b49" providerId="Windows Live" clId="Web-{5E92D238-FBDD-49B1-A334-FD695E37C85F}" dt="2020-05-09T21:11:42.850" v="19"/>
+          <ac:spMkLst>
+            <pc:docMk/>
+            <pc:sldMk cId="3964110441" sldId="258"/>
+            <ac:spMk id="22" creationId="{6DBBC3F0-E4D5-4DC9-9156-6592F510E7D0}"/>
+          </ac:spMkLst>
+        </pc:spChg>
+        <pc:spChg chg="add del">
+          <ac:chgData name="Bryan Khuu" userId="db4bb5bc1a416b49" providerId="Windows Live" clId="Web-{5E92D238-FBDD-49B1-A334-FD695E37C85F}" dt="2020-05-09T21:10:19.022" v="4"/>
+          <ac:spMkLst>
+            <pc:docMk/>
+            <pc:sldMk cId="3964110441" sldId="258"/>
+            <ac:spMk id="23" creationId="{C271F1AE-EB76-45DA-8C1D-BF917DFC4B77}"/>
+          </ac:spMkLst>
+        </pc:spChg>
+        <pc:spChg chg="add del">
+          <ac:chgData name="Bryan Khuu" userId="db4bb5bc1a416b49" providerId="Windows Live" clId="Web-{5E92D238-FBDD-49B1-A334-FD695E37C85F}" dt="2020-05-09T21:11:42.850" v="19"/>
+          <ac:spMkLst>
+            <pc:docMk/>
+            <pc:sldMk cId="3964110441" sldId="258"/>
+            <ac:spMk id="24" creationId="{25440DE7-FEC3-4B33-BE37-CA1D6793F833}"/>
+          </ac:spMkLst>
+        </pc:spChg>
+        <pc:spChg chg="add del">
+          <ac:chgData name="Bryan Khuu" userId="db4bb5bc1a416b49" providerId="Windows Live" clId="Web-{5E92D238-FBDD-49B1-A334-FD695E37C85F}" dt="2020-05-09T21:10:40.694" v="8"/>
+          <ac:spMkLst>
+            <pc:docMk/>
+            <pc:sldMk cId="3964110441" sldId="258"/>
+            <ac:spMk id="25" creationId="{6DBBC3F0-E4D5-4DC9-9156-6592F510E7D0}"/>
+          </ac:spMkLst>
+        </pc:spChg>
+        <pc:spChg chg="add del">
+          <ac:chgData name="Bryan Khuu" userId="db4bb5bc1a416b49" providerId="Windows Live" clId="Web-{5E92D238-FBDD-49B1-A334-FD695E37C85F}" dt="2020-05-09T21:13:14.678" v="51"/>
+          <ac:spMkLst>
+            <pc:docMk/>
+            <pc:sldMk cId="3964110441" sldId="258"/>
+            <ac:spMk id="26" creationId="{98D49316-27CF-4C3D-BE8C-042F06B89148}"/>
+          </ac:spMkLst>
+        </pc:spChg>
+        <pc:spChg chg="add del">
+          <ac:chgData name="Bryan Khuu" userId="db4bb5bc1a416b49" providerId="Windows Live" clId="Web-{5E92D238-FBDD-49B1-A334-FD695E37C85F}" dt="2020-05-09T21:10:40.694" v="8"/>
+          <ac:spMkLst>
+            <pc:docMk/>
+            <pc:sldMk cId="3964110441" sldId="258"/>
+            <ac:spMk id="27" creationId="{25440DE7-FEC3-4B33-BE37-CA1D6793F833}"/>
+          </ac:spMkLst>
+        </pc:spChg>
+        <pc:spChg chg="add del">
+          <ac:chgData name="Bryan Khuu" userId="db4bb5bc1a416b49" providerId="Windows Live" clId="Web-{5E92D238-FBDD-49B1-A334-FD695E37C85F}" dt="2020-05-09T21:12:27.585" v="32"/>
+          <ac:spMkLst>
+            <pc:docMk/>
+            <pc:sldMk cId="3964110441" sldId="258"/>
+            <ac:spMk id="28" creationId="{98D49316-27CF-4C3D-BE8C-042F06B89148}"/>
+          </ac:spMkLst>
+        </pc:spChg>
+        <pc:spChg chg="add del">
+          <ac:chgData name="Bryan Khuu" userId="db4bb5bc1a416b49" providerId="Windows Live" clId="Web-{5E92D238-FBDD-49B1-A334-FD695E37C85F}" dt="2020-05-09T21:11:42.834" v="18"/>
+          <ac:spMkLst>
+            <pc:docMk/>
+            <pc:sldMk cId="3964110441" sldId="258"/>
+            <ac:spMk id="29" creationId="{4088F942-5192-4329-9236-6B9F5E9E87C8}"/>
+          </ac:spMkLst>
+        </pc:spChg>
+        <pc:spChg chg="add del">
+          <ac:chgData name="Bryan Khuu" userId="db4bb5bc1a416b49" providerId="Windows Live" clId="Web-{5E92D238-FBDD-49B1-A334-FD695E37C85F}" dt="2020-05-09T21:12:30.194" v="34"/>
+          <ac:spMkLst>
+            <pc:docMk/>
+            <pc:sldMk cId="3964110441" sldId="258"/>
+            <ac:spMk id="30" creationId="{1660E788-AFA9-4A1B-9991-6AA74632A15B}"/>
+          </ac:spMkLst>
+        </pc:spChg>
+        <pc:spChg chg="add del">
+          <ac:chgData name="Bryan Khuu" userId="db4bb5bc1a416b49" providerId="Windows Live" clId="Web-{5E92D238-FBDD-49B1-A334-FD695E37C85F}" dt="2020-05-09T21:11:42.834" v="18"/>
+          <ac:spMkLst>
+            <pc:docMk/>
+            <pc:sldMk cId="3964110441" sldId="258"/>
+            <ac:spMk id="31" creationId="{6DBBC3F0-E4D5-4DC9-9156-6592F510E7D0}"/>
+          </ac:spMkLst>
+        </pc:spChg>
+        <pc:spChg chg="add del">
+          <ac:chgData name="Bryan Khuu" userId="db4bb5bc1a416b49" providerId="Windows Live" clId="Web-{5E92D238-FBDD-49B1-A334-FD695E37C85F}" dt="2020-05-09T21:12:30.194" v="34"/>
+          <ac:spMkLst>
+            <pc:docMk/>
+            <pc:sldMk cId="3964110441" sldId="258"/>
+            <ac:spMk id="32" creationId="{867D4867-5BA7-4462-B2F6-A23F4A622AA7}"/>
+          </ac:spMkLst>
+        </pc:spChg>
+        <pc:spChg chg="add del">
+          <ac:chgData name="Bryan Khuu" userId="db4bb5bc1a416b49" providerId="Windows Live" clId="Web-{5E92D238-FBDD-49B1-A334-FD695E37C85F}" dt="2020-05-09T21:11:42.834" v="18"/>
+          <ac:spMkLst>
+            <pc:docMk/>
+            <pc:sldMk cId="3964110441" sldId="258"/>
+            <ac:spMk id="33" creationId="{25440DE7-FEC3-4B33-BE37-CA1D6793F833}"/>
+          </ac:spMkLst>
+        </pc:spChg>
+        <pc:spChg chg="add del">
+          <ac:chgData name="Bryan Khuu" userId="db4bb5bc1a416b49" providerId="Windows Live" clId="Web-{5E92D238-FBDD-49B1-A334-FD695E37C85F}" dt="2020-05-09T21:12:32.288" v="36"/>
+          <ac:spMkLst>
+            <pc:docMk/>
+            <pc:sldMk cId="3964110441" sldId="258"/>
+            <ac:spMk id="34" creationId="{1660E788-AFA9-4A1B-9991-6AA74632A15B}"/>
+          </ac:spMkLst>
+        </pc:spChg>
+        <pc:spChg chg="add del">
+          <ac:chgData name="Bryan Khuu" userId="db4bb5bc1a416b49" providerId="Windows Live" clId="Web-{5E92D238-FBDD-49B1-A334-FD695E37C85F}" dt="2020-05-09T21:12:32.288" v="36"/>
+          <ac:spMkLst>
+            <pc:docMk/>
+            <pc:sldMk cId="3964110441" sldId="258"/>
+            <ac:spMk id="35" creationId="{867D4867-5BA7-4462-B2F6-A23F4A622AA7}"/>
+          </ac:spMkLst>
+        </pc:spChg>
+        <pc:spChg chg="add del">
+          <ac:chgData name="Bryan Khuu" userId="db4bb5bc1a416b49" providerId="Windows Live" clId="Web-{5E92D238-FBDD-49B1-A334-FD695E37C85F}" dt="2020-05-09T21:12:35.334" v="38"/>
+          <ac:spMkLst>
+            <pc:docMk/>
+            <pc:sldMk cId="3964110441" sldId="258"/>
+            <ac:spMk id="36" creationId="{BA4C5437-838C-45F6-BFC8-3AF0ADE30FFB}"/>
+          </ac:spMkLst>
+        </pc:spChg>
+        <pc:spChg chg="add del">
+          <ac:chgData name="Bryan Khuu" userId="db4bb5bc1a416b49" providerId="Windows Live" clId="Web-{5E92D238-FBDD-49B1-A334-FD695E37C85F}" dt="2020-05-09T21:12:35.334" v="38"/>
+          <ac:spMkLst>
+            <pc:docMk/>
+            <pc:sldMk cId="3964110441" sldId="258"/>
+            <ac:spMk id="37" creationId="{5D7CC766-DF6B-4E3F-8101-8D5F35D4AFFB}"/>
+          </ac:spMkLst>
+        </pc:spChg>
+        <pc:spChg chg="add del">
+          <ac:chgData name="Bryan Khuu" userId="db4bb5bc1a416b49" providerId="Windows Live" clId="Web-{5E92D238-FBDD-49B1-A334-FD695E37C85F}" dt="2020-05-09T21:12:35.334" v="38"/>
+          <ac:spMkLst>
+            <pc:docMk/>
+            <pc:sldMk cId="3964110441" sldId="258"/>
+            <ac:spMk id="38" creationId="{FACBD493-E381-4822-8F8F-A4194DFDB109}"/>
+          </ac:spMkLst>
+        </pc:spChg>
+        <pc:spChg chg="add del">
+          <ac:chgData name="Bryan Khuu" userId="db4bb5bc1a416b49" providerId="Windows Live" clId="Web-{5E92D238-FBDD-49B1-A334-FD695E37C85F}" dt="2020-05-09T21:12:35.334" v="38"/>
+          <ac:spMkLst>
+            <pc:docMk/>
+            <pc:sldMk cId="3964110441" sldId="258"/>
+            <ac:spMk id="39" creationId="{2310D9BE-4AD2-4CC3-84FA-4E05790B5B9F}"/>
+          </ac:spMkLst>
+        </pc:spChg>
+        <pc:spChg chg="add del">
+          <ac:chgData name="Bryan Khuu" userId="db4bb5bc1a416b49" providerId="Windows Live" clId="Web-{5E92D238-FBDD-49B1-A334-FD695E37C85F}" dt="2020-05-09T21:12:40.881" v="40"/>
+          <ac:spMkLst>
+            <pc:docMk/>
+            <pc:sldMk cId="3964110441" sldId="258"/>
+            <ac:spMk id="40" creationId="{7B9607E2-1C76-424B-8FF0-580615846EC0}"/>
+          </ac:spMkLst>
+        </pc:spChg>
+        <pc:spChg chg="add del">
+          <ac:chgData name="Bryan Khuu" userId="db4bb5bc1a416b49" providerId="Windows Live" clId="Web-{5E92D238-FBDD-49B1-A334-FD695E37C85F}" dt="2020-05-09T21:12:40.881" v="40"/>
+          <ac:spMkLst>
+            <pc:docMk/>
+            <pc:sldMk cId="3964110441" sldId="258"/>
+            <ac:spMk id="41" creationId="{56A668AF-CC37-4641-8D2B-4C91B3ACBC81}"/>
+          </ac:spMkLst>
+        </pc:spChg>
+        <pc:spChg chg="add del">
+          <ac:chgData name="Bryan Khuu" userId="db4bb5bc1a416b49" providerId="Windows Live" clId="Web-{5E92D238-FBDD-49B1-A334-FD695E37C85F}" dt="2020-05-09T21:12:40.881" v="40"/>
+          <ac:spMkLst>
+            <pc:docMk/>
+            <pc:sldMk cId="3964110441" sldId="258"/>
+            <ac:spMk id="42" creationId="{5B3165DC-54F4-4EF5-8B97-5BE55AA3DBE9}"/>
+          </ac:spMkLst>
+        </pc:spChg>
+        <pc:spChg chg="add del">
+          <ac:chgData name="Bryan Khuu" userId="db4bb5bc1a416b49" providerId="Windows Live" clId="Web-{5E92D238-FBDD-49B1-A334-FD695E37C85F}" dt="2020-05-09T21:12:43.272" v="42"/>
+          <ac:spMkLst>
+            <pc:docMk/>
+            <pc:sldMk cId="3964110441" sldId="258"/>
+            <ac:spMk id="43" creationId="{7D587F9F-3F48-4929-8532-62B82B3F66BE}"/>
+          </ac:spMkLst>
+        </pc:spChg>
+        <pc:spChg chg="add del">
+          <ac:chgData name="Bryan Khuu" userId="db4bb5bc1a416b49" providerId="Windows Live" clId="Web-{5E92D238-FBDD-49B1-A334-FD695E37C85F}" dt="2020-05-09T21:12:43.272" v="42"/>
+          <ac:spMkLst>
+            <pc:docMk/>
+            <pc:sldMk cId="3964110441" sldId="258"/>
+            <ac:spMk id="44" creationId="{6DCB66B2-3729-41B6-8A12-AB8550189D5E}"/>
+          </ac:spMkLst>
+        </pc:spChg>
+        <pc:spChg chg="add del">
+          <ac:chgData name="Bryan Khuu" userId="db4bb5bc1a416b49" providerId="Windows Live" clId="Web-{5E92D238-FBDD-49B1-A334-FD695E37C85F}" dt="2020-05-09T21:12:43.272" v="42"/>
+          <ac:spMkLst>
+            <pc:docMk/>
+            <pc:sldMk cId="3964110441" sldId="258"/>
+            <ac:spMk id="45" creationId="{ABA662FB-3DC6-4E93-98AC-B84BA41F4859}"/>
+          </ac:spMkLst>
+        </pc:spChg>
+        <pc:spChg chg="add del">
+          <ac:chgData name="Bryan Khuu" userId="db4bb5bc1a416b49" providerId="Windows Live" clId="Web-{5E92D238-FBDD-49B1-A334-FD695E37C85F}" dt="2020-05-09T21:12:43.272" v="42"/>
+          <ac:spMkLst>
+            <pc:docMk/>
+            <pc:sldMk cId="3964110441" sldId="258"/>
+            <ac:spMk id="46" creationId="{FB9BE604-0CC0-41C8-9673-995F82DA0257}"/>
+          </ac:spMkLst>
+        </pc:spChg>
+        <pc:spChg chg="add del">
+          <ac:chgData name="Bryan Khuu" userId="db4bb5bc1a416b49" providerId="Windows Live" clId="Web-{5E92D238-FBDD-49B1-A334-FD695E37C85F}" dt="2020-05-09T21:12:43.272" v="42"/>
+          <ac:spMkLst>
+            <pc:docMk/>
+            <pc:sldMk cId="3964110441" sldId="258"/>
+            <ac:spMk id="47" creationId="{2036372A-822B-498E-AD05-6BE85743A094}"/>
+          </ac:spMkLst>
+        </pc:spChg>
+        <pc:spChg chg="add del">
+          <ac:chgData name="Bryan Khuu" userId="db4bb5bc1a416b49" providerId="Windows Live" clId="Web-{5E92D238-FBDD-49B1-A334-FD695E37C85F}" dt="2020-05-09T21:12:48.006" v="44"/>
+          <ac:spMkLst>
+            <pc:docMk/>
+            <pc:sldMk cId="3964110441" sldId="258"/>
+            <ac:spMk id="48" creationId="{674D2C94-67DA-49BC-B575-EB99BE0252F3}"/>
+          </ac:spMkLst>
+        </pc:spChg>
+        <pc:spChg chg="add del">
+          <ac:chgData name="Bryan Khuu" userId="db4bb5bc1a416b49" providerId="Windows Live" clId="Web-{5E92D238-FBDD-49B1-A334-FD695E37C85F}" dt="2020-05-09T21:12:48.006" v="44"/>
+          <ac:spMkLst>
+            <pc:docMk/>
+            <pc:sldMk cId="3964110441" sldId="258"/>
+            <ac:spMk id="49" creationId="{8B77C263-A9E4-4AED-A483-A008BF4989F3}"/>
+          </ac:spMkLst>
+        </pc:spChg>
+        <pc:spChg chg="add del">
+          <ac:chgData name="Bryan Khuu" userId="db4bb5bc1a416b49" providerId="Windows Live" clId="Web-{5E92D238-FBDD-49B1-A334-FD695E37C85F}" dt="2020-05-09T21:12:48.006" v="44"/>
+          <ac:spMkLst>
+            <pc:docMk/>
+            <pc:sldMk cId="3964110441" sldId="258"/>
+            <ac:spMk id="50" creationId="{9AB81589-5E2E-48A4-A999-0BBC893AC573}"/>
+          </ac:spMkLst>
+        </pc:spChg>
+        <pc:spChg chg="add del">
+          <ac:chgData name="Bryan Khuu" userId="db4bb5bc1a416b49" providerId="Windows Live" clId="Web-{5E92D238-FBDD-49B1-A334-FD695E37C85F}" dt="2020-05-09T21:12:48.006" v="44"/>
+          <ac:spMkLst>
+            <pc:docMk/>
+            <pc:sldMk cId="3964110441" sldId="258"/>
+            <ac:spMk id="51" creationId="{E66CAF34-A4FD-4846-A2D0-97CF10923F32}"/>
+          </ac:spMkLst>
+        </pc:spChg>
+        <pc:spChg chg="add del">
+          <ac:chgData name="Bryan Khuu" userId="db4bb5bc1a416b49" providerId="Windows Live" clId="Web-{5E92D238-FBDD-49B1-A334-FD695E37C85F}" dt="2020-05-09T21:12:55.897" v="46"/>
+          <ac:spMkLst>
+            <pc:docMk/>
+            <pc:sldMk cId="3964110441" sldId="258"/>
+            <ac:spMk id="52" creationId="{4088F942-5192-4329-9236-6B9F5E9E87C8}"/>
+          </ac:spMkLst>
+        </pc:spChg>
+        <pc:spChg chg="add del">
+          <ac:chgData name="Bryan Khuu" userId="db4bb5bc1a416b49" providerId="Windows Live" clId="Web-{5E92D238-FBDD-49B1-A334-FD695E37C85F}" dt="2020-05-09T21:12:55.897" v="46"/>
+          <ac:spMkLst>
+            <pc:docMk/>
+            <pc:sldMk cId="3964110441" sldId="258"/>
+            <ac:spMk id="53" creationId="{6DBBC3F0-E4D5-4DC9-9156-6592F510E7D0}"/>
+          </ac:spMkLst>
+        </pc:spChg>
+        <pc:spChg chg="add del">
+          <ac:chgData name="Bryan Khuu" userId="db4bb5bc1a416b49" providerId="Windows Live" clId="Web-{5E92D238-FBDD-49B1-A334-FD695E37C85F}" dt="2020-05-09T21:12:55.897" v="46"/>
+          <ac:spMkLst>
+            <pc:docMk/>
+            <pc:sldMk cId="3964110441" sldId="258"/>
+            <ac:spMk id="54" creationId="{25440DE7-FEC3-4B33-BE37-CA1D6793F833}"/>
+          </ac:spMkLst>
+        </pc:spChg>
+        <pc:spChg chg="add del">
+          <ac:chgData name="Bryan Khuu" userId="db4bb5bc1a416b49" providerId="Windows Live" clId="Web-{5E92D238-FBDD-49B1-A334-FD695E37C85F}" dt="2020-05-09T21:13:04.522" v="48"/>
+          <ac:spMkLst>
+            <pc:docMk/>
+            <pc:sldMk cId="3964110441" sldId="258"/>
+            <ac:spMk id="55" creationId="{8AA1D43A-9C3D-41BA-BD9F-EF7EC7B2F076}"/>
+          </ac:spMkLst>
+        </pc:spChg>
+        <pc:spChg chg="add del">
+          <ac:chgData name="Bryan Khuu" userId="db4bb5bc1a416b49" providerId="Windows Live" clId="Web-{5E92D238-FBDD-49B1-A334-FD695E37C85F}" dt="2020-05-09T21:13:04.522" v="48"/>
+          <ac:spMkLst>
+            <pc:docMk/>
+            <pc:sldMk cId="3964110441" sldId="258"/>
+            <ac:spMk id="56" creationId="{0477181B-208D-49EE-AEEF-79DAF8BA73E1}"/>
+          </ac:spMkLst>
+        </pc:spChg>
+        <pc:spChg chg="add del">
+          <ac:chgData name="Bryan Khuu" userId="db4bb5bc1a416b49" providerId="Windows Live" clId="Web-{5E92D238-FBDD-49B1-A334-FD695E37C85F}" dt="2020-05-09T21:13:04.522" v="48"/>
+          <ac:spMkLst>
+            <pc:docMk/>
+            <pc:sldMk cId="3964110441" sldId="258"/>
+            <ac:spMk id="57" creationId="{83BFAA97-C464-45F7-995A-E13D0B4FC673}"/>
+          </ac:spMkLst>
+        </pc:spChg>
+        <pc:spChg chg="add del">
+          <ac:chgData name="Bryan Khuu" userId="db4bb5bc1a416b49" providerId="Windows Live" clId="Web-{5E92D238-FBDD-49B1-A334-FD695E37C85F}" dt="2020-05-09T21:13:04.522" v="48"/>
+          <ac:spMkLst>
+            <pc:docMk/>
+            <pc:sldMk cId="3964110441" sldId="258"/>
+            <ac:spMk id="58" creationId="{EC059808-0DA1-4E66-92F6-60C8B25B4D6B}"/>
+          </ac:spMkLst>
+        </pc:spChg>
+        <pc:spChg chg="add del">
+          <ac:chgData name="Bryan Khuu" userId="db4bb5bc1a416b49" providerId="Windows Live" clId="Web-{5E92D238-FBDD-49B1-A334-FD695E37C85F}" dt="2020-05-09T21:13:04.522" v="48"/>
+          <ac:spMkLst>
+            <pc:docMk/>
+            <pc:sldMk cId="3964110441" sldId="258"/>
+            <ac:spMk id="59" creationId="{45386504-CADE-4AFE-AF4F-0616BA69A7BA}"/>
+          </ac:spMkLst>
+        </pc:spChg>
+        <pc:spChg chg="add del">
+          <ac:chgData name="Bryan Khuu" userId="db4bb5bc1a416b49" providerId="Windows Live" clId="Web-{5E92D238-FBDD-49B1-A334-FD695E37C85F}" dt="2020-05-09T21:14:37.288" v="71"/>
+          <ac:spMkLst>
+            <pc:docMk/>
+            <pc:sldMk cId="3964110441" sldId="258"/>
+            <ac:spMk id="60" creationId="{2310D9BE-4AD2-4CC3-84FA-4E05790B5B9F}"/>
+          </ac:spMkLst>
+        </pc:spChg>
+        <pc:spChg chg="add del">
+          <ac:chgData name="Bryan Khuu" userId="db4bb5bc1a416b49" providerId="Windows Live" clId="Web-{5E92D238-FBDD-49B1-A334-FD695E37C85F}" dt="2020-05-09T21:14:37.288" v="71"/>
+          <ac:spMkLst>
+            <pc:docMk/>
+            <pc:sldMk cId="3964110441" sldId="258"/>
+            <ac:spMk id="61" creationId="{5D7CC766-DF6B-4E3F-8101-8D5F35D4AFFB}"/>
+          </ac:spMkLst>
+        </pc:spChg>
+        <pc:spChg chg="add del">
+          <ac:chgData name="Bryan Khuu" userId="db4bb5bc1a416b49" providerId="Windows Live" clId="Web-{5E92D238-FBDD-49B1-A334-FD695E37C85F}" dt="2020-05-09T21:14:16.413" v="60"/>
+          <ac:spMkLst>
+            <pc:docMk/>
+            <pc:sldMk cId="3964110441" sldId="258"/>
+            <ac:spMk id="63" creationId="{B8D39262-9511-4F20-8344-1B9DA68877A8}"/>
+          </ac:spMkLst>
+        </pc:spChg>
+        <pc:spChg chg="add del">
+          <ac:chgData name="Bryan Khuu" userId="db4bb5bc1a416b49" providerId="Windows Live" clId="Web-{5E92D238-FBDD-49B1-A334-FD695E37C85F}" dt="2020-05-09T21:14:16.413" v="60"/>
+          <ac:spMkLst>
+            <pc:docMk/>
+            <pc:sldMk cId="3964110441" sldId="258"/>
+            <ac:spMk id="64" creationId="{4F924495-5138-4BB6-B18C-C83EC04341D6}"/>
+          </ac:spMkLst>
+        </pc:spChg>
+        <pc:spChg chg="add del">
+          <ac:chgData name="Bryan Khuu" userId="db4bb5bc1a416b49" providerId="Windows Live" clId="Web-{5E92D238-FBDD-49B1-A334-FD695E37C85F}" dt="2020-05-09T21:14:16.413" v="60"/>
+          <ac:spMkLst>
+            <pc:docMk/>
+            <pc:sldMk cId="3964110441" sldId="258"/>
+            <ac:spMk id="65" creationId="{428AFF86-4DDC-4A60-AC4C-48C6DAE56894}"/>
+          </ac:spMkLst>
+        </pc:spChg>
+        <pc:spChg chg="add del">
+          <ac:chgData name="Bryan Khuu" userId="db4bb5bc1a416b49" providerId="Windows Live" clId="Web-{5E92D238-FBDD-49B1-A334-FD695E37C85F}" dt="2020-05-09T21:14:15.134" v="58"/>
+          <ac:spMkLst>
+            <pc:docMk/>
+            <pc:sldMk cId="3964110441" sldId="258"/>
+            <ac:spMk id="66" creationId="{BA4C5437-838C-45F6-BFC8-3AF0ADE30FFB}"/>
+          </ac:spMkLst>
+        </pc:spChg>
+        <pc:spChg chg="add del">
+          <ac:chgData name="Bryan Khuu" userId="db4bb5bc1a416b49" providerId="Windows Live" clId="Web-{5E92D238-FBDD-49B1-A334-FD695E37C85F}" dt="2020-05-09T21:14:17.538" v="62"/>
+          <ac:spMkLst>
+            <pc:docMk/>
+            <pc:sldMk cId="3964110441" sldId="258"/>
+            <ac:spMk id="67" creationId="{1660E788-AFA9-4A1B-9991-6AA74632A15B}"/>
+          </ac:spMkLst>
+        </pc:spChg>
+        <pc:spChg chg="add del">
+          <ac:chgData name="Bryan Khuu" userId="db4bb5bc1a416b49" providerId="Windows Live" clId="Web-{5E92D238-FBDD-49B1-A334-FD695E37C85F}" dt="2020-05-09T21:14:15.134" v="58"/>
+          <ac:spMkLst>
+            <pc:docMk/>
+            <pc:sldMk cId="3964110441" sldId="258"/>
+            <ac:spMk id="68" creationId="{FACBD493-E381-4822-8F8F-A4194DFDB109}"/>
+          </ac:spMkLst>
+        </pc:spChg>
+        <pc:spChg chg="add del">
+          <ac:chgData name="Bryan Khuu" userId="db4bb5bc1a416b49" providerId="Windows Live" clId="Web-{5E92D238-FBDD-49B1-A334-FD695E37C85F}" dt="2020-05-09T21:14:17.538" v="62"/>
+          <ac:spMkLst>
+            <pc:docMk/>
+            <pc:sldMk cId="3964110441" sldId="258"/>
+            <ac:spMk id="69" creationId="{867D4867-5BA7-4462-B2F6-A23F4A622AA7}"/>
+          </ac:spMkLst>
+        </pc:spChg>
+        <pc:spChg chg="add del">
+          <ac:chgData name="Bryan Khuu" userId="db4bb5bc1a416b49" providerId="Windows Live" clId="Web-{5E92D238-FBDD-49B1-A334-FD695E37C85F}" dt="2020-05-09T21:14:15.134" v="58"/>
+          <ac:spMkLst>
+            <pc:docMk/>
+            <pc:sldMk cId="3964110441" sldId="258"/>
+            <ac:spMk id="70" creationId="{2310D9BE-4AD2-4CC3-84FA-4E05790B5B9F}"/>
+          </ac:spMkLst>
+        </pc:spChg>
+        <pc:spChg chg="add del">
+          <ac:chgData name="Bryan Khuu" userId="db4bb5bc1a416b49" providerId="Windows Live" clId="Web-{5E92D238-FBDD-49B1-A334-FD695E37C85F}" dt="2020-05-09T21:14:20.288" v="64"/>
+          <ac:spMkLst>
+            <pc:docMk/>
+            <pc:sldMk cId="3964110441" sldId="258"/>
+            <ac:spMk id="71" creationId="{7B9607E2-1C76-424B-8FF0-580615846EC0}"/>
+          </ac:spMkLst>
+        </pc:spChg>
+        <pc:spChg chg="add del">
+          <ac:chgData name="Bryan Khuu" userId="db4bb5bc1a416b49" providerId="Windows Live" clId="Web-{5E92D238-FBDD-49B1-A334-FD695E37C85F}" dt="2020-05-09T21:14:15.134" v="58"/>
+          <ac:spMkLst>
+            <pc:docMk/>
+            <pc:sldMk cId="3964110441" sldId="258"/>
+            <ac:spMk id="72" creationId="{5D7CC766-DF6B-4E3F-8101-8D5F35D4AFFB}"/>
+          </ac:spMkLst>
+        </pc:spChg>
+        <pc:spChg chg="add del">
+          <ac:chgData name="Bryan Khuu" userId="db4bb5bc1a416b49" providerId="Windows Live" clId="Web-{5E92D238-FBDD-49B1-A334-FD695E37C85F}" dt="2020-05-09T21:14:20.288" v="64"/>
+          <ac:spMkLst>
+            <pc:docMk/>
+            <pc:sldMk cId="3964110441" sldId="258"/>
+            <ac:spMk id="73" creationId="{56A668AF-CC37-4641-8D2B-4C91B3ACBC81}"/>
+          </ac:spMkLst>
+        </pc:spChg>
+        <pc:spChg chg="add del">
+          <ac:chgData name="Bryan Khuu" userId="db4bb5bc1a416b49" providerId="Windows Live" clId="Web-{5E92D238-FBDD-49B1-A334-FD695E37C85F}" dt="2020-05-09T21:14:20.288" v="64"/>
+          <ac:spMkLst>
+            <pc:docMk/>
+            <pc:sldMk cId="3964110441" sldId="258"/>
+            <ac:spMk id="74" creationId="{5B3165DC-54F4-4EF5-8B97-5BE55AA3DBE9}"/>
+          </ac:spMkLst>
+        </pc:spChg>
+        <pc:spChg chg="add del">
+          <ac:chgData name="Bryan Khuu" userId="db4bb5bc1a416b49" providerId="Windows Live" clId="Web-{5E92D238-FBDD-49B1-A334-FD695E37C85F}" dt="2020-05-09T21:14:25.882" v="66"/>
+          <ac:spMkLst>
+            <pc:docMk/>
+            <pc:sldMk cId="3964110441" sldId="258"/>
+            <ac:spMk id="75" creationId="{98D49316-27CF-4C3D-BE8C-042F06B89148}"/>
+          </ac:spMkLst>
+        </pc:spChg>
+        <pc:spChg chg="add del">
+          <ac:chgData name="Bryan Khuu" userId="db4bb5bc1a416b49" providerId="Windows Live" clId="Web-{5E92D238-FBDD-49B1-A334-FD695E37C85F}" dt="2020-05-09T21:14:30.944" v="68"/>
+          <ac:spMkLst>
+            <pc:docMk/>
+            <pc:sldMk cId="3964110441" sldId="258"/>
+            <ac:spMk id="76" creationId="{930BC020-BDBF-49EB-9898-BAB5BF559317}"/>
+          </ac:spMkLst>
+        </pc:spChg>
+        <pc:spChg chg="add del">
+          <ac:chgData name="Bryan Khuu" userId="db4bb5bc1a416b49" providerId="Windows Live" clId="Web-{5E92D238-FBDD-49B1-A334-FD695E37C85F}" dt="2020-05-09T21:14:30.944" v="68"/>
+          <ac:spMkLst>
+            <pc:docMk/>
+            <pc:sldMk cId="3964110441" sldId="258"/>
+            <ac:spMk id="77" creationId="{64950C64-5D81-40F1-9601-8BA0D63BAE74}"/>
+          </ac:spMkLst>
+        </pc:spChg>
+        <pc:spChg chg="add del">
+          <ac:chgData name="Bryan Khuu" userId="db4bb5bc1a416b49" providerId="Windows Live" clId="Web-{5E92D238-FBDD-49B1-A334-FD695E37C85F}" dt="2020-05-09T21:14:37.288" v="70"/>
+          <ac:spMkLst>
+            <pc:docMk/>
+            <pc:sldMk cId="3964110441" sldId="258"/>
+            <ac:spMk id="78" creationId="{98D49316-27CF-4C3D-BE8C-042F06B89148}"/>
+          </ac:spMkLst>
+        </pc:spChg>
+        <pc:spChg chg="add del">
+          <ac:chgData name="Bryan Khuu" userId="db4bb5bc1a416b49" providerId="Windows Live" clId="Web-{5E92D238-FBDD-49B1-A334-FD695E37C85F}" dt="2020-05-09T21:15:17.116" v="80"/>
+          <ac:spMkLst>
+            <pc:docMk/>
+            <pc:sldMk cId="3964110441" sldId="258"/>
+            <ac:spMk id="79" creationId="{BA4C5437-838C-45F6-BFC8-3AF0ADE30FFB}"/>
+          </ac:spMkLst>
+        </pc:spChg>
+        <pc:spChg chg="add del">
+          <ac:chgData name="Bryan Khuu" userId="db4bb5bc1a416b49" providerId="Windows Live" clId="Web-{5E92D238-FBDD-49B1-A334-FD695E37C85F}" dt="2020-05-09T21:15:17.116" v="80"/>
+          <ac:spMkLst>
+            <pc:docMk/>
+            <pc:sldMk cId="3964110441" sldId="258"/>
+            <ac:spMk id="80" creationId="{FACBD493-E381-4822-8F8F-A4194DFDB109}"/>
+          </ac:spMkLst>
+        </pc:spChg>
+        <pc:spChg chg="add del">
+          <ac:chgData name="Bryan Khuu" userId="db4bb5bc1a416b49" providerId="Windows Live" clId="Web-{5E92D238-FBDD-49B1-A334-FD695E37C85F}" dt="2020-05-09T21:15:17.116" v="80"/>
+          <ac:spMkLst>
+            <pc:docMk/>
+            <pc:sldMk cId="3964110441" sldId="258"/>
+            <ac:spMk id="81" creationId="{2310D9BE-4AD2-4CC3-84FA-4E05790B5B9F}"/>
+          </ac:spMkLst>
+        </pc:spChg>
+        <pc:spChg chg="add del">
+          <ac:chgData name="Bryan Khuu" userId="db4bb5bc1a416b49" providerId="Windows Live" clId="Web-{5E92D238-FBDD-49B1-A334-FD695E37C85F}" dt="2020-05-09T21:15:17.116" v="80"/>
+          <ac:spMkLst>
+            <pc:docMk/>
+            <pc:sldMk cId="3964110441" sldId="258"/>
+            <ac:spMk id="82" creationId="{5D7CC766-DF6B-4E3F-8101-8D5F35D4AFFB}"/>
+          </ac:spMkLst>
+        </pc:spChg>
+        <pc:spChg chg="add del">
+          <ac:chgData name="Bryan Khuu" userId="db4bb5bc1a416b49" providerId="Windows Live" clId="Web-{5E92D238-FBDD-49B1-A334-FD695E37C85F}" dt="2020-05-09T21:15:35.334" v="88"/>
+          <ac:spMkLst>
+            <pc:docMk/>
+            <pc:sldMk cId="3964110441" sldId="258"/>
+            <ac:spMk id="87" creationId="{98D49316-27CF-4C3D-BE8C-042F06B89148}"/>
+          </ac:spMkLst>
+        </pc:spChg>
+        <pc:spChg chg="add del">
+          <ac:chgData name="Bryan Khuu" userId="db4bb5bc1a416b49" providerId="Windows Live" clId="Web-{5E92D238-FBDD-49B1-A334-FD695E37C85F}" dt="2020-05-09T21:15:33.131" v="85"/>
+          <ac:spMkLst>
+            <pc:docMk/>
+            <pc:sldMk cId="3964110441" sldId="258"/>
+            <ac:spMk id="89" creationId="{98D49316-27CF-4C3D-BE8C-042F06B89148}"/>
+          </ac:spMkLst>
+        </pc:spChg>
+        <pc:spChg chg="add del">
+          <ac:chgData name="Bryan Khuu" userId="db4bb5bc1a416b49" providerId="Windows Live" clId="Web-{5E92D238-FBDD-49B1-A334-FD695E37C85F}" dt="2020-05-09T21:15:35.319" v="87"/>
+          <ac:spMkLst>
+            <pc:docMk/>
+            <pc:sldMk cId="3964110441" sldId="258"/>
+            <ac:spMk id="90" creationId="{BA4C5437-838C-45F6-BFC8-3AF0ADE30FFB}"/>
+          </ac:spMkLst>
+        </pc:spChg>
+        <pc:spChg chg="add del">
+          <ac:chgData name="Bryan Khuu" userId="db4bb5bc1a416b49" providerId="Windows Live" clId="Web-{5E92D238-FBDD-49B1-A334-FD695E37C85F}" dt="2020-05-09T21:15:35.319" v="87"/>
+          <ac:spMkLst>
+            <pc:docMk/>
+            <pc:sldMk cId="3964110441" sldId="258"/>
+            <ac:spMk id="91" creationId="{FACBD493-E381-4822-8F8F-A4194DFDB109}"/>
+          </ac:spMkLst>
+        </pc:spChg>
+        <pc:spChg chg="add del">
+          <ac:chgData name="Bryan Khuu" userId="db4bb5bc1a416b49" providerId="Windows Live" clId="Web-{5E92D238-FBDD-49B1-A334-FD695E37C85F}" dt="2020-05-09T21:15:30.069" v="83"/>
+          <ac:spMkLst>
+            <pc:docMk/>
+            <pc:sldMk cId="3964110441" sldId="258"/>
+            <ac:spMk id="92" creationId="{7B9607E2-1C76-424B-8FF0-580615846EC0}"/>
+          </ac:spMkLst>
+        </pc:spChg>
+        <pc:spChg chg="add del">
+          <ac:chgData name="Bryan Khuu" userId="db4bb5bc1a416b49" providerId="Windows Live" clId="Web-{5E92D238-FBDD-49B1-A334-FD695E37C85F}" dt="2020-05-09T21:15:35.319" v="87"/>
+          <ac:spMkLst>
+            <pc:docMk/>
+            <pc:sldMk cId="3964110441" sldId="258"/>
+            <ac:spMk id="93" creationId="{2310D9BE-4AD2-4CC3-84FA-4E05790B5B9F}"/>
+          </ac:spMkLst>
+        </pc:spChg>
+        <pc:spChg chg="add del">
+          <ac:chgData name="Bryan Khuu" userId="db4bb5bc1a416b49" providerId="Windows Live" clId="Web-{5E92D238-FBDD-49B1-A334-FD695E37C85F}" dt="2020-05-09T21:15:30.069" v="83"/>
+          <ac:spMkLst>
+            <pc:docMk/>
+            <pc:sldMk cId="3964110441" sldId="258"/>
+            <ac:spMk id="94" creationId="{56A668AF-CC37-4641-8D2B-4C91B3ACBC81}"/>
+          </ac:spMkLst>
+        </pc:spChg>
+        <pc:spChg chg="add del">
+          <ac:chgData name="Bryan Khuu" userId="db4bb5bc1a416b49" providerId="Windows Live" clId="Web-{5E92D238-FBDD-49B1-A334-FD695E37C85F}" dt="2020-05-09T21:15:42.803" v="90"/>
+          <ac:spMkLst>
+            <pc:docMk/>
+            <pc:sldMk cId="3964110441" sldId="258"/>
+            <ac:spMk id="95" creationId="{98D49316-27CF-4C3D-BE8C-042F06B89148}"/>
+          </ac:spMkLst>
+        </pc:spChg>
+        <pc:spChg chg="add del">
+          <ac:chgData name="Bryan Khuu" userId="db4bb5bc1a416b49" providerId="Windows Live" clId="Web-{5E92D238-FBDD-49B1-A334-FD695E37C85F}" dt="2020-05-09T21:15:30.069" v="83"/>
+          <ac:spMkLst>
+            <pc:docMk/>
+            <pc:sldMk cId="3964110441" sldId="258"/>
+            <ac:spMk id="96" creationId="{5B3165DC-54F4-4EF5-8B97-5BE55AA3DBE9}"/>
+          </ac:spMkLst>
+        </pc:spChg>
+        <pc:spChg chg="add del">
+          <ac:chgData name="Bryan Khuu" userId="db4bb5bc1a416b49" providerId="Windows Live" clId="Web-{5E92D238-FBDD-49B1-A334-FD695E37C85F}" dt="2020-05-09T21:17:52.397" v="117"/>
+          <ac:spMkLst>
+            <pc:docMk/>
+            <pc:sldMk cId="3964110441" sldId="258"/>
+            <ac:spMk id="97" creationId="{C315E612-C0A2-4395-B579-9D425FAAC183}"/>
+          </ac:spMkLst>
+        </pc:spChg>
+        <pc:spChg chg="add del">
+          <ac:chgData name="Bryan Khuu" userId="db4bb5bc1a416b49" providerId="Windows Live" clId="Web-{5E92D238-FBDD-49B1-A334-FD695E37C85F}" dt="2020-05-09T21:15:35.319" v="87"/>
+          <ac:spMkLst>
+            <pc:docMk/>
+            <pc:sldMk cId="3964110441" sldId="258"/>
+            <ac:spMk id="98" creationId="{5D7CC766-DF6B-4E3F-8101-8D5F35D4AFFB}"/>
+          </ac:spMkLst>
+        </pc:spChg>
+        <pc:spChg chg="add del">
+          <ac:chgData name="Bryan Khuu" userId="db4bb5bc1a416b49" providerId="Windows Live" clId="Web-{5E92D238-FBDD-49B1-A334-FD695E37C85F}" dt="2020-05-09T21:17:20.131" v="106"/>
+          <ac:spMkLst>
+            <pc:docMk/>
+            <pc:sldMk cId="3964110441" sldId="258"/>
+            <ac:spMk id="100" creationId="{BA4C5437-838C-45F6-BFC8-3AF0ADE30FFB}"/>
+          </ac:spMkLst>
+        </pc:spChg>
+        <pc:spChg chg="add del">
+          <ac:chgData name="Bryan Khuu" userId="db4bb5bc1a416b49" providerId="Windows Live" clId="Web-{5E92D238-FBDD-49B1-A334-FD695E37C85F}" dt="2020-05-09T21:17:36.975" v="112"/>
+          <ac:spMkLst>
+            <pc:docMk/>
+            <pc:sldMk cId="3964110441" sldId="258"/>
+            <ac:spMk id="101" creationId="{A88B48CE-97F9-4924-96D2-BEAD09D4B7D3}"/>
+          </ac:spMkLst>
+        </pc:spChg>
+        <pc:spChg chg="add del">
+          <ac:chgData name="Bryan Khuu" userId="db4bb5bc1a416b49" providerId="Windows Live" clId="Web-{5E92D238-FBDD-49B1-A334-FD695E37C85F}" dt="2020-05-09T21:17:20.131" v="106"/>
+          <ac:spMkLst>
+            <pc:docMk/>
+            <pc:sldMk cId="3964110441" sldId="258"/>
+            <ac:spMk id="102" creationId="{FACBD493-E381-4822-8F8F-A4194DFDB109}"/>
+          </ac:spMkLst>
+        </pc:spChg>
+        <pc:spChg chg="add del">
+          <ac:chgData name="Bryan Khuu" userId="db4bb5bc1a416b49" providerId="Windows Live" clId="Web-{5E92D238-FBDD-49B1-A334-FD695E37C85F}" dt="2020-05-09T21:17:20.131" v="106"/>
+          <ac:spMkLst>
+            <pc:docMk/>
+            <pc:sldMk cId="3964110441" sldId="258"/>
+            <ac:spMk id="104" creationId="{2310D9BE-4AD2-4CC3-84FA-4E05790B5B9F}"/>
+          </ac:spMkLst>
+        </pc:spChg>
+        <pc:spChg chg="add del">
+          <ac:chgData name="Bryan Khuu" userId="db4bb5bc1a416b49" providerId="Windows Live" clId="Web-{5E92D238-FBDD-49B1-A334-FD695E37C85F}" dt="2020-05-09T21:17:39.663" v="114"/>
+          <ac:spMkLst>
+            <pc:docMk/>
+            <pc:sldMk cId="3964110441" sldId="258"/>
+            <ac:spMk id="105" creationId="{5E69A754-1A4C-4BC4-A2DD-34A040EFC65D}"/>
+          </ac:spMkLst>
+        </pc:spChg>
+        <pc:spChg chg="add del">
+          <ac:chgData name="Bryan Khuu" userId="db4bb5bc1a416b49" providerId="Windows Live" clId="Web-{5E92D238-FBDD-49B1-A334-FD695E37C85F}" dt="2020-05-09T21:17:20.131" v="106"/>
+          <ac:spMkLst>
+            <pc:docMk/>
+            <pc:sldMk cId="3964110441" sldId="258"/>
+            <ac:spMk id="106" creationId="{5D7CC766-DF6B-4E3F-8101-8D5F35D4AFFB}"/>
+          </ac:spMkLst>
+        </pc:spChg>
+        <pc:spChg chg="add del">
+          <ac:chgData name="Bryan Khuu" userId="db4bb5bc1a416b49" providerId="Windows Live" clId="Web-{5E92D238-FBDD-49B1-A334-FD695E37C85F}" dt="2020-05-09T21:17:10.179" v="103"/>
+          <ac:spMkLst>
+            <pc:docMk/>
+            <pc:sldMk cId="3964110441" sldId="258"/>
+            <ac:spMk id="108" creationId="{B8D39262-9511-4F20-8344-1B9DA68877A8}"/>
+          </ac:spMkLst>
+        </pc:spChg>
+        <pc:spChg chg="add del">
+          <ac:chgData name="Bryan Khuu" userId="db4bb5bc1a416b49" providerId="Windows Live" clId="Web-{5E92D238-FBDD-49B1-A334-FD695E37C85F}" dt="2020-05-09T21:17:10.179" v="103"/>
+          <ac:spMkLst>
+            <pc:docMk/>
+            <pc:sldMk cId="3964110441" sldId="258"/>
+            <ac:spMk id="109" creationId="{4F924495-5138-4BB6-B18C-C83EC04341D6}"/>
+          </ac:spMkLst>
+        </pc:spChg>
+        <pc:spChg chg="add del">
+          <ac:chgData name="Bryan Khuu" userId="db4bb5bc1a416b49" providerId="Windows Live" clId="Web-{5E92D238-FBDD-49B1-A334-FD695E37C85F}" dt="2020-05-09T21:17:10.179" v="103"/>
+          <ac:spMkLst>
+            <pc:docMk/>
+            <pc:sldMk cId="3964110441" sldId="258"/>
+            <ac:spMk id="110" creationId="{428AFF86-4DDC-4A60-AC4C-48C6DAE56894}"/>
+          </ac:spMkLst>
+        </pc:spChg>
+        <pc:spChg chg="add del">
+          <ac:chgData name="Bryan Khuu" userId="db4bb5bc1a416b49" providerId="Windows Live" clId="Web-{5E92D238-FBDD-49B1-A334-FD695E37C85F}" dt="2020-05-09T21:17:08.256" v="101"/>
+          <ac:spMkLst>
+            <pc:docMk/>
+            <pc:sldMk cId="3964110441" sldId="258"/>
+            <ac:spMk id="111" creationId="{BA4C5437-838C-45F6-BFC8-3AF0ADE30FFB}"/>
+          </ac:spMkLst>
+        </pc:spChg>
+        <pc:spChg chg="add del">
+          <ac:chgData name="Bryan Khuu" userId="db4bb5bc1a416b49" providerId="Windows Live" clId="Web-{5E92D238-FBDD-49B1-A334-FD695E37C85F}" dt="2020-05-09T21:17:20.116" v="105"/>
+          <ac:spMkLst>
+            <pc:docMk/>
+            <pc:sldMk cId="3964110441" sldId="258"/>
+            <ac:spMk id="112" creationId="{1660E788-AFA9-4A1B-9991-6AA74632A15B}"/>
+          </ac:spMkLst>
+        </pc:spChg>
+        <pc:spChg chg="add del">
+          <ac:chgData name="Bryan Khuu" userId="db4bb5bc1a416b49" providerId="Windows Live" clId="Web-{5E92D238-FBDD-49B1-A334-FD695E37C85F}" dt="2020-05-09T21:17:08.256" v="101"/>
+          <ac:spMkLst>
+            <pc:docMk/>
+            <pc:sldMk cId="3964110441" sldId="258"/>
+            <ac:spMk id="113" creationId="{FACBD493-E381-4822-8F8F-A4194DFDB109}"/>
+          </ac:spMkLst>
+        </pc:spChg>
+        <pc:spChg chg="add del">
+          <ac:chgData name="Bryan Khuu" userId="db4bb5bc1a416b49" providerId="Windows Live" clId="Web-{5E92D238-FBDD-49B1-A334-FD695E37C85F}" dt="2020-05-09T21:17:20.116" v="105"/>
+          <ac:spMkLst>
+            <pc:docMk/>
+            <pc:sldMk cId="3964110441" sldId="258"/>
+            <ac:spMk id="114" creationId="{867D4867-5BA7-4462-B2F6-A23F4A622AA7}"/>
+          </ac:spMkLst>
+        </pc:spChg>
+        <pc:spChg chg="add del">
+          <ac:chgData name="Bryan Khuu" userId="db4bb5bc1a416b49" providerId="Windows Live" clId="Web-{5E92D238-FBDD-49B1-A334-FD695E37C85F}" dt="2020-05-09T21:17:08.256" v="101"/>
+          <ac:spMkLst>
+            <pc:docMk/>
+            <pc:sldMk cId="3964110441" sldId="258"/>
+            <ac:spMk id="115" creationId="{2310D9BE-4AD2-4CC3-84FA-4E05790B5B9F}"/>
+          </ac:spMkLst>
+        </pc:spChg>
+        <pc:spChg chg="add del">
+          <ac:chgData name="Bryan Khuu" userId="db4bb5bc1a416b49" providerId="Windows Live" clId="Web-{5E92D238-FBDD-49B1-A334-FD695E37C85F}" dt="2020-05-09T21:20:12.710" v="154"/>
+          <ac:spMkLst>
+            <pc:docMk/>
+            <pc:sldMk cId="3964110441" sldId="258"/>
+            <ac:spMk id="116" creationId="{C315E612-C0A2-4395-B579-9D425FAAC183}"/>
+          </ac:spMkLst>
+        </pc:spChg>
+        <pc:spChg chg="add del">
+          <ac:chgData name="Bryan Khuu" userId="db4bb5bc1a416b49" providerId="Windows Live" clId="Web-{5E92D238-FBDD-49B1-A334-FD695E37C85F}" dt="2020-05-09T21:17:08.256" v="101"/>
+          <ac:spMkLst>
+            <pc:docMk/>
+            <pc:sldMk cId="3964110441" sldId="258"/>
+            <ac:spMk id="117" creationId="{5D7CC766-DF6B-4E3F-8101-8D5F35D4AFFB}"/>
+          </ac:spMkLst>
+        </pc:spChg>
+        <pc:spChg chg="add del">
+          <ac:chgData name="Bryan Khuu" userId="db4bb5bc1a416b49" providerId="Windows Live" clId="Web-{5E92D238-FBDD-49B1-A334-FD695E37C85F}" dt="2020-05-09T21:20:11.444" v="153"/>
+          <ac:spMkLst>
+            <pc:docMk/>
+            <pc:sldMk cId="3964110441" sldId="258"/>
+            <ac:spMk id="119" creationId="{A88B48CE-97F9-4924-96D2-BEAD09D4B7D3}"/>
+          </ac:spMkLst>
+        </pc:spChg>
+        <pc:spChg chg="add del ord">
+          <ac:chgData name="Bryan Khuu" userId="db4bb5bc1a416b49" providerId="Windows Live" clId="Web-{5E92D238-FBDD-49B1-A334-FD695E37C85F}" dt="2020-05-09T21:20:45.819" v="166"/>
+          <ac:spMkLst>
+            <pc:docMk/>
+            <pc:sldMk cId="3964110441" sldId="258"/>
+            <ac:spMk id="121" creationId="{5E69A754-1A4C-4BC4-A2DD-34A040EFC65D}"/>
+          </ac:spMkLst>
+        </pc:spChg>
+        <pc:spChg chg="add del">
+          <ac:chgData name="Bryan Khuu" userId="db4bb5bc1a416b49" providerId="Windows Live" clId="Web-{5E92D238-FBDD-49B1-A334-FD695E37C85F}" dt="2020-05-09T21:20:23.600" v="158"/>
+          <ac:spMkLst>
+            <pc:docMk/>
+            <pc:sldMk cId="3964110441" sldId="258"/>
+            <ac:spMk id="124" creationId="{BA4C5437-838C-45F6-BFC8-3AF0ADE30FFB}"/>
+          </ac:spMkLst>
+        </pc:spChg>
+        <pc:spChg chg="add del">
+          <ac:chgData name="Bryan Khuu" userId="db4bb5bc1a416b49" providerId="Windows Live" clId="Web-{5E92D238-FBDD-49B1-A334-FD695E37C85F}" dt="2020-05-09T21:20:29.085" v="160"/>
+          <ac:spMkLst>
+            <pc:docMk/>
+            <pc:sldMk cId="3964110441" sldId="258"/>
+            <ac:spMk id="125" creationId="{1660E788-AFA9-4A1B-9991-6AA74632A15B}"/>
+          </ac:spMkLst>
+        </pc:spChg>
+        <pc:spChg chg="add del">
+          <ac:chgData name="Bryan Khuu" userId="db4bb5bc1a416b49" providerId="Windows Live" clId="Web-{5E92D238-FBDD-49B1-A334-FD695E37C85F}" dt="2020-05-09T21:20:29.085" v="160"/>
+          <ac:spMkLst>
+            <pc:docMk/>
+            <pc:sldMk cId="3964110441" sldId="258"/>
+            <ac:spMk id="126" creationId="{867D4867-5BA7-4462-B2F6-A23F4A622AA7}"/>
+          </ac:spMkLst>
+        </pc:spChg>
+        <pc:spChg chg="add del">
+          <ac:chgData name="Bryan Khuu" userId="db4bb5bc1a416b49" providerId="Windows Live" clId="Web-{5E92D238-FBDD-49B1-A334-FD695E37C85F}" dt="2020-05-09T21:20:22.647" v="156"/>
+          <ac:spMkLst>
+            <pc:docMk/>
+            <pc:sldMk cId="3964110441" sldId="258"/>
+            <ac:spMk id="127" creationId="{98D49316-27CF-4C3D-BE8C-042F06B89148}"/>
+          </ac:spMkLst>
+        </pc:spChg>
+        <pc:spChg chg="add del">
+          <ac:chgData name="Bryan Khuu" userId="db4bb5bc1a416b49" providerId="Windows Live" clId="Web-{5E92D238-FBDD-49B1-A334-FD695E37C85F}" dt="2020-05-09T21:20:35.381" v="162"/>
+          <ac:spMkLst>
+            <pc:docMk/>
+            <pc:sldMk cId="3964110441" sldId="258"/>
+            <ac:spMk id="128" creationId="{7D587F9F-3F48-4929-8532-62B82B3F66BE}"/>
+          </ac:spMkLst>
+        </pc:spChg>
+        <pc:spChg chg="add del">
+          <ac:chgData name="Bryan Khuu" userId="db4bb5bc1a416b49" providerId="Windows Live" clId="Web-{5E92D238-FBDD-49B1-A334-FD695E37C85F}" dt="2020-05-09T21:20:23.600" v="158"/>
+          <ac:spMkLst>
+            <pc:docMk/>
+            <pc:sldMk cId="3964110441" sldId="258"/>
+            <ac:spMk id="129" creationId="{FACBD493-E381-4822-8F8F-A4194DFDB109}"/>
+          </ac:spMkLst>
+        </pc:spChg>
+        <pc:spChg chg="add del">
+          <ac:chgData name="Bryan Khuu" userId="db4bb5bc1a416b49" providerId="Windows Live" clId="Web-{5E92D238-FBDD-49B1-A334-FD695E37C85F}" dt="2020-05-09T21:20:35.381" v="162"/>
+          <ac:spMkLst>
+            <pc:docMk/>
+            <pc:sldMk cId="3964110441" sldId="258"/>
+            <ac:spMk id="130" creationId="{6DCB66B2-3729-41B6-8A12-AB8550189D5E}"/>
+          </ac:spMkLst>
+        </pc:spChg>
+        <pc:spChg chg="add del">
+          <ac:chgData name="Bryan Khuu" userId="db4bb5bc1a416b49" providerId="Windows Live" clId="Web-{5E92D238-FBDD-49B1-A334-FD695E37C85F}" dt="2020-05-09T21:20:23.600" v="158"/>
+          <ac:spMkLst>
+            <pc:docMk/>
+            <pc:sldMk cId="3964110441" sldId="258"/>
+            <ac:spMk id="131" creationId="{2310D9BE-4AD2-4CC3-84FA-4E05790B5B9F}"/>
+          </ac:spMkLst>
+        </pc:spChg>
+        <pc:spChg chg="add del">
+          <ac:chgData name="Bryan Khuu" userId="db4bb5bc1a416b49" providerId="Windows Live" clId="Web-{5E92D238-FBDD-49B1-A334-FD695E37C85F}" dt="2020-05-09T21:20:35.381" v="162"/>
+          <ac:spMkLst>
+            <pc:docMk/>
+            <pc:sldMk cId="3964110441" sldId="258"/>
+            <ac:spMk id="132" creationId="{ABA662FB-3DC6-4E93-98AC-B84BA41F4859}"/>
+          </ac:spMkLst>
+        </pc:spChg>
+        <pc:spChg chg="add del">
+          <ac:chgData name="Bryan Khuu" userId="db4bb5bc1a416b49" providerId="Windows Live" clId="Web-{5E92D238-FBDD-49B1-A334-FD695E37C85F}" dt="2020-05-09T21:20:23.600" v="158"/>
+          <ac:spMkLst>
+            <pc:docMk/>
+            <pc:sldMk cId="3964110441" sldId="258"/>
+            <ac:spMk id="133" creationId="{5D7CC766-DF6B-4E3F-8101-8D5F35D4AFFB}"/>
+          </ac:spMkLst>
+        </pc:spChg>
+        <pc:spChg chg="add del">
+          <ac:chgData name="Bryan Khuu" userId="db4bb5bc1a416b49" providerId="Windows Live" clId="Web-{5E92D238-FBDD-49B1-A334-FD695E37C85F}" dt="2020-05-09T21:20:35.381" v="162"/>
+          <ac:spMkLst>
+            <pc:docMk/>
+            <pc:sldMk cId="3964110441" sldId="258"/>
+            <ac:spMk id="134" creationId="{FB9BE604-0CC0-41C8-9673-995F82DA0257}"/>
+          </ac:spMkLst>
+        </pc:spChg>
+        <pc:spChg chg="add del">
+          <ac:chgData name="Bryan Khuu" userId="db4bb5bc1a416b49" providerId="Windows Live" clId="Web-{5E92D238-FBDD-49B1-A334-FD695E37C85F}" dt="2020-05-09T21:20:35.381" v="162"/>
+          <ac:spMkLst>
+            <pc:docMk/>
+            <pc:sldMk cId="3964110441" sldId="258"/>
+            <ac:spMk id="135" creationId="{2036372A-822B-498E-AD05-6BE85743A094}"/>
+          </ac:spMkLst>
+        </pc:spChg>
+        <pc:spChg chg="add del">
+          <ac:chgData name="Bryan Khuu" userId="db4bb5bc1a416b49" providerId="Windows Live" clId="Web-{5E92D238-FBDD-49B1-A334-FD695E37C85F}" dt="2020-05-09T21:20:38.930" v="164"/>
+          <ac:spMkLst>
+            <pc:docMk/>
+            <pc:sldMk cId="3964110441" sldId="258"/>
+            <ac:spMk id="136" creationId="{1660E788-AFA9-4A1B-9991-6AA74632A15B}"/>
+          </ac:spMkLst>
+        </pc:spChg>
+        <pc:spChg chg="add del">
+          <ac:chgData name="Bryan Khuu" userId="db4bb5bc1a416b49" providerId="Windows Live" clId="Web-{5E92D238-FBDD-49B1-A334-FD695E37C85F}" dt="2020-05-09T21:20:38.930" v="164"/>
+          <ac:spMkLst>
+            <pc:docMk/>
+            <pc:sldMk cId="3964110441" sldId="258"/>
+            <ac:spMk id="137" creationId="{867D4867-5BA7-4462-B2F6-A23F4A622AA7}"/>
+          </ac:spMkLst>
+        </pc:spChg>
+        <pc:spChg chg="add del">
+          <ac:chgData name="Bryan Khuu" userId="db4bb5bc1a416b49" providerId="Windows Live" clId="Web-{5E92D238-FBDD-49B1-A334-FD695E37C85F}" dt="2020-05-09T21:21:04.881" v="170"/>
+          <ac:spMkLst>
+            <pc:docMk/>
+            <pc:sldMk cId="3964110441" sldId="258"/>
+            <ac:spMk id="138" creationId="{98D49316-27CF-4C3D-BE8C-042F06B89148}"/>
+          </ac:spMkLst>
+        </pc:spChg>
+        <pc:spChg chg="add del">
+          <ac:chgData name="Bryan Khuu" userId="db4bb5bc1a416b49" providerId="Windows Live" clId="Web-{5E92D238-FBDD-49B1-A334-FD695E37C85F}" dt="2020-05-09T21:21:14.991" v="172"/>
+          <ac:spMkLst>
+            <pc:docMk/>
+            <pc:sldMk cId="3964110441" sldId="258"/>
+            <ac:spMk id="139" creationId="{7B9607E2-1C76-424B-8FF0-580615846EC0}"/>
+          </ac:spMkLst>
+        </pc:spChg>
+        <pc:spChg chg="add del">
+          <ac:chgData name="Bryan Khuu" userId="db4bb5bc1a416b49" providerId="Windows Live" clId="Web-{5E92D238-FBDD-49B1-A334-FD695E37C85F}" dt="2020-05-09T21:21:14.991" v="172"/>
+          <ac:spMkLst>
+            <pc:docMk/>
+            <pc:sldMk cId="3964110441" sldId="258"/>
+            <ac:spMk id="140" creationId="{56A668AF-CC37-4641-8D2B-4C91B3ACBC81}"/>
+          </ac:spMkLst>
+        </pc:spChg>
+        <pc:spChg chg="add del">
+          <ac:chgData name="Bryan Khuu" userId="db4bb5bc1a416b49" providerId="Windows Live" clId="Web-{5E92D238-FBDD-49B1-A334-FD695E37C85F}" dt="2020-05-09T21:21:14.991" v="172"/>
+          <ac:spMkLst>
+            <pc:docMk/>
+            <pc:sldMk cId="3964110441" sldId="258"/>
+            <ac:spMk id="141" creationId="{5B3165DC-54F4-4EF5-8B97-5BE55AA3DBE9}"/>
+          </ac:spMkLst>
+        </pc:spChg>
+        <pc:spChg chg="add del">
+          <ac:chgData name="Bryan Khuu" userId="db4bb5bc1a416b49" providerId="Windows Live" clId="Web-{5E92D238-FBDD-49B1-A334-FD695E37C85F}" dt="2020-05-09T21:21:18.569" v="174"/>
+          <ac:spMkLst>
+            <pc:docMk/>
+            <pc:sldMk cId="3964110441" sldId="258"/>
+            <ac:spMk id="142" creationId="{1660E788-AFA9-4A1B-9991-6AA74632A15B}"/>
+          </ac:spMkLst>
+        </pc:spChg>
+        <pc:spChg chg="add del">
+          <ac:chgData name="Bryan Khuu" userId="db4bb5bc1a416b49" providerId="Windows Live" clId="Web-{5E92D238-FBDD-49B1-A334-FD695E37C85F}" dt="2020-05-09T21:21:18.569" v="174"/>
+          <ac:spMkLst>
+            <pc:docMk/>
+            <pc:sldMk cId="3964110441" sldId="258"/>
+            <ac:spMk id="143" creationId="{867D4867-5BA7-4462-B2F6-A23F4A622AA7}"/>
+          </ac:spMkLst>
+        </pc:spChg>
+        <pc:spChg chg="add del">
+          <ac:chgData name="Bryan Khuu" userId="db4bb5bc1a416b49" providerId="Windows Live" clId="Web-{5E92D238-FBDD-49B1-A334-FD695E37C85F}" dt="2020-05-09T21:23:06.803" v="192"/>
+          <ac:spMkLst>
+            <pc:docMk/>
+            <pc:sldMk cId="3964110441" sldId="258"/>
+            <ac:spMk id="144" creationId="{98D49316-27CF-4C3D-BE8C-042F06B89148}"/>
+          </ac:spMkLst>
+        </pc:spChg>
+        <pc:spChg chg="add del">
+          <ac:chgData name="Bryan Khuu" userId="db4bb5bc1a416b49" providerId="Windows Live" clId="Web-{5E92D238-FBDD-49B1-A334-FD695E37C85F}" dt="2020-05-09T21:22:56.585" v="189"/>
+          <ac:spMkLst>
+            <pc:docMk/>
+            <pc:sldMk cId="3964110441" sldId="258"/>
+            <ac:spMk id="146" creationId="{98D49316-27CF-4C3D-BE8C-042F06B89148}"/>
+          </ac:spMkLst>
+        </pc:spChg>
+        <pc:spChg chg="add del">
+          <ac:chgData name="Bryan Khuu" userId="db4bb5bc1a416b49" providerId="Windows Live" clId="Web-{5E92D238-FBDD-49B1-A334-FD695E37C85F}" dt="2020-05-09T21:23:39.960" v="204"/>
+          <ac:spMkLst>
+            <pc:docMk/>
+            <pc:sldMk cId="3964110441" sldId="258"/>
+            <ac:spMk id="148" creationId="{1660E788-AFA9-4A1B-9991-6AA74632A15B}"/>
+          </ac:spMkLst>
+        </pc:spChg>
+        <pc:spChg chg="add del">
+          <ac:chgData name="Bryan Khuu" userId="db4bb5bc1a416b49" providerId="Windows Live" clId="Web-{5E92D238-FBDD-49B1-A334-FD695E37C85F}" dt="2020-05-09T21:22:47.241" v="183"/>
+          <ac:spMkLst>
+            <pc:docMk/>
+            <pc:sldMk cId="3964110441" sldId="258"/>
+            <ac:spMk id="149" creationId="{98D49316-27CF-4C3D-BE8C-042F06B89148}"/>
+          </ac:spMkLst>
+        </pc:spChg>
+        <pc:spChg chg="add del">
+          <ac:chgData name="Bryan Khuu" userId="db4bb5bc1a416b49" providerId="Windows Live" clId="Web-{5E92D238-FBDD-49B1-A334-FD695E37C85F}" dt="2020-05-09T21:23:39.960" v="204"/>
+          <ac:spMkLst>
+            <pc:docMk/>
+            <pc:sldMk cId="3964110441" sldId="258"/>
+            <ac:spMk id="150" creationId="{867D4867-5BA7-4462-B2F6-A23F4A622AA7}"/>
+          </ac:spMkLst>
+        </pc:spChg>
+        <pc:spChg chg="add del">
+          <ac:chgData name="Bryan Khuu" userId="db4bb5bc1a416b49" providerId="Windows Live" clId="Web-{5E92D238-FBDD-49B1-A334-FD695E37C85F}" dt="2020-05-09T21:23:45.413" v="206"/>
+          <ac:spMkLst>
+            <pc:docMk/>
+            <pc:sldMk cId="3964110441" sldId="258"/>
+            <ac:spMk id="151" creationId="{1660E788-AFA9-4A1B-9991-6AA74632A15B}"/>
+          </ac:spMkLst>
+        </pc:spChg>
+        <pc:spChg chg="add del">
+          <ac:chgData name="Bryan Khuu" userId="db4bb5bc1a416b49" providerId="Windows Live" clId="Web-{5E92D238-FBDD-49B1-A334-FD695E37C85F}" dt="2020-05-09T21:23:45.413" v="206"/>
+          <ac:spMkLst>
+            <pc:docMk/>
+            <pc:sldMk cId="3964110441" sldId="258"/>
+            <ac:spMk id="152" creationId="{867D4867-5BA7-4462-B2F6-A23F4A622AA7}"/>
+          </ac:spMkLst>
+        </pc:spChg>
+        <pc:picChg chg="del mod ord">
+          <ac:chgData name="Bryan Khuu" userId="db4bb5bc1a416b49" providerId="Windows Live" clId="Web-{5E92D238-FBDD-49B1-A334-FD695E37C85F}" dt="2020-05-09T21:17:55.960" v="119"/>
+          <ac:picMkLst>
+            <pc:docMk/>
+            <pc:sldMk cId="3964110441" sldId="258"/>
+            <ac:picMk id="5" creationId="{A4958B17-BD18-4486-A553-006D964DC15F}"/>
+          </ac:picMkLst>
+        </pc:picChg>
+        <pc:picChg chg="del mod ord">
+          <ac:chgData name="Bryan Khuu" userId="db4bb5bc1a416b49" providerId="Windows Live" clId="Web-{5E92D238-FBDD-49B1-A334-FD695E37C85F}" dt="2020-05-09T21:17:54.131" v="118"/>
+          <ac:picMkLst>
+            <pc:docMk/>
+            <pc:sldMk cId="3964110441" sldId="258"/>
+            <ac:picMk id="8" creationId="{08A9CD7F-3765-4AAE-999A-38156C29B389}"/>
+          </ac:picMkLst>
+        </pc:picChg>
+        <pc:picChg chg="del mod ord">
+          <ac:chgData name="Bryan Khuu" userId="db4bb5bc1a416b49" providerId="Windows Live" clId="Web-{5E92D238-FBDD-49B1-A334-FD695E37C85F}" dt="2020-05-09T21:18:26.694" v="134"/>
+          <ac:picMkLst>
+            <pc:docMk/>
+            <pc:sldMk cId="3964110441" sldId="258"/>
+            <ac:picMk id="9" creationId="{F2F87F3E-3CE9-4392-A054-9B488E1066F8}"/>
+          </ac:picMkLst>
+        </pc:picChg>
+        <pc:picChg chg="add del mod">
+          <ac:chgData name="Bryan Khuu" userId="db4bb5bc1a416b49" providerId="Windows Live" clId="Web-{5E92D238-FBDD-49B1-A334-FD695E37C85F}" dt="2020-05-09T21:18:27.850" v="135"/>
+          <ac:picMkLst>
+            <pc:docMk/>
+            <pc:sldMk cId="3964110441" sldId="258"/>
+            <ac:picMk id="99" creationId="{95A42C80-418C-40FA-A646-5A29D097819E}"/>
+          </ac:picMkLst>
+        </pc:picChg>
+        <pc:picChg chg="add del mod">
+          <ac:chgData name="Bryan Khuu" userId="db4bb5bc1a416b49" providerId="Windows Live" clId="Web-{5E92D238-FBDD-49B1-A334-FD695E37C85F}" dt="2020-05-09T21:18:26.694" v="133"/>
+          <ac:picMkLst>
+            <pc:docMk/>
+            <pc:sldMk cId="3964110441" sldId="258"/>
+            <ac:picMk id="103" creationId="{B120DFB6-572B-4517-8F76-40D6E3220125}"/>
+          </ac:picMkLst>
+        </pc:picChg>
+        <pc:picChg chg="add del mod">
+          <ac:chgData name="Bryan Khuu" userId="db4bb5bc1a416b49" providerId="Windows Live" clId="Web-{5E92D238-FBDD-49B1-A334-FD695E37C85F}" dt="2020-05-09T21:18:26.694" v="132"/>
+          <ac:picMkLst>
+            <pc:docMk/>
+            <pc:sldMk cId="3964110441" sldId="258"/>
+            <ac:picMk id="107" creationId="{BC49460F-BD53-4D14-8183-4899D4E3687C}"/>
+          </ac:picMkLst>
+        </pc:picChg>
+        <pc:picChg chg="add del mod ord">
+          <ac:chgData name="Bryan Khuu" userId="db4bb5bc1a416b49" providerId="Windows Live" clId="Web-{5E92D238-FBDD-49B1-A334-FD695E37C85F}" dt="2020-05-09T22:01:58.833" v="550"/>
+          <ac:picMkLst>
+            <pc:docMk/>
+            <pc:sldMk cId="3964110441" sldId="258"/>
+            <ac:picMk id="118" creationId="{95A42C80-418C-40FA-A646-5A29D097819E}"/>
+          </ac:picMkLst>
+        </pc:picChg>
+        <pc:picChg chg="add del mod ord modCrop">
+          <ac:chgData name="Bryan Khuu" userId="db4bb5bc1a416b49" providerId="Windows Live" clId="Web-{5E92D238-FBDD-49B1-A334-FD695E37C85F}" dt="2020-05-09T22:02:00.474" v="551" actId="1076"/>
+          <ac:picMkLst>
+            <pc:docMk/>
+            <pc:sldMk cId="3964110441" sldId="258"/>
+            <ac:picMk id="120" creationId="{B120DFB6-572B-4517-8F76-40D6E3220125}"/>
+          </ac:picMkLst>
+        </pc:picChg>
+        <pc:picChg chg="add del mod ord modCrop">
+          <ac:chgData name="Bryan Khuu" userId="db4bb5bc1a416b49" providerId="Windows Live" clId="Web-{5E92D238-FBDD-49B1-A334-FD695E37C85F}" dt="2020-05-09T22:02:01.864" v="552" actId="1076"/>
+          <ac:picMkLst>
+            <pc:docMk/>
+            <pc:sldMk cId="3964110441" sldId="258"/>
+            <ac:picMk id="122" creationId="{BC49460F-BD53-4D14-8183-4899D4E3687C}"/>
+          </ac:picMkLst>
+        </pc:picChg>
+        <pc:picChg chg="add del mod">
+          <ac:chgData name="Bryan Khuu" userId="db4bb5bc1a416b49" providerId="Windows Live" clId="Web-{5E92D238-FBDD-49B1-A334-FD695E37C85F}" dt="2020-05-09T21:23:24.553" v="202"/>
+          <ac:picMkLst>
+            <pc:docMk/>
+            <pc:sldMk cId="3964110441" sldId="258"/>
+            <ac:picMk id="145" creationId="{71A3090E-2821-4DB7-A1FB-7B518579FF8A}"/>
+          </ac:picMkLst>
+        </pc:picChg>
+        <pc:picChg chg="add del mod">
+          <ac:chgData name="Bryan Khuu" userId="db4bb5bc1a416b49" providerId="Windows Live" clId="Web-{5E92D238-FBDD-49B1-A334-FD695E37C85F}" dt="2020-05-09T21:23:24.553" v="201"/>
+          <ac:picMkLst>
+            <pc:docMk/>
+            <pc:sldMk cId="3964110441" sldId="258"/>
+            <ac:picMk id="147" creationId="{5CD731E1-4CF8-4839-A05E-00E2AC11644B}"/>
+          </ac:picMkLst>
+        </pc:picChg>
+        <pc:picChg chg="add del">
+          <ac:chgData name="Bryan Khuu" userId="db4bb5bc1a416b49" providerId="Windows Live" clId="Web-{5E92D238-FBDD-49B1-A334-FD695E37C85F}" dt="2020-05-09T21:23:50.913" v="208"/>
+          <ac:picMkLst>
+            <pc:docMk/>
+            <pc:sldMk cId="3964110441" sldId="258"/>
+            <ac:picMk id="153" creationId="{48E20A91-1782-4B1D-B655-65530A6C3286}"/>
+          </ac:picMkLst>
+        </pc:picChg>
+      </pc:sldChg>
+      <pc:sldChg chg="addSp delSp modSp new mod setBg">
+        <pc:chgData name="Bryan Khuu" userId="db4bb5bc1a416b49" providerId="Windows Live" clId="Web-{5E92D238-FBDD-49B1-A334-FD695E37C85F}" dt="2020-05-09T22:12:28.294" v="683" actId="20577"/>
+        <pc:sldMkLst>
+          <pc:docMk/>
+          <pc:sldMk cId="865442861" sldId="259"/>
+        </pc:sldMkLst>
+        <pc:spChg chg="mod">
+          <ac:chgData name="Bryan Khuu" userId="db4bb5bc1a416b49" providerId="Windows Live" clId="Web-{5E92D238-FBDD-49B1-A334-FD695E37C85F}" dt="2020-05-09T22:10:58.243" v="670"/>
+          <ac:spMkLst>
+            <pc:docMk/>
+            <pc:sldMk cId="865442861" sldId="259"/>
+            <ac:spMk id="2" creationId="{69611A84-1B73-45B8-9EE1-200D3F0E0A31}"/>
+          </ac:spMkLst>
+        </pc:spChg>
+        <pc:spChg chg="add del mod">
+          <ac:chgData name="Bryan Khuu" userId="db4bb5bc1a416b49" providerId="Windows Live" clId="Web-{5E92D238-FBDD-49B1-A334-FD695E37C85F}" dt="2020-05-09T22:12:28.294" v="683" actId="20577"/>
+          <ac:spMkLst>
+            <pc:docMk/>
+            <pc:sldMk cId="865442861" sldId="259"/>
+            <ac:spMk id="3" creationId="{5E690586-63ED-43F1-8E09-6E19CB05937F}"/>
+          </ac:spMkLst>
+        </pc:spChg>
+        <pc:spChg chg="add">
+          <ac:chgData name="Bryan Khuu" userId="db4bb5bc1a416b49" providerId="Windows Live" clId="Web-{5E92D238-FBDD-49B1-A334-FD695E37C85F}" dt="2020-05-09T22:10:58.243" v="670"/>
+          <ac:spMkLst>
+            <pc:docMk/>
+            <pc:sldMk cId="865442861" sldId="259"/>
+            <ac:spMk id="8" creationId="{BAC87F6E-526A-49B5-995D-42DB656594C9}"/>
+          </ac:spMkLst>
+        </pc:spChg>
+        <pc:spChg chg="add">
+          <ac:chgData name="Bryan Khuu" userId="db4bb5bc1a416b49" providerId="Windows Live" clId="Web-{5E92D238-FBDD-49B1-A334-FD695E37C85F}" dt="2020-05-09T22:10:58.243" v="670"/>
+          <ac:spMkLst>
+            <pc:docMk/>
+            <pc:sldMk cId="865442861" sldId="259"/>
+            <ac:spMk id="10" creationId="{5E5436DB-4E8B-43A5-AE55-1C527B62E203}"/>
+          </ac:spMkLst>
+        </pc:spChg>
+        <pc:spChg chg="add">
+          <ac:chgData name="Bryan Khuu" userId="db4bb5bc1a416b49" providerId="Windows Live" clId="Web-{5E92D238-FBDD-49B1-A334-FD695E37C85F}" dt="2020-05-09T22:10:58.243" v="670"/>
+          <ac:spMkLst>
+            <pc:docMk/>
+            <pc:sldMk cId="865442861" sldId="259"/>
+            <ac:spMk id="12" creationId="{0D65299F-028F-4AFC-B46A-8DB33E20FE4A}"/>
+          </ac:spMkLst>
+        </pc:spChg>
+      </pc:sldChg>
+      <pc:sldChg chg="addSp delSp modSp new">
+        <pc:chgData name="Bryan Khuu" userId="db4bb5bc1a416b49" providerId="Windows Live" clId="Web-{5E92D238-FBDD-49B1-A334-FD695E37C85F}" dt="2020-05-09T22:09:25.630" v="633" actId="20577"/>
+        <pc:sldMkLst>
+          <pc:docMk/>
+          <pc:sldMk cId="3876366827" sldId="260"/>
+        </pc:sldMkLst>
+        <pc:spChg chg="mod">
+          <ac:chgData name="Bryan Khuu" userId="db4bb5bc1a416b49" providerId="Windows Live" clId="Web-{5E92D238-FBDD-49B1-A334-FD695E37C85F}" dt="2020-05-09T22:09:25.630" v="633" actId="20577"/>
+          <ac:spMkLst>
+            <pc:docMk/>
+            <pc:sldMk cId="3876366827" sldId="260"/>
+            <ac:spMk id="2" creationId="{7AA60957-65FD-4982-8D07-2A080F0DFBC4}"/>
+          </ac:spMkLst>
+        </pc:spChg>
+        <pc:spChg chg="del">
+          <ac:chgData name="Bryan Khuu" userId="db4bb5bc1a416b49" providerId="Windows Live" clId="Web-{5E92D238-FBDD-49B1-A334-FD695E37C85F}" dt="2020-05-09T22:04:06.150" v="573"/>
+          <ac:spMkLst>
+            <pc:docMk/>
+            <pc:sldMk cId="3876366827" sldId="260"/>
+            <ac:spMk id="3" creationId="{7866AB8E-4D2A-43E8-92AD-DDF5489DDB0B}"/>
+          </ac:spMkLst>
+        </pc:spChg>
+        <pc:picChg chg="add mod ord">
+          <ac:chgData name="Bryan Khuu" userId="db4bb5bc1a416b49" providerId="Windows Live" clId="Web-{5E92D238-FBDD-49B1-A334-FD695E37C85F}" dt="2020-05-09T22:05:08.183" v="587" actId="1076"/>
+          <ac:picMkLst>
+            <pc:docMk/>
+            <pc:sldMk cId="3876366827" sldId="260"/>
+            <ac:picMk id="4" creationId="{1C779644-2880-48A0-B7ED-BC65315AC221}"/>
+          </ac:picMkLst>
+        </pc:picChg>
+        <pc:picChg chg="add mod">
+          <ac:chgData name="Bryan Khuu" userId="db4bb5bc1a416b49" providerId="Windows Live" clId="Web-{5E92D238-FBDD-49B1-A334-FD695E37C85F}" dt="2020-05-09T22:05:14.575" v="588" actId="1076"/>
+          <ac:picMkLst>
+            <pc:docMk/>
+            <pc:sldMk cId="3876366827" sldId="260"/>
+            <ac:picMk id="6" creationId="{18FCD283-6F3B-46B1-ABD3-4B677E8895AF}"/>
+          </ac:picMkLst>
+        </pc:picChg>
+      </pc:sldChg>
+      <pc:sldChg chg="addSp delSp modSp new mod setBg">
+        <pc:chgData name="Bryan Khuu" userId="db4bb5bc1a416b49" providerId="Windows Live" clId="Web-{5E92D238-FBDD-49B1-A334-FD695E37C85F}" dt="2020-05-09T22:22:54.739" v="735"/>
+        <pc:sldMkLst>
+          <pc:docMk/>
+          <pc:sldMk cId="2127869669" sldId="261"/>
+        </pc:sldMkLst>
+        <pc:spChg chg="mod">
+          <ac:chgData name="Bryan Khuu" userId="db4bb5bc1a416b49" providerId="Windows Live" clId="Web-{5E92D238-FBDD-49B1-A334-FD695E37C85F}" dt="2020-05-09T22:19:27.700" v="722" actId="1076"/>
+          <ac:spMkLst>
+            <pc:docMk/>
+            <pc:sldMk cId="2127869669" sldId="261"/>
+            <ac:spMk id="2" creationId="{D168774E-B68F-4891-8DD8-A6AF537C5F93}"/>
+          </ac:spMkLst>
+        </pc:spChg>
+        <pc:spChg chg="del">
+          <ac:chgData name="Bryan Khuu" userId="db4bb5bc1a416b49" providerId="Windows Live" clId="Web-{5E92D238-FBDD-49B1-A334-FD695E37C85F}" dt="2020-05-09T22:15:30.941" v="694"/>
+          <ac:spMkLst>
+            <pc:docMk/>
+            <pc:sldMk cId="2127869669" sldId="261"/>
+            <ac:spMk id="3" creationId="{0FEA8D3C-5991-400C-8FB6-CF61EDF9DE83}"/>
+          </ac:spMkLst>
+        </pc:spChg>
+        <pc:spChg chg="add del mod">
+          <ac:chgData name="Bryan Khuu" userId="db4bb5bc1a416b49" providerId="Windows Live" clId="Web-{5E92D238-FBDD-49B1-A334-FD695E37C85F}" dt="2020-05-09T22:18:43.698" v="713"/>
+          <ac:spMkLst>
+            <pc:docMk/>
+            <pc:sldMk cId="2127869669" sldId="261"/>
+            <ac:spMk id="9" creationId="{3C25BF41-D46C-417D-BCBC-0AD3592F7296}"/>
+          </ac:spMkLst>
+        </pc:spChg>
+        <pc:picChg chg="add del mod ord">
+          <ac:chgData name="Bryan Khuu" userId="db4bb5bc1a416b49" providerId="Windows Live" clId="Web-{5E92D238-FBDD-49B1-A334-FD695E37C85F}" dt="2020-05-09T22:18:04.619" v="712"/>
+          <ac:picMkLst>
+            <pc:docMk/>
+            <pc:sldMk cId="2127869669" sldId="261"/>
+            <ac:picMk id="4" creationId="{98FECB70-1975-4501-80E5-1F9D6E7FB746}"/>
+          </ac:picMkLst>
+        </pc:picChg>
+        <pc:picChg chg="add mod">
+          <ac:chgData name="Bryan Khuu" userId="db4bb5bc1a416b49" providerId="Windows Live" clId="Web-{5E92D238-FBDD-49B1-A334-FD695E37C85F}" dt="2020-05-09T22:19:27.731" v="723" actId="1076"/>
+          <ac:picMkLst>
+            <pc:docMk/>
+            <pc:sldMk cId="2127869669" sldId="261"/>
+            <ac:picMk id="6" creationId="{B9457002-F5E2-401C-B7E6-0F02D7298594}"/>
+          </ac:picMkLst>
+        </pc:picChg>
+        <pc:picChg chg="add mod ord">
+          <ac:chgData name="Bryan Khuu" userId="db4bb5bc1a416b49" providerId="Windows Live" clId="Web-{5E92D238-FBDD-49B1-A334-FD695E37C85F}" dt="2020-05-09T22:21:57.408" v="734" actId="1076"/>
+          <ac:picMkLst>
+            <pc:docMk/>
+            <pc:sldMk cId="2127869669" sldId="261"/>
+            <ac:picMk id="10" creationId="{81337A89-EF35-4F29-BBA1-142B06FF1E82}"/>
+          </ac:picMkLst>
+        </pc:picChg>
+      </pc:sldChg>
+    </pc:docChg>
+  </pc:docChgLst>
+  <pc:docChgLst>
+    <pc:chgData name="Amanda Lin" userId="f19f43ca814e338c" providerId="Windows Live" clId="Web-{50466BB6-A36A-4840-8042-2568C71ECAF1}"/>
+    <pc:docChg chg="modSld">
+      <pc:chgData name="Amanda Lin" userId="f19f43ca814e338c" providerId="Windows Live" clId="Web-{50466BB6-A36A-4840-8042-2568C71ECAF1}" dt="2020-05-09T21:13:44.269" v="18" actId="1076"/>
+      <pc:docMkLst>
+        <pc:docMk/>
+      </pc:docMkLst>
+      <pc:sldChg chg="addSp delSp modSp">
+        <pc:chgData name="Amanda Lin" userId="f19f43ca814e338c" providerId="Windows Live" clId="Web-{50466BB6-A36A-4840-8042-2568C71ECAF1}" dt="2020-05-09T21:13:44.269" v="18" actId="1076"/>
         <pc:sldMkLst>
           <pc:docMk/>
           <pc:sldMk cId="3517998983" sldId="256"/>
         </pc:sldMkLst>
-        <pc:spChg chg="mod">
-          <ac:chgData name="Pawel Juda" userId="f6ddb2cecf310bfe" providerId="Windows Live" clId="Web-{1BB566C2-5DB8-4F38-9573-BB226982695B}" dt="2020-05-09T20:42:49.667" v="127"/>
-          <ac:spMkLst>
-            <pc:docMk/>
-            <pc:sldMk cId="3517998983" sldId="256"/>
-            <ac:spMk id="2" creationId="{CAAA4A11-47F3-4EF2-B2E4-936E2E14E826}"/>
-          </ac:spMkLst>
-        </pc:spChg>
-        <pc:spChg chg="mod">
-          <ac:chgData name="Pawel Juda" userId="f6ddb2cecf310bfe" providerId="Windows Live" clId="Web-{1BB566C2-5DB8-4F38-9573-BB226982695B}" dt="2020-05-09T20:42:49.667" v="127"/>
-          <ac:spMkLst>
-            <pc:docMk/>
-            <pc:sldMk cId="3517998983" sldId="256"/>
-            <ac:spMk id="3" creationId="{89285546-74BC-497D-BC2E-74C014486375}"/>
-          </ac:spMkLst>
-        </pc:spChg>
-        <pc:picChg chg="mod">
-          <ac:chgData name="Pawel Juda" userId="f6ddb2cecf310bfe" providerId="Windows Live" clId="Web-{1BB566C2-5DB8-4F38-9573-BB226982695B}" dt="2020-05-09T20:25:28.342" v="89" actId="1076"/>
+        <pc:picChg chg="add del mod">
+          <ac:chgData name="Amanda Lin" userId="f19f43ca814e338c" providerId="Windows Live" clId="Web-{50466BB6-A36A-4840-8042-2568C71ECAF1}" dt="2020-05-09T20:27:38.506" v="2"/>
           <ac:picMkLst>
             <pc:docMk/>
             <pc:sldMk cId="3517998983" sldId="256"/>
             <ac:picMk id="4" creationId="{B886F3E1-EC87-42CE-A343-6522EE6AB6CF}"/>
           </ac:picMkLst>
         </pc:picChg>
-        <pc:picChg chg="mod ord">
-          <ac:chgData name="Pawel Juda" userId="f6ddb2cecf310bfe" providerId="Windows Live" clId="Web-{1BB566C2-5DB8-4F38-9573-BB226982695B}" dt="2020-05-09T20:42:49.667" v="127"/>
+        <pc:picChg chg="add mod">
+          <ac:chgData name="Amanda Lin" userId="f19f43ca814e338c" providerId="Windows Live" clId="Web-{50466BB6-A36A-4840-8042-2568C71ECAF1}" dt="2020-05-09T20:40:56.264" v="7" actId="1076"/>
           <ac:picMkLst>
             <pc:docMk/>
             <pc:sldMk cId="3517998983" sldId="256"/>
@@ -181,122 +1719,27 @@
           </ac:picMkLst>
         </pc:picChg>
         <pc:picChg chg="add del mod">
-          <ac:chgData name="Pawel Juda" userId="f6ddb2cecf310bfe" providerId="Windows Live" clId="Web-{1BB566C2-5DB8-4F38-9573-BB226982695B}" dt="2020-05-09T20:25:01.951" v="83"/>
+          <ac:chgData name="Amanda Lin" userId="f19f43ca814e338c" providerId="Windows Live" clId="Web-{50466BB6-A36A-4840-8042-2568C71ECAF1}" dt="2020-05-09T20:40:40.530" v="5"/>
           <ac:picMkLst>
             <pc:docMk/>
             <pc:sldMk cId="3517998983" sldId="256"/>
-            <ac:picMk id="5" creationId="{B465BCD0-32B2-48B6-ABED-CC3A22A8DDB4}"/>
+            <ac:picMk id="5" creationId="{7AD1F166-F593-4FF2-B2E0-961EDF8BEFD5}"/>
           </ac:picMkLst>
         </pc:picChg>
-        <pc:inkChg chg="add del">
-          <ac:chgData name="Pawel Juda" userId="f6ddb2cecf310bfe" providerId="Windows Live" clId="Web-{1BB566C2-5DB8-4F38-9573-BB226982695B}" dt="2020-05-09T20:26:21.420" v="113"/>
-          <ac:inkMkLst>
+        <pc:picChg chg="add mod">
+          <ac:chgData name="Amanda Lin" userId="f19f43ca814e338c" providerId="Windows Live" clId="Web-{50466BB6-A36A-4840-8042-2568C71ECAF1}" dt="2020-05-09T21:02:48.637" v="11" actId="14100"/>
+          <ac:picMkLst>
             <pc:docMk/>
             <pc:sldMk cId="3517998983" sldId="256"/>
-            <ac:inkMk id="6" creationId="{F40BCB5F-50EB-425C-8BF1-A5AB6F841BA0}"/>
-          </ac:inkMkLst>
-        </pc:inkChg>
-        <pc:inkChg chg="add del">
-          <ac:chgData name="Pawel Juda" userId="f6ddb2cecf310bfe" providerId="Windows Live" clId="Web-{1BB566C2-5DB8-4F38-9573-BB226982695B}" dt="2020-05-09T20:26:21.420" v="112"/>
-          <ac:inkMkLst>
+            <ac:picMk id="7" creationId="{35EBE2E6-BAA4-4861-82A8-366BE0BFAC7E}"/>
+          </ac:picMkLst>
+        </pc:picChg>
+        <pc:picChg chg="add mod">
+          <ac:chgData name="Amanda Lin" userId="f19f43ca814e338c" providerId="Windows Live" clId="Web-{50466BB6-A36A-4840-8042-2568C71ECAF1}" dt="2020-05-09T21:13:44.269" v="18" actId="1076"/>
+          <ac:picMkLst>
             <pc:docMk/>
             <pc:sldMk cId="3517998983" sldId="256"/>
-            <ac:inkMk id="7" creationId="{9DB2F1A7-3E17-4F1B-870A-FBDF9655DB99}"/>
-          </ac:inkMkLst>
-        </pc:inkChg>
-        <pc:inkChg chg="add del">
-          <ac:chgData name="Pawel Juda" userId="f6ddb2cecf310bfe" providerId="Windows Live" clId="Web-{1BB566C2-5DB8-4F38-9573-BB226982695B}" dt="2020-05-09T20:26:21.420" v="111"/>
-          <ac:inkMkLst>
-            <pc:docMk/>
-            <pc:sldMk cId="3517998983" sldId="256"/>
-            <ac:inkMk id="8" creationId="{F692786C-FCF3-41E9-A999-F69D7C793555}"/>
-          </ac:inkMkLst>
-        </pc:inkChg>
-        <pc:inkChg chg="add del">
-          <ac:chgData name="Pawel Juda" userId="f6ddb2cecf310bfe" providerId="Windows Live" clId="Web-{1BB566C2-5DB8-4F38-9573-BB226982695B}" dt="2020-05-09T20:26:21.420" v="110"/>
-          <ac:inkMkLst>
-            <pc:docMk/>
-            <pc:sldMk cId="3517998983" sldId="256"/>
-            <ac:inkMk id="9" creationId="{CCE63F92-C33E-4402-BCE3-D9208CEC2026}"/>
-          </ac:inkMkLst>
-        </pc:inkChg>
-        <pc:inkChg chg="add del">
-          <ac:chgData name="Pawel Juda" userId="f6ddb2cecf310bfe" providerId="Windows Live" clId="Web-{1BB566C2-5DB8-4F38-9573-BB226982695B}" dt="2020-05-09T20:26:21.405" v="109"/>
-          <ac:inkMkLst>
-            <pc:docMk/>
-            <pc:sldMk cId="3517998983" sldId="256"/>
-            <ac:inkMk id="10" creationId="{B857097D-04BA-4D95-9112-8F24C91C6E39}"/>
-          </ac:inkMkLst>
-        </pc:inkChg>
-        <pc:inkChg chg="add del">
-          <ac:chgData name="Pawel Juda" userId="f6ddb2cecf310bfe" providerId="Windows Live" clId="Web-{1BB566C2-5DB8-4F38-9573-BB226982695B}" dt="2020-05-09T20:26:21.405" v="108"/>
-          <ac:inkMkLst>
-            <pc:docMk/>
-            <pc:sldMk cId="3517998983" sldId="256"/>
-            <ac:inkMk id="11" creationId="{2F292C52-7CB5-46F0-A3AF-B0B3D1578B16}"/>
-          </ac:inkMkLst>
-        </pc:inkChg>
-        <pc:inkChg chg="add del">
-          <ac:chgData name="Pawel Juda" userId="f6ddb2cecf310bfe" providerId="Windows Live" clId="Web-{1BB566C2-5DB8-4F38-9573-BB226982695B}" dt="2020-05-09T20:26:21.405" v="107"/>
-          <ac:inkMkLst>
-            <pc:docMk/>
-            <pc:sldMk cId="3517998983" sldId="256"/>
-            <ac:inkMk id="12" creationId="{92803EB4-D59D-46CE-9241-987003D4ABA1}"/>
-          </ac:inkMkLst>
-        </pc:inkChg>
-        <pc:inkChg chg="add del">
-          <ac:chgData name="Pawel Juda" userId="f6ddb2cecf310bfe" providerId="Windows Live" clId="Web-{1BB566C2-5DB8-4F38-9573-BB226982695B}" dt="2020-05-09T20:26:21.405" v="106"/>
-          <ac:inkMkLst>
-            <pc:docMk/>
-            <pc:sldMk cId="3517998983" sldId="256"/>
-            <ac:inkMk id="13" creationId="{E56BDE1D-3D2B-46E7-8666-4FD31C49BD57}"/>
-          </ac:inkMkLst>
-        </pc:inkChg>
-        <pc:inkChg chg="add del">
-          <ac:chgData name="Pawel Juda" userId="f6ddb2cecf310bfe" providerId="Windows Live" clId="Web-{1BB566C2-5DB8-4F38-9573-BB226982695B}" dt="2020-05-09T20:26:21.405" v="105"/>
-          <ac:inkMkLst>
-            <pc:docMk/>
-            <pc:sldMk cId="3517998983" sldId="256"/>
-            <ac:inkMk id="14" creationId="{A0E840F4-CA74-4E6B-89AE-BD409C2E9DA8}"/>
-          </ac:inkMkLst>
-        </pc:inkChg>
-        <pc:inkChg chg="add del">
-          <ac:chgData name="Pawel Juda" userId="f6ddb2cecf310bfe" providerId="Windows Live" clId="Web-{1BB566C2-5DB8-4F38-9573-BB226982695B}" dt="2020-05-09T20:26:21.405" v="104"/>
-          <ac:inkMkLst>
-            <pc:docMk/>
-            <pc:sldMk cId="3517998983" sldId="256"/>
-            <ac:inkMk id="15" creationId="{DFC29EB8-BBDB-41F2-8143-E5E1B2F5B26E}"/>
-          </ac:inkMkLst>
-        </pc:inkChg>
-        <pc:inkChg chg="add del">
-          <ac:chgData name="Pawel Juda" userId="f6ddb2cecf310bfe" providerId="Windows Live" clId="Web-{1BB566C2-5DB8-4F38-9573-BB226982695B}" dt="2020-05-09T20:26:21.405" v="103"/>
-          <ac:inkMkLst>
-            <pc:docMk/>
-            <pc:sldMk cId="3517998983" sldId="256"/>
-            <ac:inkMk id="16" creationId="{831A89C9-0FC0-4D7C-B866-D53577B17651}"/>
-          </ac:inkMkLst>
-        </pc:inkChg>
-        <pc:inkChg chg="add del">
-          <ac:chgData name="Pawel Juda" userId="f6ddb2cecf310bfe" providerId="Windows Live" clId="Web-{1BB566C2-5DB8-4F38-9573-BB226982695B}" dt="2020-05-09T20:26:21.405" v="102"/>
-          <ac:inkMkLst>
-            <pc:docMk/>
-            <pc:sldMk cId="3517998983" sldId="256"/>
-            <ac:inkMk id="17" creationId="{20528F47-1C17-4E47-AC32-CE1D91769D0B}"/>
-          </ac:inkMkLst>
-        </pc:inkChg>
-      </pc:sldChg>
-      <pc:sldChg chg="addSp delSp modSp">
-        <pc:chgData name="Pawel Juda" userId="f6ddb2cecf310bfe" providerId="Windows Live" clId="Web-{1BB566C2-5DB8-4F38-9573-BB226982695B}" dt="2020-05-09T19:21:27.683" v="79"/>
-        <pc:sldMkLst>
-          <pc:docMk/>
-          <pc:sldMk cId="685101506" sldId="259"/>
-        </pc:sldMkLst>
-        <pc:picChg chg="add del mod">
-          <ac:chgData name="Pawel Juda" userId="f6ddb2cecf310bfe" providerId="Windows Live" clId="Web-{1BB566C2-5DB8-4F38-9573-BB226982695B}" dt="2020-05-09T19:21:27.683" v="79"/>
-          <ac:picMkLst>
-            <pc:docMk/>
-            <pc:sldMk cId="685101506" sldId="259"/>
-            <ac:picMk id="5" creationId="{9638F405-912A-46B1-B23D-5EF63E0549CB}"/>
+            <ac:picMk id="9" creationId="{C0A6A8FE-72F7-481F-B783-C986D2C749EB}"/>
           </ac:picMkLst>
         </pc:picChg>
       </pc:sldChg>
@@ -592,271 +2035,44 @@
     </pc:docChg>
   </pc:docChgLst>
   <pc:docChgLst>
-    <pc:chgData name="Bryan Khuu" userId="db4bb5bc1a416b49" providerId="Windows Live" clId="Web-{956F202B-8045-4161-BB6C-AE63D5442B16}"/>
-    <pc:docChg chg="addSld modSld">
-      <pc:chgData name="Bryan Khuu" userId="db4bb5bc1a416b49" providerId="Windows Live" clId="Web-{956F202B-8045-4161-BB6C-AE63D5442B16}" dt="2020-05-10T19:15:37.367" v="291"/>
+    <pc:chgData name="Pawel Juda" userId="f6ddb2cecf310bfe" providerId="Windows Live" clId="Web-{1BB566C2-5DB8-4F38-9573-BB226982695B}"/>
+    <pc:docChg chg="modSld">
+      <pc:chgData name="Pawel Juda" userId="f6ddb2cecf310bfe" providerId="Windows Live" clId="Web-{1BB566C2-5DB8-4F38-9573-BB226982695B}" dt="2020-05-09T20:42:49.667" v="127"/>
       <pc:docMkLst>
         <pc:docMk/>
       </pc:docMkLst>
-      <pc:sldChg chg="modSp">
-        <pc:chgData name="Bryan Khuu" userId="db4bb5bc1a416b49" providerId="Windows Live" clId="Web-{956F202B-8045-4161-BB6C-AE63D5442B16}" dt="2020-05-09T22:30:09.074" v="18"/>
-        <pc:sldMkLst>
-          <pc:docMk/>
-          <pc:sldMk cId="466311876" sldId="257"/>
-        </pc:sldMkLst>
-        <pc:spChg chg="mod">
-          <ac:chgData name="Bryan Khuu" userId="db4bb5bc1a416b49" providerId="Windows Live" clId="Web-{956F202B-8045-4161-BB6C-AE63D5442B16}" dt="2020-05-09T22:25:20.510" v="13" actId="20577"/>
-          <ac:spMkLst>
-            <pc:docMk/>
-            <pc:sldMk cId="466311876" sldId="257"/>
-            <ac:spMk id="2" creationId="{A2841FE9-55B0-4DB0-85A4-E7ABC878C8AE}"/>
-          </ac:spMkLst>
-        </pc:spChg>
-        <pc:graphicFrameChg chg="modGraphic">
-          <ac:chgData name="Bryan Khuu" userId="db4bb5bc1a416b49" providerId="Windows Live" clId="Web-{956F202B-8045-4161-BB6C-AE63D5442B16}" dt="2020-05-09T22:30:09.074" v="18"/>
-          <ac:graphicFrameMkLst>
-            <pc:docMk/>
-            <pc:sldMk cId="466311876" sldId="257"/>
-            <ac:graphicFrameMk id="5" creationId="{91169D42-FB2F-4AEC-861C-B7503AD50942}"/>
-          </ac:graphicFrameMkLst>
-        </pc:graphicFrameChg>
-      </pc:sldChg>
-      <pc:sldChg chg="addSp delSp modSp">
-        <pc:chgData name="Bryan Khuu" userId="db4bb5bc1a416b49" providerId="Windows Live" clId="Web-{956F202B-8045-4161-BB6C-AE63D5442B16}" dt="2020-05-09T23:04:01.810" v="108" actId="20577"/>
-        <pc:sldMkLst>
-          <pc:docMk/>
-          <pc:sldMk cId="3876366827" sldId="260"/>
-        </pc:sldMkLst>
-        <pc:spChg chg="mod">
-          <ac:chgData name="Bryan Khuu" userId="db4bb5bc1a416b49" providerId="Windows Live" clId="Web-{956F202B-8045-4161-BB6C-AE63D5442B16}" dt="2020-05-09T23:04:01.810" v="108" actId="20577"/>
-          <ac:spMkLst>
-            <pc:docMk/>
-            <pc:sldMk cId="3876366827" sldId="260"/>
-            <ac:spMk id="3" creationId="{FA7E6979-AB9C-4EC2-B1A7-83CFAF2AD994}"/>
-          </ac:spMkLst>
-        </pc:spChg>
-        <pc:spChg chg="add del mod">
-          <ac:chgData name="Bryan Khuu" userId="db4bb5bc1a416b49" providerId="Windows Live" clId="Web-{956F202B-8045-4161-BB6C-AE63D5442B16}" dt="2020-05-09T22:54:27.969" v="21"/>
-          <ac:spMkLst>
-            <pc:docMk/>
-            <pc:sldMk cId="3876366827" sldId="260"/>
-            <ac:spMk id="5" creationId="{DD9559C4-2E72-460D-8EF7-D8B17A2A7478}"/>
-          </ac:spMkLst>
-        </pc:spChg>
-        <pc:picChg chg="del">
-          <ac:chgData name="Bryan Khuu" userId="db4bb5bc1a416b49" providerId="Windows Live" clId="Web-{956F202B-8045-4161-BB6C-AE63D5442B16}" dt="2020-05-09T22:54:27.250" v="20"/>
-          <ac:picMkLst>
-            <pc:docMk/>
-            <pc:sldMk cId="3876366827" sldId="260"/>
-            <ac:picMk id="4" creationId="{1C779644-2880-48A0-B7ED-BC65315AC221}"/>
-          </ac:picMkLst>
-        </pc:picChg>
-        <pc:picChg chg="del">
-          <ac:chgData name="Bryan Khuu" userId="db4bb5bc1a416b49" providerId="Windows Live" clId="Web-{956F202B-8045-4161-BB6C-AE63D5442B16}" dt="2020-05-09T22:54:30.704" v="23"/>
-          <ac:picMkLst>
-            <pc:docMk/>
-            <pc:sldMk cId="3876366827" sldId="260"/>
-            <ac:picMk id="6" creationId="{18FCD283-6F3B-46B1-ABD3-4B677E8895AF}"/>
-          </ac:picMkLst>
-        </pc:picChg>
-        <pc:picChg chg="add mod ord">
-          <ac:chgData name="Bryan Khuu" userId="db4bb5bc1a416b49" providerId="Windows Live" clId="Web-{956F202B-8045-4161-BB6C-AE63D5442B16}" dt="2020-05-09T22:55:13.471" v="36" actId="1076"/>
-          <ac:picMkLst>
-            <pc:docMk/>
-            <pc:sldMk cId="3876366827" sldId="260"/>
-            <ac:picMk id="7" creationId="{807DC4DE-CC3E-45D1-989D-D69BD55EB1DC}"/>
-          </ac:picMkLst>
-        </pc:picChg>
-        <pc:picChg chg="add mod">
-          <ac:chgData name="Bryan Khuu" userId="db4bb5bc1a416b49" providerId="Windows Live" clId="Web-{956F202B-8045-4161-BB6C-AE63D5442B16}" dt="2020-05-09T22:55:19.878" v="37" actId="1076"/>
-          <ac:picMkLst>
-            <pc:docMk/>
-            <pc:sldMk cId="3876366827" sldId="260"/>
-            <ac:picMk id="9" creationId="{B8469DE2-5BD4-4878-A7AB-05BBA0E7BAA1}"/>
-          </ac:picMkLst>
-        </pc:picChg>
-      </pc:sldChg>
-      <pc:sldChg chg="addSp delSp modSp mod setBg">
-        <pc:chgData name="Bryan Khuu" userId="db4bb5bc1a416b49" providerId="Windows Live" clId="Web-{956F202B-8045-4161-BB6C-AE63D5442B16}" dt="2020-05-09T22:57:34.182" v="91" actId="20577"/>
-        <pc:sldMkLst>
-          <pc:docMk/>
-          <pc:sldMk cId="2127869669" sldId="261"/>
-        </pc:sldMkLst>
-        <pc:spChg chg="mod">
-          <ac:chgData name="Bryan Khuu" userId="db4bb5bc1a416b49" providerId="Windows Live" clId="Web-{956F202B-8045-4161-BB6C-AE63D5442B16}" dt="2020-05-09T22:57:34.182" v="91" actId="20577"/>
-          <ac:spMkLst>
-            <pc:docMk/>
-            <pc:sldMk cId="2127869669" sldId="261"/>
-            <ac:spMk id="2" creationId="{D168774E-B68F-4891-8DD8-A6AF537C5F93}"/>
-          </ac:spMkLst>
-        </pc:spChg>
-        <pc:spChg chg="add del mod">
-          <ac:chgData name="Bryan Khuu" userId="db4bb5bc1a416b49" providerId="Windows Live" clId="Web-{956F202B-8045-4161-BB6C-AE63D5442B16}" dt="2020-05-09T22:56:25.272" v="42"/>
-          <ac:spMkLst>
-            <pc:docMk/>
-            <pc:sldMk cId="2127869669" sldId="261"/>
-            <ac:spMk id="4" creationId="{2A07450C-6D62-4D39-B09D-BD9F2D507F69}"/>
-          </ac:spMkLst>
-        </pc:spChg>
-        <pc:spChg chg="add mod">
-          <ac:chgData name="Bryan Khuu" userId="db4bb5bc1a416b49" providerId="Windows Live" clId="Web-{956F202B-8045-4161-BB6C-AE63D5442B16}" dt="2020-05-09T22:56:49.273" v="48"/>
-          <ac:spMkLst>
-            <pc:docMk/>
-            <pc:sldMk cId="2127869669" sldId="261"/>
-            <ac:spMk id="9" creationId="{D300AE92-41B7-49B9-B10F-322B7E438D30}"/>
-          </ac:spMkLst>
-        </pc:spChg>
-        <pc:picChg chg="add del mod ord">
-          <ac:chgData name="Bryan Khuu" userId="db4bb5bc1a416b49" providerId="Windows Live" clId="Web-{956F202B-8045-4161-BB6C-AE63D5442B16}" dt="2020-05-09T22:56:49.273" v="48"/>
-          <ac:picMkLst>
-            <pc:docMk/>
-            <pc:sldMk cId="2127869669" sldId="261"/>
-            <ac:picMk id="5" creationId="{FE76271D-742B-4242-8CDD-E75AE1BD4E68}"/>
-          </ac:picMkLst>
-        </pc:picChg>
-        <pc:picChg chg="del">
-          <ac:chgData name="Bryan Khuu" userId="db4bb5bc1a416b49" providerId="Windows Live" clId="Web-{956F202B-8045-4161-BB6C-AE63D5442B16}" dt="2020-05-09T22:56:23.100" v="41"/>
-          <ac:picMkLst>
-            <pc:docMk/>
-            <pc:sldMk cId="2127869669" sldId="261"/>
-            <ac:picMk id="6" creationId="{B9457002-F5E2-401C-B7E6-0F02D7298594}"/>
-          </ac:picMkLst>
-        </pc:picChg>
-        <pc:picChg chg="del">
-          <ac:chgData name="Bryan Khuu" userId="db4bb5bc1a416b49" providerId="Windows Live" clId="Web-{956F202B-8045-4161-BB6C-AE63D5442B16}" dt="2020-05-09T22:56:20.787" v="40"/>
-          <ac:picMkLst>
-            <pc:docMk/>
-            <pc:sldMk cId="2127869669" sldId="261"/>
-            <ac:picMk id="10" creationId="{81337A89-EF35-4F29-BBA1-142B06FF1E82}"/>
-          </ac:picMkLst>
-        </pc:picChg>
-      </pc:sldChg>
-      <pc:sldChg chg="addSp delSp modSp new mod setBg">
-        <pc:chgData name="Bryan Khuu" userId="db4bb5bc1a416b49" providerId="Windows Live" clId="Web-{956F202B-8045-4161-BB6C-AE63D5442B16}" dt="2020-05-10T03:26:19.198" v="190" actId="1076"/>
-        <pc:sldMkLst>
-          <pc:docMk/>
-          <pc:sldMk cId="323867955" sldId="262"/>
-        </pc:sldMkLst>
-        <pc:spChg chg="mod">
-          <ac:chgData name="Bryan Khuu" userId="db4bb5bc1a416b49" providerId="Windows Live" clId="Web-{956F202B-8045-4161-BB6C-AE63D5442B16}" dt="2020-05-10T03:25:49.683" v="173" actId="20577"/>
-          <ac:spMkLst>
-            <pc:docMk/>
-            <pc:sldMk cId="323867955" sldId="262"/>
-            <ac:spMk id="2" creationId="{4879E7A6-7C20-46C5-9E20-5E772C5A0FF6}"/>
-          </ac:spMkLst>
-        </pc:spChg>
-        <pc:spChg chg="del">
-          <ac:chgData name="Bryan Khuu" userId="db4bb5bc1a416b49" providerId="Windows Live" clId="Web-{956F202B-8045-4161-BB6C-AE63D5442B16}" dt="2020-05-09T22:56:11.334" v="38"/>
-          <ac:spMkLst>
-            <pc:docMk/>
-            <pc:sldMk cId="323867955" sldId="262"/>
-            <ac:spMk id="3" creationId="{FEEB0D63-B07C-4AFA-9FE3-D2CA9C12E032}"/>
-          </ac:spMkLst>
-        </pc:spChg>
-        <pc:spChg chg="add mod">
-          <ac:chgData name="Bryan Khuu" userId="db4bb5bc1a416b49" providerId="Windows Live" clId="Web-{956F202B-8045-4161-BB6C-AE63D5442B16}" dt="2020-05-10T03:26:19.198" v="190" actId="1076"/>
-          <ac:spMkLst>
-            <pc:docMk/>
-            <pc:sldMk cId="323867955" sldId="262"/>
-            <ac:spMk id="5" creationId="{D4959F9D-8FBA-4D87-852B-13C313B58531}"/>
-          </ac:spMkLst>
-        </pc:spChg>
-        <pc:spChg chg="add del mod">
-          <ac:chgData name="Bryan Khuu" userId="db4bb5bc1a416b49" providerId="Windows Live" clId="Web-{956F202B-8045-4161-BB6C-AE63D5442B16}" dt="2020-05-10T03:15:01.287" v="111"/>
-          <ac:spMkLst>
-            <pc:docMk/>
-            <pc:sldMk cId="323867955" sldId="262"/>
-            <ac:spMk id="7" creationId="{B803AE0E-2880-4DDA-A630-468E4CE33F27}"/>
-          </ac:spMkLst>
-        </pc:spChg>
-        <pc:spChg chg="add">
-          <ac:chgData name="Bryan Khuu" userId="db4bb5bc1a416b49" providerId="Windows Live" clId="Web-{956F202B-8045-4161-BB6C-AE63D5442B16}" dt="2020-05-10T03:15:20.818" v="114"/>
-          <ac:spMkLst>
-            <pc:docMk/>
-            <pc:sldMk cId="323867955" sldId="262"/>
-            <ac:spMk id="8" creationId="{419501C6-F015-4273-AF88-E0F6C853899F}"/>
-          </ac:spMkLst>
-        </pc:spChg>
-        <pc:spChg chg="add">
-          <ac:chgData name="Bryan Khuu" userId="db4bb5bc1a416b49" providerId="Windows Live" clId="Web-{956F202B-8045-4161-BB6C-AE63D5442B16}" dt="2020-05-10T03:15:20.818" v="114"/>
-          <ac:spMkLst>
-            <pc:docMk/>
-            <pc:sldMk cId="323867955" sldId="262"/>
-            <ac:spMk id="10" creationId="{CA677DB7-5829-45BD-9754-5EC484CC4253}"/>
-          </ac:spMkLst>
-        </pc:spChg>
-        <pc:picChg chg="add mod ord">
-          <ac:chgData name="Bryan Khuu" userId="db4bb5bc1a416b49" providerId="Windows Live" clId="Web-{956F202B-8045-4161-BB6C-AE63D5442B16}" dt="2020-05-10T03:15:37.569" v="116" actId="1076"/>
-          <ac:picMkLst>
-            <pc:docMk/>
-            <pc:sldMk cId="323867955" sldId="262"/>
-            <ac:picMk id="3" creationId="{7995945E-9C91-4FA8-96A9-6ED47C774959}"/>
-          </ac:picMkLst>
-        </pc:picChg>
-        <pc:picChg chg="add del mod ord">
-          <ac:chgData name="Bryan Khuu" userId="db4bb5bc1a416b49" providerId="Windows Live" clId="Web-{956F202B-8045-4161-BB6C-AE63D5442B16}" dt="2020-05-09T22:56:15.490" v="39"/>
-          <ac:picMkLst>
-            <pc:docMk/>
-            <pc:sldMk cId="323867955" sldId="262"/>
-            <ac:picMk id="4" creationId="{0EAA1EC3-2F10-4929-83B5-AC0BC299B9A1}"/>
-          </ac:picMkLst>
-        </pc:picChg>
-      </pc:sldChg>
-      <pc:sldChg chg="delSp modSp new">
-        <pc:chgData name="Bryan Khuu" userId="db4bb5bc1a416b49" providerId="Windows Live" clId="Web-{956F202B-8045-4161-BB6C-AE63D5442B16}" dt="2020-05-10T18:43:38.387" v="290" actId="1076"/>
-        <pc:sldMkLst>
-          <pc:docMk/>
-          <pc:sldMk cId="1265264582" sldId="263"/>
-        </pc:sldMkLst>
-        <pc:spChg chg="mod">
-          <ac:chgData name="Bryan Khuu" userId="db4bb5bc1a416b49" providerId="Windows Live" clId="Web-{956F202B-8045-4161-BB6C-AE63D5442B16}" dt="2020-05-10T18:43:38.387" v="290" actId="1076"/>
-          <ac:spMkLst>
-            <pc:docMk/>
-            <pc:sldMk cId="1265264582" sldId="263"/>
-            <ac:spMk id="2" creationId="{CEF05482-E9DA-4A86-9FFF-CEF2E39DD2D9}"/>
-          </ac:spMkLst>
-        </pc:spChg>
-        <pc:spChg chg="del">
-          <ac:chgData name="Bryan Khuu" userId="db4bb5bc1a416b49" providerId="Windows Live" clId="Web-{956F202B-8045-4161-BB6C-AE63D5442B16}" dt="2020-05-10T18:36:12.722" v="289"/>
-          <ac:spMkLst>
-            <pc:docMk/>
-            <pc:sldMk cId="1265264582" sldId="263"/>
-            <ac:spMk id="3" creationId="{1C71977E-C499-4AEB-B8A4-2EC057D58DC5}"/>
-          </ac:spMkLst>
-        </pc:spChg>
-      </pc:sldChg>
-      <pc:sldChg chg="new">
-        <pc:chgData name="Bryan Khuu" userId="db4bb5bc1a416b49" providerId="Windows Live" clId="Web-{956F202B-8045-4161-BB6C-AE63D5442B16}" dt="2020-05-10T19:15:37.367" v="291"/>
-        <pc:sldMkLst>
-          <pc:docMk/>
-          <pc:sldMk cId="253110941" sldId="264"/>
-        </pc:sldMkLst>
-      </pc:sldChg>
-    </pc:docChg>
-  </pc:docChgLst>
-  <pc:docChgLst>
-    <pc:chgData name="Amanda Lin" userId="f19f43ca814e338c" providerId="Windows Live" clId="Web-{50466BB6-A36A-4840-8042-2568C71ECAF1}"/>
-    <pc:docChg chg="modSld">
-      <pc:chgData name="Amanda Lin" userId="f19f43ca814e338c" providerId="Windows Live" clId="Web-{50466BB6-A36A-4840-8042-2568C71ECAF1}" dt="2020-05-09T21:13:44.269" v="18" actId="1076"/>
-      <pc:docMkLst>
-        <pc:docMk/>
-      </pc:docMkLst>
-      <pc:sldChg chg="addSp delSp modSp">
-        <pc:chgData name="Amanda Lin" userId="f19f43ca814e338c" providerId="Windows Live" clId="Web-{50466BB6-A36A-4840-8042-2568C71ECAF1}" dt="2020-05-09T21:13:44.269" v="18" actId="1076"/>
+      <pc:sldChg chg="addSp delSp modSp mod setBg setClrOvrMap">
+        <pc:chgData name="Pawel Juda" userId="f6ddb2cecf310bfe" providerId="Windows Live" clId="Web-{1BB566C2-5DB8-4F38-9573-BB226982695B}" dt="2020-05-09T20:42:49.667" v="127"/>
         <pc:sldMkLst>
           <pc:docMk/>
           <pc:sldMk cId="3517998983" sldId="256"/>
         </pc:sldMkLst>
-        <pc:picChg chg="add del mod">
-          <ac:chgData name="Amanda Lin" userId="f19f43ca814e338c" providerId="Windows Live" clId="Web-{50466BB6-A36A-4840-8042-2568C71ECAF1}" dt="2020-05-09T20:27:38.506" v="2"/>
+        <pc:spChg chg="mod">
+          <ac:chgData name="Pawel Juda" userId="f6ddb2cecf310bfe" providerId="Windows Live" clId="Web-{1BB566C2-5DB8-4F38-9573-BB226982695B}" dt="2020-05-09T20:42:49.667" v="127"/>
+          <ac:spMkLst>
+            <pc:docMk/>
+            <pc:sldMk cId="3517998983" sldId="256"/>
+            <ac:spMk id="2" creationId="{CAAA4A11-47F3-4EF2-B2E4-936E2E14E826}"/>
+          </ac:spMkLst>
+        </pc:spChg>
+        <pc:spChg chg="mod">
+          <ac:chgData name="Pawel Juda" userId="f6ddb2cecf310bfe" providerId="Windows Live" clId="Web-{1BB566C2-5DB8-4F38-9573-BB226982695B}" dt="2020-05-09T20:42:49.667" v="127"/>
+          <ac:spMkLst>
+            <pc:docMk/>
+            <pc:sldMk cId="3517998983" sldId="256"/>
+            <ac:spMk id="3" creationId="{89285546-74BC-497D-BC2E-74C014486375}"/>
+          </ac:spMkLst>
+        </pc:spChg>
+        <pc:picChg chg="mod">
+          <ac:chgData name="Pawel Juda" userId="f6ddb2cecf310bfe" providerId="Windows Live" clId="Web-{1BB566C2-5DB8-4F38-9573-BB226982695B}" dt="2020-05-09T20:25:28.342" v="89" actId="1076"/>
           <ac:picMkLst>
             <pc:docMk/>
             <pc:sldMk cId="3517998983" sldId="256"/>
             <ac:picMk id="4" creationId="{B886F3E1-EC87-42CE-A343-6522EE6AB6CF}"/>
           </ac:picMkLst>
         </pc:picChg>
-        <pc:picChg chg="add mod">
-          <ac:chgData name="Amanda Lin" userId="f19f43ca814e338c" providerId="Windows Live" clId="Web-{50466BB6-A36A-4840-8042-2568C71ECAF1}" dt="2020-05-09T20:40:56.264" v="7" actId="1076"/>
+        <pc:picChg chg="mod ord">
+          <ac:chgData name="Pawel Juda" userId="f6ddb2cecf310bfe" providerId="Windows Live" clId="Web-{1BB566C2-5DB8-4F38-9573-BB226982695B}" dt="2020-05-09T20:42:49.667" v="127"/>
           <ac:picMkLst>
             <pc:docMk/>
             <pc:sldMk cId="3517998983" sldId="256"/>
@@ -864,1311 +2080,122 @@
           </ac:picMkLst>
         </pc:picChg>
         <pc:picChg chg="add del mod">
-          <ac:chgData name="Amanda Lin" userId="f19f43ca814e338c" providerId="Windows Live" clId="Web-{50466BB6-A36A-4840-8042-2568C71ECAF1}" dt="2020-05-09T20:40:40.530" v="5"/>
+          <ac:chgData name="Pawel Juda" userId="f6ddb2cecf310bfe" providerId="Windows Live" clId="Web-{1BB566C2-5DB8-4F38-9573-BB226982695B}" dt="2020-05-09T20:25:01.951" v="83"/>
           <ac:picMkLst>
             <pc:docMk/>
             <pc:sldMk cId="3517998983" sldId="256"/>
-            <ac:picMk id="5" creationId="{7AD1F166-F593-4FF2-B2E0-961EDF8BEFD5}"/>
+            <ac:picMk id="5" creationId="{B465BCD0-32B2-48B6-ABED-CC3A22A8DDB4}"/>
           </ac:picMkLst>
         </pc:picChg>
-        <pc:picChg chg="add mod">
-          <ac:chgData name="Amanda Lin" userId="f19f43ca814e338c" providerId="Windows Live" clId="Web-{50466BB6-A36A-4840-8042-2568C71ECAF1}" dt="2020-05-09T21:02:48.637" v="11" actId="14100"/>
-          <ac:picMkLst>
+        <pc:inkChg chg="add del">
+          <ac:chgData name="Pawel Juda" userId="f6ddb2cecf310bfe" providerId="Windows Live" clId="Web-{1BB566C2-5DB8-4F38-9573-BB226982695B}" dt="2020-05-09T20:26:21.420" v="113"/>
+          <ac:inkMkLst>
             <pc:docMk/>
             <pc:sldMk cId="3517998983" sldId="256"/>
-            <ac:picMk id="7" creationId="{35EBE2E6-BAA4-4861-82A8-366BE0BFAC7E}"/>
-          </ac:picMkLst>
-        </pc:picChg>
-        <pc:picChg chg="add mod">
-          <ac:chgData name="Amanda Lin" userId="f19f43ca814e338c" providerId="Windows Live" clId="Web-{50466BB6-A36A-4840-8042-2568C71ECAF1}" dt="2020-05-09T21:13:44.269" v="18" actId="1076"/>
-          <ac:picMkLst>
+            <ac:inkMk id="6" creationId="{F40BCB5F-50EB-425C-8BF1-A5AB6F841BA0}"/>
+          </ac:inkMkLst>
+        </pc:inkChg>
+        <pc:inkChg chg="add del">
+          <ac:chgData name="Pawel Juda" userId="f6ddb2cecf310bfe" providerId="Windows Live" clId="Web-{1BB566C2-5DB8-4F38-9573-BB226982695B}" dt="2020-05-09T20:26:21.420" v="112"/>
+          <ac:inkMkLst>
             <pc:docMk/>
             <pc:sldMk cId="3517998983" sldId="256"/>
-            <ac:picMk id="9" creationId="{C0A6A8FE-72F7-481F-B783-C986D2C749EB}"/>
-          </ac:picMkLst>
-        </pc:picChg>
+            <ac:inkMk id="7" creationId="{9DB2F1A7-3E17-4F1B-870A-FBDF9655DB99}"/>
+          </ac:inkMkLst>
+        </pc:inkChg>
+        <pc:inkChg chg="add del">
+          <ac:chgData name="Pawel Juda" userId="f6ddb2cecf310bfe" providerId="Windows Live" clId="Web-{1BB566C2-5DB8-4F38-9573-BB226982695B}" dt="2020-05-09T20:26:21.420" v="111"/>
+          <ac:inkMkLst>
+            <pc:docMk/>
+            <pc:sldMk cId="3517998983" sldId="256"/>
+            <ac:inkMk id="8" creationId="{F692786C-FCF3-41E9-A999-F69D7C793555}"/>
+          </ac:inkMkLst>
+        </pc:inkChg>
+        <pc:inkChg chg="add del">
+          <ac:chgData name="Pawel Juda" userId="f6ddb2cecf310bfe" providerId="Windows Live" clId="Web-{1BB566C2-5DB8-4F38-9573-BB226982695B}" dt="2020-05-09T20:26:21.420" v="110"/>
+          <ac:inkMkLst>
+            <pc:docMk/>
+            <pc:sldMk cId="3517998983" sldId="256"/>
+            <ac:inkMk id="9" creationId="{CCE63F92-C33E-4402-BCE3-D9208CEC2026}"/>
+          </ac:inkMkLst>
+        </pc:inkChg>
+        <pc:inkChg chg="add del">
+          <ac:chgData name="Pawel Juda" userId="f6ddb2cecf310bfe" providerId="Windows Live" clId="Web-{1BB566C2-5DB8-4F38-9573-BB226982695B}" dt="2020-05-09T20:26:21.405" v="109"/>
+          <ac:inkMkLst>
+            <pc:docMk/>
+            <pc:sldMk cId="3517998983" sldId="256"/>
+            <ac:inkMk id="10" creationId="{B857097D-04BA-4D95-9112-8F24C91C6E39}"/>
+          </ac:inkMkLst>
+        </pc:inkChg>
+        <pc:inkChg chg="add del">
+          <ac:chgData name="Pawel Juda" userId="f6ddb2cecf310bfe" providerId="Windows Live" clId="Web-{1BB566C2-5DB8-4F38-9573-BB226982695B}" dt="2020-05-09T20:26:21.405" v="108"/>
+          <ac:inkMkLst>
+            <pc:docMk/>
+            <pc:sldMk cId="3517998983" sldId="256"/>
+            <ac:inkMk id="11" creationId="{2F292C52-7CB5-46F0-A3AF-B0B3D1578B16}"/>
+          </ac:inkMkLst>
+        </pc:inkChg>
+        <pc:inkChg chg="add del">
+          <ac:chgData name="Pawel Juda" userId="f6ddb2cecf310bfe" providerId="Windows Live" clId="Web-{1BB566C2-5DB8-4F38-9573-BB226982695B}" dt="2020-05-09T20:26:21.405" v="107"/>
+          <ac:inkMkLst>
+            <pc:docMk/>
+            <pc:sldMk cId="3517998983" sldId="256"/>
+            <ac:inkMk id="12" creationId="{92803EB4-D59D-46CE-9241-987003D4ABA1}"/>
+          </ac:inkMkLst>
+        </pc:inkChg>
+        <pc:inkChg chg="add del">
+          <ac:chgData name="Pawel Juda" userId="f6ddb2cecf310bfe" providerId="Windows Live" clId="Web-{1BB566C2-5DB8-4F38-9573-BB226982695B}" dt="2020-05-09T20:26:21.405" v="106"/>
+          <ac:inkMkLst>
+            <pc:docMk/>
+            <pc:sldMk cId="3517998983" sldId="256"/>
+            <ac:inkMk id="13" creationId="{E56BDE1D-3D2B-46E7-8666-4FD31C49BD57}"/>
+          </ac:inkMkLst>
+        </pc:inkChg>
+        <pc:inkChg chg="add del">
+          <ac:chgData name="Pawel Juda" userId="f6ddb2cecf310bfe" providerId="Windows Live" clId="Web-{1BB566C2-5DB8-4F38-9573-BB226982695B}" dt="2020-05-09T20:26:21.405" v="105"/>
+          <ac:inkMkLst>
+            <pc:docMk/>
+            <pc:sldMk cId="3517998983" sldId="256"/>
+            <ac:inkMk id="14" creationId="{A0E840F4-CA74-4E6B-89AE-BD409C2E9DA8}"/>
+          </ac:inkMkLst>
+        </pc:inkChg>
+        <pc:inkChg chg="add del">
+          <ac:chgData name="Pawel Juda" userId="f6ddb2cecf310bfe" providerId="Windows Live" clId="Web-{1BB566C2-5DB8-4F38-9573-BB226982695B}" dt="2020-05-09T20:26:21.405" v="104"/>
+          <ac:inkMkLst>
+            <pc:docMk/>
+            <pc:sldMk cId="3517998983" sldId="256"/>
+            <ac:inkMk id="15" creationId="{DFC29EB8-BBDB-41F2-8143-E5E1B2F5B26E}"/>
+          </ac:inkMkLst>
+        </pc:inkChg>
+        <pc:inkChg chg="add del">
+          <ac:chgData name="Pawel Juda" userId="f6ddb2cecf310bfe" providerId="Windows Live" clId="Web-{1BB566C2-5DB8-4F38-9573-BB226982695B}" dt="2020-05-09T20:26:21.405" v="103"/>
+          <ac:inkMkLst>
+            <pc:docMk/>
+            <pc:sldMk cId="3517998983" sldId="256"/>
+            <ac:inkMk id="16" creationId="{831A89C9-0FC0-4D7C-B866-D53577B17651}"/>
+          </ac:inkMkLst>
+        </pc:inkChg>
+        <pc:inkChg chg="add del">
+          <ac:chgData name="Pawel Juda" userId="f6ddb2cecf310bfe" providerId="Windows Live" clId="Web-{1BB566C2-5DB8-4F38-9573-BB226982695B}" dt="2020-05-09T20:26:21.405" v="102"/>
+          <ac:inkMkLst>
+            <pc:docMk/>
+            <pc:sldMk cId="3517998983" sldId="256"/>
+            <ac:inkMk id="17" creationId="{20528F47-1C17-4E47-AC32-CE1D91769D0B}"/>
+          </ac:inkMkLst>
+        </pc:inkChg>
       </pc:sldChg>
-    </pc:docChg>
-  </pc:docChgLst>
-  <pc:docChgLst>
-    <pc:chgData name="Bryan Khuu" userId="db4bb5bc1a416b49" providerId="Windows Live" clId="Web-{5E92D238-FBDD-49B1-A334-FD695E37C85F}"/>
-    <pc:docChg chg="addSld modSld">
-      <pc:chgData name="Bryan Khuu" userId="db4bb5bc1a416b49" providerId="Windows Live" clId="Web-{5E92D238-FBDD-49B1-A334-FD695E37C85F}" dt="2020-05-09T22:22:54.739" v="735"/>
-      <pc:docMkLst>
-        <pc:docMk/>
-      </pc:docMkLst>
-      <pc:sldChg chg="addSp delSp modSp mod setBg">
-        <pc:chgData name="Bryan Khuu" userId="db4bb5bc1a416b49" providerId="Windows Live" clId="Web-{5E92D238-FBDD-49B1-A334-FD695E37C85F}" dt="2020-05-09T22:13:33.937" v="692" actId="20577"/>
+      <pc:sldChg chg="addSp delSp modSp">
+        <pc:chgData name="Pawel Juda" userId="f6ddb2cecf310bfe" providerId="Windows Live" clId="Web-{1BB566C2-5DB8-4F38-9573-BB226982695B}" dt="2020-05-09T19:21:27.683" v="79"/>
         <pc:sldMkLst>
           <pc:docMk/>
-          <pc:sldMk cId="466311876" sldId="257"/>
+          <pc:sldMk cId="685101506" sldId="259"/>
         </pc:sldMkLst>
-        <pc:spChg chg="mod">
-          <ac:chgData name="Bryan Khuu" userId="db4bb5bc1a416b49" providerId="Windows Live" clId="Web-{5E92D238-FBDD-49B1-A334-FD695E37C85F}" dt="2020-05-09T22:10:37.665" v="669"/>
-          <ac:spMkLst>
-            <pc:docMk/>
-            <pc:sldMk cId="466311876" sldId="257"/>
-            <ac:spMk id="2" creationId="{A2841FE9-55B0-4DB0-85A4-E7ABC878C8AE}"/>
-          </ac:spMkLst>
-        </pc:spChg>
-        <pc:spChg chg="del mod">
-          <ac:chgData name="Bryan Khuu" userId="db4bb5bc1a416b49" providerId="Windows Live" clId="Web-{5E92D238-FBDD-49B1-A334-FD695E37C85F}" dt="2020-05-09T22:10:37.665" v="669"/>
-          <ac:spMkLst>
-            <pc:docMk/>
-            <pc:sldMk cId="466311876" sldId="257"/>
-            <ac:spMk id="3" creationId="{802F4C48-DE4A-4384-8D1B-6888BF9B917E}"/>
-          </ac:spMkLst>
-        </pc:spChg>
-        <pc:graphicFrameChg chg="add modGraphic">
-          <ac:chgData name="Bryan Khuu" userId="db4bb5bc1a416b49" providerId="Windows Live" clId="Web-{5E92D238-FBDD-49B1-A334-FD695E37C85F}" dt="2020-05-09T22:13:33.937" v="692" actId="20577"/>
-          <ac:graphicFrameMkLst>
-            <pc:docMk/>
-            <pc:sldMk cId="466311876" sldId="257"/>
-            <ac:graphicFrameMk id="5" creationId="{91169D42-FB2F-4AEC-861C-B7503AD50942}"/>
-          </ac:graphicFrameMkLst>
-        </pc:graphicFrameChg>
-      </pc:sldChg>
-      <pc:sldChg chg="addSp delSp modSp mod setBg">
-        <pc:chgData name="Bryan Khuu" userId="db4bb5bc1a416b49" providerId="Windows Live" clId="Web-{5E92D238-FBDD-49B1-A334-FD695E37C85F}" dt="2020-05-09T22:02:01.864" v="552" actId="1076"/>
-        <pc:sldMkLst>
-          <pc:docMk/>
-          <pc:sldMk cId="3964110441" sldId="258"/>
-        </pc:sldMkLst>
-        <pc:spChg chg="mod ord">
-          <ac:chgData name="Bryan Khuu" userId="db4bb5bc1a416b49" providerId="Windows Live" clId="Web-{5E92D238-FBDD-49B1-A334-FD695E37C85F}" dt="2020-05-09T21:29:38.600" v="383" actId="20577"/>
-          <ac:spMkLst>
-            <pc:docMk/>
-            <pc:sldMk cId="3964110441" sldId="258"/>
-            <ac:spMk id="2" creationId="{91ABE8C2-D87A-4AE1-ACC5-77F1BB1766D7}"/>
-          </ac:spMkLst>
-        </pc:spChg>
-        <pc:spChg chg="mod ord">
-          <ac:chgData name="Bryan Khuu" userId="db4bb5bc1a416b49" providerId="Windows Live" clId="Web-{5E92D238-FBDD-49B1-A334-FD695E37C85F}" dt="2020-05-09T22:01:26.175" v="547" actId="20577"/>
-          <ac:spMkLst>
-            <pc:docMk/>
-            <pc:sldMk cId="3964110441" sldId="258"/>
-            <ac:spMk id="13" creationId="{6144181C-0323-471E-B002-4C0BA47780C0}"/>
-          </ac:spMkLst>
-        </pc:spChg>
-        <pc:spChg chg="add del">
-          <ac:chgData name="Bryan Khuu" userId="db4bb5bc1a416b49" providerId="Windows Live" clId="Web-{5E92D238-FBDD-49B1-A334-FD695E37C85F}" dt="2020-05-09T21:13:47.475" v="55"/>
-          <ac:spMkLst>
-            <pc:docMk/>
-            <pc:sldMk cId="3964110441" sldId="258"/>
-            <ac:spMk id="15" creationId="{98D49316-27CF-4C3D-BE8C-042F06B89148}"/>
-          </ac:spMkLst>
-        </pc:spChg>
-        <pc:spChg chg="add del">
-          <ac:chgData name="Bryan Khuu" userId="db4bb5bc1a416b49" providerId="Windows Live" clId="Web-{5E92D238-FBDD-49B1-A334-FD695E37C85F}" dt="2020-05-09T21:10:41.694" v="11"/>
-          <ac:spMkLst>
-            <pc:docMk/>
-            <pc:sldMk cId="3964110441" sldId="258"/>
-            <ac:spMk id="16" creationId="{1660E788-AFA9-4A1B-9991-6AA74632A15B}"/>
-          </ac:spMkLst>
-        </pc:spChg>
-        <pc:spChg chg="add del">
-          <ac:chgData name="Bryan Khuu" userId="db4bb5bc1a416b49" providerId="Windows Live" clId="Web-{5E92D238-FBDD-49B1-A334-FD695E37C85F}" dt="2020-05-09T21:14:37.288" v="71"/>
-          <ac:spMkLst>
-            <pc:docMk/>
-            <pc:sldMk cId="3964110441" sldId="258"/>
-            <ac:spMk id="17" creationId="{BA4C5437-838C-45F6-BFC8-3AF0ADE30FFB}"/>
-          </ac:spMkLst>
-        </pc:spChg>
-        <pc:spChg chg="add del">
-          <ac:chgData name="Bryan Khuu" userId="db4bb5bc1a416b49" providerId="Windows Live" clId="Web-{5E92D238-FBDD-49B1-A334-FD695E37C85F}" dt="2020-05-09T21:10:41.694" v="11"/>
-          <ac:spMkLst>
-            <pc:docMk/>
-            <pc:sldMk cId="3964110441" sldId="258"/>
-            <ac:spMk id="18" creationId="{867D4867-5BA7-4462-B2F6-A23F4A622AA7}"/>
-          </ac:spMkLst>
-        </pc:spChg>
-        <pc:spChg chg="add del">
-          <ac:chgData name="Bryan Khuu" userId="db4bb5bc1a416b49" providerId="Windows Live" clId="Web-{5E92D238-FBDD-49B1-A334-FD695E37C85F}" dt="2020-05-09T21:14:37.288" v="71"/>
-          <ac:spMkLst>
-            <pc:docMk/>
-            <pc:sldMk cId="3964110441" sldId="258"/>
-            <ac:spMk id="19" creationId="{FACBD493-E381-4822-8F8F-A4194DFDB109}"/>
-          </ac:spMkLst>
-        </pc:spChg>
-        <pc:spChg chg="add del">
-          <ac:chgData name="Bryan Khuu" userId="db4bb5bc1a416b49" providerId="Windows Live" clId="Web-{5E92D238-FBDD-49B1-A334-FD695E37C85F}" dt="2020-05-09T21:10:40.694" v="8"/>
-          <ac:spMkLst>
-            <pc:docMk/>
-            <pc:sldMk cId="3964110441" sldId="258"/>
-            <ac:spMk id="20" creationId="{4088F942-5192-4329-9236-6B9F5E9E87C8}"/>
-          </ac:spMkLst>
-        </pc:spChg>
-        <pc:spChg chg="add del">
-          <ac:chgData name="Bryan Khuu" userId="db4bb5bc1a416b49" providerId="Windows Live" clId="Web-{5E92D238-FBDD-49B1-A334-FD695E37C85F}" dt="2020-05-09T21:11:42.850" v="19"/>
-          <ac:spMkLst>
-            <pc:docMk/>
-            <pc:sldMk cId="3964110441" sldId="258"/>
-            <ac:spMk id="21" creationId="{4088F942-5192-4329-9236-6B9F5E9E87C8}"/>
-          </ac:spMkLst>
-        </pc:spChg>
-        <pc:spChg chg="add del">
-          <ac:chgData name="Bryan Khuu" userId="db4bb5bc1a416b49" providerId="Windows Live" clId="Web-{5E92D238-FBDD-49B1-A334-FD695E37C85F}" dt="2020-05-09T21:11:42.850" v="19"/>
-          <ac:spMkLst>
-            <pc:docMk/>
-            <pc:sldMk cId="3964110441" sldId="258"/>
-            <ac:spMk id="22" creationId="{6DBBC3F0-E4D5-4DC9-9156-6592F510E7D0}"/>
-          </ac:spMkLst>
-        </pc:spChg>
-        <pc:spChg chg="add del">
-          <ac:chgData name="Bryan Khuu" userId="db4bb5bc1a416b49" providerId="Windows Live" clId="Web-{5E92D238-FBDD-49B1-A334-FD695E37C85F}" dt="2020-05-09T21:10:19.022" v="4"/>
-          <ac:spMkLst>
-            <pc:docMk/>
-            <pc:sldMk cId="3964110441" sldId="258"/>
-            <ac:spMk id="23" creationId="{C271F1AE-EB76-45DA-8C1D-BF917DFC4B77}"/>
-          </ac:spMkLst>
-        </pc:spChg>
-        <pc:spChg chg="add del">
-          <ac:chgData name="Bryan Khuu" userId="db4bb5bc1a416b49" providerId="Windows Live" clId="Web-{5E92D238-FBDD-49B1-A334-FD695E37C85F}" dt="2020-05-09T21:11:42.850" v="19"/>
-          <ac:spMkLst>
-            <pc:docMk/>
-            <pc:sldMk cId="3964110441" sldId="258"/>
-            <ac:spMk id="24" creationId="{25440DE7-FEC3-4B33-BE37-CA1D6793F833}"/>
-          </ac:spMkLst>
-        </pc:spChg>
-        <pc:spChg chg="add del">
-          <ac:chgData name="Bryan Khuu" userId="db4bb5bc1a416b49" providerId="Windows Live" clId="Web-{5E92D238-FBDD-49B1-A334-FD695E37C85F}" dt="2020-05-09T21:10:40.694" v="8"/>
-          <ac:spMkLst>
-            <pc:docMk/>
-            <pc:sldMk cId="3964110441" sldId="258"/>
-            <ac:spMk id="25" creationId="{6DBBC3F0-E4D5-4DC9-9156-6592F510E7D0}"/>
-          </ac:spMkLst>
-        </pc:spChg>
-        <pc:spChg chg="add del">
-          <ac:chgData name="Bryan Khuu" userId="db4bb5bc1a416b49" providerId="Windows Live" clId="Web-{5E92D238-FBDD-49B1-A334-FD695E37C85F}" dt="2020-05-09T21:13:14.678" v="51"/>
-          <ac:spMkLst>
-            <pc:docMk/>
-            <pc:sldMk cId="3964110441" sldId="258"/>
-            <ac:spMk id="26" creationId="{98D49316-27CF-4C3D-BE8C-042F06B89148}"/>
-          </ac:spMkLst>
-        </pc:spChg>
-        <pc:spChg chg="add del">
-          <ac:chgData name="Bryan Khuu" userId="db4bb5bc1a416b49" providerId="Windows Live" clId="Web-{5E92D238-FBDD-49B1-A334-FD695E37C85F}" dt="2020-05-09T21:10:40.694" v="8"/>
-          <ac:spMkLst>
-            <pc:docMk/>
-            <pc:sldMk cId="3964110441" sldId="258"/>
-            <ac:spMk id="27" creationId="{25440DE7-FEC3-4B33-BE37-CA1D6793F833}"/>
-          </ac:spMkLst>
-        </pc:spChg>
-        <pc:spChg chg="add del">
-          <ac:chgData name="Bryan Khuu" userId="db4bb5bc1a416b49" providerId="Windows Live" clId="Web-{5E92D238-FBDD-49B1-A334-FD695E37C85F}" dt="2020-05-09T21:12:27.585" v="32"/>
-          <ac:spMkLst>
-            <pc:docMk/>
-            <pc:sldMk cId="3964110441" sldId="258"/>
-            <ac:spMk id="28" creationId="{98D49316-27CF-4C3D-BE8C-042F06B89148}"/>
-          </ac:spMkLst>
-        </pc:spChg>
-        <pc:spChg chg="add del">
-          <ac:chgData name="Bryan Khuu" userId="db4bb5bc1a416b49" providerId="Windows Live" clId="Web-{5E92D238-FBDD-49B1-A334-FD695E37C85F}" dt="2020-05-09T21:11:42.834" v="18"/>
-          <ac:spMkLst>
-            <pc:docMk/>
-            <pc:sldMk cId="3964110441" sldId="258"/>
-            <ac:spMk id="29" creationId="{4088F942-5192-4329-9236-6B9F5E9E87C8}"/>
-          </ac:spMkLst>
-        </pc:spChg>
-        <pc:spChg chg="add del">
-          <ac:chgData name="Bryan Khuu" userId="db4bb5bc1a416b49" providerId="Windows Live" clId="Web-{5E92D238-FBDD-49B1-A334-FD695E37C85F}" dt="2020-05-09T21:12:30.194" v="34"/>
-          <ac:spMkLst>
-            <pc:docMk/>
-            <pc:sldMk cId="3964110441" sldId="258"/>
-            <ac:spMk id="30" creationId="{1660E788-AFA9-4A1B-9991-6AA74632A15B}"/>
-          </ac:spMkLst>
-        </pc:spChg>
-        <pc:spChg chg="add del">
-          <ac:chgData name="Bryan Khuu" userId="db4bb5bc1a416b49" providerId="Windows Live" clId="Web-{5E92D238-FBDD-49B1-A334-FD695E37C85F}" dt="2020-05-09T21:11:42.834" v="18"/>
-          <ac:spMkLst>
-            <pc:docMk/>
-            <pc:sldMk cId="3964110441" sldId="258"/>
-            <ac:spMk id="31" creationId="{6DBBC3F0-E4D5-4DC9-9156-6592F510E7D0}"/>
-          </ac:spMkLst>
-        </pc:spChg>
-        <pc:spChg chg="add del">
-          <ac:chgData name="Bryan Khuu" userId="db4bb5bc1a416b49" providerId="Windows Live" clId="Web-{5E92D238-FBDD-49B1-A334-FD695E37C85F}" dt="2020-05-09T21:12:30.194" v="34"/>
-          <ac:spMkLst>
-            <pc:docMk/>
-            <pc:sldMk cId="3964110441" sldId="258"/>
-            <ac:spMk id="32" creationId="{867D4867-5BA7-4462-B2F6-A23F4A622AA7}"/>
-          </ac:spMkLst>
-        </pc:spChg>
-        <pc:spChg chg="add del">
-          <ac:chgData name="Bryan Khuu" userId="db4bb5bc1a416b49" providerId="Windows Live" clId="Web-{5E92D238-FBDD-49B1-A334-FD695E37C85F}" dt="2020-05-09T21:11:42.834" v="18"/>
-          <ac:spMkLst>
-            <pc:docMk/>
-            <pc:sldMk cId="3964110441" sldId="258"/>
-            <ac:spMk id="33" creationId="{25440DE7-FEC3-4B33-BE37-CA1D6793F833}"/>
-          </ac:spMkLst>
-        </pc:spChg>
-        <pc:spChg chg="add del">
-          <ac:chgData name="Bryan Khuu" userId="db4bb5bc1a416b49" providerId="Windows Live" clId="Web-{5E92D238-FBDD-49B1-A334-FD695E37C85F}" dt="2020-05-09T21:12:32.288" v="36"/>
-          <ac:spMkLst>
-            <pc:docMk/>
-            <pc:sldMk cId="3964110441" sldId="258"/>
-            <ac:spMk id="34" creationId="{1660E788-AFA9-4A1B-9991-6AA74632A15B}"/>
-          </ac:spMkLst>
-        </pc:spChg>
-        <pc:spChg chg="add del">
-          <ac:chgData name="Bryan Khuu" userId="db4bb5bc1a416b49" providerId="Windows Live" clId="Web-{5E92D238-FBDD-49B1-A334-FD695E37C85F}" dt="2020-05-09T21:12:32.288" v="36"/>
-          <ac:spMkLst>
-            <pc:docMk/>
-            <pc:sldMk cId="3964110441" sldId="258"/>
-            <ac:spMk id="35" creationId="{867D4867-5BA7-4462-B2F6-A23F4A622AA7}"/>
-          </ac:spMkLst>
-        </pc:spChg>
-        <pc:spChg chg="add del">
-          <ac:chgData name="Bryan Khuu" userId="db4bb5bc1a416b49" providerId="Windows Live" clId="Web-{5E92D238-FBDD-49B1-A334-FD695E37C85F}" dt="2020-05-09T21:12:35.334" v="38"/>
-          <ac:spMkLst>
-            <pc:docMk/>
-            <pc:sldMk cId="3964110441" sldId="258"/>
-            <ac:spMk id="36" creationId="{BA4C5437-838C-45F6-BFC8-3AF0ADE30FFB}"/>
-          </ac:spMkLst>
-        </pc:spChg>
-        <pc:spChg chg="add del">
-          <ac:chgData name="Bryan Khuu" userId="db4bb5bc1a416b49" providerId="Windows Live" clId="Web-{5E92D238-FBDD-49B1-A334-FD695E37C85F}" dt="2020-05-09T21:12:35.334" v="38"/>
-          <ac:spMkLst>
-            <pc:docMk/>
-            <pc:sldMk cId="3964110441" sldId="258"/>
-            <ac:spMk id="37" creationId="{5D7CC766-DF6B-4E3F-8101-8D5F35D4AFFB}"/>
-          </ac:spMkLst>
-        </pc:spChg>
-        <pc:spChg chg="add del">
-          <ac:chgData name="Bryan Khuu" userId="db4bb5bc1a416b49" providerId="Windows Live" clId="Web-{5E92D238-FBDD-49B1-A334-FD695E37C85F}" dt="2020-05-09T21:12:35.334" v="38"/>
-          <ac:spMkLst>
-            <pc:docMk/>
-            <pc:sldMk cId="3964110441" sldId="258"/>
-            <ac:spMk id="38" creationId="{FACBD493-E381-4822-8F8F-A4194DFDB109}"/>
-          </ac:spMkLst>
-        </pc:spChg>
-        <pc:spChg chg="add del">
-          <ac:chgData name="Bryan Khuu" userId="db4bb5bc1a416b49" providerId="Windows Live" clId="Web-{5E92D238-FBDD-49B1-A334-FD695E37C85F}" dt="2020-05-09T21:12:35.334" v="38"/>
-          <ac:spMkLst>
-            <pc:docMk/>
-            <pc:sldMk cId="3964110441" sldId="258"/>
-            <ac:spMk id="39" creationId="{2310D9BE-4AD2-4CC3-84FA-4E05790B5B9F}"/>
-          </ac:spMkLst>
-        </pc:spChg>
-        <pc:spChg chg="add del">
-          <ac:chgData name="Bryan Khuu" userId="db4bb5bc1a416b49" providerId="Windows Live" clId="Web-{5E92D238-FBDD-49B1-A334-FD695E37C85F}" dt="2020-05-09T21:12:40.881" v="40"/>
-          <ac:spMkLst>
-            <pc:docMk/>
-            <pc:sldMk cId="3964110441" sldId="258"/>
-            <ac:spMk id="40" creationId="{7B9607E2-1C76-424B-8FF0-580615846EC0}"/>
-          </ac:spMkLst>
-        </pc:spChg>
-        <pc:spChg chg="add del">
-          <ac:chgData name="Bryan Khuu" userId="db4bb5bc1a416b49" providerId="Windows Live" clId="Web-{5E92D238-FBDD-49B1-A334-FD695E37C85F}" dt="2020-05-09T21:12:40.881" v="40"/>
-          <ac:spMkLst>
-            <pc:docMk/>
-            <pc:sldMk cId="3964110441" sldId="258"/>
-            <ac:spMk id="41" creationId="{56A668AF-CC37-4641-8D2B-4C91B3ACBC81}"/>
-          </ac:spMkLst>
-        </pc:spChg>
-        <pc:spChg chg="add del">
-          <ac:chgData name="Bryan Khuu" userId="db4bb5bc1a416b49" providerId="Windows Live" clId="Web-{5E92D238-FBDD-49B1-A334-FD695E37C85F}" dt="2020-05-09T21:12:40.881" v="40"/>
-          <ac:spMkLst>
-            <pc:docMk/>
-            <pc:sldMk cId="3964110441" sldId="258"/>
-            <ac:spMk id="42" creationId="{5B3165DC-54F4-4EF5-8B97-5BE55AA3DBE9}"/>
-          </ac:spMkLst>
-        </pc:spChg>
-        <pc:spChg chg="add del">
-          <ac:chgData name="Bryan Khuu" userId="db4bb5bc1a416b49" providerId="Windows Live" clId="Web-{5E92D238-FBDD-49B1-A334-FD695E37C85F}" dt="2020-05-09T21:12:43.272" v="42"/>
-          <ac:spMkLst>
-            <pc:docMk/>
-            <pc:sldMk cId="3964110441" sldId="258"/>
-            <ac:spMk id="43" creationId="{7D587F9F-3F48-4929-8532-62B82B3F66BE}"/>
-          </ac:spMkLst>
-        </pc:spChg>
-        <pc:spChg chg="add del">
-          <ac:chgData name="Bryan Khuu" userId="db4bb5bc1a416b49" providerId="Windows Live" clId="Web-{5E92D238-FBDD-49B1-A334-FD695E37C85F}" dt="2020-05-09T21:12:43.272" v="42"/>
-          <ac:spMkLst>
-            <pc:docMk/>
-            <pc:sldMk cId="3964110441" sldId="258"/>
-            <ac:spMk id="44" creationId="{6DCB66B2-3729-41B6-8A12-AB8550189D5E}"/>
-          </ac:spMkLst>
-        </pc:spChg>
-        <pc:spChg chg="add del">
-          <ac:chgData name="Bryan Khuu" userId="db4bb5bc1a416b49" providerId="Windows Live" clId="Web-{5E92D238-FBDD-49B1-A334-FD695E37C85F}" dt="2020-05-09T21:12:43.272" v="42"/>
-          <ac:spMkLst>
-            <pc:docMk/>
-            <pc:sldMk cId="3964110441" sldId="258"/>
-            <ac:spMk id="45" creationId="{ABA662FB-3DC6-4E93-98AC-B84BA41F4859}"/>
-          </ac:spMkLst>
-        </pc:spChg>
-        <pc:spChg chg="add del">
-          <ac:chgData name="Bryan Khuu" userId="db4bb5bc1a416b49" providerId="Windows Live" clId="Web-{5E92D238-FBDD-49B1-A334-FD695E37C85F}" dt="2020-05-09T21:12:43.272" v="42"/>
-          <ac:spMkLst>
-            <pc:docMk/>
-            <pc:sldMk cId="3964110441" sldId="258"/>
-            <ac:spMk id="46" creationId="{FB9BE604-0CC0-41C8-9673-995F82DA0257}"/>
-          </ac:spMkLst>
-        </pc:spChg>
-        <pc:spChg chg="add del">
-          <ac:chgData name="Bryan Khuu" userId="db4bb5bc1a416b49" providerId="Windows Live" clId="Web-{5E92D238-FBDD-49B1-A334-FD695E37C85F}" dt="2020-05-09T21:12:43.272" v="42"/>
-          <ac:spMkLst>
-            <pc:docMk/>
-            <pc:sldMk cId="3964110441" sldId="258"/>
-            <ac:spMk id="47" creationId="{2036372A-822B-498E-AD05-6BE85743A094}"/>
-          </ac:spMkLst>
-        </pc:spChg>
-        <pc:spChg chg="add del">
-          <ac:chgData name="Bryan Khuu" userId="db4bb5bc1a416b49" providerId="Windows Live" clId="Web-{5E92D238-FBDD-49B1-A334-FD695E37C85F}" dt="2020-05-09T21:12:48.006" v="44"/>
-          <ac:spMkLst>
-            <pc:docMk/>
-            <pc:sldMk cId="3964110441" sldId="258"/>
-            <ac:spMk id="48" creationId="{674D2C94-67DA-49BC-B575-EB99BE0252F3}"/>
-          </ac:spMkLst>
-        </pc:spChg>
-        <pc:spChg chg="add del">
-          <ac:chgData name="Bryan Khuu" userId="db4bb5bc1a416b49" providerId="Windows Live" clId="Web-{5E92D238-FBDD-49B1-A334-FD695E37C85F}" dt="2020-05-09T21:12:48.006" v="44"/>
-          <ac:spMkLst>
-            <pc:docMk/>
-            <pc:sldMk cId="3964110441" sldId="258"/>
-            <ac:spMk id="49" creationId="{8B77C263-A9E4-4AED-A483-A008BF4989F3}"/>
-          </ac:spMkLst>
-        </pc:spChg>
-        <pc:spChg chg="add del">
-          <ac:chgData name="Bryan Khuu" userId="db4bb5bc1a416b49" providerId="Windows Live" clId="Web-{5E92D238-FBDD-49B1-A334-FD695E37C85F}" dt="2020-05-09T21:12:48.006" v="44"/>
-          <ac:spMkLst>
-            <pc:docMk/>
-            <pc:sldMk cId="3964110441" sldId="258"/>
-            <ac:spMk id="50" creationId="{9AB81589-5E2E-48A4-A999-0BBC893AC573}"/>
-          </ac:spMkLst>
-        </pc:spChg>
-        <pc:spChg chg="add del">
-          <ac:chgData name="Bryan Khuu" userId="db4bb5bc1a416b49" providerId="Windows Live" clId="Web-{5E92D238-FBDD-49B1-A334-FD695E37C85F}" dt="2020-05-09T21:12:48.006" v="44"/>
-          <ac:spMkLst>
-            <pc:docMk/>
-            <pc:sldMk cId="3964110441" sldId="258"/>
-            <ac:spMk id="51" creationId="{E66CAF34-A4FD-4846-A2D0-97CF10923F32}"/>
-          </ac:spMkLst>
-        </pc:spChg>
-        <pc:spChg chg="add del">
-          <ac:chgData name="Bryan Khuu" userId="db4bb5bc1a416b49" providerId="Windows Live" clId="Web-{5E92D238-FBDD-49B1-A334-FD695E37C85F}" dt="2020-05-09T21:12:55.897" v="46"/>
-          <ac:spMkLst>
-            <pc:docMk/>
-            <pc:sldMk cId="3964110441" sldId="258"/>
-            <ac:spMk id="52" creationId="{4088F942-5192-4329-9236-6B9F5E9E87C8}"/>
-          </ac:spMkLst>
-        </pc:spChg>
-        <pc:spChg chg="add del">
-          <ac:chgData name="Bryan Khuu" userId="db4bb5bc1a416b49" providerId="Windows Live" clId="Web-{5E92D238-FBDD-49B1-A334-FD695E37C85F}" dt="2020-05-09T21:12:55.897" v="46"/>
-          <ac:spMkLst>
-            <pc:docMk/>
-            <pc:sldMk cId="3964110441" sldId="258"/>
-            <ac:spMk id="53" creationId="{6DBBC3F0-E4D5-4DC9-9156-6592F510E7D0}"/>
-          </ac:spMkLst>
-        </pc:spChg>
-        <pc:spChg chg="add del">
-          <ac:chgData name="Bryan Khuu" userId="db4bb5bc1a416b49" providerId="Windows Live" clId="Web-{5E92D238-FBDD-49B1-A334-FD695E37C85F}" dt="2020-05-09T21:12:55.897" v="46"/>
-          <ac:spMkLst>
-            <pc:docMk/>
-            <pc:sldMk cId="3964110441" sldId="258"/>
-            <ac:spMk id="54" creationId="{25440DE7-FEC3-4B33-BE37-CA1D6793F833}"/>
-          </ac:spMkLst>
-        </pc:spChg>
-        <pc:spChg chg="add del">
-          <ac:chgData name="Bryan Khuu" userId="db4bb5bc1a416b49" providerId="Windows Live" clId="Web-{5E92D238-FBDD-49B1-A334-FD695E37C85F}" dt="2020-05-09T21:13:04.522" v="48"/>
-          <ac:spMkLst>
-            <pc:docMk/>
-            <pc:sldMk cId="3964110441" sldId="258"/>
-            <ac:spMk id="55" creationId="{8AA1D43A-9C3D-41BA-BD9F-EF7EC7B2F076}"/>
-          </ac:spMkLst>
-        </pc:spChg>
-        <pc:spChg chg="add del">
-          <ac:chgData name="Bryan Khuu" userId="db4bb5bc1a416b49" providerId="Windows Live" clId="Web-{5E92D238-FBDD-49B1-A334-FD695E37C85F}" dt="2020-05-09T21:13:04.522" v="48"/>
-          <ac:spMkLst>
-            <pc:docMk/>
-            <pc:sldMk cId="3964110441" sldId="258"/>
-            <ac:spMk id="56" creationId="{0477181B-208D-49EE-AEEF-79DAF8BA73E1}"/>
-          </ac:spMkLst>
-        </pc:spChg>
-        <pc:spChg chg="add del">
-          <ac:chgData name="Bryan Khuu" userId="db4bb5bc1a416b49" providerId="Windows Live" clId="Web-{5E92D238-FBDD-49B1-A334-FD695E37C85F}" dt="2020-05-09T21:13:04.522" v="48"/>
-          <ac:spMkLst>
-            <pc:docMk/>
-            <pc:sldMk cId="3964110441" sldId="258"/>
-            <ac:spMk id="57" creationId="{83BFAA97-C464-45F7-995A-E13D0B4FC673}"/>
-          </ac:spMkLst>
-        </pc:spChg>
-        <pc:spChg chg="add del">
-          <ac:chgData name="Bryan Khuu" userId="db4bb5bc1a416b49" providerId="Windows Live" clId="Web-{5E92D238-FBDD-49B1-A334-FD695E37C85F}" dt="2020-05-09T21:13:04.522" v="48"/>
-          <ac:spMkLst>
-            <pc:docMk/>
-            <pc:sldMk cId="3964110441" sldId="258"/>
-            <ac:spMk id="58" creationId="{EC059808-0DA1-4E66-92F6-60C8B25B4D6B}"/>
-          </ac:spMkLst>
-        </pc:spChg>
-        <pc:spChg chg="add del">
-          <ac:chgData name="Bryan Khuu" userId="db4bb5bc1a416b49" providerId="Windows Live" clId="Web-{5E92D238-FBDD-49B1-A334-FD695E37C85F}" dt="2020-05-09T21:13:04.522" v="48"/>
-          <ac:spMkLst>
-            <pc:docMk/>
-            <pc:sldMk cId="3964110441" sldId="258"/>
-            <ac:spMk id="59" creationId="{45386504-CADE-4AFE-AF4F-0616BA69A7BA}"/>
-          </ac:spMkLst>
-        </pc:spChg>
-        <pc:spChg chg="add del">
-          <ac:chgData name="Bryan Khuu" userId="db4bb5bc1a416b49" providerId="Windows Live" clId="Web-{5E92D238-FBDD-49B1-A334-FD695E37C85F}" dt="2020-05-09T21:14:37.288" v="71"/>
-          <ac:spMkLst>
-            <pc:docMk/>
-            <pc:sldMk cId="3964110441" sldId="258"/>
-            <ac:spMk id="60" creationId="{2310D9BE-4AD2-4CC3-84FA-4E05790B5B9F}"/>
-          </ac:spMkLst>
-        </pc:spChg>
-        <pc:spChg chg="add del">
-          <ac:chgData name="Bryan Khuu" userId="db4bb5bc1a416b49" providerId="Windows Live" clId="Web-{5E92D238-FBDD-49B1-A334-FD695E37C85F}" dt="2020-05-09T21:14:37.288" v="71"/>
-          <ac:spMkLst>
-            <pc:docMk/>
-            <pc:sldMk cId="3964110441" sldId="258"/>
-            <ac:spMk id="61" creationId="{5D7CC766-DF6B-4E3F-8101-8D5F35D4AFFB}"/>
-          </ac:spMkLst>
-        </pc:spChg>
-        <pc:spChg chg="add del">
-          <ac:chgData name="Bryan Khuu" userId="db4bb5bc1a416b49" providerId="Windows Live" clId="Web-{5E92D238-FBDD-49B1-A334-FD695E37C85F}" dt="2020-05-09T21:14:16.413" v="60"/>
-          <ac:spMkLst>
-            <pc:docMk/>
-            <pc:sldMk cId="3964110441" sldId="258"/>
-            <ac:spMk id="63" creationId="{B8D39262-9511-4F20-8344-1B9DA68877A8}"/>
-          </ac:spMkLst>
-        </pc:spChg>
-        <pc:spChg chg="add del">
-          <ac:chgData name="Bryan Khuu" userId="db4bb5bc1a416b49" providerId="Windows Live" clId="Web-{5E92D238-FBDD-49B1-A334-FD695E37C85F}" dt="2020-05-09T21:14:16.413" v="60"/>
-          <ac:spMkLst>
-            <pc:docMk/>
-            <pc:sldMk cId="3964110441" sldId="258"/>
-            <ac:spMk id="64" creationId="{4F924495-5138-4BB6-B18C-C83EC04341D6}"/>
-          </ac:spMkLst>
-        </pc:spChg>
-        <pc:spChg chg="add del">
-          <ac:chgData name="Bryan Khuu" userId="db4bb5bc1a416b49" providerId="Windows Live" clId="Web-{5E92D238-FBDD-49B1-A334-FD695E37C85F}" dt="2020-05-09T21:14:16.413" v="60"/>
-          <ac:spMkLst>
-            <pc:docMk/>
-            <pc:sldMk cId="3964110441" sldId="258"/>
-            <ac:spMk id="65" creationId="{428AFF86-4DDC-4A60-AC4C-48C6DAE56894}"/>
-          </ac:spMkLst>
-        </pc:spChg>
-        <pc:spChg chg="add del">
-          <ac:chgData name="Bryan Khuu" userId="db4bb5bc1a416b49" providerId="Windows Live" clId="Web-{5E92D238-FBDD-49B1-A334-FD695E37C85F}" dt="2020-05-09T21:14:15.134" v="58"/>
-          <ac:spMkLst>
-            <pc:docMk/>
-            <pc:sldMk cId="3964110441" sldId="258"/>
-            <ac:spMk id="66" creationId="{BA4C5437-838C-45F6-BFC8-3AF0ADE30FFB}"/>
-          </ac:spMkLst>
-        </pc:spChg>
-        <pc:spChg chg="add del">
-          <ac:chgData name="Bryan Khuu" userId="db4bb5bc1a416b49" providerId="Windows Live" clId="Web-{5E92D238-FBDD-49B1-A334-FD695E37C85F}" dt="2020-05-09T21:14:17.538" v="62"/>
-          <ac:spMkLst>
-            <pc:docMk/>
-            <pc:sldMk cId="3964110441" sldId="258"/>
-            <ac:spMk id="67" creationId="{1660E788-AFA9-4A1B-9991-6AA74632A15B}"/>
-          </ac:spMkLst>
-        </pc:spChg>
-        <pc:spChg chg="add del">
-          <ac:chgData name="Bryan Khuu" userId="db4bb5bc1a416b49" providerId="Windows Live" clId="Web-{5E92D238-FBDD-49B1-A334-FD695E37C85F}" dt="2020-05-09T21:14:15.134" v="58"/>
-          <ac:spMkLst>
-            <pc:docMk/>
-            <pc:sldMk cId="3964110441" sldId="258"/>
-            <ac:spMk id="68" creationId="{FACBD493-E381-4822-8F8F-A4194DFDB109}"/>
-          </ac:spMkLst>
-        </pc:spChg>
-        <pc:spChg chg="add del">
-          <ac:chgData name="Bryan Khuu" userId="db4bb5bc1a416b49" providerId="Windows Live" clId="Web-{5E92D238-FBDD-49B1-A334-FD695E37C85F}" dt="2020-05-09T21:14:17.538" v="62"/>
-          <ac:spMkLst>
-            <pc:docMk/>
-            <pc:sldMk cId="3964110441" sldId="258"/>
-            <ac:spMk id="69" creationId="{867D4867-5BA7-4462-B2F6-A23F4A622AA7}"/>
-          </ac:spMkLst>
-        </pc:spChg>
-        <pc:spChg chg="add del">
-          <ac:chgData name="Bryan Khuu" userId="db4bb5bc1a416b49" providerId="Windows Live" clId="Web-{5E92D238-FBDD-49B1-A334-FD695E37C85F}" dt="2020-05-09T21:14:15.134" v="58"/>
-          <ac:spMkLst>
-            <pc:docMk/>
-            <pc:sldMk cId="3964110441" sldId="258"/>
-            <ac:spMk id="70" creationId="{2310D9BE-4AD2-4CC3-84FA-4E05790B5B9F}"/>
-          </ac:spMkLst>
-        </pc:spChg>
-        <pc:spChg chg="add del">
-          <ac:chgData name="Bryan Khuu" userId="db4bb5bc1a416b49" providerId="Windows Live" clId="Web-{5E92D238-FBDD-49B1-A334-FD695E37C85F}" dt="2020-05-09T21:14:20.288" v="64"/>
-          <ac:spMkLst>
-            <pc:docMk/>
-            <pc:sldMk cId="3964110441" sldId="258"/>
-            <ac:spMk id="71" creationId="{7B9607E2-1C76-424B-8FF0-580615846EC0}"/>
-          </ac:spMkLst>
-        </pc:spChg>
-        <pc:spChg chg="add del">
-          <ac:chgData name="Bryan Khuu" userId="db4bb5bc1a416b49" providerId="Windows Live" clId="Web-{5E92D238-FBDD-49B1-A334-FD695E37C85F}" dt="2020-05-09T21:14:15.134" v="58"/>
-          <ac:spMkLst>
-            <pc:docMk/>
-            <pc:sldMk cId="3964110441" sldId="258"/>
-            <ac:spMk id="72" creationId="{5D7CC766-DF6B-4E3F-8101-8D5F35D4AFFB}"/>
-          </ac:spMkLst>
-        </pc:spChg>
-        <pc:spChg chg="add del">
-          <ac:chgData name="Bryan Khuu" userId="db4bb5bc1a416b49" providerId="Windows Live" clId="Web-{5E92D238-FBDD-49B1-A334-FD695E37C85F}" dt="2020-05-09T21:14:20.288" v="64"/>
-          <ac:spMkLst>
-            <pc:docMk/>
-            <pc:sldMk cId="3964110441" sldId="258"/>
-            <ac:spMk id="73" creationId="{56A668AF-CC37-4641-8D2B-4C91B3ACBC81}"/>
-          </ac:spMkLst>
-        </pc:spChg>
-        <pc:spChg chg="add del">
-          <ac:chgData name="Bryan Khuu" userId="db4bb5bc1a416b49" providerId="Windows Live" clId="Web-{5E92D238-FBDD-49B1-A334-FD695E37C85F}" dt="2020-05-09T21:14:20.288" v="64"/>
-          <ac:spMkLst>
-            <pc:docMk/>
-            <pc:sldMk cId="3964110441" sldId="258"/>
-            <ac:spMk id="74" creationId="{5B3165DC-54F4-4EF5-8B97-5BE55AA3DBE9}"/>
-          </ac:spMkLst>
-        </pc:spChg>
-        <pc:spChg chg="add del">
-          <ac:chgData name="Bryan Khuu" userId="db4bb5bc1a416b49" providerId="Windows Live" clId="Web-{5E92D238-FBDD-49B1-A334-FD695E37C85F}" dt="2020-05-09T21:14:25.882" v="66"/>
-          <ac:spMkLst>
-            <pc:docMk/>
-            <pc:sldMk cId="3964110441" sldId="258"/>
-            <ac:spMk id="75" creationId="{98D49316-27CF-4C3D-BE8C-042F06B89148}"/>
-          </ac:spMkLst>
-        </pc:spChg>
-        <pc:spChg chg="add del">
-          <ac:chgData name="Bryan Khuu" userId="db4bb5bc1a416b49" providerId="Windows Live" clId="Web-{5E92D238-FBDD-49B1-A334-FD695E37C85F}" dt="2020-05-09T21:14:30.944" v="68"/>
-          <ac:spMkLst>
-            <pc:docMk/>
-            <pc:sldMk cId="3964110441" sldId="258"/>
-            <ac:spMk id="76" creationId="{930BC020-BDBF-49EB-9898-BAB5BF559317}"/>
-          </ac:spMkLst>
-        </pc:spChg>
-        <pc:spChg chg="add del">
-          <ac:chgData name="Bryan Khuu" userId="db4bb5bc1a416b49" providerId="Windows Live" clId="Web-{5E92D238-FBDD-49B1-A334-FD695E37C85F}" dt="2020-05-09T21:14:30.944" v="68"/>
-          <ac:spMkLst>
-            <pc:docMk/>
-            <pc:sldMk cId="3964110441" sldId="258"/>
-            <ac:spMk id="77" creationId="{64950C64-5D81-40F1-9601-8BA0D63BAE74}"/>
-          </ac:spMkLst>
-        </pc:spChg>
-        <pc:spChg chg="add del">
-          <ac:chgData name="Bryan Khuu" userId="db4bb5bc1a416b49" providerId="Windows Live" clId="Web-{5E92D238-FBDD-49B1-A334-FD695E37C85F}" dt="2020-05-09T21:14:37.288" v="70"/>
-          <ac:spMkLst>
-            <pc:docMk/>
-            <pc:sldMk cId="3964110441" sldId="258"/>
-            <ac:spMk id="78" creationId="{98D49316-27CF-4C3D-BE8C-042F06B89148}"/>
-          </ac:spMkLst>
-        </pc:spChg>
-        <pc:spChg chg="add del">
-          <ac:chgData name="Bryan Khuu" userId="db4bb5bc1a416b49" providerId="Windows Live" clId="Web-{5E92D238-FBDD-49B1-A334-FD695E37C85F}" dt="2020-05-09T21:15:17.116" v="80"/>
-          <ac:spMkLst>
-            <pc:docMk/>
-            <pc:sldMk cId="3964110441" sldId="258"/>
-            <ac:spMk id="79" creationId="{BA4C5437-838C-45F6-BFC8-3AF0ADE30FFB}"/>
-          </ac:spMkLst>
-        </pc:spChg>
-        <pc:spChg chg="add del">
-          <ac:chgData name="Bryan Khuu" userId="db4bb5bc1a416b49" providerId="Windows Live" clId="Web-{5E92D238-FBDD-49B1-A334-FD695E37C85F}" dt="2020-05-09T21:15:17.116" v="80"/>
-          <ac:spMkLst>
-            <pc:docMk/>
-            <pc:sldMk cId="3964110441" sldId="258"/>
-            <ac:spMk id="80" creationId="{FACBD493-E381-4822-8F8F-A4194DFDB109}"/>
-          </ac:spMkLst>
-        </pc:spChg>
-        <pc:spChg chg="add del">
-          <ac:chgData name="Bryan Khuu" userId="db4bb5bc1a416b49" providerId="Windows Live" clId="Web-{5E92D238-FBDD-49B1-A334-FD695E37C85F}" dt="2020-05-09T21:15:17.116" v="80"/>
-          <ac:spMkLst>
-            <pc:docMk/>
-            <pc:sldMk cId="3964110441" sldId="258"/>
-            <ac:spMk id="81" creationId="{2310D9BE-4AD2-4CC3-84FA-4E05790B5B9F}"/>
-          </ac:spMkLst>
-        </pc:spChg>
-        <pc:spChg chg="add del">
-          <ac:chgData name="Bryan Khuu" userId="db4bb5bc1a416b49" providerId="Windows Live" clId="Web-{5E92D238-FBDD-49B1-A334-FD695E37C85F}" dt="2020-05-09T21:15:17.116" v="80"/>
-          <ac:spMkLst>
-            <pc:docMk/>
-            <pc:sldMk cId="3964110441" sldId="258"/>
-            <ac:spMk id="82" creationId="{5D7CC766-DF6B-4E3F-8101-8D5F35D4AFFB}"/>
-          </ac:spMkLst>
-        </pc:spChg>
-        <pc:spChg chg="add del">
-          <ac:chgData name="Bryan Khuu" userId="db4bb5bc1a416b49" providerId="Windows Live" clId="Web-{5E92D238-FBDD-49B1-A334-FD695E37C85F}" dt="2020-05-09T21:15:35.334" v="88"/>
-          <ac:spMkLst>
-            <pc:docMk/>
-            <pc:sldMk cId="3964110441" sldId="258"/>
-            <ac:spMk id="87" creationId="{98D49316-27CF-4C3D-BE8C-042F06B89148}"/>
-          </ac:spMkLst>
-        </pc:spChg>
-        <pc:spChg chg="add del">
-          <ac:chgData name="Bryan Khuu" userId="db4bb5bc1a416b49" providerId="Windows Live" clId="Web-{5E92D238-FBDD-49B1-A334-FD695E37C85F}" dt="2020-05-09T21:15:33.131" v="85"/>
-          <ac:spMkLst>
-            <pc:docMk/>
-            <pc:sldMk cId="3964110441" sldId="258"/>
-            <ac:spMk id="89" creationId="{98D49316-27CF-4C3D-BE8C-042F06B89148}"/>
-          </ac:spMkLst>
-        </pc:spChg>
-        <pc:spChg chg="add del">
-          <ac:chgData name="Bryan Khuu" userId="db4bb5bc1a416b49" providerId="Windows Live" clId="Web-{5E92D238-FBDD-49B1-A334-FD695E37C85F}" dt="2020-05-09T21:15:35.319" v="87"/>
-          <ac:spMkLst>
-            <pc:docMk/>
-            <pc:sldMk cId="3964110441" sldId="258"/>
-            <ac:spMk id="90" creationId="{BA4C5437-838C-45F6-BFC8-3AF0ADE30FFB}"/>
-          </ac:spMkLst>
-        </pc:spChg>
-        <pc:spChg chg="add del">
-          <ac:chgData name="Bryan Khuu" userId="db4bb5bc1a416b49" providerId="Windows Live" clId="Web-{5E92D238-FBDD-49B1-A334-FD695E37C85F}" dt="2020-05-09T21:15:35.319" v="87"/>
-          <ac:spMkLst>
-            <pc:docMk/>
-            <pc:sldMk cId="3964110441" sldId="258"/>
-            <ac:spMk id="91" creationId="{FACBD493-E381-4822-8F8F-A4194DFDB109}"/>
-          </ac:spMkLst>
-        </pc:spChg>
-        <pc:spChg chg="add del">
-          <ac:chgData name="Bryan Khuu" userId="db4bb5bc1a416b49" providerId="Windows Live" clId="Web-{5E92D238-FBDD-49B1-A334-FD695E37C85F}" dt="2020-05-09T21:15:30.069" v="83"/>
-          <ac:spMkLst>
-            <pc:docMk/>
-            <pc:sldMk cId="3964110441" sldId="258"/>
-            <ac:spMk id="92" creationId="{7B9607E2-1C76-424B-8FF0-580615846EC0}"/>
-          </ac:spMkLst>
-        </pc:spChg>
-        <pc:spChg chg="add del">
-          <ac:chgData name="Bryan Khuu" userId="db4bb5bc1a416b49" providerId="Windows Live" clId="Web-{5E92D238-FBDD-49B1-A334-FD695E37C85F}" dt="2020-05-09T21:15:35.319" v="87"/>
-          <ac:spMkLst>
-            <pc:docMk/>
-            <pc:sldMk cId="3964110441" sldId="258"/>
-            <ac:spMk id="93" creationId="{2310D9BE-4AD2-4CC3-84FA-4E05790B5B9F}"/>
-          </ac:spMkLst>
-        </pc:spChg>
-        <pc:spChg chg="add del">
-          <ac:chgData name="Bryan Khuu" userId="db4bb5bc1a416b49" providerId="Windows Live" clId="Web-{5E92D238-FBDD-49B1-A334-FD695E37C85F}" dt="2020-05-09T21:15:30.069" v="83"/>
-          <ac:spMkLst>
-            <pc:docMk/>
-            <pc:sldMk cId="3964110441" sldId="258"/>
-            <ac:spMk id="94" creationId="{56A668AF-CC37-4641-8D2B-4C91B3ACBC81}"/>
-          </ac:spMkLst>
-        </pc:spChg>
-        <pc:spChg chg="add del">
-          <ac:chgData name="Bryan Khuu" userId="db4bb5bc1a416b49" providerId="Windows Live" clId="Web-{5E92D238-FBDD-49B1-A334-FD695E37C85F}" dt="2020-05-09T21:15:42.803" v="90"/>
-          <ac:spMkLst>
-            <pc:docMk/>
-            <pc:sldMk cId="3964110441" sldId="258"/>
-            <ac:spMk id="95" creationId="{98D49316-27CF-4C3D-BE8C-042F06B89148}"/>
-          </ac:spMkLst>
-        </pc:spChg>
-        <pc:spChg chg="add del">
-          <ac:chgData name="Bryan Khuu" userId="db4bb5bc1a416b49" providerId="Windows Live" clId="Web-{5E92D238-FBDD-49B1-A334-FD695E37C85F}" dt="2020-05-09T21:15:30.069" v="83"/>
-          <ac:spMkLst>
-            <pc:docMk/>
-            <pc:sldMk cId="3964110441" sldId="258"/>
-            <ac:spMk id="96" creationId="{5B3165DC-54F4-4EF5-8B97-5BE55AA3DBE9}"/>
-          </ac:spMkLst>
-        </pc:spChg>
-        <pc:spChg chg="add del">
-          <ac:chgData name="Bryan Khuu" userId="db4bb5bc1a416b49" providerId="Windows Live" clId="Web-{5E92D238-FBDD-49B1-A334-FD695E37C85F}" dt="2020-05-09T21:17:52.397" v="117"/>
-          <ac:spMkLst>
-            <pc:docMk/>
-            <pc:sldMk cId="3964110441" sldId="258"/>
-            <ac:spMk id="97" creationId="{C315E612-C0A2-4395-B579-9D425FAAC183}"/>
-          </ac:spMkLst>
-        </pc:spChg>
-        <pc:spChg chg="add del">
-          <ac:chgData name="Bryan Khuu" userId="db4bb5bc1a416b49" providerId="Windows Live" clId="Web-{5E92D238-FBDD-49B1-A334-FD695E37C85F}" dt="2020-05-09T21:15:35.319" v="87"/>
-          <ac:spMkLst>
-            <pc:docMk/>
-            <pc:sldMk cId="3964110441" sldId="258"/>
-            <ac:spMk id="98" creationId="{5D7CC766-DF6B-4E3F-8101-8D5F35D4AFFB}"/>
-          </ac:spMkLst>
-        </pc:spChg>
-        <pc:spChg chg="add del">
-          <ac:chgData name="Bryan Khuu" userId="db4bb5bc1a416b49" providerId="Windows Live" clId="Web-{5E92D238-FBDD-49B1-A334-FD695E37C85F}" dt="2020-05-09T21:17:20.131" v="106"/>
-          <ac:spMkLst>
-            <pc:docMk/>
-            <pc:sldMk cId="3964110441" sldId="258"/>
-            <ac:spMk id="100" creationId="{BA4C5437-838C-45F6-BFC8-3AF0ADE30FFB}"/>
-          </ac:spMkLst>
-        </pc:spChg>
-        <pc:spChg chg="add del">
-          <ac:chgData name="Bryan Khuu" userId="db4bb5bc1a416b49" providerId="Windows Live" clId="Web-{5E92D238-FBDD-49B1-A334-FD695E37C85F}" dt="2020-05-09T21:17:36.975" v="112"/>
-          <ac:spMkLst>
-            <pc:docMk/>
-            <pc:sldMk cId="3964110441" sldId="258"/>
-            <ac:spMk id="101" creationId="{A88B48CE-97F9-4924-96D2-BEAD09D4B7D3}"/>
-          </ac:spMkLst>
-        </pc:spChg>
-        <pc:spChg chg="add del">
-          <ac:chgData name="Bryan Khuu" userId="db4bb5bc1a416b49" providerId="Windows Live" clId="Web-{5E92D238-FBDD-49B1-A334-FD695E37C85F}" dt="2020-05-09T21:17:20.131" v="106"/>
-          <ac:spMkLst>
-            <pc:docMk/>
-            <pc:sldMk cId="3964110441" sldId="258"/>
-            <ac:spMk id="102" creationId="{FACBD493-E381-4822-8F8F-A4194DFDB109}"/>
-          </ac:spMkLst>
-        </pc:spChg>
-        <pc:spChg chg="add del">
-          <ac:chgData name="Bryan Khuu" userId="db4bb5bc1a416b49" providerId="Windows Live" clId="Web-{5E92D238-FBDD-49B1-A334-FD695E37C85F}" dt="2020-05-09T21:17:20.131" v="106"/>
-          <ac:spMkLst>
-            <pc:docMk/>
-            <pc:sldMk cId="3964110441" sldId="258"/>
-            <ac:spMk id="104" creationId="{2310D9BE-4AD2-4CC3-84FA-4E05790B5B9F}"/>
-          </ac:spMkLst>
-        </pc:spChg>
-        <pc:spChg chg="add del">
-          <ac:chgData name="Bryan Khuu" userId="db4bb5bc1a416b49" providerId="Windows Live" clId="Web-{5E92D238-FBDD-49B1-A334-FD695E37C85F}" dt="2020-05-09T21:17:39.663" v="114"/>
-          <ac:spMkLst>
-            <pc:docMk/>
-            <pc:sldMk cId="3964110441" sldId="258"/>
-            <ac:spMk id="105" creationId="{5E69A754-1A4C-4BC4-A2DD-34A040EFC65D}"/>
-          </ac:spMkLst>
-        </pc:spChg>
-        <pc:spChg chg="add del">
-          <ac:chgData name="Bryan Khuu" userId="db4bb5bc1a416b49" providerId="Windows Live" clId="Web-{5E92D238-FBDD-49B1-A334-FD695E37C85F}" dt="2020-05-09T21:17:20.131" v="106"/>
-          <ac:spMkLst>
-            <pc:docMk/>
-            <pc:sldMk cId="3964110441" sldId="258"/>
-            <ac:spMk id="106" creationId="{5D7CC766-DF6B-4E3F-8101-8D5F35D4AFFB}"/>
-          </ac:spMkLst>
-        </pc:spChg>
-        <pc:spChg chg="add del">
-          <ac:chgData name="Bryan Khuu" userId="db4bb5bc1a416b49" providerId="Windows Live" clId="Web-{5E92D238-FBDD-49B1-A334-FD695E37C85F}" dt="2020-05-09T21:17:10.179" v="103"/>
-          <ac:spMkLst>
-            <pc:docMk/>
-            <pc:sldMk cId="3964110441" sldId="258"/>
-            <ac:spMk id="108" creationId="{B8D39262-9511-4F20-8344-1B9DA68877A8}"/>
-          </ac:spMkLst>
-        </pc:spChg>
-        <pc:spChg chg="add del">
-          <ac:chgData name="Bryan Khuu" userId="db4bb5bc1a416b49" providerId="Windows Live" clId="Web-{5E92D238-FBDD-49B1-A334-FD695E37C85F}" dt="2020-05-09T21:17:10.179" v="103"/>
-          <ac:spMkLst>
-            <pc:docMk/>
-            <pc:sldMk cId="3964110441" sldId="258"/>
-            <ac:spMk id="109" creationId="{4F924495-5138-4BB6-B18C-C83EC04341D6}"/>
-          </ac:spMkLst>
-        </pc:spChg>
-        <pc:spChg chg="add del">
-          <ac:chgData name="Bryan Khuu" userId="db4bb5bc1a416b49" providerId="Windows Live" clId="Web-{5E92D238-FBDD-49B1-A334-FD695E37C85F}" dt="2020-05-09T21:17:10.179" v="103"/>
-          <ac:spMkLst>
-            <pc:docMk/>
-            <pc:sldMk cId="3964110441" sldId="258"/>
-            <ac:spMk id="110" creationId="{428AFF86-4DDC-4A60-AC4C-48C6DAE56894}"/>
-          </ac:spMkLst>
-        </pc:spChg>
-        <pc:spChg chg="add del">
-          <ac:chgData name="Bryan Khuu" userId="db4bb5bc1a416b49" providerId="Windows Live" clId="Web-{5E92D238-FBDD-49B1-A334-FD695E37C85F}" dt="2020-05-09T21:17:08.256" v="101"/>
-          <ac:spMkLst>
-            <pc:docMk/>
-            <pc:sldMk cId="3964110441" sldId="258"/>
-            <ac:spMk id="111" creationId="{BA4C5437-838C-45F6-BFC8-3AF0ADE30FFB}"/>
-          </ac:spMkLst>
-        </pc:spChg>
-        <pc:spChg chg="add del">
-          <ac:chgData name="Bryan Khuu" userId="db4bb5bc1a416b49" providerId="Windows Live" clId="Web-{5E92D238-FBDD-49B1-A334-FD695E37C85F}" dt="2020-05-09T21:17:20.116" v="105"/>
-          <ac:spMkLst>
-            <pc:docMk/>
-            <pc:sldMk cId="3964110441" sldId="258"/>
-            <ac:spMk id="112" creationId="{1660E788-AFA9-4A1B-9991-6AA74632A15B}"/>
-          </ac:spMkLst>
-        </pc:spChg>
-        <pc:spChg chg="add del">
-          <ac:chgData name="Bryan Khuu" userId="db4bb5bc1a416b49" providerId="Windows Live" clId="Web-{5E92D238-FBDD-49B1-A334-FD695E37C85F}" dt="2020-05-09T21:17:08.256" v="101"/>
-          <ac:spMkLst>
-            <pc:docMk/>
-            <pc:sldMk cId="3964110441" sldId="258"/>
-            <ac:spMk id="113" creationId="{FACBD493-E381-4822-8F8F-A4194DFDB109}"/>
-          </ac:spMkLst>
-        </pc:spChg>
-        <pc:spChg chg="add del">
-          <ac:chgData name="Bryan Khuu" userId="db4bb5bc1a416b49" providerId="Windows Live" clId="Web-{5E92D238-FBDD-49B1-A334-FD695E37C85F}" dt="2020-05-09T21:17:20.116" v="105"/>
-          <ac:spMkLst>
-            <pc:docMk/>
-            <pc:sldMk cId="3964110441" sldId="258"/>
-            <ac:spMk id="114" creationId="{867D4867-5BA7-4462-B2F6-A23F4A622AA7}"/>
-          </ac:spMkLst>
-        </pc:spChg>
-        <pc:spChg chg="add del">
-          <ac:chgData name="Bryan Khuu" userId="db4bb5bc1a416b49" providerId="Windows Live" clId="Web-{5E92D238-FBDD-49B1-A334-FD695E37C85F}" dt="2020-05-09T21:17:08.256" v="101"/>
-          <ac:spMkLst>
-            <pc:docMk/>
-            <pc:sldMk cId="3964110441" sldId="258"/>
-            <ac:spMk id="115" creationId="{2310D9BE-4AD2-4CC3-84FA-4E05790B5B9F}"/>
-          </ac:spMkLst>
-        </pc:spChg>
-        <pc:spChg chg="add del">
-          <ac:chgData name="Bryan Khuu" userId="db4bb5bc1a416b49" providerId="Windows Live" clId="Web-{5E92D238-FBDD-49B1-A334-FD695E37C85F}" dt="2020-05-09T21:20:12.710" v="154"/>
-          <ac:spMkLst>
-            <pc:docMk/>
-            <pc:sldMk cId="3964110441" sldId="258"/>
-            <ac:spMk id="116" creationId="{C315E612-C0A2-4395-B579-9D425FAAC183}"/>
-          </ac:spMkLst>
-        </pc:spChg>
-        <pc:spChg chg="add del">
-          <ac:chgData name="Bryan Khuu" userId="db4bb5bc1a416b49" providerId="Windows Live" clId="Web-{5E92D238-FBDD-49B1-A334-FD695E37C85F}" dt="2020-05-09T21:17:08.256" v="101"/>
-          <ac:spMkLst>
-            <pc:docMk/>
-            <pc:sldMk cId="3964110441" sldId="258"/>
-            <ac:spMk id="117" creationId="{5D7CC766-DF6B-4E3F-8101-8D5F35D4AFFB}"/>
-          </ac:spMkLst>
-        </pc:spChg>
-        <pc:spChg chg="add del">
-          <ac:chgData name="Bryan Khuu" userId="db4bb5bc1a416b49" providerId="Windows Live" clId="Web-{5E92D238-FBDD-49B1-A334-FD695E37C85F}" dt="2020-05-09T21:20:11.444" v="153"/>
-          <ac:spMkLst>
-            <pc:docMk/>
-            <pc:sldMk cId="3964110441" sldId="258"/>
-            <ac:spMk id="119" creationId="{A88B48CE-97F9-4924-96D2-BEAD09D4B7D3}"/>
-          </ac:spMkLst>
-        </pc:spChg>
-        <pc:spChg chg="add del ord">
-          <ac:chgData name="Bryan Khuu" userId="db4bb5bc1a416b49" providerId="Windows Live" clId="Web-{5E92D238-FBDD-49B1-A334-FD695E37C85F}" dt="2020-05-09T21:20:45.819" v="166"/>
-          <ac:spMkLst>
-            <pc:docMk/>
-            <pc:sldMk cId="3964110441" sldId="258"/>
-            <ac:spMk id="121" creationId="{5E69A754-1A4C-4BC4-A2DD-34A040EFC65D}"/>
-          </ac:spMkLst>
-        </pc:spChg>
-        <pc:spChg chg="add del">
-          <ac:chgData name="Bryan Khuu" userId="db4bb5bc1a416b49" providerId="Windows Live" clId="Web-{5E92D238-FBDD-49B1-A334-FD695E37C85F}" dt="2020-05-09T21:20:23.600" v="158"/>
-          <ac:spMkLst>
-            <pc:docMk/>
-            <pc:sldMk cId="3964110441" sldId="258"/>
-            <ac:spMk id="124" creationId="{BA4C5437-838C-45F6-BFC8-3AF0ADE30FFB}"/>
-          </ac:spMkLst>
-        </pc:spChg>
-        <pc:spChg chg="add del">
-          <ac:chgData name="Bryan Khuu" userId="db4bb5bc1a416b49" providerId="Windows Live" clId="Web-{5E92D238-FBDD-49B1-A334-FD695E37C85F}" dt="2020-05-09T21:20:29.085" v="160"/>
-          <ac:spMkLst>
-            <pc:docMk/>
-            <pc:sldMk cId="3964110441" sldId="258"/>
-            <ac:spMk id="125" creationId="{1660E788-AFA9-4A1B-9991-6AA74632A15B}"/>
-          </ac:spMkLst>
-        </pc:spChg>
-        <pc:spChg chg="add del">
-          <ac:chgData name="Bryan Khuu" userId="db4bb5bc1a416b49" providerId="Windows Live" clId="Web-{5E92D238-FBDD-49B1-A334-FD695E37C85F}" dt="2020-05-09T21:20:29.085" v="160"/>
-          <ac:spMkLst>
-            <pc:docMk/>
-            <pc:sldMk cId="3964110441" sldId="258"/>
-            <ac:spMk id="126" creationId="{867D4867-5BA7-4462-B2F6-A23F4A622AA7}"/>
-          </ac:spMkLst>
-        </pc:spChg>
-        <pc:spChg chg="add del">
-          <ac:chgData name="Bryan Khuu" userId="db4bb5bc1a416b49" providerId="Windows Live" clId="Web-{5E92D238-FBDD-49B1-A334-FD695E37C85F}" dt="2020-05-09T21:20:22.647" v="156"/>
-          <ac:spMkLst>
-            <pc:docMk/>
-            <pc:sldMk cId="3964110441" sldId="258"/>
-            <ac:spMk id="127" creationId="{98D49316-27CF-4C3D-BE8C-042F06B89148}"/>
-          </ac:spMkLst>
-        </pc:spChg>
-        <pc:spChg chg="add del">
-          <ac:chgData name="Bryan Khuu" userId="db4bb5bc1a416b49" providerId="Windows Live" clId="Web-{5E92D238-FBDD-49B1-A334-FD695E37C85F}" dt="2020-05-09T21:20:35.381" v="162"/>
-          <ac:spMkLst>
-            <pc:docMk/>
-            <pc:sldMk cId="3964110441" sldId="258"/>
-            <ac:spMk id="128" creationId="{7D587F9F-3F48-4929-8532-62B82B3F66BE}"/>
-          </ac:spMkLst>
-        </pc:spChg>
-        <pc:spChg chg="add del">
-          <ac:chgData name="Bryan Khuu" userId="db4bb5bc1a416b49" providerId="Windows Live" clId="Web-{5E92D238-FBDD-49B1-A334-FD695E37C85F}" dt="2020-05-09T21:20:23.600" v="158"/>
-          <ac:spMkLst>
-            <pc:docMk/>
-            <pc:sldMk cId="3964110441" sldId="258"/>
-            <ac:spMk id="129" creationId="{FACBD493-E381-4822-8F8F-A4194DFDB109}"/>
-          </ac:spMkLst>
-        </pc:spChg>
-        <pc:spChg chg="add del">
-          <ac:chgData name="Bryan Khuu" userId="db4bb5bc1a416b49" providerId="Windows Live" clId="Web-{5E92D238-FBDD-49B1-A334-FD695E37C85F}" dt="2020-05-09T21:20:35.381" v="162"/>
-          <ac:spMkLst>
-            <pc:docMk/>
-            <pc:sldMk cId="3964110441" sldId="258"/>
-            <ac:spMk id="130" creationId="{6DCB66B2-3729-41B6-8A12-AB8550189D5E}"/>
-          </ac:spMkLst>
-        </pc:spChg>
-        <pc:spChg chg="add del">
-          <ac:chgData name="Bryan Khuu" userId="db4bb5bc1a416b49" providerId="Windows Live" clId="Web-{5E92D238-FBDD-49B1-A334-FD695E37C85F}" dt="2020-05-09T21:20:23.600" v="158"/>
-          <ac:spMkLst>
-            <pc:docMk/>
-            <pc:sldMk cId="3964110441" sldId="258"/>
-            <ac:spMk id="131" creationId="{2310D9BE-4AD2-4CC3-84FA-4E05790B5B9F}"/>
-          </ac:spMkLst>
-        </pc:spChg>
-        <pc:spChg chg="add del">
-          <ac:chgData name="Bryan Khuu" userId="db4bb5bc1a416b49" providerId="Windows Live" clId="Web-{5E92D238-FBDD-49B1-A334-FD695E37C85F}" dt="2020-05-09T21:20:35.381" v="162"/>
-          <ac:spMkLst>
-            <pc:docMk/>
-            <pc:sldMk cId="3964110441" sldId="258"/>
-            <ac:spMk id="132" creationId="{ABA662FB-3DC6-4E93-98AC-B84BA41F4859}"/>
-          </ac:spMkLst>
-        </pc:spChg>
-        <pc:spChg chg="add del">
-          <ac:chgData name="Bryan Khuu" userId="db4bb5bc1a416b49" providerId="Windows Live" clId="Web-{5E92D238-FBDD-49B1-A334-FD695E37C85F}" dt="2020-05-09T21:20:23.600" v="158"/>
-          <ac:spMkLst>
-            <pc:docMk/>
-            <pc:sldMk cId="3964110441" sldId="258"/>
-            <ac:spMk id="133" creationId="{5D7CC766-DF6B-4E3F-8101-8D5F35D4AFFB}"/>
-          </ac:spMkLst>
-        </pc:spChg>
-        <pc:spChg chg="add del">
-          <ac:chgData name="Bryan Khuu" userId="db4bb5bc1a416b49" providerId="Windows Live" clId="Web-{5E92D238-FBDD-49B1-A334-FD695E37C85F}" dt="2020-05-09T21:20:35.381" v="162"/>
-          <ac:spMkLst>
-            <pc:docMk/>
-            <pc:sldMk cId="3964110441" sldId="258"/>
-            <ac:spMk id="134" creationId="{FB9BE604-0CC0-41C8-9673-995F82DA0257}"/>
-          </ac:spMkLst>
-        </pc:spChg>
-        <pc:spChg chg="add del">
-          <ac:chgData name="Bryan Khuu" userId="db4bb5bc1a416b49" providerId="Windows Live" clId="Web-{5E92D238-FBDD-49B1-A334-FD695E37C85F}" dt="2020-05-09T21:20:35.381" v="162"/>
-          <ac:spMkLst>
-            <pc:docMk/>
-            <pc:sldMk cId="3964110441" sldId="258"/>
-            <ac:spMk id="135" creationId="{2036372A-822B-498E-AD05-6BE85743A094}"/>
-          </ac:spMkLst>
-        </pc:spChg>
-        <pc:spChg chg="add del">
-          <ac:chgData name="Bryan Khuu" userId="db4bb5bc1a416b49" providerId="Windows Live" clId="Web-{5E92D238-FBDD-49B1-A334-FD695E37C85F}" dt="2020-05-09T21:20:38.930" v="164"/>
-          <ac:spMkLst>
-            <pc:docMk/>
-            <pc:sldMk cId="3964110441" sldId="258"/>
-            <ac:spMk id="136" creationId="{1660E788-AFA9-4A1B-9991-6AA74632A15B}"/>
-          </ac:spMkLst>
-        </pc:spChg>
-        <pc:spChg chg="add del">
-          <ac:chgData name="Bryan Khuu" userId="db4bb5bc1a416b49" providerId="Windows Live" clId="Web-{5E92D238-FBDD-49B1-A334-FD695E37C85F}" dt="2020-05-09T21:20:38.930" v="164"/>
-          <ac:spMkLst>
-            <pc:docMk/>
-            <pc:sldMk cId="3964110441" sldId="258"/>
-            <ac:spMk id="137" creationId="{867D4867-5BA7-4462-B2F6-A23F4A622AA7}"/>
-          </ac:spMkLst>
-        </pc:spChg>
-        <pc:spChg chg="add del">
-          <ac:chgData name="Bryan Khuu" userId="db4bb5bc1a416b49" providerId="Windows Live" clId="Web-{5E92D238-FBDD-49B1-A334-FD695E37C85F}" dt="2020-05-09T21:21:04.881" v="170"/>
-          <ac:spMkLst>
-            <pc:docMk/>
-            <pc:sldMk cId="3964110441" sldId="258"/>
-            <ac:spMk id="138" creationId="{98D49316-27CF-4C3D-BE8C-042F06B89148}"/>
-          </ac:spMkLst>
-        </pc:spChg>
-        <pc:spChg chg="add del">
-          <ac:chgData name="Bryan Khuu" userId="db4bb5bc1a416b49" providerId="Windows Live" clId="Web-{5E92D238-FBDD-49B1-A334-FD695E37C85F}" dt="2020-05-09T21:21:14.991" v="172"/>
-          <ac:spMkLst>
-            <pc:docMk/>
-            <pc:sldMk cId="3964110441" sldId="258"/>
-            <ac:spMk id="139" creationId="{7B9607E2-1C76-424B-8FF0-580615846EC0}"/>
-          </ac:spMkLst>
-        </pc:spChg>
-        <pc:spChg chg="add del">
-          <ac:chgData name="Bryan Khuu" userId="db4bb5bc1a416b49" providerId="Windows Live" clId="Web-{5E92D238-FBDD-49B1-A334-FD695E37C85F}" dt="2020-05-09T21:21:14.991" v="172"/>
-          <ac:spMkLst>
-            <pc:docMk/>
-            <pc:sldMk cId="3964110441" sldId="258"/>
-            <ac:spMk id="140" creationId="{56A668AF-CC37-4641-8D2B-4C91B3ACBC81}"/>
-          </ac:spMkLst>
-        </pc:spChg>
-        <pc:spChg chg="add del">
-          <ac:chgData name="Bryan Khuu" userId="db4bb5bc1a416b49" providerId="Windows Live" clId="Web-{5E92D238-FBDD-49B1-A334-FD695E37C85F}" dt="2020-05-09T21:21:14.991" v="172"/>
-          <ac:spMkLst>
-            <pc:docMk/>
-            <pc:sldMk cId="3964110441" sldId="258"/>
-            <ac:spMk id="141" creationId="{5B3165DC-54F4-4EF5-8B97-5BE55AA3DBE9}"/>
-          </ac:spMkLst>
-        </pc:spChg>
-        <pc:spChg chg="add del">
-          <ac:chgData name="Bryan Khuu" userId="db4bb5bc1a416b49" providerId="Windows Live" clId="Web-{5E92D238-FBDD-49B1-A334-FD695E37C85F}" dt="2020-05-09T21:21:18.569" v="174"/>
-          <ac:spMkLst>
-            <pc:docMk/>
-            <pc:sldMk cId="3964110441" sldId="258"/>
-            <ac:spMk id="142" creationId="{1660E788-AFA9-4A1B-9991-6AA74632A15B}"/>
-          </ac:spMkLst>
-        </pc:spChg>
-        <pc:spChg chg="add del">
-          <ac:chgData name="Bryan Khuu" userId="db4bb5bc1a416b49" providerId="Windows Live" clId="Web-{5E92D238-FBDD-49B1-A334-FD695E37C85F}" dt="2020-05-09T21:21:18.569" v="174"/>
-          <ac:spMkLst>
-            <pc:docMk/>
-            <pc:sldMk cId="3964110441" sldId="258"/>
-            <ac:spMk id="143" creationId="{867D4867-5BA7-4462-B2F6-A23F4A622AA7}"/>
-          </ac:spMkLst>
-        </pc:spChg>
-        <pc:spChg chg="add del">
-          <ac:chgData name="Bryan Khuu" userId="db4bb5bc1a416b49" providerId="Windows Live" clId="Web-{5E92D238-FBDD-49B1-A334-FD695E37C85F}" dt="2020-05-09T21:23:06.803" v="192"/>
-          <ac:spMkLst>
-            <pc:docMk/>
-            <pc:sldMk cId="3964110441" sldId="258"/>
-            <ac:spMk id="144" creationId="{98D49316-27CF-4C3D-BE8C-042F06B89148}"/>
-          </ac:spMkLst>
-        </pc:spChg>
-        <pc:spChg chg="add del">
-          <ac:chgData name="Bryan Khuu" userId="db4bb5bc1a416b49" providerId="Windows Live" clId="Web-{5E92D238-FBDD-49B1-A334-FD695E37C85F}" dt="2020-05-09T21:22:56.585" v="189"/>
-          <ac:spMkLst>
-            <pc:docMk/>
-            <pc:sldMk cId="3964110441" sldId="258"/>
-            <ac:spMk id="146" creationId="{98D49316-27CF-4C3D-BE8C-042F06B89148}"/>
-          </ac:spMkLst>
-        </pc:spChg>
-        <pc:spChg chg="add del">
-          <ac:chgData name="Bryan Khuu" userId="db4bb5bc1a416b49" providerId="Windows Live" clId="Web-{5E92D238-FBDD-49B1-A334-FD695E37C85F}" dt="2020-05-09T21:23:39.960" v="204"/>
-          <ac:spMkLst>
-            <pc:docMk/>
-            <pc:sldMk cId="3964110441" sldId="258"/>
-            <ac:spMk id="148" creationId="{1660E788-AFA9-4A1B-9991-6AA74632A15B}"/>
-          </ac:spMkLst>
-        </pc:spChg>
-        <pc:spChg chg="add del">
-          <ac:chgData name="Bryan Khuu" userId="db4bb5bc1a416b49" providerId="Windows Live" clId="Web-{5E92D238-FBDD-49B1-A334-FD695E37C85F}" dt="2020-05-09T21:22:47.241" v="183"/>
-          <ac:spMkLst>
-            <pc:docMk/>
-            <pc:sldMk cId="3964110441" sldId="258"/>
-            <ac:spMk id="149" creationId="{98D49316-27CF-4C3D-BE8C-042F06B89148}"/>
-          </ac:spMkLst>
-        </pc:spChg>
-        <pc:spChg chg="add del">
-          <ac:chgData name="Bryan Khuu" userId="db4bb5bc1a416b49" providerId="Windows Live" clId="Web-{5E92D238-FBDD-49B1-A334-FD695E37C85F}" dt="2020-05-09T21:23:39.960" v="204"/>
-          <ac:spMkLst>
-            <pc:docMk/>
-            <pc:sldMk cId="3964110441" sldId="258"/>
-            <ac:spMk id="150" creationId="{867D4867-5BA7-4462-B2F6-A23F4A622AA7}"/>
-          </ac:spMkLst>
-        </pc:spChg>
-        <pc:spChg chg="add del">
-          <ac:chgData name="Bryan Khuu" userId="db4bb5bc1a416b49" providerId="Windows Live" clId="Web-{5E92D238-FBDD-49B1-A334-FD695E37C85F}" dt="2020-05-09T21:23:45.413" v="206"/>
-          <ac:spMkLst>
-            <pc:docMk/>
-            <pc:sldMk cId="3964110441" sldId="258"/>
-            <ac:spMk id="151" creationId="{1660E788-AFA9-4A1B-9991-6AA74632A15B}"/>
-          </ac:spMkLst>
-        </pc:spChg>
-        <pc:spChg chg="add del">
-          <ac:chgData name="Bryan Khuu" userId="db4bb5bc1a416b49" providerId="Windows Live" clId="Web-{5E92D238-FBDD-49B1-A334-FD695E37C85F}" dt="2020-05-09T21:23:45.413" v="206"/>
-          <ac:spMkLst>
-            <pc:docMk/>
-            <pc:sldMk cId="3964110441" sldId="258"/>
-            <ac:spMk id="152" creationId="{867D4867-5BA7-4462-B2F6-A23F4A622AA7}"/>
-          </ac:spMkLst>
-        </pc:spChg>
-        <pc:picChg chg="del mod ord">
-          <ac:chgData name="Bryan Khuu" userId="db4bb5bc1a416b49" providerId="Windows Live" clId="Web-{5E92D238-FBDD-49B1-A334-FD695E37C85F}" dt="2020-05-09T21:17:55.960" v="119"/>
+        <pc:picChg chg="add del mod">
+          <ac:chgData name="Pawel Juda" userId="f6ddb2cecf310bfe" providerId="Windows Live" clId="Web-{1BB566C2-5DB8-4F38-9573-BB226982695B}" dt="2020-05-09T19:21:27.683" v="79"/>
           <ac:picMkLst>
             <pc:docMk/>
-            <pc:sldMk cId="3964110441" sldId="258"/>
-            <ac:picMk id="5" creationId="{A4958B17-BD18-4486-A553-006D964DC15F}"/>
-          </ac:picMkLst>
-        </pc:picChg>
-        <pc:picChg chg="del mod ord">
-          <ac:chgData name="Bryan Khuu" userId="db4bb5bc1a416b49" providerId="Windows Live" clId="Web-{5E92D238-FBDD-49B1-A334-FD695E37C85F}" dt="2020-05-09T21:17:54.131" v="118"/>
-          <ac:picMkLst>
-            <pc:docMk/>
-            <pc:sldMk cId="3964110441" sldId="258"/>
-            <ac:picMk id="8" creationId="{08A9CD7F-3765-4AAE-999A-38156C29B389}"/>
-          </ac:picMkLst>
-        </pc:picChg>
-        <pc:picChg chg="del mod ord">
-          <ac:chgData name="Bryan Khuu" userId="db4bb5bc1a416b49" providerId="Windows Live" clId="Web-{5E92D238-FBDD-49B1-A334-FD695E37C85F}" dt="2020-05-09T21:18:26.694" v="134"/>
-          <ac:picMkLst>
-            <pc:docMk/>
-            <pc:sldMk cId="3964110441" sldId="258"/>
-            <ac:picMk id="9" creationId="{F2F87F3E-3CE9-4392-A054-9B488E1066F8}"/>
-          </ac:picMkLst>
-        </pc:picChg>
-        <pc:picChg chg="add del mod">
-          <ac:chgData name="Bryan Khuu" userId="db4bb5bc1a416b49" providerId="Windows Live" clId="Web-{5E92D238-FBDD-49B1-A334-FD695E37C85F}" dt="2020-05-09T21:18:27.850" v="135"/>
-          <ac:picMkLst>
-            <pc:docMk/>
-            <pc:sldMk cId="3964110441" sldId="258"/>
-            <ac:picMk id="99" creationId="{95A42C80-418C-40FA-A646-5A29D097819E}"/>
-          </ac:picMkLst>
-        </pc:picChg>
-        <pc:picChg chg="add del mod">
-          <ac:chgData name="Bryan Khuu" userId="db4bb5bc1a416b49" providerId="Windows Live" clId="Web-{5E92D238-FBDD-49B1-A334-FD695E37C85F}" dt="2020-05-09T21:18:26.694" v="133"/>
-          <ac:picMkLst>
-            <pc:docMk/>
-            <pc:sldMk cId="3964110441" sldId="258"/>
-            <ac:picMk id="103" creationId="{B120DFB6-572B-4517-8F76-40D6E3220125}"/>
-          </ac:picMkLst>
-        </pc:picChg>
-        <pc:picChg chg="add del mod">
-          <ac:chgData name="Bryan Khuu" userId="db4bb5bc1a416b49" providerId="Windows Live" clId="Web-{5E92D238-FBDD-49B1-A334-FD695E37C85F}" dt="2020-05-09T21:18:26.694" v="132"/>
-          <ac:picMkLst>
-            <pc:docMk/>
-            <pc:sldMk cId="3964110441" sldId="258"/>
-            <ac:picMk id="107" creationId="{BC49460F-BD53-4D14-8183-4899D4E3687C}"/>
-          </ac:picMkLst>
-        </pc:picChg>
-        <pc:picChg chg="add del mod ord">
-          <ac:chgData name="Bryan Khuu" userId="db4bb5bc1a416b49" providerId="Windows Live" clId="Web-{5E92D238-FBDD-49B1-A334-FD695E37C85F}" dt="2020-05-09T22:01:58.833" v="550"/>
-          <ac:picMkLst>
-            <pc:docMk/>
-            <pc:sldMk cId="3964110441" sldId="258"/>
-            <ac:picMk id="118" creationId="{95A42C80-418C-40FA-A646-5A29D097819E}"/>
-          </ac:picMkLst>
-        </pc:picChg>
-        <pc:picChg chg="add del mod ord modCrop">
-          <ac:chgData name="Bryan Khuu" userId="db4bb5bc1a416b49" providerId="Windows Live" clId="Web-{5E92D238-FBDD-49B1-A334-FD695E37C85F}" dt="2020-05-09T22:02:00.474" v="551" actId="1076"/>
-          <ac:picMkLst>
-            <pc:docMk/>
-            <pc:sldMk cId="3964110441" sldId="258"/>
-            <ac:picMk id="120" creationId="{B120DFB6-572B-4517-8F76-40D6E3220125}"/>
-          </ac:picMkLst>
-        </pc:picChg>
-        <pc:picChg chg="add del mod ord modCrop">
-          <ac:chgData name="Bryan Khuu" userId="db4bb5bc1a416b49" providerId="Windows Live" clId="Web-{5E92D238-FBDD-49B1-A334-FD695E37C85F}" dt="2020-05-09T22:02:01.864" v="552" actId="1076"/>
-          <ac:picMkLst>
-            <pc:docMk/>
-            <pc:sldMk cId="3964110441" sldId="258"/>
-            <ac:picMk id="122" creationId="{BC49460F-BD53-4D14-8183-4899D4E3687C}"/>
-          </ac:picMkLst>
-        </pc:picChg>
-        <pc:picChg chg="add del mod">
-          <ac:chgData name="Bryan Khuu" userId="db4bb5bc1a416b49" providerId="Windows Live" clId="Web-{5E92D238-FBDD-49B1-A334-FD695E37C85F}" dt="2020-05-09T21:23:24.553" v="202"/>
-          <ac:picMkLst>
-            <pc:docMk/>
-            <pc:sldMk cId="3964110441" sldId="258"/>
-            <ac:picMk id="145" creationId="{71A3090E-2821-4DB7-A1FB-7B518579FF8A}"/>
-          </ac:picMkLst>
-        </pc:picChg>
-        <pc:picChg chg="add del mod">
-          <ac:chgData name="Bryan Khuu" userId="db4bb5bc1a416b49" providerId="Windows Live" clId="Web-{5E92D238-FBDD-49B1-A334-FD695E37C85F}" dt="2020-05-09T21:23:24.553" v="201"/>
-          <ac:picMkLst>
-            <pc:docMk/>
-            <pc:sldMk cId="3964110441" sldId="258"/>
-            <ac:picMk id="147" creationId="{5CD731E1-4CF8-4839-A05E-00E2AC11644B}"/>
-          </ac:picMkLst>
-        </pc:picChg>
-        <pc:picChg chg="add del">
-          <ac:chgData name="Bryan Khuu" userId="db4bb5bc1a416b49" providerId="Windows Live" clId="Web-{5E92D238-FBDD-49B1-A334-FD695E37C85F}" dt="2020-05-09T21:23:50.913" v="208"/>
-          <ac:picMkLst>
-            <pc:docMk/>
-            <pc:sldMk cId="3964110441" sldId="258"/>
-            <ac:picMk id="153" creationId="{48E20A91-1782-4B1D-B655-65530A6C3286}"/>
-          </ac:picMkLst>
-        </pc:picChg>
-      </pc:sldChg>
-      <pc:sldChg chg="addSp delSp modSp new mod setBg">
-        <pc:chgData name="Bryan Khuu" userId="db4bb5bc1a416b49" providerId="Windows Live" clId="Web-{5E92D238-FBDD-49B1-A334-FD695E37C85F}" dt="2020-05-09T22:12:28.294" v="683" actId="20577"/>
-        <pc:sldMkLst>
-          <pc:docMk/>
-          <pc:sldMk cId="865442861" sldId="259"/>
-        </pc:sldMkLst>
-        <pc:spChg chg="mod">
-          <ac:chgData name="Bryan Khuu" userId="db4bb5bc1a416b49" providerId="Windows Live" clId="Web-{5E92D238-FBDD-49B1-A334-FD695E37C85F}" dt="2020-05-09T22:10:58.243" v="670"/>
-          <ac:spMkLst>
-            <pc:docMk/>
-            <pc:sldMk cId="865442861" sldId="259"/>
-            <ac:spMk id="2" creationId="{69611A84-1B73-45B8-9EE1-200D3F0E0A31}"/>
-          </ac:spMkLst>
-        </pc:spChg>
-        <pc:spChg chg="add del mod">
-          <ac:chgData name="Bryan Khuu" userId="db4bb5bc1a416b49" providerId="Windows Live" clId="Web-{5E92D238-FBDD-49B1-A334-FD695E37C85F}" dt="2020-05-09T22:12:28.294" v="683" actId="20577"/>
-          <ac:spMkLst>
-            <pc:docMk/>
-            <pc:sldMk cId="865442861" sldId="259"/>
-            <ac:spMk id="3" creationId="{5E690586-63ED-43F1-8E09-6E19CB05937F}"/>
-          </ac:spMkLst>
-        </pc:spChg>
-        <pc:spChg chg="add">
-          <ac:chgData name="Bryan Khuu" userId="db4bb5bc1a416b49" providerId="Windows Live" clId="Web-{5E92D238-FBDD-49B1-A334-FD695E37C85F}" dt="2020-05-09T22:10:58.243" v="670"/>
-          <ac:spMkLst>
-            <pc:docMk/>
-            <pc:sldMk cId="865442861" sldId="259"/>
-            <ac:spMk id="8" creationId="{BAC87F6E-526A-49B5-995D-42DB656594C9}"/>
-          </ac:spMkLst>
-        </pc:spChg>
-        <pc:spChg chg="add">
-          <ac:chgData name="Bryan Khuu" userId="db4bb5bc1a416b49" providerId="Windows Live" clId="Web-{5E92D238-FBDD-49B1-A334-FD695E37C85F}" dt="2020-05-09T22:10:58.243" v="670"/>
-          <ac:spMkLst>
-            <pc:docMk/>
-            <pc:sldMk cId="865442861" sldId="259"/>
-            <ac:spMk id="10" creationId="{5E5436DB-4E8B-43A5-AE55-1C527B62E203}"/>
-          </ac:spMkLst>
-        </pc:spChg>
-        <pc:spChg chg="add">
-          <ac:chgData name="Bryan Khuu" userId="db4bb5bc1a416b49" providerId="Windows Live" clId="Web-{5E92D238-FBDD-49B1-A334-FD695E37C85F}" dt="2020-05-09T22:10:58.243" v="670"/>
-          <ac:spMkLst>
-            <pc:docMk/>
-            <pc:sldMk cId="865442861" sldId="259"/>
-            <ac:spMk id="12" creationId="{0D65299F-028F-4AFC-B46A-8DB33E20FE4A}"/>
-          </ac:spMkLst>
-        </pc:spChg>
-      </pc:sldChg>
-      <pc:sldChg chg="addSp delSp modSp new">
-        <pc:chgData name="Bryan Khuu" userId="db4bb5bc1a416b49" providerId="Windows Live" clId="Web-{5E92D238-FBDD-49B1-A334-FD695E37C85F}" dt="2020-05-09T22:09:25.630" v="633" actId="20577"/>
-        <pc:sldMkLst>
-          <pc:docMk/>
-          <pc:sldMk cId="3876366827" sldId="260"/>
-        </pc:sldMkLst>
-        <pc:spChg chg="mod">
-          <ac:chgData name="Bryan Khuu" userId="db4bb5bc1a416b49" providerId="Windows Live" clId="Web-{5E92D238-FBDD-49B1-A334-FD695E37C85F}" dt="2020-05-09T22:09:25.630" v="633" actId="20577"/>
-          <ac:spMkLst>
-            <pc:docMk/>
-            <pc:sldMk cId="3876366827" sldId="260"/>
-            <ac:spMk id="2" creationId="{7AA60957-65FD-4982-8D07-2A080F0DFBC4}"/>
-          </ac:spMkLst>
-        </pc:spChg>
-        <pc:spChg chg="del">
-          <ac:chgData name="Bryan Khuu" userId="db4bb5bc1a416b49" providerId="Windows Live" clId="Web-{5E92D238-FBDD-49B1-A334-FD695E37C85F}" dt="2020-05-09T22:04:06.150" v="573"/>
-          <ac:spMkLst>
-            <pc:docMk/>
-            <pc:sldMk cId="3876366827" sldId="260"/>
-            <ac:spMk id="3" creationId="{7866AB8E-4D2A-43E8-92AD-DDF5489DDB0B}"/>
-          </ac:spMkLst>
-        </pc:spChg>
-        <pc:picChg chg="add mod ord">
-          <ac:chgData name="Bryan Khuu" userId="db4bb5bc1a416b49" providerId="Windows Live" clId="Web-{5E92D238-FBDD-49B1-A334-FD695E37C85F}" dt="2020-05-09T22:05:08.183" v="587" actId="1076"/>
-          <ac:picMkLst>
-            <pc:docMk/>
-            <pc:sldMk cId="3876366827" sldId="260"/>
-            <ac:picMk id="4" creationId="{1C779644-2880-48A0-B7ED-BC65315AC221}"/>
-          </ac:picMkLst>
-        </pc:picChg>
-        <pc:picChg chg="add mod">
-          <ac:chgData name="Bryan Khuu" userId="db4bb5bc1a416b49" providerId="Windows Live" clId="Web-{5E92D238-FBDD-49B1-A334-FD695E37C85F}" dt="2020-05-09T22:05:14.575" v="588" actId="1076"/>
-          <ac:picMkLst>
-            <pc:docMk/>
-            <pc:sldMk cId="3876366827" sldId="260"/>
-            <ac:picMk id="6" creationId="{18FCD283-6F3B-46B1-ABD3-4B677E8895AF}"/>
-          </ac:picMkLst>
-        </pc:picChg>
-      </pc:sldChg>
-      <pc:sldChg chg="addSp delSp modSp new mod setBg">
-        <pc:chgData name="Bryan Khuu" userId="db4bb5bc1a416b49" providerId="Windows Live" clId="Web-{5E92D238-FBDD-49B1-A334-FD695E37C85F}" dt="2020-05-09T22:22:54.739" v="735"/>
-        <pc:sldMkLst>
-          <pc:docMk/>
-          <pc:sldMk cId="2127869669" sldId="261"/>
-        </pc:sldMkLst>
-        <pc:spChg chg="mod">
-          <ac:chgData name="Bryan Khuu" userId="db4bb5bc1a416b49" providerId="Windows Live" clId="Web-{5E92D238-FBDD-49B1-A334-FD695E37C85F}" dt="2020-05-09T22:19:27.700" v="722" actId="1076"/>
-          <ac:spMkLst>
-            <pc:docMk/>
-            <pc:sldMk cId="2127869669" sldId="261"/>
-            <ac:spMk id="2" creationId="{D168774E-B68F-4891-8DD8-A6AF537C5F93}"/>
-          </ac:spMkLst>
-        </pc:spChg>
-        <pc:spChg chg="del">
-          <ac:chgData name="Bryan Khuu" userId="db4bb5bc1a416b49" providerId="Windows Live" clId="Web-{5E92D238-FBDD-49B1-A334-FD695E37C85F}" dt="2020-05-09T22:15:30.941" v="694"/>
-          <ac:spMkLst>
-            <pc:docMk/>
-            <pc:sldMk cId="2127869669" sldId="261"/>
-            <ac:spMk id="3" creationId="{0FEA8D3C-5991-400C-8FB6-CF61EDF9DE83}"/>
-          </ac:spMkLst>
-        </pc:spChg>
-        <pc:spChg chg="add del mod">
-          <ac:chgData name="Bryan Khuu" userId="db4bb5bc1a416b49" providerId="Windows Live" clId="Web-{5E92D238-FBDD-49B1-A334-FD695E37C85F}" dt="2020-05-09T22:18:43.698" v="713"/>
-          <ac:spMkLst>
-            <pc:docMk/>
-            <pc:sldMk cId="2127869669" sldId="261"/>
-            <ac:spMk id="9" creationId="{3C25BF41-D46C-417D-BCBC-0AD3592F7296}"/>
-          </ac:spMkLst>
-        </pc:spChg>
-        <pc:picChg chg="add del mod ord">
-          <ac:chgData name="Bryan Khuu" userId="db4bb5bc1a416b49" providerId="Windows Live" clId="Web-{5E92D238-FBDD-49B1-A334-FD695E37C85F}" dt="2020-05-09T22:18:04.619" v="712"/>
-          <ac:picMkLst>
-            <pc:docMk/>
-            <pc:sldMk cId="2127869669" sldId="261"/>
-            <ac:picMk id="4" creationId="{98FECB70-1975-4501-80E5-1F9D6E7FB746}"/>
-          </ac:picMkLst>
-        </pc:picChg>
-        <pc:picChg chg="add mod">
-          <ac:chgData name="Bryan Khuu" userId="db4bb5bc1a416b49" providerId="Windows Live" clId="Web-{5E92D238-FBDD-49B1-A334-FD695E37C85F}" dt="2020-05-09T22:19:27.731" v="723" actId="1076"/>
-          <ac:picMkLst>
-            <pc:docMk/>
-            <pc:sldMk cId="2127869669" sldId="261"/>
-            <ac:picMk id="6" creationId="{B9457002-F5E2-401C-B7E6-0F02D7298594}"/>
-          </ac:picMkLst>
-        </pc:picChg>
-        <pc:picChg chg="add mod ord">
-          <ac:chgData name="Bryan Khuu" userId="db4bb5bc1a416b49" providerId="Windows Live" clId="Web-{5E92D238-FBDD-49B1-A334-FD695E37C85F}" dt="2020-05-09T22:21:57.408" v="734" actId="1076"/>
-          <ac:picMkLst>
-            <pc:docMk/>
-            <pc:sldMk cId="2127869669" sldId="261"/>
-            <ac:picMk id="10" creationId="{81337A89-EF35-4F29-BBA1-142B06FF1E82}"/>
+            <pc:sldMk cId="685101506" sldId="259"/>
+            <ac:picMk id="5" creationId="{9638F405-912A-46B1-B23D-5EF63E0549CB}"/>
           </ac:picMkLst>
         </pc:picChg>
       </pc:sldChg>
@@ -5000,6 +5027,444 @@
 </dgm:styleDef>
 </file>
 
+<file path=ppt/notesMasters/notesMaster1.xml><?xml version="1.0" encoding="utf-8"?>
+<p:notesMaster xmlns:a="http://schemas.openxmlformats.org/drawingml/2006/main" xmlns:r="http://schemas.openxmlformats.org/officeDocument/2006/relationships" xmlns:p="http://schemas.openxmlformats.org/presentationml/2006/main">
+  <p:cSld>
+    <p:bg>
+      <p:bgRef idx="1001">
+        <a:schemeClr val="bg1"/>
+      </p:bgRef>
+    </p:bg>
+    <p:spTree>
+      <p:nvGrpSpPr>
+        <p:cNvPr id="1" name=""/>
+        <p:cNvGrpSpPr/>
+        <p:nvPr/>
+      </p:nvGrpSpPr>
+      <p:grpSpPr>
+        <a:xfrm>
+          <a:off x="0" y="0"/>
+          <a:ext cx="0" cy="0"/>
+          <a:chOff x="0" y="0"/>
+          <a:chExt cx="0" cy="0"/>
+        </a:xfrm>
+      </p:grpSpPr>
+      <p:sp>
+        <p:nvSpPr>
+          <p:cNvPr id="2" name="Header Placeholder 1"/>
+          <p:cNvSpPr>
+            <a:spLocks noGrp="1"/>
+          </p:cNvSpPr>
+          <p:nvPr>
+            <p:ph type="hdr" sz="quarter"/>
+          </p:nvPr>
+        </p:nvSpPr>
+        <p:spPr>
+          <a:xfrm>
+            <a:off x="0" y="0"/>
+            <a:ext cx="2971800" cy="458788"/>
+          </a:xfrm>
+          <a:prstGeom prst="rect">
+            <a:avLst/>
+          </a:prstGeom>
+        </p:spPr>
+        <p:txBody>
+          <a:bodyPr vert="horz" lIns="91440" tIns="45720" rIns="91440" bIns="45720" rtlCol="0"/>
+          <a:lstStyle>
+            <a:lvl1pPr algn="l">
+              <a:defRPr sz="1200"/>
+            </a:lvl1pPr>
+          </a:lstStyle>
+          <a:p>
+            <a:endParaRPr lang="en-US"/>
+          </a:p>
+        </p:txBody>
+      </p:sp>
+      <p:sp>
+        <p:nvSpPr>
+          <p:cNvPr id="3" name="Date Placeholder 2"/>
+          <p:cNvSpPr>
+            <a:spLocks noGrp="1"/>
+          </p:cNvSpPr>
+          <p:nvPr>
+            <p:ph type="dt" idx="1"/>
+          </p:nvPr>
+        </p:nvSpPr>
+        <p:spPr>
+          <a:xfrm>
+            <a:off x="3884613" y="0"/>
+            <a:ext cx="2971800" cy="458788"/>
+          </a:xfrm>
+          <a:prstGeom prst="rect">
+            <a:avLst/>
+          </a:prstGeom>
+        </p:spPr>
+        <p:txBody>
+          <a:bodyPr vert="horz" lIns="91440" tIns="45720" rIns="91440" bIns="45720" rtlCol="0"/>
+          <a:lstStyle>
+            <a:lvl1pPr algn="r">
+              <a:defRPr sz="1200"/>
+            </a:lvl1pPr>
+          </a:lstStyle>
+          <a:p>
+            <a:fld id="{4EEE02B0-6859-47AC-BD31-B197A274B047}" type="datetimeFigureOut">
+              <a:rPr lang="en-US"/>
+              <a:t>5/10/2020</a:t>
+            </a:fld>
+            <a:endParaRPr lang="en-US"/>
+          </a:p>
+        </p:txBody>
+      </p:sp>
+      <p:sp>
+        <p:nvSpPr>
+          <p:cNvPr id="4" name="Slide Image Placeholder 3"/>
+          <p:cNvSpPr>
+            <a:spLocks noGrp="1" noRot="1" noChangeAspect="1"/>
+          </p:cNvSpPr>
+          <p:nvPr>
+            <p:ph type="sldImg" idx="2"/>
+          </p:nvPr>
+        </p:nvSpPr>
+        <p:spPr>
+          <a:xfrm>
+            <a:off x="685800" y="1143000"/>
+            <a:ext cx="5486400" cy="3086100"/>
+          </a:xfrm>
+          <a:prstGeom prst="rect">
+            <a:avLst/>
+          </a:prstGeom>
+          <a:noFill/>
+          <a:ln w="12700">
+            <a:solidFill>
+              <a:prstClr val="black"/>
+            </a:solidFill>
+          </a:ln>
+        </p:spPr>
+        <p:txBody>
+          <a:bodyPr vert="horz" lIns="91440" tIns="45720" rIns="91440" bIns="45720" rtlCol="0" anchor="ctr"/>
+          <a:lstStyle/>
+          <a:p>
+            <a:endParaRPr lang="en-US"/>
+          </a:p>
+        </p:txBody>
+      </p:sp>
+      <p:sp>
+        <p:nvSpPr>
+          <p:cNvPr id="5" name="Notes Placeholder 4"/>
+          <p:cNvSpPr>
+            <a:spLocks noGrp="1"/>
+          </p:cNvSpPr>
+          <p:nvPr>
+            <p:ph type="body" sz="quarter" idx="3"/>
+          </p:nvPr>
+        </p:nvSpPr>
+        <p:spPr>
+          <a:xfrm>
+            <a:off x="685800" y="4400550"/>
+            <a:ext cx="5486400" cy="3600450"/>
+          </a:xfrm>
+          <a:prstGeom prst="rect">
+            <a:avLst/>
+          </a:prstGeom>
+        </p:spPr>
+        <p:txBody>
+          <a:bodyPr vert="horz" lIns="91440" tIns="45720" rIns="91440" bIns="45720" rtlCol="0"/>
+          <a:lstStyle/>
+          <a:p>
+            <a:pPr lvl="0"/>
+            <a:r>
+              <a:rPr lang="en-US"/>
+              <a:t>Click to edit Master text styles</a:t>
+            </a:r>
+          </a:p>
+          <a:p>
+            <a:pPr lvl="1"/>
+            <a:r>
+              <a:rPr lang="en-US"/>
+              <a:t>Second level</a:t>
+            </a:r>
+          </a:p>
+          <a:p>
+            <a:pPr lvl="2"/>
+            <a:r>
+              <a:rPr lang="en-US"/>
+              <a:t>Third level</a:t>
+            </a:r>
+          </a:p>
+          <a:p>
+            <a:pPr lvl="3"/>
+            <a:r>
+              <a:rPr lang="en-US"/>
+              <a:t>Fourth level</a:t>
+            </a:r>
+          </a:p>
+          <a:p>
+            <a:pPr lvl="4"/>
+            <a:r>
+              <a:rPr lang="en-US"/>
+              <a:t>Fifth level</a:t>
+            </a:r>
+          </a:p>
+        </p:txBody>
+      </p:sp>
+      <p:sp>
+        <p:nvSpPr>
+          <p:cNvPr id="6" name="Footer Placeholder 5"/>
+          <p:cNvSpPr>
+            <a:spLocks noGrp="1"/>
+          </p:cNvSpPr>
+          <p:nvPr>
+            <p:ph type="ftr" sz="quarter" idx="4"/>
+          </p:nvPr>
+        </p:nvSpPr>
+        <p:spPr>
+          <a:xfrm>
+            <a:off x="0" y="8685213"/>
+            <a:ext cx="2971800" cy="458787"/>
+          </a:xfrm>
+          <a:prstGeom prst="rect">
+            <a:avLst/>
+          </a:prstGeom>
+        </p:spPr>
+        <p:txBody>
+          <a:bodyPr vert="horz" lIns="91440" tIns="45720" rIns="91440" bIns="45720" rtlCol="0" anchor="b"/>
+          <a:lstStyle>
+            <a:lvl1pPr algn="l">
+              <a:defRPr sz="1200"/>
+            </a:lvl1pPr>
+          </a:lstStyle>
+          <a:p>
+            <a:endParaRPr lang="en-US"/>
+          </a:p>
+        </p:txBody>
+      </p:sp>
+      <p:sp>
+        <p:nvSpPr>
+          <p:cNvPr id="7" name="Slide Number Placeholder 6"/>
+          <p:cNvSpPr>
+            <a:spLocks noGrp="1"/>
+          </p:cNvSpPr>
+          <p:nvPr>
+            <p:ph type="sldNum" sz="quarter" idx="5"/>
+          </p:nvPr>
+        </p:nvSpPr>
+        <p:spPr>
+          <a:xfrm>
+            <a:off x="3884613" y="8685213"/>
+            <a:ext cx="2971800" cy="458787"/>
+          </a:xfrm>
+          <a:prstGeom prst="rect">
+            <a:avLst/>
+          </a:prstGeom>
+        </p:spPr>
+        <p:txBody>
+          <a:bodyPr vert="horz" lIns="91440" tIns="45720" rIns="91440" bIns="45720" rtlCol="0" anchor="b"/>
+          <a:lstStyle>
+            <a:lvl1pPr algn="r">
+              <a:defRPr sz="1200"/>
+            </a:lvl1pPr>
+          </a:lstStyle>
+          <a:p>
+            <a:fld id="{49B0B5E5-BA20-46CE-BF64-A5F8E51168E5}" type="slidenum">
+              <a:rPr lang="en-US"/>
+              <a:t>‹#›</a:t>
+            </a:fld>
+            <a:endParaRPr lang="en-US"/>
+          </a:p>
+        </p:txBody>
+      </p:sp>
+    </p:spTree>
+    <p:extLst>
+      <p:ext uri="{BB962C8B-B14F-4D97-AF65-F5344CB8AC3E}">
+        <p14:creationId xmlns:p14="http://schemas.microsoft.com/office/powerpoint/2010/main" val="1435261384"/>
+      </p:ext>
+    </p:extLst>
+  </p:cSld>
+  <p:clrMap bg1="lt1" tx1="dk1" bg2="lt2" tx2="dk2" accent1="accent1" accent2="accent2" accent3="accent3" accent4="accent4" accent5="accent5" accent6="accent6" hlink="hlink" folHlink="folHlink"/>
+  <p:notesStyle>
+    <a:lvl1pPr marL="0" algn="l" defTabSz="914400" rtl="0" eaLnBrk="1" latinLnBrk="0" hangingPunct="1">
+      <a:defRPr sz="1200" kern="1200">
+        <a:solidFill>
+          <a:schemeClr val="tx1"/>
+        </a:solidFill>
+        <a:latin typeface="+mn-lt"/>
+        <a:ea typeface="+mn-ea"/>
+        <a:cs typeface="+mn-cs"/>
+      </a:defRPr>
+    </a:lvl1pPr>
+    <a:lvl2pPr marL="457200" algn="l" defTabSz="914400" rtl="0" eaLnBrk="1" latinLnBrk="0" hangingPunct="1">
+      <a:defRPr sz="1200" kern="1200">
+        <a:solidFill>
+          <a:schemeClr val="tx1"/>
+        </a:solidFill>
+        <a:latin typeface="+mn-lt"/>
+        <a:ea typeface="+mn-ea"/>
+        <a:cs typeface="+mn-cs"/>
+      </a:defRPr>
+    </a:lvl2pPr>
+    <a:lvl3pPr marL="914400" algn="l" defTabSz="914400" rtl="0" eaLnBrk="1" latinLnBrk="0" hangingPunct="1">
+      <a:defRPr sz="1200" kern="1200">
+        <a:solidFill>
+          <a:schemeClr val="tx1"/>
+        </a:solidFill>
+        <a:latin typeface="+mn-lt"/>
+        <a:ea typeface="+mn-ea"/>
+        <a:cs typeface="+mn-cs"/>
+      </a:defRPr>
+    </a:lvl3pPr>
+    <a:lvl4pPr marL="1371600" algn="l" defTabSz="914400" rtl="0" eaLnBrk="1" latinLnBrk="0" hangingPunct="1">
+      <a:defRPr sz="1200" kern="1200">
+        <a:solidFill>
+          <a:schemeClr val="tx1"/>
+        </a:solidFill>
+        <a:latin typeface="+mn-lt"/>
+        <a:ea typeface="+mn-ea"/>
+        <a:cs typeface="+mn-cs"/>
+      </a:defRPr>
+    </a:lvl4pPr>
+    <a:lvl5pPr marL="1828800" algn="l" defTabSz="914400" rtl="0" eaLnBrk="1" latinLnBrk="0" hangingPunct="1">
+      <a:defRPr sz="1200" kern="1200">
+        <a:solidFill>
+          <a:schemeClr val="tx1"/>
+        </a:solidFill>
+        <a:latin typeface="+mn-lt"/>
+        <a:ea typeface="+mn-ea"/>
+        <a:cs typeface="+mn-cs"/>
+      </a:defRPr>
+    </a:lvl5pPr>
+    <a:lvl6pPr marL="2286000" algn="l" defTabSz="914400" rtl="0" eaLnBrk="1" latinLnBrk="0" hangingPunct="1">
+      <a:defRPr sz="1200" kern="1200">
+        <a:solidFill>
+          <a:schemeClr val="tx1"/>
+        </a:solidFill>
+        <a:latin typeface="+mn-lt"/>
+        <a:ea typeface="+mn-ea"/>
+        <a:cs typeface="+mn-cs"/>
+      </a:defRPr>
+    </a:lvl6pPr>
+    <a:lvl7pPr marL="2743200" algn="l" defTabSz="914400" rtl="0" eaLnBrk="1" latinLnBrk="0" hangingPunct="1">
+      <a:defRPr sz="1200" kern="1200">
+        <a:solidFill>
+          <a:schemeClr val="tx1"/>
+        </a:solidFill>
+        <a:latin typeface="+mn-lt"/>
+        <a:ea typeface="+mn-ea"/>
+        <a:cs typeface="+mn-cs"/>
+      </a:defRPr>
+    </a:lvl7pPr>
+    <a:lvl8pPr marL="3200400" algn="l" defTabSz="914400" rtl="0" eaLnBrk="1" latinLnBrk="0" hangingPunct="1">
+      <a:defRPr sz="1200" kern="1200">
+        <a:solidFill>
+          <a:schemeClr val="tx1"/>
+        </a:solidFill>
+        <a:latin typeface="+mn-lt"/>
+        <a:ea typeface="+mn-ea"/>
+        <a:cs typeface="+mn-cs"/>
+      </a:defRPr>
+    </a:lvl8pPr>
+    <a:lvl9pPr marL="3657600" algn="l" defTabSz="914400" rtl="0" eaLnBrk="1" latinLnBrk="0" hangingPunct="1">
+      <a:defRPr sz="1200" kern="1200">
+        <a:solidFill>
+          <a:schemeClr val="tx1"/>
+        </a:solidFill>
+        <a:latin typeface="+mn-lt"/>
+        <a:ea typeface="+mn-ea"/>
+        <a:cs typeface="+mn-cs"/>
+      </a:defRPr>
+    </a:lvl9pPr>
+  </p:notesStyle>
+</p:notesMaster>
+</file>
+
+<file path=ppt/notesSlides/notesSlide1.xml><?xml version="1.0" encoding="utf-8"?>
+<p:notes xmlns:a="http://schemas.openxmlformats.org/drawingml/2006/main" xmlns:r="http://schemas.openxmlformats.org/officeDocument/2006/relationships" xmlns:p="http://schemas.openxmlformats.org/presentationml/2006/main">
+  <p:cSld>
+    <p:spTree>
+      <p:nvGrpSpPr>
+        <p:cNvPr id="1" name=""/>
+        <p:cNvGrpSpPr/>
+        <p:nvPr/>
+      </p:nvGrpSpPr>
+      <p:grpSpPr>
+        <a:xfrm>
+          <a:off x="0" y="0"/>
+          <a:ext cx="0" cy="0"/>
+          <a:chOff x="0" y="0"/>
+          <a:chExt cx="0" cy="0"/>
+        </a:xfrm>
+      </p:grpSpPr>
+      <p:sp>
+        <p:nvSpPr>
+          <p:cNvPr id="2" name="Slide Image Placeholder 1"/>
+          <p:cNvSpPr>
+            <a:spLocks noGrp="1" noRot="1" noChangeAspect="1"/>
+          </p:cNvSpPr>
+          <p:nvPr>
+            <p:ph type="sldImg"/>
+          </p:nvPr>
+        </p:nvSpPr>
+        <p:spPr/>
+      </p:sp>
+      <p:sp>
+        <p:nvSpPr>
+          <p:cNvPr id="3" name="Notes Placeholder 2"/>
+          <p:cNvSpPr>
+            <a:spLocks noGrp="1"/>
+          </p:cNvSpPr>
+          <p:nvPr>
+            <p:ph type="body" idx="1"/>
+          </p:nvPr>
+        </p:nvSpPr>
+        <p:spPr/>
+        <p:txBody>
+          <a:bodyPr/>
+          <a:lstStyle/>
+          <a:p>
+            <a:r>
+              <a:rPr lang="en-US">
+                <a:cs typeface="Calibri"/>
+              </a:rPr>
+              <a:t>contrast</a:t>
+            </a:r>
+          </a:p>
+        </p:txBody>
+      </p:sp>
+      <p:sp>
+        <p:nvSpPr>
+          <p:cNvPr id="4" name="Slide Number Placeholder 3"/>
+          <p:cNvSpPr>
+            <a:spLocks noGrp="1"/>
+          </p:cNvSpPr>
+          <p:nvPr>
+            <p:ph type="sldNum" sz="quarter" idx="5"/>
+          </p:nvPr>
+        </p:nvSpPr>
+        <p:spPr/>
+        <p:txBody>
+          <a:bodyPr/>
+          <a:lstStyle/>
+          <a:p>
+            <a:fld id="{49B0B5E5-BA20-46CE-BF64-A5F8E51168E5}" type="slidenum">
+              <a:rPr lang="en-US"/>
+              <a:t>‹#›</a:t>
+            </a:fld>
+            <a:endParaRPr lang="en-US"/>
+          </a:p>
+        </p:txBody>
+      </p:sp>
+    </p:spTree>
+    <p:extLst>
+      <p:ext uri="{BB962C8B-B14F-4D97-AF65-F5344CB8AC3E}">
+        <p14:creationId xmlns:p14="http://schemas.microsoft.com/office/powerpoint/2010/main" val="2255711378"/>
+      </p:ext>
+    </p:extLst>
+  </p:cSld>
+  <p:clrMapOvr>
+    <a:masterClrMapping/>
+  </p:clrMapOvr>
+</p:notes>
+</file>
+
 <file path=ppt/slideLayouts/slideLayout1.xml><?xml version="1.0" encoding="utf-8"?>
 <p:sldLayout xmlns:a="http://schemas.openxmlformats.org/drawingml/2006/main" xmlns:r="http://schemas.openxmlformats.org/officeDocument/2006/relationships" xmlns:p="http://schemas.openxmlformats.org/presentationml/2006/main" type="title" preserve="1">
   <p:cSld name="Title Slide">
@@ -9721,23 +10186,15 @@
           <a:lstStyle/>
           <a:p>
             <a:r>
-              <a:rPr lang="en-US" dirty="0"/>
-              <a:t>Feature </a:t>
-            </a:r>
-            <a:r>
               <a:rPr lang="en-US"/>
-              <a:t>Selection</a:t>
+              <a:t>Feature Selection</a:t>
             </a:r>
             <a:br>
-              <a:rPr lang="en-US" dirty="0"/>
+              <a:rPr lang="en-US"/>
             </a:br>
             <a:r>
               <a:rPr lang="en-US"/>
-              <a:t>&amp; </a:t>
-            </a:r>
-            <a:r>
-              <a:rPr lang="en-US" dirty="0"/>
-              <a:t>visualization</a:t>
+              <a:t>&amp; visualization</a:t>
             </a:r>
           </a:p>
         </p:txBody>
@@ -9860,7 +10317,7 @@
         </p:nvSpPr>
         <p:spPr>
           <a:xfrm>
-            <a:off x="2231136" y="360843"/>
+            <a:off x="2231136" y="130805"/>
             <a:ext cx="7729728" cy="1188720"/>
           </a:xfrm>
         </p:spPr>
@@ -9875,6 +10332,66 @@
           </a:p>
         </p:txBody>
       </p:sp>
+      <p:pic>
+        <p:nvPicPr>
+          <p:cNvPr id="5" name="Picture 5" descr="A close up of a map&#10;&#10;Description generated with very high confidence">
+            <a:extLst>
+              <a:ext uri="{FF2B5EF4-FFF2-40B4-BE49-F238E27FC236}">
+                <a16:creationId xmlns:a16="http://schemas.microsoft.com/office/drawing/2014/main" id="{A1448429-C12A-48E3-B82E-33F6B3F51509}"/>
+              </a:ext>
+            </a:extLst>
+          </p:cNvPr>
+          <p:cNvPicPr>
+            <a:picLocks noChangeAspect="1"/>
+          </p:cNvPicPr>
+          <p:nvPr/>
+        </p:nvPicPr>
+        <p:blipFill>
+          <a:blip r:embed="rId3"/>
+          <a:stretch>
+            <a:fillRect/>
+          </a:stretch>
+        </p:blipFill>
+        <p:spPr>
+          <a:xfrm>
+            <a:off x="1043796" y="1434725"/>
+            <a:ext cx="5057953" cy="5153115"/>
+          </a:xfrm>
+          <a:prstGeom prst="rect">
+            <a:avLst/>
+          </a:prstGeom>
+        </p:spPr>
+      </p:pic>
+      <p:pic>
+        <p:nvPicPr>
+          <p:cNvPr id="7" name="Picture 7" descr="A close up of a map&#10;&#10;Description generated with very high confidence">
+            <a:extLst>
+              <a:ext uri="{FF2B5EF4-FFF2-40B4-BE49-F238E27FC236}">
+                <a16:creationId xmlns:a16="http://schemas.microsoft.com/office/drawing/2014/main" id="{1C9D8948-70BC-4317-A8AC-6F6E9C16F053}"/>
+              </a:ext>
+            </a:extLst>
+          </p:cNvPr>
+          <p:cNvPicPr>
+            <a:picLocks noChangeAspect="1"/>
+          </p:cNvPicPr>
+          <p:nvPr/>
+        </p:nvPicPr>
+        <p:blipFill>
+          <a:blip r:embed="rId4"/>
+          <a:stretch>
+            <a:fillRect/>
+          </a:stretch>
+        </p:blipFill>
+        <p:spPr>
+          <a:xfrm>
+            <a:off x="6521570" y="1444288"/>
+            <a:ext cx="4827916" cy="5119610"/>
+          </a:xfrm>
+          <a:prstGeom prst="rect">
+            <a:avLst/>
+          </a:prstGeom>
+        </p:spPr>
+      </p:pic>
     </p:spTree>
     <p:extLst>
       <p:ext uri="{BB962C8B-B14F-4D97-AF65-F5344CB8AC3E}">
@@ -10226,4 +10743,299 @@
     </a:ext>
   </a:extLst>
 </a:theme>
+</file>
+
+<file path=ppt/theme/theme2.xml><?xml version="1.0" encoding="utf-8"?>
+<a:theme xmlns:a="http://schemas.openxmlformats.org/drawingml/2006/main" name="Office Theme">
+  <a:themeElements>
+    <a:clrScheme name="Office">
+      <a:dk1>
+        <a:sysClr val="windowText" lastClr="000000"/>
+      </a:dk1>
+      <a:lt1>
+        <a:sysClr val="window" lastClr="FFFFFF"/>
+      </a:lt1>
+      <a:dk2>
+        <a:srgbClr val="44546A"/>
+      </a:dk2>
+      <a:lt2>
+        <a:srgbClr val="E7E6E6"/>
+      </a:lt2>
+      <a:accent1>
+        <a:srgbClr val="4472C4"/>
+      </a:accent1>
+      <a:accent2>
+        <a:srgbClr val="ED7D31"/>
+      </a:accent2>
+      <a:accent3>
+        <a:srgbClr val="A5A5A5"/>
+      </a:accent3>
+      <a:accent4>
+        <a:srgbClr val="FFC000"/>
+      </a:accent4>
+      <a:accent5>
+        <a:srgbClr val="5B9BD5"/>
+      </a:accent5>
+      <a:accent6>
+        <a:srgbClr val="70AD47"/>
+      </a:accent6>
+      <a:hlink>
+        <a:srgbClr val="0563C1"/>
+      </a:hlink>
+      <a:folHlink>
+        <a:srgbClr val="954F72"/>
+      </a:folHlink>
+    </a:clrScheme>
+    <a:fontScheme name="Office">
+      <a:majorFont>
+        <a:latin typeface="Calibri Light" panose="020F0302020204030204"/>
+        <a:ea typeface=""/>
+        <a:cs typeface=""/>
+        <a:font script="Jpan" typeface="游ゴシック Light"/>
+        <a:font script="Hang" typeface="맑은 고딕"/>
+        <a:font script="Hans" typeface="等线 Light"/>
+        <a:font script="Hant" typeface="新細明體"/>
+        <a:font script="Arab" typeface="Times New Roman"/>
+        <a:font script="Hebr" typeface="Times New Roman"/>
+        <a:font script="Thai" typeface="Angsana New"/>
+        <a:font script="Ethi" typeface="Nyala"/>
+        <a:font script="Beng" typeface="Vrinda"/>
+        <a:font script="Gujr" typeface="Shruti"/>
+        <a:font script="Khmr" typeface="MoolBoran"/>
+        <a:font script="Knda" typeface="Tunga"/>
+        <a:font script="Guru" typeface="Raavi"/>
+        <a:font script="Cans" typeface="Euphemia"/>
+        <a:font script="Cher" typeface="Plantagenet Cherokee"/>
+        <a:font script="Yiii" typeface="Microsoft Yi Baiti"/>
+        <a:font script="Tibt" typeface="Microsoft Himalaya"/>
+        <a:font script="Thaa" typeface="MV Boli"/>
+        <a:font script="Deva" typeface="Mangal"/>
+        <a:font script="Telu" typeface="Gautami"/>
+        <a:font script="Taml" typeface="Latha"/>
+        <a:font script="Syrc" typeface="Estrangelo Edessa"/>
+        <a:font script="Orya" typeface="Kalinga"/>
+        <a:font script="Mlym" typeface="Kartika"/>
+        <a:font script="Laoo" typeface="DokChampa"/>
+        <a:font script="Sinh" typeface="Iskoola Pota"/>
+        <a:font script="Mong" typeface="Mongolian Baiti"/>
+        <a:font script="Viet" typeface="Times New Roman"/>
+        <a:font script="Uigh" typeface="Microsoft Uighur"/>
+        <a:font script="Geor" typeface="Sylfaen"/>
+        <a:font script="Armn" typeface="Arial"/>
+        <a:font script="Bugi" typeface="Leelawadee UI"/>
+        <a:font script="Bopo" typeface="Microsoft JhengHei"/>
+        <a:font script="Java" typeface="Javanese Text"/>
+        <a:font script="Lisu" typeface="Segoe UI"/>
+        <a:font script="Mymr" typeface="Myanmar Text"/>
+        <a:font script="Nkoo" typeface="Ebrima"/>
+        <a:font script="Olck" typeface="Nirmala UI"/>
+        <a:font script="Osma" typeface="Ebrima"/>
+        <a:font script="Phag" typeface="Phagspa"/>
+        <a:font script="Syrn" typeface="Estrangelo Edessa"/>
+        <a:font script="Syrj" typeface="Estrangelo Edessa"/>
+        <a:font script="Syre" typeface="Estrangelo Edessa"/>
+        <a:font script="Sora" typeface="Nirmala UI"/>
+        <a:font script="Tale" typeface="Microsoft Tai Le"/>
+        <a:font script="Talu" typeface="Microsoft New Tai Lue"/>
+        <a:font script="Tfng" typeface="Ebrima"/>
+      </a:majorFont>
+      <a:minorFont>
+        <a:latin typeface="Calibri" panose="020F0502020204030204"/>
+        <a:ea typeface=""/>
+        <a:cs typeface=""/>
+        <a:font script="Jpan" typeface="游ゴシック"/>
+        <a:font script="Hang" typeface="맑은 고딕"/>
+        <a:font script="Hans" typeface="等线"/>
+        <a:font script="Hant" typeface="新細明體"/>
+        <a:font script="Arab" typeface="Arial"/>
+        <a:font script="Hebr" typeface="Arial"/>
+        <a:font script="Thai" typeface="Cordia New"/>
+        <a:font script="Ethi" typeface="Nyala"/>
+        <a:font script="Beng" typeface="Vrinda"/>
+        <a:font script="Gujr" typeface="Shruti"/>
+        <a:font script="Khmr" typeface="DaunPenh"/>
+        <a:font script="Knda" typeface="Tunga"/>
+        <a:font script="Guru" typeface="Raavi"/>
+        <a:font script="Cans" typeface="Euphemia"/>
+        <a:font script="Cher" typeface="Plantagenet Cherokee"/>
+        <a:font script="Yiii" typeface="Microsoft Yi Baiti"/>
+        <a:font script="Tibt" typeface="Microsoft Himalaya"/>
+        <a:font script="Thaa" typeface="MV Boli"/>
+        <a:font script="Deva" typeface="Mangal"/>
+        <a:font script="Telu" typeface="Gautami"/>
+        <a:font script="Taml" typeface="Latha"/>
+        <a:font script="Syrc" typeface="Estrangelo Edessa"/>
+        <a:font script="Orya" typeface="Kalinga"/>
+        <a:font script="Mlym" typeface="Kartika"/>
+        <a:font script="Laoo" typeface="DokChampa"/>
+        <a:font script="Sinh" typeface="Iskoola Pota"/>
+        <a:font script="Mong" typeface="Mongolian Baiti"/>
+        <a:font script="Viet" typeface="Arial"/>
+        <a:font script="Uigh" typeface="Microsoft Uighur"/>
+        <a:font script="Geor" typeface="Sylfaen"/>
+        <a:font script="Armn" typeface="Arial"/>
+        <a:font script="Bugi" typeface="Leelawadee UI"/>
+        <a:font script="Bopo" typeface="Microsoft JhengHei"/>
+        <a:font script="Java" typeface="Javanese Text"/>
+        <a:font script="Lisu" typeface="Segoe UI"/>
+        <a:font script="Mymr" typeface="Myanmar Text"/>
+        <a:font script="Nkoo" typeface="Ebrima"/>
+        <a:font script="Olck" typeface="Nirmala UI"/>
+        <a:font script="Osma" typeface="Ebrima"/>
+        <a:font script="Phag" typeface="Phagspa"/>
+        <a:font script="Syrn" typeface="Estrangelo Edessa"/>
+        <a:font script="Syrj" typeface="Estrangelo Edessa"/>
+        <a:font script="Syre" typeface="Estrangelo Edessa"/>
+        <a:font script="Sora" typeface="Nirmala UI"/>
+        <a:font script="Tale" typeface="Microsoft Tai Le"/>
+        <a:font script="Talu" typeface="Microsoft New Tai Lue"/>
+        <a:font script="Tfng" typeface="Ebrima"/>
+      </a:minorFont>
+    </a:fontScheme>
+    <a:fmtScheme name="Office">
+      <a:fillStyleLst>
+        <a:solidFill>
+          <a:schemeClr val="phClr"/>
+        </a:solidFill>
+        <a:gradFill rotWithShape="1">
+          <a:gsLst>
+            <a:gs pos="0">
+              <a:schemeClr val="phClr">
+                <a:lumMod val="110000"/>
+                <a:satMod val="105000"/>
+                <a:tint val="67000"/>
+              </a:schemeClr>
+            </a:gs>
+            <a:gs pos="50000">
+              <a:schemeClr val="phClr">
+                <a:lumMod val="105000"/>
+                <a:satMod val="103000"/>
+                <a:tint val="73000"/>
+              </a:schemeClr>
+            </a:gs>
+            <a:gs pos="100000">
+              <a:schemeClr val="phClr">
+                <a:lumMod val="105000"/>
+                <a:satMod val="109000"/>
+                <a:tint val="81000"/>
+              </a:schemeClr>
+            </a:gs>
+          </a:gsLst>
+          <a:lin ang="5400000" scaled="0"/>
+        </a:gradFill>
+        <a:gradFill rotWithShape="1">
+          <a:gsLst>
+            <a:gs pos="0">
+              <a:schemeClr val="phClr">
+                <a:satMod val="103000"/>
+                <a:lumMod val="102000"/>
+                <a:tint val="94000"/>
+              </a:schemeClr>
+            </a:gs>
+            <a:gs pos="50000">
+              <a:schemeClr val="phClr">
+                <a:satMod val="110000"/>
+                <a:lumMod val="100000"/>
+                <a:shade val="100000"/>
+              </a:schemeClr>
+            </a:gs>
+            <a:gs pos="100000">
+              <a:schemeClr val="phClr">
+                <a:lumMod val="99000"/>
+                <a:satMod val="120000"/>
+                <a:shade val="78000"/>
+              </a:schemeClr>
+            </a:gs>
+          </a:gsLst>
+          <a:lin ang="5400000" scaled="0"/>
+        </a:gradFill>
+      </a:fillStyleLst>
+      <a:lnStyleLst>
+        <a:ln w="6350" cap="flat" cmpd="sng" algn="ctr">
+          <a:solidFill>
+            <a:schemeClr val="phClr"/>
+          </a:solidFill>
+          <a:prstDash val="solid"/>
+          <a:miter lim="800000"/>
+        </a:ln>
+        <a:ln w="12700" cap="flat" cmpd="sng" algn="ctr">
+          <a:solidFill>
+            <a:schemeClr val="phClr"/>
+          </a:solidFill>
+          <a:prstDash val="solid"/>
+          <a:miter lim="800000"/>
+        </a:ln>
+        <a:ln w="19050" cap="flat" cmpd="sng" algn="ctr">
+          <a:solidFill>
+            <a:schemeClr val="phClr"/>
+          </a:solidFill>
+          <a:prstDash val="solid"/>
+          <a:miter lim="800000"/>
+        </a:ln>
+      </a:lnStyleLst>
+      <a:effectStyleLst>
+        <a:effectStyle>
+          <a:effectLst/>
+        </a:effectStyle>
+        <a:effectStyle>
+          <a:effectLst/>
+        </a:effectStyle>
+        <a:effectStyle>
+          <a:effectLst>
+            <a:outerShdw blurRad="57150" dist="19050" dir="5400000" algn="ctr" rotWithShape="0">
+              <a:srgbClr val="000000">
+                <a:alpha val="63000"/>
+              </a:srgbClr>
+            </a:outerShdw>
+          </a:effectLst>
+        </a:effectStyle>
+      </a:effectStyleLst>
+      <a:bgFillStyleLst>
+        <a:solidFill>
+          <a:schemeClr val="phClr"/>
+        </a:solidFill>
+        <a:solidFill>
+          <a:schemeClr val="phClr">
+            <a:tint val="95000"/>
+            <a:satMod val="170000"/>
+          </a:schemeClr>
+        </a:solidFill>
+        <a:gradFill rotWithShape="1">
+          <a:gsLst>
+            <a:gs pos="0">
+              <a:schemeClr val="phClr">
+                <a:tint val="93000"/>
+                <a:satMod val="150000"/>
+                <a:shade val="98000"/>
+                <a:lumMod val="102000"/>
+              </a:schemeClr>
+            </a:gs>
+            <a:gs pos="50000">
+              <a:schemeClr val="phClr">
+                <a:tint val="98000"/>
+                <a:satMod val="130000"/>
+                <a:shade val="90000"/>
+                <a:lumMod val="103000"/>
+              </a:schemeClr>
+            </a:gs>
+            <a:gs pos="100000">
+              <a:schemeClr val="phClr">
+                <a:shade val="63000"/>
+                <a:satMod val="120000"/>
+              </a:schemeClr>
+            </a:gs>
+          </a:gsLst>
+          <a:lin ang="5400000" scaled="0"/>
+        </a:gradFill>
+      </a:bgFillStyleLst>
+    </a:fmtScheme>
+  </a:themeElements>
+  <a:objectDefaults/>
+  <a:extraClrSchemeLst/>
+  <a:extLst>
+    <a:ext uri="{05A4C25C-085E-4340-85A3-A5531E510DB2}">
+      <thm15:themeFamily xmlns:thm15="http://schemas.microsoft.com/office/thememl/2012/main" name="Office Theme" id="{62F939B6-93AF-4DB8-9C6B-D6C7DFDC589F}" vid="{4A3C46E8-61CC-4603-A589-7422A47A8E4A}"/>
+    </a:ext>
+  </a:extLst>
+</a:theme>
 </file>
</xml_diff>

<commit_message>
CNN and Logistic Regression Completed
</commit_message>
<xml_diff>
--- a/Audio Dog Bark Identification.pptx
+++ b/Audio Dog Bark Identification.pptx
@@ -5,18 +5,19 @@
     <p:sldMasterId id="2147483660" r:id="rId1"/>
   </p:sldMasterIdLst>
   <p:notesMasterIdLst>
-    <p:notesMasterId r:id="rId11"/>
+    <p:notesMasterId r:id="rId12"/>
   </p:notesMasterIdLst>
   <p:sldIdLst>
     <p:sldId id="256" r:id="rId2"/>
     <p:sldId id="258" r:id="rId3"/>
     <p:sldId id="260" r:id="rId4"/>
-    <p:sldId id="259" r:id="rId5"/>
-    <p:sldId id="261" r:id="rId6"/>
-    <p:sldId id="257" r:id="rId7"/>
-    <p:sldId id="262" r:id="rId8"/>
-    <p:sldId id="263" r:id="rId9"/>
-    <p:sldId id="264" r:id="rId10"/>
+    <p:sldId id="265" r:id="rId5"/>
+    <p:sldId id="259" r:id="rId6"/>
+    <p:sldId id="261" r:id="rId7"/>
+    <p:sldId id="257" r:id="rId8"/>
+    <p:sldId id="262" r:id="rId9"/>
+    <p:sldId id="263" r:id="rId10"/>
+    <p:sldId id="264" r:id="rId11"/>
   </p:sldIdLst>
   <p:sldSz cx="12192000" cy="6858000"/>
   <p:notesSz cx="6858000" cy="9144000"/>
@@ -131,7 +132,7 @@
     <p1510:client id="{50466BB6-A36A-4840-8042-2568C71ECAF1}" v="24" dt="2020-05-09T21:13:44.269"/>
     <p1510:client id="{5A7429CA-5897-425C-883B-77C9F7C46FCC}" v="298" dt="2020-05-09T20:54:17.669"/>
     <p1510:client id="{5E92D238-FBDD-49B1-A334-FD695E37C85F}" v="653" dt="2020-05-09T22:22:54.770"/>
-    <p1510:client id="{956F202B-8045-4161-BB6C-AE63D5442B16}" v="323" dt="2020-05-10T20:00:23.677"/>
+    <p1510:client id="{956F202B-8045-4161-BB6C-AE63D5442B16}" v="396" dt="2020-05-10T21:43:27.543"/>
   </p1510:revLst>
 </p1510:revInfo>
 </file>
@@ -141,7 +142,7 @@
   <pc:docChgLst>
     <pc:chgData name="Bryan Khuu" userId="db4bb5bc1a416b49" providerId="Windows Live" clId="Web-{956F202B-8045-4161-BB6C-AE63D5442B16}"/>
     <pc:docChg chg="addSld modSld">
-      <pc:chgData name="Bryan Khuu" userId="db4bb5bc1a416b49" providerId="Windows Live" clId="Web-{956F202B-8045-4161-BB6C-AE63D5442B16}" dt="2020-05-10T20:00:23.677" v="315" actId="1076"/>
+      <pc:chgData name="Bryan Khuu" userId="db4bb5bc1a416b49" providerId="Windows Live" clId="Web-{956F202B-8045-4161-BB6C-AE63D5442B16}" dt="2020-05-10T21:43:27.543" v="384" actId="1076"/>
       <pc:docMkLst>
         <pc:docMk/>
       </pc:docMkLst>
@@ -403,1287 +404,90 @@
           <pc:sldMk cId="253110941" sldId="264"/>
         </pc:sldMkLst>
       </pc:sldChg>
-    </pc:docChg>
-  </pc:docChgLst>
-  <pc:docChgLst>
-    <pc:chgData name="Bryan Khuu" userId="db4bb5bc1a416b49" providerId="Windows Live" clId="Web-{5E92D238-FBDD-49B1-A334-FD695E37C85F}"/>
-    <pc:docChg chg="addSld modSld">
-      <pc:chgData name="Bryan Khuu" userId="db4bb5bc1a416b49" providerId="Windows Live" clId="Web-{5E92D238-FBDD-49B1-A334-FD695E37C85F}" dt="2020-05-09T22:22:54.739" v="735"/>
-      <pc:docMkLst>
-        <pc:docMk/>
-      </pc:docMkLst>
-      <pc:sldChg chg="addSp delSp modSp mod setBg">
-        <pc:chgData name="Bryan Khuu" userId="db4bb5bc1a416b49" providerId="Windows Live" clId="Web-{5E92D238-FBDD-49B1-A334-FD695E37C85F}" dt="2020-05-09T22:13:33.937" v="692" actId="20577"/>
+      <pc:sldChg chg="addSp delSp modSp new">
+        <pc:chgData name="Bryan Khuu" userId="db4bb5bc1a416b49" providerId="Windows Live" clId="Web-{956F202B-8045-4161-BB6C-AE63D5442B16}" dt="2020-05-10T21:43:27.543" v="384" actId="1076"/>
         <pc:sldMkLst>
           <pc:docMk/>
-          <pc:sldMk cId="466311876" sldId="257"/>
+          <pc:sldMk cId="2909226165" sldId="265"/>
         </pc:sldMkLst>
         <pc:spChg chg="mod">
-          <ac:chgData name="Bryan Khuu" userId="db4bb5bc1a416b49" providerId="Windows Live" clId="Web-{5E92D238-FBDD-49B1-A334-FD695E37C85F}" dt="2020-05-09T22:10:37.665" v="669"/>
-          <ac:spMkLst>
-            <pc:docMk/>
-            <pc:sldMk cId="466311876" sldId="257"/>
-            <ac:spMk id="2" creationId="{A2841FE9-55B0-4DB0-85A4-E7ABC878C8AE}"/>
-          </ac:spMkLst>
-        </pc:spChg>
-        <pc:spChg chg="del mod">
-          <ac:chgData name="Bryan Khuu" userId="db4bb5bc1a416b49" providerId="Windows Live" clId="Web-{5E92D238-FBDD-49B1-A334-FD695E37C85F}" dt="2020-05-09T22:10:37.665" v="669"/>
-          <ac:spMkLst>
-            <pc:docMk/>
-            <pc:sldMk cId="466311876" sldId="257"/>
-            <ac:spMk id="3" creationId="{802F4C48-DE4A-4384-8D1B-6888BF9B917E}"/>
-          </ac:spMkLst>
-        </pc:spChg>
-        <pc:graphicFrameChg chg="add modGraphic">
-          <ac:chgData name="Bryan Khuu" userId="db4bb5bc1a416b49" providerId="Windows Live" clId="Web-{5E92D238-FBDD-49B1-A334-FD695E37C85F}" dt="2020-05-09T22:13:33.937" v="692" actId="20577"/>
-          <ac:graphicFrameMkLst>
-            <pc:docMk/>
-            <pc:sldMk cId="466311876" sldId="257"/>
-            <ac:graphicFrameMk id="5" creationId="{91169D42-FB2F-4AEC-861C-B7503AD50942}"/>
-          </ac:graphicFrameMkLst>
-        </pc:graphicFrameChg>
-      </pc:sldChg>
-      <pc:sldChg chg="addSp delSp modSp mod setBg">
-        <pc:chgData name="Bryan Khuu" userId="db4bb5bc1a416b49" providerId="Windows Live" clId="Web-{5E92D238-FBDD-49B1-A334-FD695E37C85F}" dt="2020-05-09T22:02:01.864" v="552" actId="1076"/>
-        <pc:sldMkLst>
-          <pc:docMk/>
-          <pc:sldMk cId="3964110441" sldId="258"/>
-        </pc:sldMkLst>
-        <pc:spChg chg="mod ord">
-          <ac:chgData name="Bryan Khuu" userId="db4bb5bc1a416b49" providerId="Windows Live" clId="Web-{5E92D238-FBDD-49B1-A334-FD695E37C85F}" dt="2020-05-09T21:29:38.600" v="383" actId="20577"/>
-          <ac:spMkLst>
-            <pc:docMk/>
-            <pc:sldMk cId="3964110441" sldId="258"/>
-            <ac:spMk id="2" creationId="{91ABE8C2-D87A-4AE1-ACC5-77F1BB1766D7}"/>
-          </ac:spMkLst>
-        </pc:spChg>
-        <pc:spChg chg="mod ord">
-          <ac:chgData name="Bryan Khuu" userId="db4bb5bc1a416b49" providerId="Windows Live" clId="Web-{5E92D238-FBDD-49B1-A334-FD695E37C85F}" dt="2020-05-09T22:01:26.175" v="547" actId="20577"/>
-          <ac:spMkLst>
-            <pc:docMk/>
-            <pc:sldMk cId="3964110441" sldId="258"/>
-            <ac:spMk id="13" creationId="{6144181C-0323-471E-B002-4C0BA47780C0}"/>
-          </ac:spMkLst>
-        </pc:spChg>
-        <pc:spChg chg="add del">
-          <ac:chgData name="Bryan Khuu" userId="db4bb5bc1a416b49" providerId="Windows Live" clId="Web-{5E92D238-FBDD-49B1-A334-FD695E37C85F}" dt="2020-05-09T21:13:47.475" v="55"/>
-          <ac:spMkLst>
-            <pc:docMk/>
-            <pc:sldMk cId="3964110441" sldId="258"/>
-            <ac:spMk id="15" creationId="{98D49316-27CF-4C3D-BE8C-042F06B89148}"/>
-          </ac:spMkLst>
-        </pc:spChg>
-        <pc:spChg chg="add del">
-          <ac:chgData name="Bryan Khuu" userId="db4bb5bc1a416b49" providerId="Windows Live" clId="Web-{5E92D238-FBDD-49B1-A334-FD695E37C85F}" dt="2020-05-09T21:10:41.694" v="11"/>
-          <ac:spMkLst>
-            <pc:docMk/>
-            <pc:sldMk cId="3964110441" sldId="258"/>
-            <ac:spMk id="16" creationId="{1660E788-AFA9-4A1B-9991-6AA74632A15B}"/>
-          </ac:spMkLst>
-        </pc:spChg>
-        <pc:spChg chg="add del">
-          <ac:chgData name="Bryan Khuu" userId="db4bb5bc1a416b49" providerId="Windows Live" clId="Web-{5E92D238-FBDD-49B1-A334-FD695E37C85F}" dt="2020-05-09T21:14:37.288" v="71"/>
-          <ac:spMkLst>
-            <pc:docMk/>
-            <pc:sldMk cId="3964110441" sldId="258"/>
-            <ac:spMk id="17" creationId="{BA4C5437-838C-45F6-BFC8-3AF0ADE30FFB}"/>
-          </ac:spMkLst>
-        </pc:spChg>
-        <pc:spChg chg="add del">
-          <ac:chgData name="Bryan Khuu" userId="db4bb5bc1a416b49" providerId="Windows Live" clId="Web-{5E92D238-FBDD-49B1-A334-FD695E37C85F}" dt="2020-05-09T21:10:41.694" v="11"/>
-          <ac:spMkLst>
-            <pc:docMk/>
-            <pc:sldMk cId="3964110441" sldId="258"/>
-            <ac:spMk id="18" creationId="{867D4867-5BA7-4462-B2F6-A23F4A622AA7}"/>
-          </ac:spMkLst>
-        </pc:spChg>
-        <pc:spChg chg="add del">
-          <ac:chgData name="Bryan Khuu" userId="db4bb5bc1a416b49" providerId="Windows Live" clId="Web-{5E92D238-FBDD-49B1-A334-FD695E37C85F}" dt="2020-05-09T21:14:37.288" v="71"/>
-          <ac:spMkLst>
-            <pc:docMk/>
-            <pc:sldMk cId="3964110441" sldId="258"/>
-            <ac:spMk id="19" creationId="{FACBD493-E381-4822-8F8F-A4194DFDB109}"/>
-          </ac:spMkLst>
-        </pc:spChg>
-        <pc:spChg chg="add del">
-          <ac:chgData name="Bryan Khuu" userId="db4bb5bc1a416b49" providerId="Windows Live" clId="Web-{5E92D238-FBDD-49B1-A334-FD695E37C85F}" dt="2020-05-09T21:10:40.694" v="8"/>
-          <ac:spMkLst>
-            <pc:docMk/>
-            <pc:sldMk cId="3964110441" sldId="258"/>
-            <ac:spMk id="20" creationId="{4088F942-5192-4329-9236-6B9F5E9E87C8}"/>
-          </ac:spMkLst>
-        </pc:spChg>
-        <pc:spChg chg="add del">
-          <ac:chgData name="Bryan Khuu" userId="db4bb5bc1a416b49" providerId="Windows Live" clId="Web-{5E92D238-FBDD-49B1-A334-FD695E37C85F}" dt="2020-05-09T21:11:42.850" v="19"/>
-          <ac:spMkLst>
-            <pc:docMk/>
-            <pc:sldMk cId="3964110441" sldId="258"/>
-            <ac:spMk id="21" creationId="{4088F942-5192-4329-9236-6B9F5E9E87C8}"/>
-          </ac:spMkLst>
-        </pc:spChg>
-        <pc:spChg chg="add del">
-          <ac:chgData name="Bryan Khuu" userId="db4bb5bc1a416b49" providerId="Windows Live" clId="Web-{5E92D238-FBDD-49B1-A334-FD695E37C85F}" dt="2020-05-09T21:11:42.850" v="19"/>
-          <ac:spMkLst>
-            <pc:docMk/>
-            <pc:sldMk cId="3964110441" sldId="258"/>
-            <ac:spMk id="22" creationId="{6DBBC3F0-E4D5-4DC9-9156-6592F510E7D0}"/>
-          </ac:spMkLst>
-        </pc:spChg>
-        <pc:spChg chg="add del">
-          <ac:chgData name="Bryan Khuu" userId="db4bb5bc1a416b49" providerId="Windows Live" clId="Web-{5E92D238-FBDD-49B1-A334-FD695E37C85F}" dt="2020-05-09T21:10:19.022" v="4"/>
-          <ac:spMkLst>
-            <pc:docMk/>
-            <pc:sldMk cId="3964110441" sldId="258"/>
-            <ac:spMk id="23" creationId="{C271F1AE-EB76-45DA-8C1D-BF917DFC4B77}"/>
-          </ac:spMkLst>
-        </pc:spChg>
-        <pc:spChg chg="add del">
-          <ac:chgData name="Bryan Khuu" userId="db4bb5bc1a416b49" providerId="Windows Live" clId="Web-{5E92D238-FBDD-49B1-A334-FD695E37C85F}" dt="2020-05-09T21:11:42.850" v="19"/>
-          <ac:spMkLst>
-            <pc:docMk/>
-            <pc:sldMk cId="3964110441" sldId="258"/>
-            <ac:spMk id="24" creationId="{25440DE7-FEC3-4B33-BE37-CA1D6793F833}"/>
-          </ac:spMkLst>
-        </pc:spChg>
-        <pc:spChg chg="add del">
-          <ac:chgData name="Bryan Khuu" userId="db4bb5bc1a416b49" providerId="Windows Live" clId="Web-{5E92D238-FBDD-49B1-A334-FD695E37C85F}" dt="2020-05-09T21:10:40.694" v="8"/>
-          <ac:spMkLst>
-            <pc:docMk/>
-            <pc:sldMk cId="3964110441" sldId="258"/>
-            <ac:spMk id="25" creationId="{6DBBC3F0-E4D5-4DC9-9156-6592F510E7D0}"/>
-          </ac:spMkLst>
-        </pc:spChg>
-        <pc:spChg chg="add del">
-          <ac:chgData name="Bryan Khuu" userId="db4bb5bc1a416b49" providerId="Windows Live" clId="Web-{5E92D238-FBDD-49B1-A334-FD695E37C85F}" dt="2020-05-09T21:13:14.678" v="51"/>
-          <ac:spMkLst>
-            <pc:docMk/>
-            <pc:sldMk cId="3964110441" sldId="258"/>
-            <ac:spMk id="26" creationId="{98D49316-27CF-4C3D-BE8C-042F06B89148}"/>
-          </ac:spMkLst>
-        </pc:spChg>
-        <pc:spChg chg="add del">
-          <ac:chgData name="Bryan Khuu" userId="db4bb5bc1a416b49" providerId="Windows Live" clId="Web-{5E92D238-FBDD-49B1-A334-FD695E37C85F}" dt="2020-05-09T21:10:40.694" v="8"/>
-          <ac:spMkLst>
-            <pc:docMk/>
-            <pc:sldMk cId="3964110441" sldId="258"/>
-            <ac:spMk id="27" creationId="{25440DE7-FEC3-4B33-BE37-CA1D6793F833}"/>
-          </ac:spMkLst>
-        </pc:spChg>
-        <pc:spChg chg="add del">
-          <ac:chgData name="Bryan Khuu" userId="db4bb5bc1a416b49" providerId="Windows Live" clId="Web-{5E92D238-FBDD-49B1-A334-FD695E37C85F}" dt="2020-05-09T21:12:27.585" v="32"/>
-          <ac:spMkLst>
-            <pc:docMk/>
-            <pc:sldMk cId="3964110441" sldId="258"/>
-            <ac:spMk id="28" creationId="{98D49316-27CF-4C3D-BE8C-042F06B89148}"/>
-          </ac:spMkLst>
-        </pc:spChg>
-        <pc:spChg chg="add del">
-          <ac:chgData name="Bryan Khuu" userId="db4bb5bc1a416b49" providerId="Windows Live" clId="Web-{5E92D238-FBDD-49B1-A334-FD695E37C85F}" dt="2020-05-09T21:11:42.834" v="18"/>
-          <ac:spMkLst>
-            <pc:docMk/>
-            <pc:sldMk cId="3964110441" sldId="258"/>
-            <ac:spMk id="29" creationId="{4088F942-5192-4329-9236-6B9F5E9E87C8}"/>
-          </ac:spMkLst>
-        </pc:spChg>
-        <pc:spChg chg="add del">
-          <ac:chgData name="Bryan Khuu" userId="db4bb5bc1a416b49" providerId="Windows Live" clId="Web-{5E92D238-FBDD-49B1-A334-FD695E37C85F}" dt="2020-05-09T21:12:30.194" v="34"/>
-          <ac:spMkLst>
-            <pc:docMk/>
-            <pc:sldMk cId="3964110441" sldId="258"/>
-            <ac:spMk id="30" creationId="{1660E788-AFA9-4A1B-9991-6AA74632A15B}"/>
-          </ac:spMkLst>
-        </pc:spChg>
-        <pc:spChg chg="add del">
-          <ac:chgData name="Bryan Khuu" userId="db4bb5bc1a416b49" providerId="Windows Live" clId="Web-{5E92D238-FBDD-49B1-A334-FD695E37C85F}" dt="2020-05-09T21:11:42.834" v="18"/>
-          <ac:spMkLst>
-            <pc:docMk/>
-            <pc:sldMk cId="3964110441" sldId="258"/>
-            <ac:spMk id="31" creationId="{6DBBC3F0-E4D5-4DC9-9156-6592F510E7D0}"/>
-          </ac:spMkLst>
-        </pc:spChg>
-        <pc:spChg chg="add del">
-          <ac:chgData name="Bryan Khuu" userId="db4bb5bc1a416b49" providerId="Windows Live" clId="Web-{5E92D238-FBDD-49B1-A334-FD695E37C85F}" dt="2020-05-09T21:12:30.194" v="34"/>
-          <ac:spMkLst>
-            <pc:docMk/>
-            <pc:sldMk cId="3964110441" sldId="258"/>
-            <ac:spMk id="32" creationId="{867D4867-5BA7-4462-B2F6-A23F4A622AA7}"/>
-          </ac:spMkLst>
-        </pc:spChg>
-        <pc:spChg chg="add del">
-          <ac:chgData name="Bryan Khuu" userId="db4bb5bc1a416b49" providerId="Windows Live" clId="Web-{5E92D238-FBDD-49B1-A334-FD695E37C85F}" dt="2020-05-09T21:11:42.834" v="18"/>
-          <ac:spMkLst>
-            <pc:docMk/>
-            <pc:sldMk cId="3964110441" sldId="258"/>
-            <ac:spMk id="33" creationId="{25440DE7-FEC3-4B33-BE37-CA1D6793F833}"/>
-          </ac:spMkLst>
-        </pc:spChg>
-        <pc:spChg chg="add del">
-          <ac:chgData name="Bryan Khuu" userId="db4bb5bc1a416b49" providerId="Windows Live" clId="Web-{5E92D238-FBDD-49B1-A334-FD695E37C85F}" dt="2020-05-09T21:12:32.288" v="36"/>
-          <ac:spMkLst>
-            <pc:docMk/>
-            <pc:sldMk cId="3964110441" sldId="258"/>
-            <ac:spMk id="34" creationId="{1660E788-AFA9-4A1B-9991-6AA74632A15B}"/>
-          </ac:spMkLst>
-        </pc:spChg>
-        <pc:spChg chg="add del">
-          <ac:chgData name="Bryan Khuu" userId="db4bb5bc1a416b49" providerId="Windows Live" clId="Web-{5E92D238-FBDD-49B1-A334-FD695E37C85F}" dt="2020-05-09T21:12:32.288" v="36"/>
-          <ac:spMkLst>
-            <pc:docMk/>
-            <pc:sldMk cId="3964110441" sldId="258"/>
-            <ac:spMk id="35" creationId="{867D4867-5BA7-4462-B2F6-A23F4A622AA7}"/>
-          </ac:spMkLst>
-        </pc:spChg>
-        <pc:spChg chg="add del">
-          <ac:chgData name="Bryan Khuu" userId="db4bb5bc1a416b49" providerId="Windows Live" clId="Web-{5E92D238-FBDD-49B1-A334-FD695E37C85F}" dt="2020-05-09T21:12:35.334" v="38"/>
-          <ac:spMkLst>
-            <pc:docMk/>
-            <pc:sldMk cId="3964110441" sldId="258"/>
-            <ac:spMk id="36" creationId="{BA4C5437-838C-45F6-BFC8-3AF0ADE30FFB}"/>
-          </ac:spMkLst>
-        </pc:spChg>
-        <pc:spChg chg="add del">
-          <ac:chgData name="Bryan Khuu" userId="db4bb5bc1a416b49" providerId="Windows Live" clId="Web-{5E92D238-FBDD-49B1-A334-FD695E37C85F}" dt="2020-05-09T21:12:35.334" v="38"/>
-          <ac:spMkLst>
-            <pc:docMk/>
-            <pc:sldMk cId="3964110441" sldId="258"/>
-            <ac:spMk id="37" creationId="{5D7CC766-DF6B-4E3F-8101-8D5F35D4AFFB}"/>
-          </ac:spMkLst>
-        </pc:spChg>
-        <pc:spChg chg="add del">
-          <ac:chgData name="Bryan Khuu" userId="db4bb5bc1a416b49" providerId="Windows Live" clId="Web-{5E92D238-FBDD-49B1-A334-FD695E37C85F}" dt="2020-05-09T21:12:35.334" v="38"/>
-          <ac:spMkLst>
-            <pc:docMk/>
-            <pc:sldMk cId="3964110441" sldId="258"/>
-            <ac:spMk id="38" creationId="{FACBD493-E381-4822-8F8F-A4194DFDB109}"/>
-          </ac:spMkLst>
-        </pc:spChg>
-        <pc:spChg chg="add del">
-          <ac:chgData name="Bryan Khuu" userId="db4bb5bc1a416b49" providerId="Windows Live" clId="Web-{5E92D238-FBDD-49B1-A334-FD695E37C85F}" dt="2020-05-09T21:12:35.334" v="38"/>
-          <ac:spMkLst>
-            <pc:docMk/>
-            <pc:sldMk cId="3964110441" sldId="258"/>
-            <ac:spMk id="39" creationId="{2310D9BE-4AD2-4CC3-84FA-4E05790B5B9F}"/>
-          </ac:spMkLst>
-        </pc:spChg>
-        <pc:spChg chg="add del">
-          <ac:chgData name="Bryan Khuu" userId="db4bb5bc1a416b49" providerId="Windows Live" clId="Web-{5E92D238-FBDD-49B1-A334-FD695E37C85F}" dt="2020-05-09T21:12:40.881" v="40"/>
-          <ac:spMkLst>
-            <pc:docMk/>
-            <pc:sldMk cId="3964110441" sldId="258"/>
-            <ac:spMk id="40" creationId="{7B9607E2-1C76-424B-8FF0-580615846EC0}"/>
-          </ac:spMkLst>
-        </pc:spChg>
-        <pc:spChg chg="add del">
-          <ac:chgData name="Bryan Khuu" userId="db4bb5bc1a416b49" providerId="Windows Live" clId="Web-{5E92D238-FBDD-49B1-A334-FD695E37C85F}" dt="2020-05-09T21:12:40.881" v="40"/>
-          <ac:spMkLst>
-            <pc:docMk/>
-            <pc:sldMk cId="3964110441" sldId="258"/>
-            <ac:spMk id="41" creationId="{56A668AF-CC37-4641-8D2B-4C91B3ACBC81}"/>
-          </ac:spMkLst>
-        </pc:spChg>
-        <pc:spChg chg="add del">
-          <ac:chgData name="Bryan Khuu" userId="db4bb5bc1a416b49" providerId="Windows Live" clId="Web-{5E92D238-FBDD-49B1-A334-FD695E37C85F}" dt="2020-05-09T21:12:40.881" v="40"/>
-          <ac:spMkLst>
-            <pc:docMk/>
-            <pc:sldMk cId="3964110441" sldId="258"/>
-            <ac:spMk id="42" creationId="{5B3165DC-54F4-4EF5-8B97-5BE55AA3DBE9}"/>
-          </ac:spMkLst>
-        </pc:spChg>
-        <pc:spChg chg="add del">
-          <ac:chgData name="Bryan Khuu" userId="db4bb5bc1a416b49" providerId="Windows Live" clId="Web-{5E92D238-FBDD-49B1-A334-FD695E37C85F}" dt="2020-05-09T21:12:43.272" v="42"/>
-          <ac:spMkLst>
-            <pc:docMk/>
-            <pc:sldMk cId="3964110441" sldId="258"/>
-            <ac:spMk id="43" creationId="{7D587F9F-3F48-4929-8532-62B82B3F66BE}"/>
-          </ac:spMkLst>
-        </pc:spChg>
-        <pc:spChg chg="add del">
-          <ac:chgData name="Bryan Khuu" userId="db4bb5bc1a416b49" providerId="Windows Live" clId="Web-{5E92D238-FBDD-49B1-A334-FD695E37C85F}" dt="2020-05-09T21:12:43.272" v="42"/>
-          <ac:spMkLst>
-            <pc:docMk/>
-            <pc:sldMk cId="3964110441" sldId="258"/>
-            <ac:spMk id="44" creationId="{6DCB66B2-3729-41B6-8A12-AB8550189D5E}"/>
-          </ac:spMkLst>
-        </pc:spChg>
-        <pc:spChg chg="add del">
-          <ac:chgData name="Bryan Khuu" userId="db4bb5bc1a416b49" providerId="Windows Live" clId="Web-{5E92D238-FBDD-49B1-A334-FD695E37C85F}" dt="2020-05-09T21:12:43.272" v="42"/>
-          <ac:spMkLst>
-            <pc:docMk/>
-            <pc:sldMk cId="3964110441" sldId="258"/>
-            <ac:spMk id="45" creationId="{ABA662FB-3DC6-4E93-98AC-B84BA41F4859}"/>
-          </ac:spMkLst>
-        </pc:spChg>
-        <pc:spChg chg="add del">
-          <ac:chgData name="Bryan Khuu" userId="db4bb5bc1a416b49" providerId="Windows Live" clId="Web-{5E92D238-FBDD-49B1-A334-FD695E37C85F}" dt="2020-05-09T21:12:43.272" v="42"/>
-          <ac:spMkLst>
-            <pc:docMk/>
-            <pc:sldMk cId="3964110441" sldId="258"/>
-            <ac:spMk id="46" creationId="{FB9BE604-0CC0-41C8-9673-995F82DA0257}"/>
-          </ac:spMkLst>
-        </pc:spChg>
-        <pc:spChg chg="add del">
-          <ac:chgData name="Bryan Khuu" userId="db4bb5bc1a416b49" providerId="Windows Live" clId="Web-{5E92D238-FBDD-49B1-A334-FD695E37C85F}" dt="2020-05-09T21:12:43.272" v="42"/>
-          <ac:spMkLst>
-            <pc:docMk/>
-            <pc:sldMk cId="3964110441" sldId="258"/>
-            <ac:spMk id="47" creationId="{2036372A-822B-498E-AD05-6BE85743A094}"/>
-          </ac:spMkLst>
-        </pc:spChg>
-        <pc:spChg chg="add del">
-          <ac:chgData name="Bryan Khuu" userId="db4bb5bc1a416b49" providerId="Windows Live" clId="Web-{5E92D238-FBDD-49B1-A334-FD695E37C85F}" dt="2020-05-09T21:12:48.006" v="44"/>
-          <ac:spMkLst>
-            <pc:docMk/>
-            <pc:sldMk cId="3964110441" sldId="258"/>
-            <ac:spMk id="48" creationId="{674D2C94-67DA-49BC-B575-EB99BE0252F3}"/>
-          </ac:spMkLst>
-        </pc:spChg>
-        <pc:spChg chg="add del">
-          <ac:chgData name="Bryan Khuu" userId="db4bb5bc1a416b49" providerId="Windows Live" clId="Web-{5E92D238-FBDD-49B1-A334-FD695E37C85F}" dt="2020-05-09T21:12:48.006" v="44"/>
-          <ac:spMkLst>
-            <pc:docMk/>
-            <pc:sldMk cId="3964110441" sldId="258"/>
-            <ac:spMk id="49" creationId="{8B77C263-A9E4-4AED-A483-A008BF4989F3}"/>
-          </ac:spMkLst>
-        </pc:spChg>
-        <pc:spChg chg="add del">
-          <ac:chgData name="Bryan Khuu" userId="db4bb5bc1a416b49" providerId="Windows Live" clId="Web-{5E92D238-FBDD-49B1-A334-FD695E37C85F}" dt="2020-05-09T21:12:48.006" v="44"/>
-          <ac:spMkLst>
-            <pc:docMk/>
-            <pc:sldMk cId="3964110441" sldId="258"/>
-            <ac:spMk id="50" creationId="{9AB81589-5E2E-48A4-A999-0BBC893AC573}"/>
-          </ac:spMkLst>
-        </pc:spChg>
-        <pc:spChg chg="add del">
-          <ac:chgData name="Bryan Khuu" userId="db4bb5bc1a416b49" providerId="Windows Live" clId="Web-{5E92D238-FBDD-49B1-A334-FD695E37C85F}" dt="2020-05-09T21:12:48.006" v="44"/>
-          <ac:spMkLst>
-            <pc:docMk/>
-            <pc:sldMk cId="3964110441" sldId="258"/>
-            <ac:spMk id="51" creationId="{E66CAF34-A4FD-4846-A2D0-97CF10923F32}"/>
-          </ac:spMkLst>
-        </pc:spChg>
-        <pc:spChg chg="add del">
-          <ac:chgData name="Bryan Khuu" userId="db4bb5bc1a416b49" providerId="Windows Live" clId="Web-{5E92D238-FBDD-49B1-A334-FD695E37C85F}" dt="2020-05-09T21:12:55.897" v="46"/>
-          <ac:spMkLst>
-            <pc:docMk/>
-            <pc:sldMk cId="3964110441" sldId="258"/>
-            <ac:spMk id="52" creationId="{4088F942-5192-4329-9236-6B9F5E9E87C8}"/>
-          </ac:spMkLst>
-        </pc:spChg>
-        <pc:spChg chg="add del">
-          <ac:chgData name="Bryan Khuu" userId="db4bb5bc1a416b49" providerId="Windows Live" clId="Web-{5E92D238-FBDD-49B1-A334-FD695E37C85F}" dt="2020-05-09T21:12:55.897" v="46"/>
-          <ac:spMkLst>
-            <pc:docMk/>
-            <pc:sldMk cId="3964110441" sldId="258"/>
-            <ac:spMk id="53" creationId="{6DBBC3F0-E4D5-4DC9-9156-6592F510E7D0}"/>
-          </ac:spMkLst>
-        </pc:spChg>
-        <pc:spChg chg="add del">
-          <ac:chgData name="Bryan Khuu" userId="db4bb5bc1a416b49" providerId="Windows Live" clId="Web-{5E92D238-FBDD-49B1-A334-FD695E37C85F}" dt="2020-05-09T21:12:55.897" v="46"/>
-          <ac:spMkLst>
-            <pc:docMk/>
-            <pc:sldMk cId="3964110441" sldId="258"/>
-            <ac:spMk id="54" creationId="{25440DE7-FEC3-4B33-BE37-CA1D6793F833}"/>
-          </ac:spMkLst>
-        </pc:spChg>
-        <pc:spChg chg="add del">
-          <ac:chgData name="Bryan Khuu" userId="db4bb5bc1a416b49" providerId="Windows Live" clId="Web-{5E92D238-FBDD-49B1-A334-FD695E37C85F}" dt="2020-05-09T21:13:04.522" v="48"/>
-          <ac:spMkLst>
-            <pc:docMk/>
-            <pc:sldMk cId="3964110441" sldId="258"/>
-            <ac:spMk id="55" creationId="{8AA1D43A-9C3D-41BA-BD9F-EF7EC7B2F076}"/>
-          </ac:spMkLst>
-        </pc:spChg>
-        <pc:spChg chg="add del">
-          <ac:chgData name="Bryan Khuu" userId="db4bb5bc1a416b49" providerId="Windows Live" clId="Web-{5E92D238-FBDD-49B1-A334-FD695E37C85F}" dt="2020-05-09T21:13:04.522" v="48"/>
-          <ac:spMkLst>
-            <pc:docMk/>
-            <pc:sldMk cId="3964110441" sldId="258"/>
-            <ac:spMk id="56" creationId="{0477181B-208D-49EE-AEEF-79DAF8BA73E1}"/>
-          </ac:spMkLst>
-        </pc:spChg>
-        <pc:spChg chg="add del">
-          <ac:chgData name="Bryan Khuu" userId="db4bb5bc1a416b49" providerId="Windows Live" clId="Web-{5E92D238-FBDD-49B1-A334-FD695E37C85F}" dt="2020-05-09T21:13:04.522" v="48"/>
-          <ac:spMkLst>
-            <pc:docMk/>
-            <pc:sldMk cId="3964110441" sldId="258"/>
-            <ac:spMk id="57" creationId="{83BFAA97-C464-45F7-995A-E13D0B4FC673}"/>
-          </ac:spMkLst>
-        </pc:spChg>
-        <pc:spChg chg="add del">
-          <ac:chgData name="Bryan Khuu" userId="db4bb5bc1a416b49" providerId="Windows Live" clId="Web-{5E92D238-FBDD-49B1-A334-FD695E37C85F}" dt="2020-05-09T21:13:04.522" v="48"/>
-          <ac:spMkLst>
-            <pc:docMk/>
-            <pc:sldMk cId="3964110441" sldId="258"/>
-            <ac:spMk id="58" creationId="{EC059808-0DA1-4E66-92F6-60C8B25B4D6B}"/>
-          </ac:spMkLst>
-        </pc:spChg>
-        <pc:spChg chg="add del">
-          <ac:chgData name="Bryan Khuu" userId="db4bb5bc1a416b49" providerId="Windows Live" clId="Web-{5E92D238-FBDD-49B1-A334-FD695E37C85F}" dt="2020-05-09T21:13:04.522" v="48"/>
-          <ac:spMkLst>
-            <pc:docMk/>
-            <pc:sldMk cId="3964110441" sldId="258"/>
-            <ac:spMk id="59" creationId="{45386504-CADE-4AFE-AF4F-0616BA69A7BA}"/>
-          </ac:spMkLst>
-        </pc:spChg>
-        <pc:spChg chg="add del">
-          <ac:chgData name="Bryan Khuu" userId="db4bb5bc1a416b49" providerId="Windows Live" clId="Web-{5E92D238-FBDD-49B1-A334-FD695E37C85F}" dt="2020-05-09T21:14:37.288" v="71"/>
-          <ac:spMkLst>
-            <pc:docMk/>
-            <pc:sldMk cId="3964110441" sldId="258"/>
-            <ac:spMk id="60" creationId="{2310D9BE-4AD2-4CC3-84FA-4E05790B5B9F}"/>
-          </ac:spMkLst>
-        </pc:spChg>
-        <pc:spChg chg="add del">
-          <ac:chgData name="Bryan Khuu" userId="db4bb5bc1a416b49" providerId="Windows Live" clId="Web-{5E92D238-FBDD-49B1-A334-FD695E37C85F}" dt="2020-05-09T21:14:37.288" v="71"/>
-          <ac:spMkLst>
-            <pc:docMk/>
-            <pc:sldMk cId="3964110441" sldId="258"/>
-            <ac:spMk id="61" creationId="{5D7CC766-DF6B-4E3F-8101-8D5F35D4AFFB}"/>
-          </ac:spMkLst>
-        </pc:spChg>
-        <pc:spChg chg="add del">
-          <ac:chgData name="Bryan Khuu" userId="db4bb5bc1a416b49" providerId="Windows Live" clId="Web-{5E92D238-FBDD-49B1-A334-FD695E37C85F}" dt="2020-05-09T21:14:16.413" v="60"/>
-          <ac:spMkLst>
-            <pc:docMk/>
-            <pc:sldMk cId="3964110441" sldId="258"/>
-            <ac:spMk id="63" creationId="{B8D39262-9511-4F20-8344-1B9DA68877A8}"/>
-          </ac:spMkLst>
-        </pc:spChg>
-        <pc:spChg chg="add del">
-          <ac:chgData name="Bryan Khuu" userId="db4bb5bc1a416b49" providerId="Windows Live" clId="Web-{5E92D238-FBDD-49B1-A334-FD695E37C85F}" dt="2020-05-09T21:14:16.413" v="60"/>
-          <ac:spMkLst>
-            <pc:docMk/>
-            <pc:sldMk cId="3964110441" sldId="258"/>
-            <ac:spMk id="64" creationId="{4F924495-5138-4BB6-B18C-C83EC04341D6}"/>
-          </ac:spMkLst>
-        </pc:spChg>
-        <pc:spChg chg="add del">
-          <ac:chgData name="Bryan Khuu" userId="db4bb5bc1a416b49" providerId="Windows Live" clId="Web-{5E92D238-FBDD-49B1-A334-FD695E37C85F}" dt="2020-05-09T21:14:16.413" v="60"/>
-          <ac:spMkLst>
-            <pc:docMk/>
-            <pc:sldMk cId="3964110441" sldId="258"/>
-            <ac:spMk id="65" creationId="{428AFF86-4DDC-4A60-AC4C-48C6DAE56894}"/>
-          </ac:spMkLst>
-        </pc:spChg>
-        <pc:spChg chg="add del">
-          <ac:chgData name="Bryan Khuu" userId="db4bb5bc1a416b49" providerId="Windows Live" clId="Web-{5E92D238-FBDD-49B1-A334-FD695E37C85F}" dt="2020-05-09T21:14:15.134" v="58"/>
-          <ac:spMkLst>
-            <pc:docMk/>
-            <pc:sldMk cId="3964110441" sldId="258"/>
-            <ac:spMk id="66" creationId="{BA4C5437-838C-45F6-BFC8-3AF0ADE30FFB}"/>
-          </ac:spMkLst>
-        </pc:spChg>
-        <pc:spChg chg="add del">
-          <ac:chgData name="Bryan Khuu" userId="db4bb5bc1a416b49" providerId="Windows Live" clId="Web-{5E92D238-FBDD-49B1-A334-FD695E37C85F}" dt="2020-05-09T21:14:17.538" v="62"/>
-          <ac:spMkLst>
-            <pc:docMk/>
-            <pc:sldMk cId="3964110441" sldId="258"/>
-            <ac:spMk id="67" creationId="{1660E788-AFA9-4A1B-9991-6AA74632A15B}"/>
-          </ac:spMkLst>
-        </pc:spChg>
-        <pc:spChg chg="add del">
-          <ac:chgData name="Bryan Khuu" userId="db4bb5bc1a416b49" providerId="Windows Live" clId="Web-{5E92D238-FBDD-49B1-A334-FD695E37C85F}" dt="2020-05-09T21:14:15.134" v="58"/>
-          <ac:spMkLst>
-            <pc:docMk/>
-            <pc:sldMk cId="3964110441" sldId="258"/>
-            <ac:spMk id="68" creationId="{FACBD493-E381-4822-8F8F-A4194DFDB109}"/>
-          </ac:spMkLst>
-        </pc:spChg>
-        <pc:spChg chg="add del">
-          <ac:chgData name="Bryan Khuu" userId="db4bb5bc1a416b49" providerId="Windows Live" clId="Web-{5E92D238-FBDD-49B1-A334-FD695E37C85F}" dt="2020-05-09T21:14:17.538" v="62"/>
-          <ac:spMkLst>
-            <pc:docMk/>
-            <pc:sldMk cId="3964110441" sldId="258"/>
-            <ac:spMk id="69" creationId="{867D4867-5BA7-4462-B2F6-A23F4A622AA7}"/>
-          </ac:spMkLst>
-        </pc:spChg>
-        <pc:spChg chg="add del">
-          <ac:chgData name="Bryan Khuu" userId="db4bb5bc1a416b49" providerId="Windows Live" clId="Web-{5E92D238-FBDD-49B1-A334-FD695E37C85F}" dt="2020-05-09T21:14:15.134" v="58"/>
-          <ac:spMkLst>
-            <pc:docMk/>
-            <pc:sldMk cId="3964110441" sldId="258"/>
-            <ac:spMk id="70" creationId="{2310D9BE-4AD2-4CC3-84FA-4E05790B5B9F}"/>
-          </ac:spMkLst>
-        </pc:spChg>
-        <pc:spChg chg="add del">
-          <ac:chgData name="Bryan Khuu" userId="db4bb5bc1a416b49" providerId="Windows Live" clId="Web-{5E92D238-FBDD-49B1-A334-FD695E37C85F}" dt="2020-05-09T21:14:20.288" v="64"/>
-          <ac:spMkLst>
-            <pc:docMk/>
-            <pc:sldMk cId="3964110441" sldId="258"/>
-            <ac:spMk id="71" creationId="{7B9607E2-1C76-424B-8FF0-580615846EC0}"/>
-          </ac:spMkLst>
-        </pc:spChg>
-        <pc:spChg chg="add del">
-          <ac:chgData name="Bryan Khuu" userId="db4bb5bc1a416b49" providerId="Windows Live" clId="Web-{5E92D238-FBDD-49B1-A334-FD695E37C85F}" dt="2020-05-09T21:14:15.134" v="58"/>
-          <ac:spMkLst>
-            <pc:docMk/>
-            <pc:sldMk cId="3964110441" sldId="258"/>
-            <ac:spMk id="72" creationId="{5D7CC766-DF6B-4E3F-8101-8D5F35D4AFFB}"/>
-          </ac:spMkLst>
-        </pc:spChg>
-        <pc:spChg chg="add del">
-          <ac:chgData name="Bryan Khuu" userId="db4bb5bc1a416b49" providerId="Windows Live" clId="Web-{5E92D238-FBDD-49B1-A334-FD695E37C85F}" dt="2020-05-09T21:14:20.288" v="64"/>
-          <ac:spMkLst>
-            <pc:docMk/>
-            <pc:sldMk cId="3964110441" sldId="258"/>
-            <ac:spMk id="73" creationId="{56A668AF-CC37-4641-8D2B-4C91B3ACBC81}"/>
-          </ac:spMkLst>
-        </pc:spChg>
-        <pc:spChg chg="add del">
-          <ac:chgData name="Bryan Khuu" userId="db4bb5bc1a416b49" providerId="Windows Live" clId="Web-{5E92D238-FBDD-49B1-A334-FD695E37C85F}" dt="2020-05-09T21:14:20.288" v="64"/>
-          <ac:spMkLst>
-            <pc:docMk/>
-            <pc:sldMk cId="3964110441" sldId="258"/>
-            <ac:spMk id="74" creationId="{5B3165DC-54F4-4EF5-8B97-5BE55AA3DBE9}"/>
-          </ac:spMkLst>
-        </pc:spChg>
-        <pc:spChg chg="add del">
-          <ac:chgData name="Bryan Khuu" userId="db4bb5bc1a416b49" providerId="Windows Live" clId="Web-{5E92D238-FBDD-49B1-A334-FD695E37C85F}" dt="2020-05-09T21:14:25.882" v="66"/>
-          <ac:spMkLst>
-            <pc:docMk/>
-            <pc:sldMk cId="3964110441" sldId="258"/>
-            <ac:spMk id="75" creationId="{98D49316-27CF-4C3D-BE8C-042F06B89148}"/>
-          </ac:spMkLst>
-        </pc:spChg>
-        <pc:spChg chg="add del">
-          <ac:chgData name="Bryan Khuu" userId="db4bb5bc1a416b49" providerId="Windows Live" clId="Web-{5E92D238-FBDD-49B1-A334-FD695E37C85F}" dt="2020-05-09T21:14:30.944" v="68"/>
-          <ac:spMkLst>
-            <pc:docMk/>
-            <pc:sldMk cId="3964110441" sldId="258"/>
-            <ac:spMk id="76" creationId="{930BC020-BDBF-49EB-9898-BAB5BF559317}"/>
-          </ac:spMkLst>
-        </pc:spChg>
-        <pc:spChg chg="add del">
-          <ac:chgData name="Bryan Khuu" userId="db4bb5bc1a416b49" providerId="Windows Live" clId="Web-{5E92D238-FBDD-49B1-A334-FD695E37C85F}" dt="2020-05-09T21:14:30.944" v="68"/>
-          <ac:spMkLst>
-            <pc:docMk/>
-            <pc:sldMk cId="3964110441" sldId="258"/>
-            <ac:spMk id="77" creationId="{64950C64-5D81-40F1-9601-8BA0D63BAE74}"/>
-          </ac:spMkLst>
-        </pc:spChg>
-        <pc:spChg chg="add del">
-          <ac:chgData name="Bryan Khuu" userId="db4bb5bc1a416b49" providerId="Windows Live" clId="Web-{5E92D238-FBDD-49B1-A334-FD695E37C85F}" dt="2020-05-09T21:14:37.288" v="70"/>
-          <ac:spMkLst>
-            <pc:docMk/>
-            <pc:sldMk cId="3964110441" sldId="258"/>
-            <ac:spMk id="78" creationId="{98D49316-27CF-4C3D-BE8C-042F06B89148}"/>
-          </ac:spMkLst>
-        </pc:spChg>
-        <pc:spChg chg="add del">
-          <ac:chgData name="Bryan Khuu" userId="db4bb5bc1a416b49" providerId="Windows Live" clId="Web-{5E92D238-FBDD-49B1-A334-FD695E37C85F}" dt="2020-05-09T21:15:17.116" v="80"/>
-          <ac:spMkLst>
-            <pc:docMk/>
-            <pc:sldMk cId="3964110441" sldId="258"/>
-            <ac:spMk id="79" creationId="{BA4C5437-838C-45F6-BFC8-3AF0ADE30FFB}"/>
-          </ac:spMkLst>
-        </pc:spChg>
-        <pc:spChg chg="add del">
-          <ac:chgData name="Bryan Khuu" userId="db4bb5bc1a416b49" providerId="Windows Live" clId="Web-{5E92D238-FBDD-49B1-A334-FD695E37C85F}" dt="2020-05-09T21:15:17.116" v="80"/>
-          <ac:spMkLst>
-            <pc:docMk/>
-            <pc:sldMk cId="3964110441" sldId="258"/>
-            <ac:spMk id="80" creationId="{FACBD493-E381-4822-8F8F-A4194DFDB109}"/>
-          </ac:spMkLst>
-        </pc:spChg>
-        <pc:spChg chg="add del">
-          <ac:chgData name="Bryan Khuu" userId="db4bb5bc1a416b49" providerId="Windows Live" clId="Web-{5E92D238-FBDD-49B1-A334-FD695E37C85F}" dt="2020-05-09T21:15:17.116" v="80"/>
-          <ac:spMkLst>
-            <pc:docMk/>
-            <pc:sldMk cId="3964110441" sldId="258"/>
-            <ac:spMk id="81" creationId="{2310D9BE-4AD2-4CC3-84FA-4E05790B5B9F}"/>
-          </ac:spMkLst>
-        </pc:spChg>
-        <pc:spChg chg="add del">
-          <ac:chgData name="Bryan Khuu" userId="db4bb5bc1a416b49" providerId="Windows Live" clId="Web-{5E92D238-FBDD-49B1-A334-FD695E37C85F}" dt="2020-05-09T21:15:17.116" v="80"/>
-          <ac:spMkLst>
-            <pc:docMk/>
-            <pc:sldMk cId="3964110441" sldId="258"/>
-            <ac:spMk id="82" creationId="{5D7CC766-DF6B-4E3F-8101-8D5F35D4AFFB}"/>
-          </ac:spMkLst>
-        </pc:spChg>
-        <pc:spChg chg="add del">
-          <ac:chgData name="Bryan Khuu" userId="db4bb5bc1a416b49" providerId="Windows Live" clId="Web-{5E92D238-FBDD-49B1-A334-FD695E37C85F}" dt="2020-05-09T21:15:35.334" v="88"/>
-          <ac:spMkLst>
-            <pc:docMk/>
-            <pc:sldMk cId="3964110441" sldId="258"/>
-            <ac:spMk id="87" creationId="{98D49316-27CF-4C3D-BE8C-042F06B89148}"/>
-          </ac:spMkLst>
-        </pc:spChg>
-        <pc:spChg chg="add del">
-          <ac:chgData name="Bryan Khuu" userId="db4bb5bc1a416b49" providerId="Windows Live" clId="Web-{5E92D238-FBDD-49B1-A334-FD695E37C85F}" dt="2020-05-09T21:15:33.131" v="85"/>
-          <ac:spMkLst>
-            <pc:docMk/>
-            <pc:sldMk cId="3964110441" sldId="258"/>
-            <ac:spMk id="89" creationId="{98D49316-27CF-4C3D-BE8C-042F06B89148}"/>
-          </ac:spMkLst>
-        </pc:spChg>
-        <pc:spChg chg="add del">
-          <ac:chgData name="Bryan Khuu" userId="db4bb5bc1a416b49" providerId="Windows Live" clId="Web-{5E92D238-FBDD-49B1-A334-FD695E37C85F}" dt="2020-05-09T21:15:35.319" v="87"/>
-          <ac:spMkLst>
-            <pc:docMk/>
-            <pc:sldMk cId="3964110441" sldId="258"/>
-            <ac:spMk id="90" creationId="{BA4C5437-838C-45F6-BFC8-3AF0ADE30FFB}"/>
-          </ac:spMkLst>
-        </pc:spChg>
-        <pc:spChg chg="add del">
-          <ac:chgData name="Bryan Khuu" userId="db4bb5bc1a416b49" providerId="Windows Live" clId="Web-{5E92D238-FBDD-49B1-A334-FD695E37C85F}" dt="2020-05-09T21:15:35.319" v="87"/>
-          <ac:spMkLst>
-            <pc:docMk/>
-            <pc:sldMk cId="3964110441" sldId="258"/>
-            <ac:spMk id="91" creationId="{FACBD493-E381-4822-8F8F-A4194DFDB109}"/>
-          </ac:spMkLst>
-        </pc:spChg>
-        <pc:spChg chg="add del">
-          <ac:chgData name="Bryan Khuu" userId="db4bb5bc1a416b49" providerId="Windows Live" clId="Web-{5E92D238-FBDD-49B1-A334-FD695E37C85F}" dt="2020-05-09T21:15:30.069" v="83"/>
-          <ac:spMkLst>
-            <pc:docMk/>
-            <pc:sldMk cId="3964110441" sldId="258"/>
-            <ac:spMk id="92" creationId="{7B9607E2-1C76-424B-8FF0-580615846EC0}"/>
-          </ac:spMkLst>
-        </pc:spChg>
-        <pc:spChg chg="add del">
-          <ac:chgData name="Bryan Khuu" userId="db4bb5bc1a416b49" providerId="Windows Live" clId="Web-{5E92D238-FBDD-49B1-A334-FD695E37C85F}" dt="2020-05-09T21:15:35.319" v="87"/>
-          <ac:spMkLst>
-            <pc:docMk/>
-            <pc:sldMk cId="3964110441" sldId="258"/>
-            <ac:spMk id="93" creationId="{2310D9BE-4AD2-4CC3-84FA-4E05790B5B9F}"/>
-          </ac:spMkLst>
-        </pc:spChg>
-        <pc:spChg chg="add del">
-          <ac:chgData name="Bryan Khuu" userId="db4bb5bc1a416b49" providerId="Windows Live" clId="Web-{5E92D238-FBDD-49B1-A334-FD695E37C85F}" dt="2020-05-09T21:15:30.069" v="83"/>
-          <ac:spMkLst>
-            <pc:docMk/>
-            <pc:sldMk cId="3964110441" sldId="258"/>
-            <ac:spMk id="94" creationId="{56A668AF-CC37-4641-8D2B-4C91B3ACBC81}"/>
-          </ac:spMkLst>
-        </pc:spChg>
-        <pc:spChg chg="add del">
-          <ac:chgData name="Bryan Khuu" userId="db4bb5bc1a416b49" providerId="Windows Live" clId="Web-{5E92D238-FBDD-49B1-A334-FD695E37C85F}" dt="2020-05-09T21:15:42.803" v="90"/>
-          <ac:spMkLst>
-            <pc:docMk/>
-            <pc:sldMk cId="3964110441" sldId="258"/>
-            <ac:spMk id="95" creationId="{98D49316-27CF-4C3D-BE8C-042F06B89148}"/>
-          </ac:spMkLst>
-        </pc:spChg>
-        <pc:spChg chg="add del">
-          <ac:chgData name="Bryan Khuu" userId="db4bb5bc1a416b49" providerId="Windows Live" clId="Web-{5E92D238-FBDD-49B1-A334-FD695E37C85F}" dt="2020-05-09T21:15:30.069" v="83"/>
-          <ac:spMkLst>
-            <pc:docMk/>
-            <pc:sldMk cId="3964110441" sldId="258"/>
-            <ac:spMk id="96" creationId="{5B3165DC-54F4-4EF5-8B97-5BE55AA3DBE9}"/>
-          </ac:spMkLst>
-        </pc:spChg>
-        <pc:spChg chg="add del">
-          <ac:chgData name="Bryan Khuu" userId="db4bb5bc1a416b49" providerId="Windows Live" clId="Web-{5E92D238-FBDD-49B1-A334-FD695E37C85F}" dt="2020-05-09T21:17:52.397" v="117"/>
-          <ac:spMkLst>
-            <pc:docMk/>
-            <pc:sldMk cId="3964110441" sldId="258"/>
-            <ac:spMk id="97" creationId="{C315E612-C0A2-4395-B579-9D425FAAC183}"/>
-          </ac:spMkLst>
-        </pc:spChg>
-        <pc:spChg chg="add del">
-          <ac:chgData name="Bryan Khuu" userId="db4bb5bc1a416b49" providerId="Windows Live" clId="Web-{5E92D238-FBDD-49B1-A334-FD695E37C85F}" dt="2020-05-09T21:15:35.319" v="87"/>
-          <ac:spMkLst>
-            <pc:docMk/>
-            <pc:sldMk cId="3964110441" sldId="258"/>
-            <ac:spMk id="98" creationId="{5D7CC766-DF6B-4E3F-8101-8D5F35D4AFFB}"/>
-          </ac:spMkLst>
-        </pc:spChg>
-        <pc:spChg chg="add del">
-          <ac:chgData name="Bryan Khuu" userId="db4bb5bc1a416b49" providerId="Windows Live" clId="Web-{5E92D238-FBDD-49B1-A334-FD695E37C85F}" dt="2020-05-09T21:17:20.131" v="106"/>
-          <ac:spMkLst>
-            <pc:docMk/>
-            <pc:sldMk cId="3964110441" sldId="258"/>
-            <ac:spMk id="100" creationId="{BA4C5437-838C-45F6-BFC8-3AF0ADE30FFB}"/>
-          </ac:spMkLst>
-        </pc:spChg>
-        <pc:spChg chg="add del">
-          <ac:chgData name="Bryan Khuu" userId="db4bb5bc1a416b49" providerId="Windows Live" clId="Web-{5E92D238-FBDD-49B1-A334-FD695E37C85F}" dt="2020-05-09T21:17:36.975" v="112"/>
-          <ac:spMkLst>
-            <pc:docMk/>
-            <pc:sldMk cId="3964110441" sldId="258"/>
-            <ac:spMk id="101" creationId="{A88B48CE-97F9-4924-96D2-BEAD09D4B7D3}"/>
-          </ac:spMkLst>
-        </pc:spChg>
-        <pc:spChg chg="add del">
-          <ac:chgData name="Bryan Khuu" userId="db4bb5bc1a416b49" providerId="Windows Live" clId="Web-{5E92D238-FBDD-49B1-A334-FD695E37C85F}" dt="2020-05-09T21:17:20.131" v="106"/>
-          <ac:spMkLst>
-            <pc:docMk/>
-            <pc:sldMk cId="3964110441" sldId="258"/>
-            <ac:spMk id="102" creationId="{FACBD493-E381-4822-8F8F-A4194DFDB109}"/>
-          </ac:spMkLst>
-        </pc:spChg>
-        <pc:spChg chg="add del">
-          <ac:chgData name="Bryan Khuu" userId="db4bb5bc1a416b49" providerId="Windows Live" clId="Web-{5E92D238-FBDD-49B1-A334-FD695E37C85F}" dt="2020-05-09T21:17:20.131" v="106"/>
-          <ac:spMkLst>
-            <pc:docMk/>
-            <pc:sldMk cId="3964110441" sldId="258"/>
-            <ac:spMk id="104" creationId="{2310D9BE-4AD2-4CC3-84FA-4E05790B5B9F}"/>
-          </ac:spMkLst>
-        </pc:spChg>
-        <pc:spChg chg="add del">
-          <ac:chgData name="Bryan Khuu" userId="db4bb5bc1a416b49" providerId="Windows Live" clId="Web-{5E92D238-FBDD-49B1-A334-FD695E37C85F}" dt="2020-05-09T21:17:39.663" v="114"/>
-          <ac:spMkLst>
-            <pc:docMk/>
-            <pc:sldMk cId="3964110441" sldId="258"/>
-            <ac:spMk id="105" creationId="{5E69A754-1A4C-4BC4-A2DD-34A040EFC65D}"/>
-          </ac:spMkLst>
-        </pc:spChg>
-        <pc:spChg chg="add del">
-          <ac:chgData name="Bryan Khuu" userId="db4bb5bc1a416b49" providerId="Windows Live" clId="Web-{5E92D238-FBDD-49B1-A334-FD695E37C85F}" dt="2020-05-09T21:17:20.131" v="106"/>
-          <ac:spMkLst>
-            <pc:docMk/>
-            <pc:sldMk cId="3964110441" sldId="258"/>
-            <ac:spMk id="106" creationId="{5D7CC766-DF6B-4E3F-8101-8D5F35D4AFFB}"/>
-          </ac:spMkLst>
-        </pc:spChg>
-        <pc:spChg chg="add del">
-          <ac:chgData name="Bryan Khuu" userId="db4bb5bc1a416b49" providerId="Windows Live" clId="Web-{5E92D238-FBDD-49B1-A334-FD695E37C85F}" dt="2020-05-09T21:17:10.179" v="103"/>
-          <ac:spMkLst>
-            <pc:docMk/>
-            <pc:sldMk cId="3964110441" sldId="258"/>
-            <ac:spMk id="108" creationId="{B8D39262-9511-4F20-8344-1B9DA68877A8}"/>
-          </ac:spMkLst>
-        </pc:spChg>
-        <pc:spChg chg="add del">
-          <ac:chgData name="Bryan Khuu" userId="db4bb5bc1a416b49" providerId="Windows Live" clId="Web-{5E92D238-FBDD-49B1-A334-FD695E37C85F}" dt="2020-05-09T21:17:10.179" v="103"/>
-          <ac:spMkLst>
-            <pc:docMk/>
-            <pc:sldMk cId="3964110441" sldId="258"/>
-            <ac:spMk id="109" creationId="{4F924495-5138-4BB6-B18C-C83EC04341D6}"/>
-          </ac:spMkLst>
-        </pc:spChg>
-        <pc:spChg chg="add del">
-          <ac:chgData name="Bryan Khuu" userId="db4bb5bc1a416b49" providerId="Windows Live" clId="Web-{5E92D238-FBDD-49B1-A334-FD695E37C85F}" dt="2020-05-09T21:17:10.179" v="103"/>
-          <ac:spMkLst>
-            <pc:docMk/>
-            <pc:sldMk cId="3964110441" sldId="258"/>
-            <ac:spMk id="110" creationId="{428AFF86-4DDC-4A60-AC4C-48C6DAE56894}"/>
-          </ac:spMkLst>
-        </pc:spChg>
-        <pc:spChg chg="add del">
-          <ac:chgData name="Bryan Khuu" userId="db4bb5bc1a416b49" providerId="Windows Live" clId="Web-{5E92D238-FBDD-49B1-A334-FD695E37C85F}" dt="2020-05-09T21:17:08.256" v="101"/>
-          <ac:spMkLst>
-            <pc:docMk/>
-            <pc:sldMk cId="3964110441" sldId="258"/>
-            <ac:spMk id="111" creationId="{BA4C5437-838C-45F6-BFC8-3AF0ADE30FFB}"/>
-          </ac:spMkLst>
-        </pc:spChg>
-        <pc:spChg chg="add del">
-          <ac:chgData name="Bryan Khuu" userId="db4bb5bc1a416b49" providerId="Windows Live" clId="Web-{5E92D238-FBDD-49B1-A334-FD695E37C85F}" dt="2020-05-09T21:17:20.116" v="105"/>
-          <ac:spMkLst>
-            <pc:docMk/>
-            <pc:sldMk cId="3964110441" sldId="258"/>
-            <ac:spMk id="112" creationId="{1660E788-AFA9-4A1B-9991-6AA74632A15B}"/>
-          </ac:spMkLst>
-        </pc:spChg>
-        <pc:spChg chg="add del">
-          <ac:chgData name="Bryan Khuu" userId="db4bb5bc1a416b49" providerId="Windows Live" clId="Web-{5E92D238-FBDD-49B1-A334-FD695E37C85F}" dt="2020-05-09T21:17:08.256" v="101"/>
-          <ac:spMkLst>
-            <pc:docMk/>
-            <pc:sldMk cId="3964110441" sldId="258"/>
-            <ac:spMk id="113" creationId="{FACBD493-E381-4822-8F8F-A4194DFDB109}"/>
-          </ac:spMkLst>
-        </pc:spChg>
-        <pc:spChg chg="add del">
-          <ac:chgData name="Bryan Khuu" userId="db4bb5bc1a416b49" providerId="Windows Live" clId="Web-{5E92D238-FBDD-49B1-A334-FD695E37C85F}" dt="2020-05-09T21:17:20.116" v="105"/>
-          <ac:spMkLst>
-            <pc:docMk/>
-            <pc:sldMk cId="3964110441" sldId="258"/>
-            <ac:spMk id="114" creationId="{867D4867-5BA7-4462-B2F6-A23F4A622AA7}"/>
-          </ac:spMkLst>
-        </pc:spChg>
-        <pc:spChg chg="add del">
-          <ac:chgData name="Bryan Khuu" userId="db4bb5bc1a416b49" providerId="Windows Live" clId="Web-{5E92D238-FBDD-49B1-A334-FD695E37C85F}" dt="2020-05-09T21:17:08.256" v="101"/>
-          <ac:spMkLst>
-            <pc:docMk/>
-            <pc:sldMk cId="3964110441" sldId="258"/>
-            <ac:spMk id="115" creationId="{2310D9BE-4AD2-4CC3-84FA-4E05790B5B9F}"/>
-          </ac:spMkLst>
-        </pc:spChg>
-        <pc:spChg chg="add del">
-          <ac:chgData name="Bryan Khuu" userId="db4bb5bc1a416b49" providerId="Windows Live" clId="Web-{5E92D238-FBDD-49B1-A334-FD695E37C85F}" dt="2020-05-09T21:20:12.710" v="154"/>
-          <ac:spMkLst>
-            <pc:docMk/>
-            <pc:sldMk cId="3964110441" sldId="258"/>
-            <ac:spMk id="116" creationId="{C315E612-C0A2-4395-B579-9D425FAAC183}"/>
-          </ac:spMkLst>
-        </pc:spChg>
-        <pc:spChg chg="add del">
-          <ac:chgData name="Bryan Khuu" userId="db4bb5bc1a416b49" providerId="Windows Live" clId="Web-{5E92D238-FBDD-49B1-A334-FD695E37C85F}" dt="2020-05-09T21:17:08.256" v="101"/>
-          <ac:spMkLst>
-            <pc:docMk/>
-            <pc:sldMk cId="3964110441" sldId="258"/>
-            <ac:spMk id="117" creationId="{5D7CC766-DF6B-4E3F-8101-8D5F35D4AFFB}"/>
-          </ac:spMkLst>
-        </pc:spChg>
-        <pc:spChg chg="add del">
-          <ac:chgData name="Bryan Khuu" userId="db4bb5bc1a416b49" providerId="Windows Live" clId="Web-{5E92D238-FBDD-49B1-A334-FD695E37C85F}" dt="2020-05-09T21:20:11.444" v="153"/>
-          <ac:spMkLst>
-            <pc:docMk/>
-            <pc:sldMk cId="3964110441" sldId="258"/>
-            <ac:spMk id="119" creationId="{A88B48CE-97F9-4924-96D2-BEAD09D4B7D3}"/>
-          </ac:spMkLst>
-        </pc:spChg>
-        <pc:spChg chg="add del ord">
-          <ac:chgData name="Bryan Khuu" userId="db4bb5bc1a416b49" providerId="Windows Live" clId="Web-{5E92D238-FBDD-49B1-A334-FD695E37C85F}" dt="2020-05-09T21:20:45.819" v="166"/>
-          <ac:spMkLst>
-            <pc:docMk/>
-            <pc:sldMk cId="3964110441" sldId="258"/>
-            <ac:spMk id="121" creationId="{5E69A754-1A4C-4BC4-A2DD-34A040EFC65D}"/>
-          </ac:spMkLst>
-        </pc:spChg>
-        <pc:spChg chg="add del">
-          <ac:chgData name="Bryan Khuu" userId="db4bb5bc1a416b49" providerId="Windows Live" clId="Web-{5E92D238-FBDD-49B1-A334-FD695E37C85F}" dt="2020-05-09T21:20:23.600" v="158"/>
-          <ac:spMkLst>
-            <pc:docMk/>
-            <pc:sldMk cId="3964110441" sldId="258"/>
-            <ac:spMk id="124" creationId="{BA4C5437-838C-45F6-BFC8-3AF0ADE30FFB}"/>
-          </ac:spMkLst>
-        </pc:spChg>
-        <pc:spChg chg="add del">
-          <ac:chgData name="Bryan Khuu" userId="db4bb5bc1a416b49" providerId="Windows Live" clId="Web-{5E92D238-FBDD-49B1-A334-FD695E37C85F}" dt="2020-05-09T21:20:29.085" v="160"/>
-          <ac:spMkLst>
-            <pc:docMk/>
-            <pc:sldMk cId="3964110441" sldId="258"/>
-            <ac:spMk id="125" creationId="{1660E788-AFA9-4A1B-9991-6AA74632A15B}"/>
-          </ac:spMkLst>
-        </pc:spChg>
-        <pc:spChg chg="add del">
-          <ac:chgData name="Bryan Khuu" userId="db4bb5bc1a416b49" providerId="Windows Live" clId="Web-{5E92D238-FBDD-49B1-A334-FD695E37C85F}" dt="2020-05-09T21:20:29.085" v="160"/>
-          <ac:spMkLst>
-            <pc:docMk/>
-            <pc:sldMk cId="3964110441" sldId="258"/>
-            <ac:spMk id="126" creationId="{867D4867-5BA7-4462-B2F6-A23F4A622AA7}"/>
-          </ac:spMkLst>
-        </pc:spChg>
-        <pc:spChg chg="add del">
-          <ac:chgData name="Bryan Khuu" userId="db4bb5bc1a416b49" providerId="Windows Live" clId="Web-{5E92D238-FBDD-49B1-A334-FD695E37C85F}" dt="2020-05-09T21:20:22.647" v="156"/>
-          <ac:spMkLst>
-            <pc:docMk/>
-            <pc:sldMk cId="3964110441" sldId="258"/>
-            <ac:spMk id="127" creationId="{98D49316-27CF-4C3D-BE8C-042F06B89148}"/>
-          </ac:spMkLst>
-        </pc:spChg>
-        <pc:spChg chg="add del">
-          <ac:chgData name="Bryan Khuu" userId="db4bb5bc1a416b49" providerId="Windows Live" clId="Web-{5E92D238-FBDD-49B1-A334-FD695E37C85F}" dt="2020-05-09T21:20:35.381" v="162"/>
-          <ac:spMkLst>
-            <pc:docMk/>
-            <pc:sldMk cId="3964110441" sldId="258"/>
-            <ac:spMk id="128" creationId="{7D587F9F-3F48-4929-8532-62B82B3F66BE}"/>
-          </ac:spMkLst>
-        </pc:spChg>
-        <pc:spChg chg="add del">
-          <ac:chgData name="Bryan Khuu" userId="db4bb5bc1a416b49" providerId="Windows Live" clId="Web-{5E92D238-FBDD-49B1-A334-FD695E37C85F}" dt="2020-05-09T21:20:23.600" v="158"/>
-          <ac:spMkLst>
-            <pc:docMk/>
-            <pc:sldMk cId="3964110441" sldId="258"/>
-            <ac:spMk id="129" creationId="{FACBD493-E381-4822-8F8F-A4194DFDB109}"/>
-          </ac:spMkLst>
-        </pc:spChg>
-        <pc:spChg chg="add del">
-          <ac:chgData name="Bryan Khuu" userId="db4bb5bc1a416b49" providerId="Windows Live" clId="Web-{5E92D238-FBDD-49B1-A334-FD695E37C85F}" dt="2020-05-09T21:20:35.381" v="162"/>
-          <ac:spMkLst>
-            <pc:docMk/>
-            <pc:sldMk cId="3964110441" sldId="258"/>
-            <ac:spMk id="130" creationId="{6DCB66B2-3729-41B6-8A12-AB8550189D5E}"/>
-          </ac:spMkLst>
-        </pc:spChg>
-        <pc:spChg chg="add del">
-          <ac:chgData name="Bryan Khuu" userId="db4bb5bc1a416b49" providerId="Windows Live" clId="Web-{5E92D238-FBDD-49B1-A334-FD695E37C85F}" dt="2020-05-09T21:20:23.600" v="158"/>
-          <ac:spMkLst>
-            <pc:docMk/>
-            <pc:sldMk cId="3964110441" sldId="258"/>
-            <ac:spMk id="131" creationId="{2310D9BE-4AD2-4CC3-84FA-4E05790B5B9F}"/>
-          </ac:spMkLst>
-        </pc:spChg>
-        <pc:spChg chg="add del">
-          <ac:chgData name="Bryan Khuu" userId="db4bb5bc1a416b49" providerId="Windows Live" clId="Web-{5E92D238-FBDD-49B1-A334-FD695E37C85F}" dt="2020-05-09T21:20:35.381" v="162"/>
-          <ac:spMkLst>
-            <pc:docMk/>
-            <pc:sldMk cId="3964110441" sldId="258"/>
-            <ac:spMk id="132" creationId="{ABA662FB-3DC6-4E93-98AC-B84BA41F4859}"/>
-          </ac:spMkLst>
-        </pc:spChg>
-        <pc:spChg chg="add del">
-          <ac:chgData name="Bryan Khuu" userId="db4bb5bc1a416b49" providerId="Windows Live" clId="Web-{5E92D238-FBDD-49B1-A334-FD695E37C85F}" dt="2020-05-09T21:20:23.600" v="158"/>
-          <ac:spMkLst>
-            <pc:docMk/>
-            <pc:sldMk cId="3964110441" sldId="258"/>
-            <ac:spMk id="133" creationId="{5D7CC766-DF6B-4E3F-8101-8D5F35D4AFFB}"/>
-          </ac:spMkLst>
-        </pc:spChg>
-        <pc:spChg chg="add del">
-          <ac:chgData name="Bryan Khuu" userId="db4bb5bc1a416b49" providerId="Windows Live" clId="Web-{5E92D238-FBDD-49B1-A334-FD695E37C85F}" dt="2020-05-09T21:20:35.381" v="162"/>
-          <ac:spMkLst>
-            <pc:docMk/>
-            <pc:sldMk cId="3964110441" sldId="258"/>
-            <ac:spMk id="134" creationId="{FB9BE604-0CC0-41C8-9673-995F82DA0257}"/>
-          </ac:spMkLst>
-        </pc:spChg>
-        <pc:spChg chg="add del">
-          <ac:chgData name="Bryan Khuu" userId="db4bb5bc1a416b49" providerId="Windows Live" clId="Web-{5E92D238-FBDD-49B1-A334-FD695E37C85F}" dt="2020-05-09T21:20:35.381" v="162"/>
-          <ac:spMkLst>
-            <pc:docMk/>
-            <pc:sldMk cId="3964110441" sldId="258"/>
-            <ac:spMk id="135" creationId="{2036372A-822B-498E-AD05-6BE85743A094}"/>
-          </ac:spMkLst>
-        </pc:spChg>
-        <pc:spChg chg="add del">
-          <ac:chgData name="Bryan Khuu" userId="db4bb5bc1a416b49" providerId="Windows Live" clId="Web-{5E92D238-FBDD-49B1-A334-FD695E37C85F}" dt="2020-05-09T21:20:38.930" v="164"/>
-          <ac:spMkLst>
-            <pc:docMk/>
-            <pc:sldMk cId="3964110441" sldId="258"/>
-            <ac:spMk id="136" creationId="{1660E788-AFA9-4A1B-9991-6AA74632A15B}"/>
-          </ac:spMkLst>
-        </pc:spChg>
-        <pc:spChg chg="add del">
-          <ac:chgData name="Bryan Khuu" userId="db4bb5bc1a416b49" providerId="Windows Live" clId="Web-{5E92D238-FBDD-49B1-A334-FD695E37C85F}" dt="2020-05-09T21:20:38.930" v="164"/>
-          <ac:spMkLst>
-            <pc:docMk/>
-            <pc:sldMk cId="3964110441" sldId="258"/>
-            <ac:spMk id="137" creationId="{867D4867-5BA7-4462-B2F6-A23F4A622AA7}"/>
-          </ac:spMkLst>
-        </pc:spChg>
-        <pc:spChg chg="add del">
-          <ac:chgData name="Bryan Khuu" userId="db4bb5bc1a416b49" providerId="Windows Live" clId="Web-{5E92D238-FBDD-49B1-A334-FD695E37C85F}" dt="2020-05-09T21:21:04.881" v="170"/>
-          <ac:spMkLst>
-            <pc:docMk/>
-            <pc:sldMk cId="3964110441" sldId="258"/>
-            <ac:spMk id="138" creationId="{98D49316-27CF-4C3D-BE8C-042F06B89148}"/>
-          </ac:spMkLst>
-        </pc:spChg>
-        <pc:spChg chg="add del">
-          <ac:chgData name="Bryan Khuu" userId="db4bb5bc1a416b49" providerId="Windows Live" clId="Web-{5E92D238-FBDD-49B1-A334-FD695E37C85F}" dt="2020-05-09T21:21:14.991" v="172"/>
-          <ac:spMkLst>
-            <pc:docMk/>
-            <pc:sldMk cId="3964110441" sldId="258"/>
-            <ac:spMk id="139" creationId="{7B9607E2-1C76-424B-8FF0-580615846EC0}"/>
-          </ac:spMkLst>
-        </pc:spChg>
-        <pc:spChg chg="add del">
-          <ac:chgData name="Bryan Khuu" userId="db4bb5bc1a416b49" providerId="Windows Live" clId="Web-{5E92D238-FBDD-49B1-A334-FD695E37C85F}" dt="2020-05-09T21:21:14.991" v="172"/>
-          <ac:spMkLst>
-            <pc:docMk/>
-            <pc:sldMk cId="3964110441" sldId="258"/>
-            <ac:spMk id="140" creationId="{56A668AF-CC37-4641-8D2B-4C91B3ACBC81}"/>
-          </ac:spMkLst>
-        </pc:spChg>
-        <pc:spChg chg="add del">
-          <ac:chgData name="Bryan Khuu" userId="db4bb5bc1a416b49" providerId="Windows Live" clId="Web-{5E92D238-FBDD-49B1-A334-FD695E37C85F}" dt="2020-05-09T21:21:14.991" v="172"/>
-          <ac:spMkLst>
-            <pc:docMk/>
-            <pc:sldMk cId="3964110441" sldId="258"/>
-            <ac:spMk id="141" creationId="{5B3165DC-54F4-4EF5-8B97-5BE55AA3DBE9}"/>
-          </ac:spMkLst>
-        </pc:spChg>
-        <pc:spChg chg="add del">
-          <ac:chgData name="Bryan Khuu" userId="db4bb5bc1a416b49" providerId="Windows Live" clId="Web-{5E92D238-FBDD-49B1-A334-FD695E37C85F}" dt="2020-05-09T21:21:18.569" v="174"/>
-          <ac:spMkLst>
-            <pc:docMk/>
-            <pc:sldMk cId="3964110441" sldId="258"/>
-            <ac:spMk id="142" creationId="{1660E788-AFA9-4A1B-9991-6AA74632A15B}"/>
-          </ac:spMkLst>
-        </pc:spChg>
-        <pc:spChg chg="add del">
-          <ac:chgData name="Bryan Khuu" userId="db4bb5bc1a416b49" providerId="Windows Live" clId="Web-{5E92D238-FBDD-49B1-A334-FD695E37C85F}" dt="2020-05-09T21:21:18.569" v="174"/>
-          <ac:spMkLst>
-            <pc:docMk/>
-            <pc:sldMk cId="3964110441" sldId="258"/>
-            <ac:spMk id="143" creationId="{867D4867-5BA7-4462-B2F6-A23F4A622AA7}"/>
-          </ac:spMkLst>
-        </pc:spChg>
-        <pc:spChg chg="add del">
-          <ac:chgData name="Bryan Khuu" userId="db4bb5bc1a416b49" providerId="Windows Live" clId="Web-{5E92D238-FBDD-49B1-A334-FD695E37C85F}" dt="2020-05-09T21:23:06.803" v="192"/>
-          <ac:spMkLst>
-            <pc:docMk/>
-            <pc:sldMk cId="3964110441" sldId="258"/>
-            <ac:spMk id="144" creationId="{98D49316-27CF-4C3D-BE8C-042F06B89148}"/>
-          </ac:spMkLst>
-        </pc:spChg>
-        <pc:spChg chg="add del">
-          <ac:chgData name="Bryan Khuu" userId="db4bb5bc1a416b49" providerId="Windows Live" clId="Web-{5E92D238-FBDD-49B1-A334-FD695E37C85F}" dt="2020-05-09T21:22:56.585" v="189"/>
-          <ac:spMkLst>
-            <pc:docMk/>
-            <pc:sldMk cId="3964110441" sldId="258"/>
-            <ac:spMk id="146" creationId="{98D49316-27CF-4C3D-BE8C-042F06B89148}"/>
-          </ac:spMkLst>
-        </pc:spChg>
-        <pc:spChg chg="add del">
-          <ac:chgData name="Bryan Khuu" userId="db4bb5bc1a416b49" providerId="Windows Live" clId="Web-{5E92D238-FBDD-49B1-A334-FD695E37C85F}" dt="2020-05-09T21:23:39.960" v="204"/>
-          <ac:spMkLst>
-            <pc:docMk/>
-            <pc:sldMk cId="3964110441" sldId="258"/>
-            <ac:spMk id="148" creationId="{1660E788-AFA9-4A1B-9991-6AA74632A15B}"/>
-          </ac:spMkLst>
-        </pc:spChg>
-        <pc:spChg chg="add del">
-          <ac:chgData name="Bryan Khuu" userId="db4bb5bc1a416b49" providerId="Windows Live" clId="Web-{5E92D238-FBDD-49B1-A334-FD695E37C85F}" dt="2020-05-09T21:22:47.241" v="183"/>
-          <ac:spMkLst>
-            <pc:docMk/>
-            <pc:sldMk cId="3964110441" sldId="258"/>
-            <ac:spMk id="149" creationId="{98D49316-27CF-4C3D-BE8C-042F06B89148}"/>
-          </ac:spMkLst>
-        </pc:spChg>
-        <pc:spChg chg="add del">
-          <ac:chgData name="Bryan Khuu" userId="db4bb5bc1a416b49" providerId="Windows Live" clId="Web-{5E92D238-FBDD-49B1-A334-FD695E37C85F}" dt="2020-05-09T21:23:39.960" v="204"/>
-          <ac:spMkLst>
-            <pc:docMk/>
-            <pc:sldMk cId="3964110441" sldId="258"/>
-            <ac:spMk id="150" creationId="{867D4867-5BA7-4462-B2F6-A23F4A622AA7}"/>
-          </ac:spMkLst>
-        </pc:spChg>
-        <pc:spChg chg="add del">
-          <ac:chgData name="Bryan Khuu" userId="db4bb5bc1a416b49" providerId="Windows Live" clId="Web-{5E92D238-FBDD-49B1-A334-FD695E37C85F}" dt="2020-05-09T21:23:45.413" v="206"/>
-          <ac:spMkLst>
-            <pc:docMk/>
-            <pc:sldMk cId="3964110441" sldId="258"/>
-            <ac:spMk id="151" creationId="{1660E788-AFA9-4A1B-9991-6AA74632A15B}"/>
-          </ac:spMkLst>
-        </pc:spChg>
-        <pc:spChg chg="add del">
-          <ac:chgData name="Bryan Khuu" userId="db4bb5bc1a416b49" providerId="Windows Live" clId="Web-{5E92D238-FBDD-49B1-A334-FD695E37C85F}" dt="2020-05-09T21:23:45.413" v="206"/>
-          <ac:spMkLst>
-            <pc:docMk/>
-            <pc:sldMk cId="3964110441" sldId="258"/>
-            <ac:spMk id="152" creationId="{867D4867-5BA7-4462-B2F6-A23F4A622AA7}"/>
-          </ac:spMkLst>
-        </pc:spChg>
-        <pc:picChg chg="del mod ord">
-          <ac:chgData name="Bryan Khuu" userId="db4bb5bc1a416b49" providerId="Windows Live" clId="Web-{5E92D238-FBDD-49B1-A334-FD695E37C85F}" dt="2020-05-09T21:17:55.960" v="119"/>
+          <ac:chgData name="Bryan Khuu" userId="db4bb5bc1a416b49" providerId="Windows Live" clId="Web-{956F202B-8045-4161-BB6C-AE63D5442B16}" dt="2020-05-10T21:39:42.004" v="373" actId="20577"/>
+          <ac:spMkLst>
+            <pc:docMk/>
+            <pc:sldMk cId="2909226165" sldId="265"/>
+            <ac:spMk id="2" creationId="{16C4DA88-18B7-4FF5-BA75-8EE2831DCCD0}"/>
+          </ac:spMkLst>
+        </pc:spChg>
+        <pc:spChg chg="del">
+          <ac:chgData name="Bryan Khuu" userId="db4bb5bc1a416b49" providerId="Windows Live" clId="Web-{956F202B-8045-4161-BB6C-AE63D5442B16}" dt="2020-05-10T21:36:06.746" v="328"/>
+          <ac:spMkLst>
+            <pc:docMk/>
+            <pc:sldMk cId="2909226165" sldId="265"/>
+            <ac:spMk id="3" creationId="{F41EC3C3-214F-4B0F-96BF-BD5F60C9B31C}"/>
+          </ac:spMkLst>
+        </pc:spChg>
+        <pc:spChg chg="add del mod">
+          <ac:chgData name="Bryan Khuu" userId="db4bb5bc1a416b49" providerId="Windows Live" clId="Web-{956F202B-8045-4161-BB6C-AE63D5442B16}" dt="2020-05-10T21:36:44.763" v="331"/>
+          <ac:spMkLst>
+            <pc:docMk/>
+            <pc:sldMk cId="2909226165" sldId="265"/>
+            <ac:spMk id="7" creationId="{D1A68A87-1928-4778-A8E1-0498E2BC87D9}"/>
+          </ac:spMkLst>
+        </pc:spChg>
+        <pc:spChg chg="add del mod">
+          <ac:chgData name="Bryan Khuu" userId="db4bb5bc1a416b49" providerId="Windows Live" clId="Web-{956F202B-8045-4161-BB6C-AE63D5442B16}" dt="2020-05-10T21:37:32.108" v="344"/>
+          <ac:spMkLst>
+            <pc:docMk/>
+            <pc:sldMk cId="2909226165" sldId="265"/>
+            <ac:spMk id="11" creationId="{C4BF720C-A1C9-47D4-9DA1-82B5F68179DE}"/>
+          </ac:spMkLst>
+        </pc:spChg>
+        <pc:spChg chg="add mod">
+          <ac:chgData name="Bryan Khuu" userId="db4bb5bc1a416b49" providerId="Windows Live" clId="Web-{956F202B-8045-4161-BB6C-AE63D5442B16}" dt="2020-05-10T21:37:30.436" v="343"/>
+          <ac:spMkLst>
+            <pc:docMk/>
+            <pc:sldMk cId="2909226165" sldId="265"/>
+            <ac:spMk id="12" creationId="{48ED2522-702A-4CE6-B734-AF775958B003}"/>
+          </ac:spMkLst>
+        </pc:spChg>
+        <pc:spChg chg="add del mod">
+          <ac:chgData name="Bryan Khuu" userId="db4bb5bc1a416b49" providerId="Windows Live" clId="Web-{956F202B-8045-4161-BB6C-AE63D5442B16}" dt="2020-05-10T21:43:17.433" v="381"/>
+          <ac:spMkLst>
+            <pc:docMk/>
+            <pc:sldMk cId="2909226165" sldId="265"/>
+            <ac:spMk id="17" creationId="{ADD1F031-6B52-46ED-B014-8A52A03E5BB2}"/>
+          </ac:spMkLst>
+        </pc:spChg>
+        <pc:picChg chg="add del mod ord">
+          <ac:chgData name="Bryan Khuu" userId="db4bb5bc1a416b49" providerId="Windows Live" clId="Web-{956F202B-8045-4161-BB6C-AE63D5442B16}" dt="2020-05-10T21:36:43.513" v="330"/>
           <ac:picMkLst>
             <pc:docMk/>
-            <pc:sldMk cId="3964110441" sldId="258"/>
-            <ac:picMk id="5" creationId="{A4958B17-BD18-4486-A553-006D964DC15F}"/>
-          </ac:picMkLst>
-        </pc:picChg>
-        <pc:picChg chg="del mod ord">
-          <ac:chgData name="Bryan Khuu" userId="db4bb5bc1a416b49" providerId="Windows Live" clId="Web-{5E92D238-FBDD-49B1-A334-FD695E37C85F}" dt="2020-05-09T21:17:54.131" v="118"/>
-          <ac:picMkLst>
-            <pc:docMk/>
-            <pc:sldMk cId="3964110441" sldId="258"/>
-            <ac:picMk id="8" creationId="{08A9CD7F-3765-4AAE-999A-38156C29B389}"/>
-          </ac:picMkLst>
-        </pc:picChg>
-        <pc:picChg chg="del mod ord">
-          <ac:chgData name="Bryan Khuu" userId="db4bb5bc1a416b49" providerId="Windows Live" clId="Web-{5E92D238-FBDD-49B1-A334-FD695E37C85F}" dt="2020-05-09T21:18:26.694" v="134"/>
-          <ac:picMkLst>
-            <pc:docMk/>
-            <pc:sldMk cId="3964110441" sldId="258"/>
-            <ac:picMk id="9" creationId="{F2F87F3E-3CE9-4392-A054-9B488E1066F8}"/>
-          </ac:picMkLst>
-        </pc:picChg>
-        <pc:picChg chg="add del mod">
-          <ac:chgData name="Bryan Khuu" userId="db4bb5bc1a416b49" providerId="Windows Live" clId="Web-{5E92D238-FBDD-49B1-A334-FD695E37C85F}" dt="2020-05-09T21:18:27.850" v="135"/>
-          <ac:picMkLst>
-            <pc:docMk/>
-            <pc:sldMk cId="3964110441" sldId="258"/>
-            <ac:picMk id="99" creationId="{95A42C80-418C-40FA-A646-5A29D097819E}"/>
-          </ac:picMkLst>
-        </pc:picChg>
-        <pc:picChg chg="add del mod">
-          <ac:chgData name="Bryan Khuu" userId="db4bb5bc1a416b49" providerId="Windows Live" clId="Web-{5E92D238-FBDD-49B1-A334-FD695E37C85F}" dt="2020-05-09T21:18:26.694" v="133"/>
-          <ac:picMkLst>
-            <pc:docMk/>
-            <pc:sldMk cId="3964110441" sldId="258"/>
-            <ac:picMk id="103" creationId="{B120DFB6-572B-4517-8F76-40D6E3220125}"/>
-          </ac:picMkLst>
-        </pc:picChg>
-        <pc:picChg chg="add del mod">
-          <ac:chgData name="Bryan Khuu" userId="db4bb5bc1a416b49" providerId="Windows Live" clId="Web-{5E92D238-FBDD-49B1-A334-FD695E37C85F}" dt="2020-05-09T21:18:26.694" v="132"/>
-          <ac:picMkLst>
-            <pc:docMk/>
-            <pc:sldMk cId="3964110441" sldId="258"/>
-            <ac:picMk id="107" creationId="{BC49460F-BD53-4D14-8183-4899D4E3687C}"/>
-          </ac:picMkLst>
-        </pc:picChg>
-        <pc:picChg chg="add del mod ord">
-          <ac:chgData name="Bryan Khuu" userId="db4bb5bc1a416b49" providerId="Windows Live" clId="Web-{5E92D238-FBDD-49B1-A334-FD695E37C85F}" dt="2020-05-09T22:01:58.833" v="550"/>
-          <ac:picMkLst>
-            <pc:docMk/>
-            <pc:sldMk cId="3964110441" sldId="258"/>
-            <ac:picMk id="118" creationId="{95A42C80-418C-40FA-A646-5A29D097819E}"/>
+            <pc:sldMk cId="2909226165" sldId="265"/>
+            <ac:picMk id="4" creationId="{DEF14962-F2D3-4690-AC65-4E06EFFF1040}"/>
           </ac:picMkLst>
         </pc:picChg>
         <pc:picChg chg="add del mod ord modCrop">
-          <ac:chgData name="Bryan Khuu" userId="db4bb5bc1a416b49" providerId="Windows Live" clId="Web-{5E92D238-FBDD-49B1-A334-FD695E37C85F}" dt="2020-05-09T22:02:00.474" v="551" actId="1076"/>
+          <ac:chgData name="Bryan Khuu" userId="db4bb5bc1a416b49" providerId="Windows Live" clId="Web-{956F202B-8045-4161-BB6C-AE63D5442B16}" dt="2020-05-10T21:37:29.311" v="341"/>
           <ac:picMkLst>
             <pc:docMk/>
-            <pc:sldMk cId="3964110441" sldId="258"/>
-            <ac:picMk id="120" creationId="{B120DFB6-572B-4517-8F76-40D6E3220125}"/>
+            <pc:sldMk cId="2909226165" sldId="265"/>
+            <ac:picMk id="8" creationId="{A106B01E-FB26-4690-BA75-0FCBD96CF84D}"/>
           </ac:picMkLst>
         </pc:picChg>
-        <pc:picChg chg="add del mod ord modCrop">
-          <ac:chgData name="Bryan Khuu" userId="db4bb5bc1a416b49" providerId="Windows Live" clId="Web-{5E92D238-FBDD-49B1-A334-FD695E37C85F}" dt="2020-05-09T22:02:01.864" v="552" actId="1076"/>
+        <pc:picChg chg="add mod ord">
+          <ac:chgData name="Bryan Khuu" userId="db4bb5bc1a416b49" providerId="Windows Live" clId="Web-{956F202B-8045-4161-BB6C-AE63D5442B16}" dt="2020-05-10T21:43:26.559" v="383" actId="1076"/>
           <ac:picMkLst>
             <pc:docMk/>
-            <pc:sldMk cId="3964110441" sldId="258"/>
-            <ac:picMk id="122" creationId="{BC49460F-BD53-4D14-8183-4899D4E3687C}"/>
-          </ac:picMkLst>
-        </pc:picChg>
-        <pc:picChg chg="add del mod">
-          <ac:chgData name="Bryan Khuu" userId="db4bb5bc1a416b49" providerId="Windows Live" clId="Web-{5E92D238-FBDD-49B1-A334-FD695E37C85F}" dt="2020-05-09T21:23:24.553" v="202"/>
-          <ac:picMkLst>
-            <pc:docMk/>
-            <pc:sldMk cId="3964110441" sldId="258"/>
-            <ac:picMk id="145" creationId="{71A3090E-2821-4DB7-A1FB-7B518579FF8A}"/>
-          </ac:picMkLst>
-        </pc:picChg>
-        <pc:picChg chg="add del mod">
-          <ac:chgData name="Bryan Khuu" userId="db4bb5bc1a416b49" providerId="Windows Live" clId="Web-{5E92D238-FBDD-49B1-A334-FD695E37C85F}" dt="2020-05-09T21:23:24.553" v="201"/>
-          <ac:picMkLst>
-            <pc:docMk/>
-            <pc:sldMk cId="3964110441" sldId="258"/>
-            <ac:picMk id="147" creationId="{5CD731E1-4CF8-4839-A05E-00E2AC11644B}"/>
-          </ac:picMkLst>
-        </pc:picChg>
-        <pc:picChg chg="add del">
-          <ac:chgData name="Bryan Khuu" userId="db4bb5bc1a416b49" providerId="Windows Live" clId="Web-{5E92D238-FBDD-49B1-A334-FD695E37C85F}" dt="2020-05-09T21:23:50.913" v="208"/>
-          <ac:picMkLst>
-            <pc:docMk/>
-            <pc:sldMk cId="3964110441" sldId="258"/>
-            <ac:picMk id="153" creationId="{48E20A91-1782-4B1D-B655-65530A6C3286}"/>
-          </ac:picMkLst>
-        </pc:picChg>
-      </pc:sldChg>
-      <pc:sldChg chg="addSp delSp modSp new mod setBg">
-        <pc:chgData name="Bryan Khuu" userId="db4bb5bc1a416b49" providerId="Windows Live" clId="Web-{5E92D238-FBDD-49B1-A334-FD695E37C85F}" dt="2020-05-09T22:12:28.294" v="683" actId="20577"/>
-        <pc:sldMkLst>
-          <pc:docMk/>
-          <pc:sldMk cId="865442861" sldId="259"/>
-        </pc:sldMkLst>
-        <pc:spChg chg="mod">
-          <ac:chgData name="Bryan Khuu" userId="db4bb5bc1a416b49" providerId="Windows Live" clId="Web-{5E92D238-FBDD-49B1-A334-FD695E37C85F}" dt="2020-05-09T22:10:58.243" v="670"/>
-          <ac:spMkLst>
-            <pc:docMk/>
-            <pc:sldMk cId="865442861" sldId="259"/>
-            <ac:spMk id="2" creationId="{69611A84-1B73-45B8-9EE1-200D3F0E0A31}"/>
-          </ac:spMkLst>
-        </pc:spChg>
-        <pc:spChg chg="add del mod">
-          <ac:chgData name="Bryan Khuu" userId="db4bb5bc1a416b49" providerId="Windows Live" clId="Web-{5E92D238-FBDD-49B1-A334-FD695E37C85F}" dt="2020-05-09T22:12:28.294" v="683" actId="20577"/>
-          <ac:spMkLst>
-            <pc:docMk/>
-            <pc:sldMk cId="865442861" sldId="259"/>
-            <ac:spMk id="3" creationId="{5E690586-63ED-43F1-8E09-6E19CB05937F}"/>
-          </ac:spMkLst>
-        </pc:spChg>
-        <pc:spChg chg="add">
-          <ac:chgData name="Bryan Khuu" userId="db4bb5bc1a416b49" providerId="Windows Live" clId="Web-{5E92D238-FBDD-49B1-A334-FD695E37C85F}" dt="2020-05-09T22:10:58.243" v="670"/>
-          <ac:spMkLst>
-            <pc:docMk/>
-            <pc:sldMk cId="865442861" sldId="259"/>
-            <ac:spMk id="8" creationId="{BAC87F6E-526A-49B5-995D-42DB656594C9}"/>
-          </ac:spMkLst>
-        </pc:spChg>
-        <pc:spChg chg="add">
-          <ac:chgData name="Bryan Khuu" userId="db4bb5bc1a416b49" providerId="Windows Live" clId="Web-{5E92D238-FBDD-49B1-A334-FD695E37C85F}" dt="2020-05-09T22:10:58.243" v="670"/>
-          <ac:spMkLst>
-            <pc:docMk/>
-            <pc:sldMk cId="865442861" sldId="259"/>
-            <ac:spMk id="10" creationId="{5E5436DB-4E8B-43A5-AE55-1C527B62E203}"/>
-          </ac:spMkLst>
-        </pc:spChg>
-        <pc:spChg chg="add">
-          <ac:chgData name="Bryan Khuu" userId="db4bb5bc1a416b49" providerId="Windows Live" clId="Web-{5E92D238-FBDD-49B1-A334-FD695E37C85F}" dt="2020-05-09T22:10:58.243" v="670"/>
-          <ac:spMkLst>
-            <pc:docMk/>
-            <pc:sldMk cId="865442861" sldId="259"/>
-            <ac:spMk id="12" creationId="{0D65299F-028F-4AFC-B46A-8DB33E20FE4A}"/>
-          </ac:spMkLst>
-        </pc:spChg>
-      </pc:sldChg>
-      <pc:sldChg chg="addSp delSp modSp new">
-        <pc:chgData name="Bryan Khuu" userId="db4bb5bc1a416b49" providerId="Windows Live" clId="Web-{5E92D238-FBDD-49B1-A334-FD695E37C85F}" dt="2020-05-09T22:09:25.630" v="633" actId="20577"/>
-        <pc:sldMkLst>
-          <pc:docMk/>
-          <pc:sldMk cId="3876366827" sldId="260"/>
-        </pc:sldMkLst>
-        <pc:spChg chg="mod">
-          <ac:chgData name="Bryan Khuu" userId="db4bb5bc1a416b49" providerId="Windows Live" clId="Web-{5E92D238-FBDD-49B1-A334-FD695E37C85F}" dt="2020-05-09T22:09:25.630" v="633" actId="20577"/>
-          <ac:spMkLst>
-            <pc:docMk/>
-            <pc:sldMk cId="3876366827" sldId="260"/>
-            <ac:spMk id="2" creationId="{7AA60957-65FD-4982-8D07-2A080F0DFBC4}"/>
-          </ac:spMkLst>
-        </pc:spChg>
-        <pc:spChg chg="del">
-          <ac:chgData name="Bryan Khuu" userId="db4bb5bc1a416b49" providerId="Windows Live" clId="Web-{5E92D238-FBDD-49B1-A334-FD695E37C85F}" dt="2020-05-09T22:04:06.150" v="573"/>
-          <ac:spMkLst>
-            <pc:docMk/>
-            <pc:sldMk cId="3876366827" sldId="260"/>
-            <ac:spMk id="3" creationId="{7866AB8E-4D2A-43E8-92AD-DDF5489DDB0B}"/>
-          </ac:spMkLst>
-        </pc:spChg>
-        <pc:picChg chg="add mod ord">
-          <ac:chgData name="Bryan Khuu" userId="db4bb5bc1a416b49" providerId="Windows Live" clId="Web-{5E92D238-FBDD-49B1-A334-FD695E37C85F}" dt="2020-05-09T22:05:08.183" v="587" actId="1076"/>
-          <ac:picMkLst>
-            <pc:docMk/>
-            <pc:sldMk cId="3876366827" sldId="260"/>
-            <ac:picMk id="4" creationId="{1C779644-2880-48A0-B7ED-BC65315AC221}"/>
+            <pc:sldMk cId="2909226165" sldId="265"/>
+            <ac:picMk id="13" creationId="{C5353CF5-556B-4850-8712-232318E33CA0}"/>
           </ac:picMkLst>
         </pc:picChg>
         <pc:picChg chg="add mod">
-          <ac:chgData name="Bryan Khuu" userId="db4bb5bc1a416b49" providerId="Windows Live" clId="Web-{5E92D238-FBDD-49B1-A334-FD695E37C85F}" dt="2020-05-09T22:05:14.575" v="588" actId="1076"/>
+          <ac:chgData name="Bryan Khuu" userId="db4bb5bc1a416b49" providerId="Windows Live" clId="Web-{956F202B-8045-4161-BB6C-AE63D5442B16}" dt="2020-05-10T21:43:27.543" v="384" actId="1076"/>
           <ac:picMkLst>
             <pc:docMk/>
-            <pc:sldMk cId="3876366827" sldId="260"/>
-            <ac:picMk id="6" creationId="{18FCD283-6F3B-46B1-ABD3-4B677E8895AF}"/>
-          </ac:picMkLst>
-        </pc:picChg>
-      </pc:sldChg>
-      <pc:sldChg chg="addSp delSp modSp new mod setBg">
-        <pc:chgData name="Bryan Khuu" userId="db4bb5bc1a416b49" providerId="Windows Live" clId="Web-{5E92D238-FBDD-49B1-A334-FD695E37C85F}" dt="2020-05-09T22:22:54.739" v="735"/>
-        <pc:sldMkLst>
-          <pc:docMk/>
-          <pc:sldMk cId="2127869669" sldId="261"/>
-        </pc:sldMkLst>
-        <pc:spChg chg="mod">
-          <ac:chgData name="Bryan Khuu" userId="db4bb5bc1a416b49" providerId="Windows Live" clId="Web-{5E92D238-FBDD-49B1-A334-FD695E37C85F}" dt="2020-05-09T22:19:27.700" v="722" actId="1076"/>
-          <ac:spMkLst>
-            <pc:docMk/>
-            <pc:sldMk cId="2127869669" sldId="261"/>
-            <ac:spMk id="2" creationId="{D168774E-B68F-4891-8DD8-A6AF537C5F93}"/>
-          </ac:spMkLst>
-        </pc:spChg>
-        <pc:spChg chg="del">
-          <ac:chgData name="Bryan Khuu" userId="db4bb5bc1a416b49" providerId="Windows Live" clId="Web-{5E92D238-FBDD-49B1-A334-FD695E37C85F}" dt="2020-05-09T22:15:30.941" v="694"/>
-          <ac:spMkLst>
-            <pc:docMk/>
-            <pc:sldMk cId="2127869669" sldId="261"/>
-            <ac:spMk id="3" creationId="{0FEA8D3C-5991-400C-8FB6-CF61EDF9DE83}"/>
-          </ac:spMkLst>
-        </pc:spChg>
-        <pc:spChg chg="add del mod">
-          <ac:chgData name="Bryan Khuu" userId="db4bb5bc1a416b49" providerId="Windows Live" clId="Web-{5E92D238-FBDD-49B1-A334-FD695E37C85F}" dt="2020-05-09T22:18:43.698" v="713"/>
-          <ac:spMkLst>
-            <pc:docMk/>
-            <pc:sldMk cId="2127869669" sldId="261"/>
-            <ac:spMk id="9" creationId="{3C25BF41-D46C-417D-BCBC-0AD3592F7296}"/>
-          </ac:spMkLst>
-        </pc:spChg>
-        <pc:picChg chg="add del mod ord">
-          <ac:chgData name="Bryan Khuu" userId="db4bb5bc1a416b49" providerId="Windows Live" clId="Web-{5E92D238-FBDD-49B1-A334-FD695E37C85F}" dt="2020-05-09T22:18:04.619" v="712"/>
-          <ac:picMkLst>
-            <pc:docMk/>
-            <pc:sldMk cId="2127869669" sldId="261"/>
-            <ac:picMk id="4" creationId="{98FECB70-1975-4501-80E5-1F9D6E7FB746}"/>
-          </ac:picMkLst>
-        </pc:picChg>
-        <pc:picChg chg="add mod">
-          <ac:chgData name="Bryan Khuu" userId="db4bb5bc1a416b49" providerId="Windows Live" clId="Web-{5E92D238-FBDD-49B1-A334-FD695E37C85F}" dt="2020-05-09T22:19:27.731" v="723" actId="1076"/>
-          <ac:picMkLst>
-            <pc:docMk/>
-            <pc:sldMk cId="2127869669" sldId="261"/>
-            <ac:picMk id="6" creationId="{B9457002-F5E2-401C-B7E6-0F02D7298594}"/>
-          </ac:picMkLst>
-        </pc:picChg>
-        <pc:picChg chg="add mod ord">
-          <ac:chgData name="Bryan Khuu" userId="db4bb5bc1a416b49" providerId="Windows Live" clId="Web-{5E92D238-FBDD-49B1-A334-FD695E37C85F}" dt="2020-05-09T22:21:57.408" v="734" actId="1076"/>
-          <ac:picMkLst>
-            <pc:docMk/>
-            <pc:sldMk cId="2127869669" sldId="261"/>
-            <ac:picMk id="10" creationId="{81337A89-EF35-4F29-BBA1-142B06FF1E82}"/>
+            <pc:sldMk cId="2909226165" sldId="265"/>
+            <ac:picMk id="15" creationId="{BCA5E616-F0F3-4494-8A81-F2A755EB2B91}"/>
           </ac:picMkLst>
         </pc:picChg>
       </pc:sldChg>
@@ -1740,6 +544,1290 @@
             <pc:docMk/>
             <pc:sldMk cId="3517998983" sldId="256"/>
             <ac:picMk id="9" creationId="{C0A6A8FE-72F7-481F-B783-C986D2C749EB}"/>
+          </ac:picMkLst>
+        </pc:picChg>
+      </pc:sldChg>
+    </pc:docChg>
+  </pc:docChgLst>
+  <pc:docChgLst>
+    <pc:chgData name="Bryan Khuu" userId="db4bb5bc1a416b49" providerId="Windows Live" clId="Web-{5E92D238-FBDD-49B1-A334-FD695E37C85F}"/>
+    <pc:docChg chg="addSld modSld">
+      <pc:chgData name="Bryan Khuu" userId="db4bb5bc1a416b49" providerId="Windows Live" clId="Web-{5E92D238-FBDD-49B1-A334-FD695E37C85F}" dt="2020-05-09T22:22:54.739" v="735"/>
+      <pc:docMkLst>
+        <pc:docMk/>
+      </pc:docMkLst>
+      <pc:sldChg chg="addSp delSp modSp mod setBg">
+        <pc:chgData name="Bryan Khuu" userId="db4bb5bc1a416b49" providerId="Windows Live" clId="Web-{5E92D238-FBDD-49B1-A334-FD695E37C85F}" dt="2020-05-09T22:13:33.937" v="692" actId="20577"/>
+        <pc:sldMkLst>
+          <pc:docMk/>
+          <pc:sldMk cId="466311876" sldId="257"/>
+        </pc:sldMkLst>
+        <pc:spChg chg="mod">
+          <ac:chgData name="Bryan Khuu" userId="db4bb5bc1a416b49" providerId="Windows Live" clId="Web-{5E92D238-FBDD-49B1-A334-FD695E37C85F}" dt="2020-05-09T22:10:37.665" v="669"/>
+          <ac:spMkLst>
+            <pc:docMk/>
+            <pc:sldMk cId="466311876" sldId="257"/>
+            <ac:spMk id="2" creationId="{A2841FE9-55B0-4DB0-85A4-E7ABC878C8AE}"/>
+          </ac:spMkLst>
+        </pc:spChg>
+        <pc:spChg chg="del mod">
+          <ac:chgData name="Bryan Khuu" userId="db4bb5bc1a416b49" providerId="Windows Live" clId="Web-{5E92D238-FBDD-49B1-A334-FD695E37C85F}" dt="2020-05-09T22:10:37.665" v="669"/>
+          <ac:spMkLst>
+            <pc:docMk/>
+            <pc:sldMk cId="466311876" sldId="257"/>
+            <ac:spMk id="3" creationId="{802F4C48-DE4A-4384-8D1B-6888BF9B917E}"/>
+          </ac:spMkLst>
+        </pc:spChg>
+        <pc:graphicFrameChg chg="add modGraphic">
+          <ac:chgData name="Bryan Khuu" userId="db4bb5bc1a416b49" providerId="Windows Live" clId="Web-{5E92D238-FBDD-49B1-A334-FD695E37C85F}" dt="2020-05-09T22:13:33.937" v="692" actId="20577"/>
+          <ac:graphicFrameMkLst>
+            <pc:docMk/>
+            <pc:sldMk cId="466311876" sldId="257"/>
+            <ac:graphicFrameMk id="5" creationId="{91169D42-FB2F-4AEC-861C-B7503AD50942}"/>
+          </ac:graphicFrameMkLst>
+        </pc:graphicFrameChg>
+      </pc:sldChg>
+      <pc:sldChg chg="addSp delSp modSp mod setBg">
+        <pc:chgData name="Bryan Khuu" userId="db4bb5bc1a416b49" providerId="Windows Live" clId="Web-{5E92D238-FBDD-49B1-A334-FD695E37C85F}" dt="2020-05-09T22:02:01.864" v="552" actId="1076"/>
+        <pc:sldMkLst>
+          <pc:docMk/>
+          <pc:sldMk cId="3964110441" sldId="258"/>
+        </pc:sldMkLst>
+        <pc:spChg chg="mod ord">
+          <ac:chgData name="Bryan Khuu" userId="db4bb5bc1a416b49" providerId="Windows Live" clId="Web-{5E92D238-FBDD-49B1-A334-FD695E37C85F}" dt="2020-05-09T21:29:38.600" v="383" actId="20577"/>
+          <ac:spMkLst>
+            <pc:docMk/>
+            <pc:sldMk cId="3964110441" sldId="258"/>
+            <ac:spMk id="2" creationId="{91ABE8C2-D87A-4AE1-ACC5-77F1BB1766D7}"/>
+          </ac:spMkLst>
+        </pc:spChg>
+        <pc:spChg chg="mod ord">
+          <ac:chgData name="Bryan Khuu" userId="db4bb5bc1a416b49" providerId="Windows Live" clId="Web-{5E92D238-FBDD-49B1-A334-FD695E37C85F}" dt="2020-05-09T22:01:26.175" v="547" actId="20577"/>
+          <ac:spMkLst>
+            <pc:docMk/>
+            <pc:sldMk cId="3964110441" sldId="258"/>
+            <ac:spMk id="13" creationId="{6144181C-0323-471E-B002-4C0BA47780C0}"/>
+          </ac:spMkLst>
+        </pc:spChg>
+        <pc:spChg chg="add del">
+          <ac:chgData name="Bryan Khuu" userId="db4bb5bc1a416b49" providerId="Windows Live" clId="Web-{5E92D238-FBDD-49B1-A334-FD695E37C85F}" dt="2020-05-09T21:13:47.475" v="55"/>
+          <ac:spMkLst>
+            <pc:docMk/>
+            <pc:sldMk cId="3964110441" sldId="258"/>
+            <ac:spMk id="15" creationId="{98D49316-27CF-4C3D-BE8C-042F06B89148}"/>
+          </ac:spMkLst>
+        </pc:spChg>
+        <pc:spChg chg="add del">
+          <ac:chgData name="Bryan Khuu" userId="db4bb5bc1a416b49" providerId="Windows Live" clId="Web-{5E92D238-FBDD-49B1-A334-FD695E37C85F}" dt="2020-05-09T21:10:41.694" v="11"/>
+          <ac:spMkLst>
+            <pc:docMk/>
+            <pc:sldMk cId="3964110441" sldId="258"/>
+            <ac:spMk id="16" creationId="{1660E788-AFA9-4A1B-9991-6AA74632A15B}"/>
+          </ac:spMkLst>
+        </pc:spChg>
+        <pc:spChg chg="add del">
+          <ac:chgData name="Bryan Khuu" userId="db4bb5bc1a416b49" providerId="Windows Live" clId="Web-{5E92D238-FBDD-49B1-A334-FD695E37C85F}" dt="2020-05-09T21:14:37.288" v="71"/>
+          <ac:spMkLst>
+            <pc:docMk/>
+            <pc:sldMk cId="3964110441" sldId="258"/>
+            <ac:spMk id="17" creationId="{BA4C5437-838C-45F6-BFC8-3AF0ADE30FFB}"/>
+          </ac:spMkLst>
+        </pc:spChg>
+        <pc:spChg chg="add del">
+          <ac:chgData name="Bryan Khuu" userId="db4bb5bc1a416b49" providerId="Windows Live" clId="Web-{5E92D238-FBDD-49B1-A334-FD695E37C85F}" dt="2020-05-09T21:10:41.694" v="11"/>
+          <ac:spMkLst>
+            <pc:docMk/>
+            <pc:sldMk cId="3964110441" sldId="258"/>
+            <ac:spMk id="18" creationId="{867D4867-5BA7-4462-B2F6-A23F4A622AA7}"/>
+          </ac:spMkLst>
+        </pc:spChg>
+        <pc:spChg chg="add del">
+          <ac:chgData name="Bryan Khuu" userId="db4bb5bc1a416b49" providerId="Windows Live" clId="Web-{5E92D238-FBDD-49B1-A334-FD695E37C85F}" dt="2020-05-09T21:14:37.288" v="71"/>
+          <ac:spMkLst>
+            <pc:docMk/>
+            <pc:sldMk cId="3964110441" sldId="258"/>
+            <ac:spMk id="19" creationId="{FACBD493-E381-4822-8F8F-A4194DFDB109}"/>
+          </ac:spMkLst>
+        </pc:spChg>
+        <pc:spChg chg="add del">
+          <ac:chgData name="Bryan Khuu" userId="db4bb5bc1a416b49" providerId="Windows Live" clId="Web-{5E92D238-FBDD-49B1-A334-FD695E37C85F}" dt="2020-05-09T21:10:40.694" v="8"/>
+          <ac:spMkLst>
+            <pc:docMk/>
+            <pc:sldMk cId="3964110441" sldId="258"/>
+            <ac:spMk id="20" creationId="{4088F942-5192-4329-9236-6B9F5E9E87C8}"/>
+          </ac:spMkLst>
+        </pc:spChg>
+        <pc:spChg chg="add del">
+          <ac:chgData name="Bryan Khuu" userId="db4bb5bc1a416b49" providerId="Windows Live" clId="Web-{5E92D238-FBDD-49B1-A334-FD695E37C85F}" dt="2020-05-09T21:11:42.850" v="19"/>
+          <ac:spMkLst>
+            <pc:docMk/>
+            <pc:sldMk cId="3964110441" sldId="258"/>
+            <ac:spMk id="21" creationId="{4088F942-5192-4329-9236-6B9F5E9E87C8}"/>
+          </ac:spMkLst>
+        </pc:spChg>
+        <pc:spChg chg="add del">
+          <ac:chgData name="Bryan Khuu" userId="db4bb5bc1a416b49" providerId="Windows Live" clId="Web-{5E92D238-FBDD-49B1-A334-FD695E37C85F}" dt="2020-05-09T21:11:42.850" v="19"/>
+          <ac:spMkLst>
+            <pc:docMk/>
+            <pc:sldMk cId="3964110441" sldId="258"/>
+            <ac:spMk id="22" creationId="{6DBBC3F0-E4D5-4DC9-9156-6592F510E7D0}"/>
+          </ac:spMkLst>
+        </pc:spChg>
+        <pc:spChg chg="add del">
+          <ac:chgData name="Bryan Khuu" userId="db4bb5bc1a416b49" providerId="Windows Live" clId="Web-{5E92D238-FBDD-49B1-A334-FD695E37C85F}" dt="2020-05-09T21:10:19.022" v="4"/>
+          <ac:spMkLst>
+            <pc:docMk/>
+            <pc:sldMk cId="3964110441" sldId="258"/>
+            <ac:spMk id="23" creationId="{C271F1AE-EB76-45DA-8C1D-BF917DFC4B77}"/>
+          </ac:spMkLst>
+        </pc:spChg>
+        <pc:spChg chg="add del">
+          <ac:chgData name="Bryan Khuu" userId="db4bb5bc1a416b49" providerId="Windows Live" clId="Web-{5E92D238-FBDD-49B1-A334-FD695E37C85F}" dt="2020-05-09T21:11:42.850" v="19"/>
+          <ac:spMkLst>
+            <pc:docMk/>
+            <pc:sldMk cId="3964110441" sldId="258"/>
+            <ac:spMk id="24" creationId="{25440DE7-FEC3-4B33-BE37-CA1D6793F833}"/>
+          </ac:spMkLst>
+        </pc:spChg>
+        <pc:spChg chg="add del">
+          <ac:chgData name="Bryan Khuu" userId="db4bb5bc1a416b49" providerId="Windows Live" clId="Web-{5E92D238-FBDD-49B1-A334-FD695E37C85F}" dt="2020-05-09T21:10:40.694" v="8"/>
+          <ac:spMkLst>
+            <pc:docMk/>
+            <pc:sldMk cId="3964110441" sldId="258"/>
+            <ac:spMk id="25" creationId="{6DBBC3F0-E4D5-4DC9-9156-6592F510E7D0}"/>
+          </ac:spMkLst>
+        </pc:spChg>
+        <pc:spChg chg="add del">
+          <ac:chgData name="Bryan Khuu" userId="db4bb5bc1a416b49" providerId="Windows Live" clId="Web-{5E92D238-FBDD-49B1-A334-FD695E37C85F}" dt="2020-05-09T21:13:14.678" v="51"/>
+          <ac:spMkLst>
+            <pc:docMk/>
+            <pc:sldMk cId="3964110441" sldId="258"/>
+            <ac:spMk id="26" creationId="{98D49316-27CF-4C3D-BE8C-042F06B89148}"/>
+          </ac:spMkLst>
+        </pc:spChg>
+        <pc:spChg chg="add del">
+          <ac:chgData name="Bryan Khuu" userId="db4bb5bc1a416b49" providerId="Windows Live" clId="Web-{5E92D238-FBDD-49B1-A334-FD695E37C85F}" dt="2020-05-09T21:10:40.694" v="8"/>
+          <ac:spMkLst>
+            <pc:docMk/>
+            <pc:sldMk cId="3964110441" sldId="258"/>
+            <ac:spMk id="27" creationId="{25440DE7-FEC3-4B33-BE37-CA1D6793F833}"/>
+          </ac:spMkLst>
+        </pc:spChg>
+        <pc:spChg chg="add del">
+          <ac:chgData name="Bryan Khuu" userId="db4bb5bc1a416b49" providerId="Windows Live" clId="Web-{5E92D238-FBDD-49B1-A334-FD695E37C85F}" dt="2020-05-09T21:12:27.585" v="32"/>
+          <ac:spMkLst>
+            <pc:docMk/>
+            <pc:sldMk cId="3964110441" sldId="258"/>
+            <ac:spMk id="28" creationId="{98D49316-27CF-4C3D-BE8C-042F06B89148}"/>
+          </ac:spMkLst>
+        </pc:spChg>
+        <pc:spChg chg="add del">
+          <ac:chgData name="Bryan Khuu" userId="db4bb5bc1a416b49" providerId="Windows Live" clId="Web-{5E92D238-FBDD-49B1-A334-FD695E37C85F}" dt="2020-05-09T21:11:42.834" v="18"/>
+          <ac:spMkLst>
+            <pc:docMk/>
+            <pc:sldMk cId="3964110441" sldId="258"/>
+            <ac:spMk id="29" creationId="{4088F942-5192-4329-9236-6B9F5E9E87C8}"/>
+          </ac:spMkLst>
+        </pc:spChg>
+        <pc:spChg chg="add del">
+          <ac:chgData name="Bryan Khuu" userId="db4bb5bc1a416b49" providerId="Windows Live" clId="Web-{5E92D238-FBDD-49B1-A334-FD695E37C85F}" dt="2020-05-09T21:12:30.194" v="34"/>
+          <ac:spMkLst>
+            <pc:docMk/>
+            <pc:sldMk cId="3964110441" sldId="258"/>
+            <ac:spMk id="30" creationId="{1660E788-AFA9-4A1B-9991-6AA74632A15B}"/>
+          </ac:spMkLst>
+        </pc:spChg>
+        <pc:spChg chg="add del">
+          <ac:chgData name="Bryan Khuu" userId="db4bb5bc1a416b49" providerId="Windows Live" clId="Web-{5E92D238-FBDD-49B1-A334-FD695E37C85F}" dt="2020-05-09T21:11:42.834" v="18"/>
+          <ac:spMkLst>
+            <pc:docMk/>
+            <pc:sldMk cId="3964110441" sldId="258"/>
+            <ac:spMk id="31" creationId="{6DBBC3F0-E4D5-4DC9-9156-6592F510E7D0}"/>
+          </ac:spMkLst>
+        </pc:spChg>
+        <pc:spChg chg="add del">
+          <ac:chgData name="Bryan Khuu" userId="db4bb5bc1a416b49" providerId="Windows Live" clId="Web-{5E92D238-FBDD-49B1-A334-FD695E37C85F}" dt="2020-05-09T21:12:30.194" v="34"/>
+          <ac:spMkLst>
+            <pc:docMk/>
+            <pc:sldMk cId="3964110441" sldId="258"/>
+            <ac:spMk id="32" creationId="{867D4867-5BA7-4462-B2F6-A23F4A622AA7}"/>
+          </ac:spMkLst>
+        </pc:spChg>
+        <pc:spChg chg="add del">
+          <ac:chgData name="Bryan Khuu" userId="db4bb5bc1a416b49" providerId="Windows Live" clId="Web-{5E92D238-FBDD-49B1-A334-FD695E37C85F}" dt="2020-05-09T21:11:42.834" v="18"/>
+          <ac:spMkLst>
+            <pc:docMk/>
+            <pc:sldMk cId="3964110441" sldId="258"/>
+            <ac:spMk id="33" creationId="{25440DE7-FEC3-4B33-BE37-CA1D6793F833}"/>
+          </ac:spMkLst>
+        </pc:spChg>
+        <pc:spChg chg="add del">
+          <ac:chgData name="Bryan Khuu" userId="db4bb5bc1a416b49" providerId="Windows Live" clId="Web-{5E92D238-FBDD-49B1-A334-FD695E37C85F}" dt="2020-05-09T21:12:32.288" v="36"/>
+          <ac:spMkLst>
+            <pc:docMk/>
+            <pc:sldMk cId="3964110441" sldId="258"/>
+            <ac:spMk id="34" creationId="{1660E788-AFA9-4A1B-9991-6AA74632A15B}"/>
+          </ac:spMkLst>
+        </pc:spChg>
+        <pc:spChg chg="add del">
+          <ac:chgData name="Bryan Khuu" userId="db4bb5bc1a416b49" providerId="Windows Live" clId="Web-{5E92D238-FBDD-49B1-A334-FD695E37C85F}" dt="2020-05-09T21:12:32.288" v="36"/>
+          <ac:spMkLst>
+            <pc:docMk/>
+            <pc:sldMk cId="3964110441" sldId="258"/>
+            <ac:spMk id="35" creationId="{867D4867-5BA7-4462-B2F6-A23F4A622AA7}"/>
+          </ac:spMkLst>
+        </pc:spChg>
+        <pc:spChg chg="add del">
+          <ac:chgData name="Bryan Khuu" userId="db4bb5bc1a416b49" providerId="Windows Live" clId="Web-{5E92D238-FBDD-49B1-A334-FD695E37C85F}" dt="2020-05-09T21:12:35.334" v="38"/>
+          <ac:spMkLst>
+            <pc:docMk/>
+            <pc:sldMk cId="3964110441" sldId="258"/>
+            <ac:spMk id="36" creationId="{BA4C5437-838C-45F6-BFC8-3AF0ADE30FFB}"/>
+          </ac:spMkLst>
+        </pc:spChg>
+        <pc:spChg chg="add del">
+          <ac:chgData name="Bryan Khuu" userId="db4bb5bc1a416b49" providerId="Windows Live" clId="Web-{5E92D238-FBDD-49B1-A334-FD695E37C85F}" dt="2020-05-09T21:12:35.334" v="38"/>
+          <ac:spMkLst>
+            <pc:docMk/>
+            <pc:sldMk cId="3964110441" sldId="258"/>
+            <ac:spMk id="37" creationId="{5D7CC766-DF6B-4E3F-8101-8D5F35D4AFFB}"/>
+          </ac:spMkLst>
+        </pc:spChg>
+        <pc:spChg chg="add del">
+          <ac:chgData name="Bryan Khuu" userId="db4bb5bc1a416b49" providerId="Windows Live" clId="Web-{5E92D238-FBDD-49B1-A334-FD695E37C85F}" dt="2020-05-09T21:12:35.334" v="38"/>
+          <ac:spMkLst>
+            <pc:docMk/>
+            <pc:sldMk cId="3964110441" sldId="258"/>
+            <ac:spMk id="38" creationId="{FACBD493-E381-4822-8F8F-A4194DFDB109}"/>
+          </ac:spMkLst>
+        </pc:spChg>
+        <pc:spChg chg="add del">
+          <ac:chgData name="Bryan Khuu" userId="db4bb5bc1a416b49" providerId="Windows Live" clId="Web-{5E92D238-FBDD-49B1-A334-FD695E37C85F}" dt="2020-05-09T21:12:35.334" v="38"/>
+          <ac:spMkLst>
+            <pc:docMk/>
+            <pc:sldMk cId="3964110441" sldId="258"/>
+            <ac:spMk id="39" creationId="{2310D9BE-4AD2-4CC3-84FA-4E05790B5B9F}"/>
+          </ac:spMkLst>
+        </pc:spChg>
+        <pc:spChg chg="add del">
+          <ac:chgData name="Bryan Khuu" userId="db4bb5bc1a416b49" providerId="Windows Live" clId="Web-{5E92D238-FBDD-49B1-A334-FD695E37C85F}" dt="2020-05-09T21:12:40.881" v="40"/>
+          <ac:spMkLst>
+            <pc:docMk/>
+            <pc:sldMk cId="3964110441" sldId="258"/>
+            <ac:spMk id="40" creationId="{7B9607E2-1C76-424B-8FF0-580615846EC0}"/>
+          </ac:spMkLst>
+        </pc:spChg>
+        <pc:spChg chg="add del">
+          <ac:chgData name="Bryan Khuu" userId="db4bb5bc1a416b49" providerId="Windows Live" clId="Web-{5E92D238-FBDD-49B1-A334-FD695E37C85F}" dt="2020-05-09T21:12:40.881" v="40"/>
+          <ac:spMkLst>
+            <pc:docMk/>
+            <pc:sldMk cId="3964110441" sldId="258"/>
+            <ac:spMk id="41" creationId="{56A668AF-CC37-4641-8D2B-4C91B3ACBC81}"/>
+          </ac:spMkLst>
+        </pc:spChg>
+        <pc:spChg chg="add del">
+          <ac:chgData name="Bryan Khuu" userId="db4bb5bc1a416b49" providerId="Windows Live" clId="Web-{5E92D238-FBDD-49B1-A334-FD695E37C85F}" dt="2020-05-09T21:12:40.881" v="40"/>
+          <ac:spMkLst>
+            <pc:docMk/>
+            <pc:sldMk cId="3964110441" sldId="258"/>
+            <ac:spMk id="42" creationId="{5B3165DC-54F4-4EF5-8B97-5BE55AA3DBE9}"/>
+          </ac:spMkLst>
+        </pc:spChg>
+        <pc:spChg chg="add del">
+          <ac:chgData name="Bryan Khuu" userId="db4bb5bc1a416b49" providerId="Windows Live" clId="Web-{5E92D238-FBDD-49B1-A334-FD695E37C85F}" dt="2020-05-09T21:12:43.272" v="42"/>
+          <ac:spMkLst>
+            <pc:docMk/>
+            <pc:sldMk cId="3964110441" sldId="258"/>
+            <ac:spMk id="43" creationId="{7D587F9F-3F48-4929-8532-62B82B3F66BE}"/>
+          </ac:spMkLst>
+        </pc:spChg>
+        <pc:spChg chg="add del">
+          <ac:chgData name="Bryan Khuu" userId="db4bb5bc1a416b49" providerId="Windows Live" clId="Web-{5E92D238-FBDD-49B1-A334-FD695E37C85F}" dt="2020-05-09T21:12:43.272" v="42"/>
+          <ac:spMkLst>
+            <pc:docMk/>
+            <pc:sldMk cId="3964110441" sldId="258"/>
+            <ac:spMk id="44" creationId="{6DCB66B2-3729-41B6-8A12-AB8550189D5E}"/>
+          </ac:spMkLst>
+        </pc:spChg>
+        <pc:spChg chg="add del">
+          <ac:chgData name="Bryan Khuu" userId="db4bb5bc1a416b49" providerId="Windows Live" clId="Web-{5E92D238-FBDD-49B1-A334-FD695E37C85F}" dt="2020-05-09T21:12:43.272" v="42"/>
+          <ac:spMkLst>
+            <pc:docMk/>
+            <pc:sldMk cId="3964110441" sldId="258"/>
+            <ac:spMk id="45" creationId="{ABA662FB-3DC6-4E93-98AC-B84BA41F4859}"/>
+          </ac:spMkLst>
+        </pc:spChg>
+        <pc:spChg chg="add del">
+          <ac:chgData name="Bryan Khuu" userId="db4bb5bc1a416b49" providerId="Windows Live" clId="Web-{5E92D238-FBDD-49B1-A334-FD695E37C85F}" dt="2020-05-09T21:12:43.272" v="42"/>
+          <ac:spMkLst>
+            <pc:docMk/>
+            <pc:sldMk cId="3964110441" sldId="258"/>
+            <ac:spMk id="46" creationId="{FB9BE604-0CC0-41C8-9673-995F82DA0257}"/>
+          </ac:spMkLst>
+        </pc:spChg>
+        <pc:spChg chg="add del">
+          <ac:chgData name="Bryan Khuu" userId="db4bb5bc1a416b49" providerId="Windows Live" clId="Web-{5E92D238-FBDD-49B1-A334-FD695E37C85F}" dt="2020-05-09T21:12:43.272" v="42"/>
+          <ac:spMkLst>
+            <pc:docMk/>
+            <pc:sldMk cId="3964110441" sldId="258"/>
+            <ac:spMk id="47" creationId="{2036372A-822B-498E-AD05-6BE85743A094}"/>
+          </ac:spMkLst>
+        </pc:spChg>
+        <pc:spChg chg="add del">
+          <ac:chgData name="Bryan Khuu" userId="db4bb5bc1a416b49" providerId="Windows Live" clId="Web-{5E92D238-FBDD-49B1-A334-FD695E37C85F}" dt="2020-05-09T21:12:48.006" v="44"/>
+          <ac:spMkLst>
+            <pc:docMk/>
+            <pc:sldMk cId="3964110441" sldId="258"/>
+            <ac:spMk id="48" creationId="{674D2C94-67DA-49BC-B575-EB99BE0252F3}"/>
+          </ac:spMkLst>
+        </pc:spChg>
+        <pc:spChg chg="add del">
+          <ac:chgData name="Bryan Khuu" userId="db4bb5bc1a416b49" providerId="Windows Live" clId="Web-{5E92D238-FBDD-49B1-A334-FD695E37C85F}" dt="2020-05-09T21:12:48.006" v="44"/>
+          <ac:spMkLst>
+            <pc:docMk/>
+            <pc:sldMk cId="3964110441" sldId="258"/>
+            <ac:spMk id="49" creationId="{8B77C263-A9E4-4AED-A483-A008BF4989F3}"/>
+          </ac:spMkLst>
+        </pc:spChg>
+        <pc:spChg chg="add del">
+          <ac:chgData name="Bryan Khuu" userId="db4bb5bc1a416b49" providerId="Windows Live" clId="Web-{5E92D238-FBDD-49B1-A334-FD695E37C85F}" dt="2020-05-09T21:12:48.006" v="44"/>
+          <ac:spMkLst>
+            <pc:docMk/>
+            <pc:sldMk cId="3964110441" sldId="258"/>
+            <ac:spMk id="50" creationId="{9AB81589-5E2E-48A4-A999-0BBC893AC573}"/>
+          </ac:spMkLst>
+        </pc:spChg>
+        <pc:spChg chg="add del">
+          <ac:chgData name="Bryan Khuu" userId="db4bb5bc1a416b49" providerId="Windows Live" clId="Web-{5E92D238-FBDD-49B1-A334-FD695E37C85F}" dt="2020-05-09T21:12:48.006" v="44"/>
+          <ac:spMkLst>
+            <pc:docMk/>
+            <pc:sldMk cId="3964110441" sldId="258"/>
+            <ac:spMk id="51" creationId="{E66CAF34-A4FD-4846-A2D0-97CF10923F32}"/>
+          </ac:spMkLst>
+        </pc:spChg>
+        <pc:spChg chg="add del">
+          <ac:chgData name="Bryan Khuu" userId="db4bb5bc1a416b49" providerId="Windows Live" clId="Web-{5E92D238-FBDD-49B1-A334-FD695E37C85F}" dt="2020-05-09T21:12:55.897" v="46"/>
+          <ac:spMkLst>
+            <pc:docMk/>
+            <pc:sldMk cId="3964110441" sldId="258"/>
+            <ac:spMk id="52" creationId="{4088F942-5192-4329-9236-6B9F5E9E87C8}"/>
+          </ac:spMkLst>
+        </pc:spChg>
+        <pc:spChg chg="add del">
+          <ac:chgData name="Bryan Khuu" userId="db4bb5bc1a416b49" providerId="Windows Live" clId="Web-{5E92D238-FBDD-49B1-A334-FD695E37C85F}" dt="2020-05-09T21:12:55.897" v="46"/>
+          <ac:spMkLst>
+            <pc:docMk/>
+            <pc:sldMk cId="3964110441" sldId="258"/>
+            <ac:spMk id="53" creationId="{6DBBC3F0-E4D5-4DC9-9156-6592F510E7D0}"/>
+          </ac:spMkLst>
+        </pc:spChg>
+        <pc:spChg chg="add del">
+          <ac:chgData name="Bryan Khuu" userId="db4bb5bc1a416b49" providerId="Windows Live" clId="Web-{5E92D238-FBDD-49B1-A334-FD695E37C85F}" dt="2020-05-09T21:12:55.897" v="46"/>
+          <ac:spMkLst>
+            <pc:docMk/>
+            <pc:sldMk cId="3964110441" sldId="258"/>
+            <ac:spMk id="54" creationId="{25440DE7-FEC3-4B33-BE37-CA1D6793F833}"/>
+          </ac:spMkLst>
+        </pc:spChg>
+        <pc:spChg chg="add del">
+          <ac:chgData name="Bryan Khuu" userId="db4bb5bc1a416b49" providerId="Windows Live" clId="Web-{5E92D238-FBDD-49B1-A334-FD695E37C85F}" dt="2020-05-09T21:13:04.522" v="48"/>
+          <ac:spMkLst>
+            <pc:docMk/>
+            <pc:sldMk cId="3964110441" sldId="258"/>
+            <ac:spMk id="55" creationId="{8AA1D43A-9C3D-41BA-BD9F-EF7EC7B2F076}"/>
+          </ac:spMkLst>
+        </pc:spChg>
+        <pc:spChg chg="add del">
+          <ac:chgData name="Bryan Khuu" userId="db4bb5bc1a416b49" providerId="Windows Live" clId="Web-{5E92D238-FBDD-49B1-A334-FD695E37C85F}" dt="2020-05-09T21:13:04.522" v="48"/>
+          <ac:spMkLst>
+            <pc:docMk/>
+            <pc:sldMk cId="3964110441" sldId="258"/>
+            <ac:spMk id="56" creationId="{0477181B-208D-49EE-AEEF-79DAF8BA73E1}"/>
+          </ac:spMkLst>
+        </pc:spChg>
+        <pc:spChg chg="add del">
+          <ac:chgData name="Bryan Khuu" userId="db4bb5bc1a416b49" providerId="Windows Live" clId="Web-{5E92D238-FBDD-49B1-A334-FD695E37C85F}" dt="2020-05-09T21:13:04.522" v="48"/>
+          <ac:spMkLst>
+            <pc:docMk/>
+            <pc:sldMk cId="3964110441" sldId="258"/>
+            <ac:spMk id="57" creationId="{83BFAA97-C464-45F7-995A-E13D0B4FC673}"/>
+          </ac:spMkLst>
+        </pc:spChg>
+        <pc:spChg chg="add del">
+          <ac:chgData name="Bryan Khuu" userId="db4bb5bc1a416b49" providerId="Windows Live" clId="Web-{5E92D238-FBDD-49B1-A334-FD695E37C85F}" dt="2020-05-09T21:13:04.522" v="48"/>
+          <ac:spMkLst>
+            <pc:docMk/>
+            <pc:sldMk cId="3964110441" sldId="258"/>
+            <ac:spMk id="58" creationId="{EC059808-0DA1-4E66-92F6-60C8B25B4D6B}"/>
+          </ac:spMkLst>
+        </pc:spChg>
+        <pc:spChg chg="add del">
+          <ac:chgData name="Bryan Khuu" userId="db4bb5bc1a416b49" providerId="Windows Live" clId="Web-{5E92D238-FBDD-49B1-A334-FD695E37C85F}" dt="2020-05-09T21:13:04.522" v="48"/>
+          <ac:spMkLst>
+            <pc:docMk/>
+            <pc:sldMk cId="3964110441" sldId="258"/>
+            <ac:spMk id="59" creationId="{45386504-CADE-4AFE-AF4F-0616BA69A7BA}"/>
+          </ac:spMkLst>
+        </pc:spChg>
+        <pc:spChg chg="add del">
+          <ac:chgData name="Bryan Khuu" userId="db4bb5bc1a416b49" providerId="Windows Live" clId="Web-{5E92D238-FBDD-49B1-A334-FD695E37C85F}" dt="2020-05-09T21:14:37.288" v="71"/>
+          <ac:spMkLst>
+            <pc:docMk/>
+            <pc:sldMk cId="3964110441" sldId="258"/>
+            <ac:spMk id="60" creationId="{2310D9BE-4AD2-4CC3-84FA-4E05790B5B9F}"/>
+          </ac:spMkLst>
+        </pc:spChg>
+        <pc:spChg chg="add del">
+          <ac:chgData name="Bryan Khuu" userId="db4bb5bc1a416b49" providerId="Windows Live" clId="Web-{5E92D238-FBDD-49B1-A334-FD695E37C85F}" dt="2020-05-09T21:14:37.288" v="71"/>
+          <ac:spMkLst>
+            <pc:docMk/>
+            <pc:sldMk cId="3964110441" sldId="258"/>
+            <ac:spMk id="61" creationId="{5D7CC766-DF6B-4E3F-8101-8D5F35D4AFFB}"/>
+          </ac:spMkLst>
+        </pc:spChg>
+        <pc:spChg chg="add del">
+          <ac:chgData name="Bryan Khuu" userId="db4bb5bc1a416b49" providerId="Windows Live" clId="Web-{5E92D238-FBDD-49B1-A334-FD695E37C85F}" dt="2020-05-09T21:14:16.413" v="60"/>
+          <ac:spMkLst>
+            <pc:docMk/>
+            <pc:sldMk cId="3964110441" sldId="258"/>
+            <ac:spMk id="63" creationId="{B8D39262-9511-4F20-8344-1B9DA68877A8}"/>
+          </ac:spMkLst>
+        </pc:spChg>
+        <pc:spChg chg="add del">
+          <ac:chgData name="Bryan Khuu" userId="db4bb5bc1a416b49" providerId="Windows Live" clId="Web-{5E92D238-FBDD-49B1-A334-FD695E37C85F}" dt="2020-05-09T21:14:16.413" v="60"/>
+          <ac:spMkLst>
+            <pc:docMk/>
+            <pc:sldMk cId="3964110441" sldId="258"/>
+            <ac:spMk id="64" creationId="{4F924495-5138-4BB6-B18C-C83EC04341D6}"/>
+          </ac:spMkLst>
+        </pc:spChg>
+        <pc:spChg chg="add del">
+          <ac:chgData name="Bryan Khuu" userId="db4bb5bc1a416b49" providerId="Windows Live" clId="Web-{5E92D238-FBDD-49B1-A334-FD695E37C85F}" dt="2020-05-09T21:14:16.413" v="60"/>
+          <ac:spMkLst>
+            <pc:docMk/>
+            <pc:sldMk cId="3964110441" sldId="258"/>
+            <ac:spMk id="65" creationId="{428AFF86-4DDC-4A60-AC4C-48C6DAE56894}"/>
+          </ac:spMkLst>
+        </pc:spChg>
+        <pc:spChg chg="add del">
+          <ac:chgData name="Bryan Khuu" userId="db4bb5bc1a416b49" providerId="Windows Live" clId="Web-{5E92D238-FBDD-49B1-A334-FD695E37C85F}" dt="2020-05-09T21:14:15.134" v="58"/>
+          <ac:spMkLst>
+            <pc:docMk/>
+            <pc:sldMk cId="3964110441" sldId="258"/>
+            <ac:spMk id="66" creationId="{BA4C5437-838C-45F6-BFC8-3AF0ADE30FFB}"/>
+          </ac:spMkLst>
+        </pc:spChg>
+        <pc:spChg chg="add del">
+          <ac:chgData name="Bryan Khuu" userId="db4bb5bc1a416b49" providerId="Windows Live" clId="Web-{5E92D238-FBDD-49B1-A334-FD695E37C85F}" dt="2020-05-09T21:14:17.538" v="62"/>
+          <ac:spMkLst>
+            <pc:docMk/>
+            <pc:sldMk cId="3964110441" sldId="258"/>
+            <ac:spMk id="67" creationId="{1660E788-AFA9-4A1B-9991-6AA74632A15B}"/>
+          </ac:spMkLst>
+        </pc:spChg>
+        <pc:spChg chg="add del">
+          <ac:chgData name="Bryan Khuu" userId="db4bb5bc1a416b49" providerId="Windows Live" clId="Web-{5E92D238-FBDD-49B1-A334-FD695E37C85F}" dt="2020-05-09T21:14:15.134" v="58"/>
+          <ac:spMkLst>
+            <pc:docMk/>
+            <pc:sldMk cId="3964110441" sldId="258"/>
+            <ac:spMk id="68" creationId="{FACBD493-E381-4822-8F8F-A4194DFDB109}"/>
+          </ac:spMkLst>
+        </pc:spChg>
+        <pc:spChg chg="add del">
+          <ac:chgData name="Bryan Khuu" userId="db4bb5bc1a416b49" providerId="Windows Live" clId="Web-{5E92D238-FBDD-49B1-A334-FD695E37C85F}" dt="2020-05-09T21:14:17.538" v="62"/>
+          <ac:spMkLst>
+            <pc:docMk/>
+            <pc:sldMk cId="3964110441" sldId="258"/>
+            <ac:spMk id="69" creationId="{867D4867-5BA7-4462-B2F6-A23F4A622AA7}"/>
+          </ac:spMkLst>
+        </pc:spChg>
+        <pc:spChg chg="add del">
+          <ac:chgData name="Bryan Khuu" userId="db4bb5bc1a416b49" providerId="Windows Live" clId="Web-{5E92D238-FBDD-49B1-A334-FD695E37C85F}" dt="2020-05-09T21:14:15.134" v="58"/>
+          <ac:spMkLst>
+            <pc:docMk/>
+            <pc:sldMk cId="3964110441" sldId="258"/>
+            <ac:spMk id="70" creationId="{2310D9BE-4AD2-4CC3-84FA-4E05790B5B9F}"/>
+          </ac:spMkLst>
+        </pc:spChg>
+        <pc:spChg chg="add del">
+          <ac:chgData name="Bryan Khuu" userId="db4bb5bc1a416b49" providerId="Windows Live" clId="Web-{5E92D238-FBDD-49B1-A334-FD695E37C85F}" dt="2020-05-09T21:14:20.288" v="64"/>
+          <ac:spMkLst>
+            <pc:docMk/>
+            <pc:sldMk cId="3964110441" sldId="258"/>
+            <ac:spMk id="71" creationId="{7B9607E2-1C76-424B-8FF0-580615846EC0}"/>
+          </ac:spMkLst>
+        </pc:spChg>
+        <pc:spChg chg="add del">
+          <ac:chgData name="Bryan Khuu" userId="db4bb5bc1a416b49" providerId="Windows Live" clId="Web-{5E92D238-FBDD-49B1-A334-FD695E37C85F}" dt="2020-05-09T21:14:15.134" v="58"/>
+          <ac:spMkLst>
+            <pc:docMk/>
+            <pc:sldMk cId="3964110441" sldId="258"/>
+            <ac:spMk id="72" creationId="{5D7CC766-DF6B-4E3F-8101-8D5F35D4AFFB}"/>
+          </ac:spMkLst>
+        </pc:spChg>
+        <pc:spChg chg="add del">
+          <ac:chgData name="Bryan Khuu" userId="db4bb5bc1a416b49" providerId="Windows Live" clId="Web-{5E92D238-FBDD-49B1-A334-FD695E37C85F}" dt="2020-05-09T21:14:20.288" v="64"/>
+          <ac:spMkLst>
+            <pc:docMk/>
+            <pc:sldMk cId="3964110441" sldId="258"/>
+            <ac:spMk id="73" creationId="{56A668AF-CC37-4641-8D2B-4C91B3ACBC81}"/>
+          </ac:spMkLst>
+        </pc:spChg>
+        <pc:spChg chg="add del">
+          <ac:chgData name="Bryan Khuu" userId="db4bb5bc1a416b49" providerId="Windows Live" clId="Web-{5E92D238-FBDD-49B1-A334-FD695E37C85F}" dt="2020-05-09T21:14:20.288" v="64"/>
+          <ac:spMkLst>
+            <pc:docMk/>
+            <pc:sldMk cId="3964110441" sldId="258"/>
+            <ac:spMk id="74" creationId="{5B3165DC-54F4-4EF5-8B97-5BE55AA3DBE9}"/>
+          </ac:spMkLst>
+        </pc:spChg>
+        <pc:spChg chg="add del">
+          <ac:chgData name="Bryan Khuu" userId="db4bb5bc1a416b49" providerId="Windows Live" clId="Web-{5E92D238-FBDD-49B1-A334-FD695E37C85F}" dt="2020-05-09T21:14:25.882" v="66"/>
+          <ac:spMkLst>
+            <pc:docMk/>
+            <pc:sldMk cId="3964110441" sldId="258"/>
+            <ac:spMk id="75" creationId="{98D49316-27CF-4C3D-BE8C-042F06B89148}"/>
+          </ac:spMkLst>
+        </pc:spChg>
+        <pc:spChg chg="add del">
+          <ac:chgData name="Bryan Khuu" userId="db4bb5bc1a416b49" providerId="Windows Live" clId="Web-{5E92D238-FBDD-49B1-A334-FD695E37C85F}" dt="2020-05-09T21:14:30.944" v="68"/>
+          <ac:spMkLst>
+            <pc:docMk/>
+            <pc:sldMk cId="3964110441" sldId="258"/>
+            <ac:spMk id="76" creationId="{930BC020-BDBF-49EB-9898-BAB5BF559317}"/>
+          </ac:spMkLst>
+        </pc:spChg>
+        <pc:spChg chg="add del">
+          <ac:chgData name="Bryan Khuu" userId="db4bb5bc1a416b49" providerId="Windows Live" clId="Web-{5E92D238-FBDD-49B1-A334-FD695E37C85F}" dt="2020-05-09T21:14:30.944" v="68"/>
+          <ac:spMkLst>
+            <pc:docMk/>
+            <pc:sldMk cId="3964110441" sldId="258"/>
+            <ac:spMk id="77" creationId="{64950C64-5D81-40F1-9601-8BA0D63BAE74}"/>
+          </ac:spMkLst>
+        </pc:spChg>
+        <pc:spChg chg="add del">
+          <ac:chgData name="Bryan Khuu" userId="db4bb5bc1a416b49" providerId="Windows Live" clId="Web-{5E92D238-FBDD-49B1-A334-FD695E37C85F}" dt="2020-05-09T21:14:37.288" v="70"/>
+          <ac:spMkLst>
+            <pc:docMk/>
+            <pc:sldMk cId="3964110441" sldId="258"/>
+            <ac:spMk id="78" creationId="{98D49316-27CF-4C3D-BE8C-042F06B89148}"/>
+          </ac:spMkLst>
+        </pc:spChg>
+        <pc:spChg chg="add del">
+          <ac:chgData name="Bryan Khuu" userId="db4bb5bc1a416b49" providerId="Windows Live" clId="Web-{5E92D238-FBDD-49B1-A334-FD695E37C85F}" dt="2020-05-09T21:15:17.116" v="80"/>
+          <ac:spMkLst>
+            <pc:docMk/>
+            <pc:sldMk cId="3964110441" sldId="258"/>
+            <ac:spMk id="79" creationId="{BA4C5437-838C-45F6-BFC8-3AF0ADE30FFB}"/>
+          </ac:spMkLst>
+        </pc:spChg>
+        <pc:spChg chg="add del">
+          <ac:chgData name="Bryan Khuu" userId="db4bb5bc1a416b49" providerId="Windows Live" clId="Web-{5E92D238-FBDD-49B1-A334-FD695E37C85F}" dt="2020-05-09T21:15:17.116" v="80"/>
+          <ac:spMkLst>
+            <pc:docMk/>
+            <pc:sldMk cId="3964110441" sldId="258"/>
+            <ac:spMk id="80" creationId="{FACBD493-E381-4822-8F8F-A4194DFDB109}"/>
+          </ac:spMkLst>
+        </pc:spChg>
+        <pc:spChg chg="add del">
+          <ac:chgData name="Bryan Khuu" userId="db4bb5bc1a416b49" providerId="Windows Live" clId="Web-{5E92D238-FBDD-49B1-A334-FD695E37C85F}" dt="2020-05-09T21:15:17.116" v="80"/>
+          <ac:spMkLst>
+            <pc:docMk/>
+            <pc:sldMk cId="3964110441" sldId="258"/>
+            <ac:spMk id="81" creationId="{2310D9BE-4AD2-4CC3-84FA-4E05790B5B9F}"/>
+          </ac:spMkLst>
+        </pc:spChg>
+        <pc:spChg chg="add del">
+          <ac:chgData name="Bryan Khuu" userId="db4bb5bc1a416b49" providerId="Windows Live" clId="Web-{5E92D238-FBDD-49B1-A334-FD695E37C85F}" dt="2020-05-09T21:15:17.116" v="80"/>
+          <ac:spMkLst>
+            <pc:docMk/>
+            <pc:sldMk cId="3964110441" sldId="258"/>
+            <ac:spMk id="82" creationId="{5D7CC766-DF6B-4E3F-8101-8D5F35D4AFFB}"/>
+          </ac:spMkLst>
+        </pc:spChg>
+        <pc:spChg chg="add del">
+          <ac:chgData name="Bryan Khuu" userId="db4bb5bc1a416b49" providerId="Windows Live" clId="Web-{5E92D238-FBDD-49B1-A334-FD695E37C85F}" dt="2020-05-09T21:15:35.334" v="88"/>
+          <ac:spMkLst>
+            <pc:docMk/>
+            <pc:sldMk cId="3964110441" sldId="258"/>
+            <ac:spMk id="87" creationId="{98D49316-27CF-4C3D-BE8C-042F06B89148}"/>
+          </ac:spMkLst>
+        </pc:spChg>
+        <pc:spChg chg="add del">
+          <ac:chgData name="Bryan Khuu" userId="db4bb5bc1a416b49" providerId="Windows Live" clId="Web-{5E92D238-FBDD-49B1-A334-FD695E37C85F}" dt="2020-05-09T21:15:33.131" v="85"/>
+          <ac:spMkLst>
+            <pc:docMk/>
+            <pc:sldMk cId="3964110441" sldId="258"/>
+            <ac:spMk id="89" creationId="{98D49316-27CF-4C3D-BE8C-042F06B89148}"/>
+          </ac:spMkLst>
+        </pc:spChg>
+        <pc:spChg chg="add del">
+          <ac:chgData name="Bryan Khuu" userId="db4bb5bc1a416b49" providerId="Windows Live" clId="Web-{5E92D238-FBDD-49B1-A334-FD695E37C85F}" dt="2020-05-09T21:15:35.319" v="87"/>
+          <ac:spMkLst>
+            <pc:docMk/>
+            <pc:sldMk cId="3964110441" sldId="258"/>
+            <ac:spMk id="90" creationId="{BA4C5437-838C-45F6-BFC8-3AF0ADE30FFB}"/>
+          </ac:spMkLst>
+        </pc:spChg>
+        <pc:spChg chg="add del">
+          <ac:chgData name="Bryan Khuu" userId="db4bb5bc1a416b49" providerId="Windows Live" clId="Web-{5E92D238-FBDD-49B1-A334-FD695E37C85F}" dt="2020-05-09T21:15:35.319" v="87"/>
+          <ac:spMkLst>
+            <pc:docMk/>
+            <pc:sldMk cId="3964110441" sldId="258"/>
+            <ac:spMk id="91" creationId="{FACBD493-E381-4822-8F8F-A4194DFDB109}"/>
+          </ac:spMkLst>
+        </pc:spChg>
+        <pc:spChg chg="add del">
+          <ac:chgData name="Bryan Khuu" userId="db4bb5bc1a416b49" providerId="Windows Live" clId="Web-{5E92D238-FBDD-49B1-A334-FD695E37C85F}" dt="2020-05-09T21:15:30.069" v="83"/>
+          <ac:spMkLst>
+            <pc:docMk/>
+            <pc:sldMk cId="3964110441" sldId="258"/>
+            <ac:spMk id="92" creationId="{7B9607E2-1C76-424B-8FF0-580615846EC0}"/>
+          </ac:spMkLst>
+        </pc:spChg>
+        <pc:spChg chg="add del">
+          <ac:chgData name="Bryan Khuu" userId="db4bb5bc1a416b49" providerId="Windows Live" clId="Web-{5E92D238-FBDD-49B1-A334-FD695E37C85F}" dt="2020-05-09T21:15:35.319" v="87"/>
+          <ac:spMkLst>
+            <pc:docMk/>
+            <pc:sldMk cId="3964110441" sldId="258"/>
+            <ac:spMk id="93" creationId="{2310D9BE-4AD2-4CC3-84FA-4E05790B5B9F}"/>
+          </ac:spMkLst>
+        </pc:spChg>
+        <pc:spChg chg="add del">
+          <ac:chgData name="Bryan Khuu" userId="db4bb5bc1a416b49" providerId="Windows Live" clId="Web-{5E92D238-FBDD-49B1-A334-FD695E37C85F}" dt="2020-05-09T21:15:30.069" v="83"/>
+          <ac:spMkLst>
+            <pc:docMk/>
+            <pc:sldMk cId="3964110441" sldId="258"/>
+            <ac:spMk id="94" creationId="{56A668AF-CC37-4641-8D2B-4C91B3ACBC81}"/>
+          </ac:spMkLst>
+        </pc:spChg>
+        <pc:spChg chg="add del">
+          <ac:chgData name="Bryan Khuu" userId="db4bb5bc1a416b49" providerId="Windows Live" clId="Web-{5E92D238-FBDD-49B1-A334-FD695E37C85F}" dt="2020-05-09T21:15:42.803" v="90"/>
+          <ac:spMkLst>
+            <pc:docMk/>
+            <pc:sldMk cId="3964110441" sldId="258"/>
+            <ac:spMk id="95" creationId="{98D49316-27CF-4C3D-BE8C-042F06B89148}"/>
+          </ac:spMkLst>
+        </pc:spChg>
+        <pc:spChg chg="add del">
+          <ac:chgData name="Bryan Khuu" userId="db4bb5bc1a416b49" providerId="Windows Live" clId="Web-{5E92D238-FBDD-49B1-A334-FD695E37C85F}" dt="2020-05-09T21:15:30.069" v="83"/>
+          <ac:spMkLst>
+            <pc:docMk/>
+            <pc:sldMk cId="3964110441" sldId="258"/>
+            <ac:spMk id="96" creationId="{5B3165DC-54F4-4EF5-8B97-5BE55AA3DBE9}"/>
+          </ac:spMkLst>
+        </pc:spChg>
+        <pc:spChg chg="add del">
+          <ac:chgData name="Bryan Khuu" userId="db4bb5bc1a416b49" providerId="Windows Live" clId="Web-{5E92D238-FBDD-49B1-A334-FD695E37C85F}" dt="2020-05-09T21:17:52.397" v="117"/>
+          <ac:spMkLst>
+            <pc:docMk/>
+            <pc:sldMk cId="3964110441" sldId="258"/>
+            <ac:spMk id="97" creationId="{C315E612-C0A2-4395-B579-9D425FAAC183}"/>
+          </ac:spMkLst>
+        </pc:spChg>
+        <pc:spChg chg="add del">
+          <ac:chgData name="Bryan Khuu" userId="db4bb5bc1a416b49" providerId="Windows Live" clId="Web-{5E92D238-FBDD-49B1-A334-FD695E37C85F}" dt="2020-05-09T21:15:35.319" v="87"/>
+          <ac:spMkLst>
+            <pc:docMk/>
+            <pc:sldMk cId="3964110441" sldId="258"/>
+            <ac:spMk id="98" creationId="{5D7CC766-DF6B-4E3F-8101-8D5F35D4AFFB}"/>
+          </ac:spMkLst>
+        </pc:spChg>
+        <pc:spChg chg="add del">
+          <ac:chgData name="Bryan Khuu" userId="db4bb5bc1a416b49" providerId="Windows Live" clId="Web-{5E92D238-FBDD-49B1-A334-FD695E37C85F}" dt="2020-05-09T21:17:20.131" v="106"/>
+          <ac:spMkLst>
+            <pc:docMk/>
+            <pc:sldMk cId="3964110441" sldId="258"/>
+            <ac:spMk id="100" creationId="{BA4C5437-838C-45F6-BFC8-3AF0ADE30FFB}"/>
+          </ac:spMkLst>
+        </pc:spChg>
+        <pc:spChg chg="add del">
+          <ac:chgData name="Bryan Khuu" userId="db4bb5bc1a416b49" providerId="Windows Live" clId="Web-{5E92D238-FBDD-49B1-A334-FD695E37C85F}" dt="2020-05-09T21:17:36.975" v="112"/>
+          <ac:spMkLst>
+            <pc:docMk/>
+            <pc:sldMk cId="3964110441" sldId="258"/>
+            <ac:spMk id="101" creationId="{A88B48CE-97F9-4924-96D2-BEAD09D4B7D3}"/>
+          </ac:spMkLst>
+        </pc:spChg>
+        <pc:spChg chg="add del">
+          <ac:chgData name="Bryan Khuu" userId="db4bb5bc1a416b49" providerId="Windows Live" clId="Web-{5E92D238-FBDD-49B1-A334-FD695E37C85F}" dt="2020-05-09T21:17:20.131" v="106"/>
+          <ac:spMkLst>
+            <pc:docMk/>
+            <pc:sldMk cId="3964110441" sldId="258"/>
+            <ac:spMk id="102" creationId="{FACBD493-E381-4822-8F8F-A4194DFDB109}"/>
+          </ac:spMkLst>
+        </pc:spChg>
+        <pc:spChg chg="add del">
+          <ac:chgData name="Bryan Khuu" userId="db4bb5bc1a416b49" providerId="Windows Live" clId="Web-{5E92D238-FBDD-49B1-A334-FD695E37C85F}" dt="2020-05-09T21:17:20.131" v="106"/>
+          <ac:spMkLst>
+            <pc:docMk/>
+            <pc:sldMk cId="3964110441" sldId="258"/>
+            <ac:spMk id="104" creationId="{2310D9BE-4AD2-4CC3-84FA-4E05790B5B9F}"/>
+          </ac:spMkLst>
+        </pc:spChg>
+        <pc:spChg chg="add del">
+          <ac:chgData name="Bryan Khuu" userId="db4bb5bc1a416b49" providerId="Windows Live" clId="Web-{5E92D238-FBDD-49B1-A334-FD695E37C85F}" dt="2020-05-09T21:17:39.663" v="114"/>
+          <ac:spMkLst>
+            <pc:docMk/>
+            <pc:sldMk cId="3964110441" sldId="258"/>
+            <ac:spMk id="105" creationId="{5E69A754-1A4C-4BC4-A2DD-34A040EFC65D}"/>
+          </ac:spMkLst>
+        </pc:spChg>
+        <pc:spChg chg="add del">
+          <ac:chgData name="Bryan Khuu" userId="db4bb5bc1a416b49" providerId="Windows Live" clId="Web-{5E92D238-FBDD-49B1-A334-FD695E37C85F}" dt="2020-05-09T21:17:20.131" v="106"/>
+          <ac:spMkLst>
+            <pc:docMk/>
+            <pc:sldMk cId="3964110441" sldId="258"/>
+            <ac:spMk id="106" creationId="{5D7CC766-DF6B-4E3F-8101-8D5F35D4AFFB}"/>
+          </ac:spMkLst>
+        </pc:spChg>
+        <pc:spChg chg="add del">
+          <ac:chgData name="Bryan Khuu" userId="db4bb5bc1a416b49" providerId="Windows Live" clId="Web-{5E92D238-FBDD-49B1-A334-FD695E37C85F}" dt="2020-05-09T21:17:10.179" v="103"/>
+          <ac:spMkLst>
+            <pc:docMk/>
+            <pc:sldMk cId="3964110441" sldId="258"/>
+            <ac:spMk id="108" creationId="{B8D39262-9511-4F20-8344-1B9DA68877A8}"/>
+          </ac:spMkLst>
+        </pc:spChg>
+        <pc:spChg chg="add del">
+          <ac:chgData name="Bryan Khuu" userId="db4bb5bc1a416b49" providerId="Windows Live" clId="Web-{5E92D238-FBDD-49B1-A334-FD695E37C85F}" dt="2020-05-09T21:17:10.179" v="103"/>
+          <ac:spMkLst>
+            <pc:docMk/>
+            <pc:sldMk cId="3964110441" sldId="258"/>
+            <ac:spMk id="109" creationId="{4F924495-5138-4BB6-B18C-C83EC04341D6}"/>
+          </ac:spMkLst>
+        </pc:spChg>
+        <pc:spChg chg="add del">
+          <ac:chgData name="Bryan Khuu" userId="db4bb5bc1a416b49" providerId="Windows Live" clId="Web-{5E92D238-FBDD-49B1-A334-FD695E37C85F}" dt="2020-05-09T21:17:10.179" v="103"/>
+          <ac:spMkLst>
+            <pc:docMk/>
+            <pc:sldMk cId="3964110441" sldId="258"/>
+            <ac:spMk id="110" creationId="{428AFF86-4DDC-4A60-AC4C-48C6DAE56894}"/>
+          </ac:spMkLst>
+        </pc:spChg>
+        <pc:spChg chg="add del">
+          <ac:chgData name="Bryan Khuu" userId="db4bb5bc1a416b49" providerId="Windows Live" clId="Web-{5E92D238-FBDD-49B1-A334-FD695E37C85F}" dt="2020-05-09T21:17:08.256" v="101"/>
+          <ac:spMkLst>
+            <pc:docMk/>
+            <pc:sldMk cId="3964110441" sldId="258"/>
+            <ac:spMk id="111" creationId="{BA4C5437-838C-45F6-BFC8-3AF0ADE30FFB}"/>
+          </ac:spMkLst>
+        </pc:spChg>
+        <pc:spChg chg="add del">
+          <ac:chgData name="Bryan Khuu" userId="db4bb5bc1a416b49" providerId="Windows Live" clId="Web-{5E92D238-FBDD-49B1-A334-FD695E37C85F}" dt="2020-05-09T21:17:20.116" v="105"/>
+          <ac:spMkLst>
+            <pc:docMk/>
+            <pc:sldMk cId="3964110441" sldId="258"/>
+            <ac:spMk id="112" creationId="{1660E788-AFA9-4A1B-9991-6AA74632A15B}"/>
+          </ac:spMkLst>
+        </pc:spChg>
+        <pc:spChg chg="add del">
+          <ac:chgData name="Bryan Khuu" userId="db4bb5bc1a416b49" providerId="Windows Live" clId="Web-{5E92D238-FBDD-49B1-A334-FD695E37C85F}" dt="2020-05-09T21:17:08.256" v="101"/>
+          <ac:spMkLst>
+            <pc:docMk/>
+            <pc:sldMk cId="3964110441" sldId="258"/>
+            <ac:spMk id="113" creationId="{FACBD493-E381-4822-8F8F-A4194DFDB109}"/>
+          </ac:spMkLst>
+        </pc:spChg>
+        <pc:spChg chg="add del">
+          <ac:chgData name="Bryan Khuu" userId="db4bb5bc1a416b49" providerId="Windows Live" clId="Web-{5E92D238-FBDD-49B1-A334-FD695E37C85F}" dt="2020-05-09T21:17:20.116" v="105"/>
+          <ac:spMkLst>
+            <pc:docMk/>
+            <pc:sldMk cId="3964110441" sldId="258"/>
+            <ac:spMk id="114" creationId="{867D4867-5BA7-4462-B2F6-A23F4A622AA7}"/>
+          </ac:spMkLst>
+        </pc:spChg>
+        <pc:spChg chg="add del">
+          <ac:chgData name="Bryan Khuu" userId="db4bb5bc1a416b49" providerId="Windows Live" clId="Web-{5E92D238-FBDD-49B1-A334-FD695E37C85F}" dt="2020-05-09T21:17:08.256" v="101"/>
+          <ac:spMkLst>
+            <pc:docMk/>
+            <pc:sldMk cId="3964110441" sldId="258"/>
+            <ac:spMk id="115" creationId="{2310D9BE-4AD2-4CC3-84FA-4E05790B5B9F}"/>
+          </ac:spMkLst>
+        </pc:spChg>
+        <pc:spChg chg="add del">
+          <ac:chgData name="Bryan Khuu" userId="db4bb5bc1a416b49" providerId="Windows Live" clId="Web-{5E92D238-FBDD-49B1-A334-FD695E37C85F}" dt="2020-05-09T21:20:12.710" v="154"/>
+          <ac:spMkLst>
+            <pc:docMk/>
+            <pc:sldMk cId="3964110441" sldId="258"/>
+            <ac:spMk id="116" creationId="{C315E612-C0A2-4395-B579-9D425FAAC183}"/>
+          </ac:spMkLst>
+        </pc:spChg>
+        <pc:spChg chg="add del">
+          <ac:chgData name="Bryan Khuu" userId="db4bb5bc1a416b49" providerId="Windows Live" clId="Web-{5E92D238-FBDD-49B1-A334-FD695E37C85F}" dt="2020-05-09T21:17:08.256" v="101"/>
+          <ac:spMkLst>
+            <pc:docMk/>
+            <pc:sldMk cId="3964110441" sldId="258"/>
+            <ac:spMk id="117" creationId="{5D7CC766-DF6B-4E3F-8101-8D5F35D4AFFB}"/>
+          </ac:spMkLst>
+        </pc:spChg>
+        <pc:spChg chg="add del">
+          <ac:chgData name="Bryan Khuu" userId="db4bb5bc1a416b49" providerId="Windows Live" clId="Web-{5E92D238-FBDD-49B1-A334-FD695E37C85F}" dt="2020-05-09T21:20:11.444" v="153"/>
+          <ac:spMkLst>
+            <pc:docMk/>
+            <pc:sldMk cId="3964110441" sldId="258"/>
+            <ac:spMk id="119" creationId="{A88B48CE-97F9-4924-96D2-BEAD09D4B7D3}"/>
+          </ac:spMkLst>
+        </pc:spChg>
+        <pc:spChg chg="add del ord">
+          <ac:chgData name="Bryan Khuu" userId="db4bb5bc1a416b49" providerId="Windows Live" clId="Web-{5E92D238-FBDD-49B1-A334-FD695E37C85F}" dt="2020-05-09T21:20:45.819" v="166"/>
+          <ac:spMkLst>
+            <pc:docMk/>
+            <pc:sldMk cId="3964110441" sldId="258"/>
+            <ac:spMk id="121" creationId="{5E69A754-1A4C-4BC4-A2DD-34A040EFC65D}"/>
+          </ac:spMkLst>
+        </pc:spChg>
+        <pc:spChg chg="add del">
+          <ac:chgData name="Bryan Khuu" userId="db4bb5bc1a416b49" providerId="Windows Live" clId="Web-{5E92D238-FBDD-49B1-A334-FD695E37C85F}" dt="2020-05-09T21:20:23.600" v="158"/>
+          <ac:spMkLst>
+            <pc:docMk/>
+            <pc:sldMk cId="3964110441" sldId="258"/>
+            <ac:spMk id="124" creationId="{BA4C5437-838C-45F6-BFC8-3AF0ADE30FFB}"/>
+          </ac:spMkLst>
+        </pc:spChg>
+        <pc:spChg chg="add del">
+          <ac:chgData name="Bryan Khuu" userId="db4bb5bc1a416b49" providerId="Windows Live" clId="Web-{5E92D238-FBDD-49B1-A334-FD695E37C85F}" dt="2020-05-09T21:20:29.085" v="160"/>
+          <ac:spMkLst>
+            <pc:docMk/>
+            <pc:sldMk cId="3964110441" sldId="258"/>
+            <ac:spMk id="125" creationId="{1660E788-AFA9-4A1B-9991-6AA74632A15B}"/>
+          </ac:spMkLst>
+        </pc:spChg>
+        <pc:spChg chg="add del">
+          <ac:chgData name="Bryan Khuu" userId="db4bb5bc1a416b49" providerId="Windows Live" clId="Web-{5E92D238-FBDD-49B1-A334-FD695E37C85F}" dt="2020-05-09T21:20:29.085" v="160"/>
+          <ac:spMkLst>
+            <pc:docMk/>
+            <pc:sldMk cId="3964110441" sldId="258"/>
+            <ac:spMk id="126" creationId="{867D4867-5BA7-4462-B2F6-A23F4A622AA7}"/>
+          </ac:spMkLst>
+        </pc:spChg>
+        <pc:spChg chg="add del">
+          <ac:chgData name="Bryan Khuu" userId="db4bb5bc1a416b49" providerId="Windows Live" clId="Web-{5E92D238-FBDD-49B1-A334-FD695E37C85F}" dt="2020-05-09T21:20:22.647" v="156"/>
+          <ac:spMkLst>
+            <pc:docMk/>
+            <pc:sldMk cId="3964110441" sldId="258"/>
+            <ac:spMk id="127" creationId="{98D49316-27CF-4C3D-BE8C-042F06B89148}"/>
+          </ac:spMkLst>
+        </pc:spChg>
+        <pc:spChg chg="add del">
+          <ac:chgData name="Bryan Khuu" userId="db4bb5bc1a416b49" providerId="Windows Live" clId="Web-{5E92D238-FBDD-49B1-A334-FD695E37C85F}" dt="2020-05-09T21:20:35.381" v="162"/>
+          <ac:spMkLst>
+            <pc:docMk/>
+            <pc:sldMk cId="3964110441" sldId="258"/>
+            <ac:spMk id="128" creationId="{7D587F9F-3F48-4929-8532-62B82B3F66BE}"/>
+          </ac:spMkLst>
+        </pc:spChg>
+        <pc:spChg chg="add del">
+          <ac:chgData name="Bryan Khuu" userId="db4bb5bc1a416b49" providerId="Windows Live" clId="Web-{5E92D238-FBDD-49B1-A334-FD695E37C85F}" dt="2020-05-09T21:20:23.600" v="158"/>
+          <ac:spMkLst>
+            <pc:docMk/>
+            <pc:sldMk cId="3964110441" sldId="258"/>
+            <ac:spMk id="129" creationId="{FACBD493-E381-4822-8F8F-A4194DFDB109}"/>
+          </ac:spMkLst>
+        </pc:spChg>
+        <pc:spChg chg="add del">
+          <ac:chgData name="Bryan Khuu" userId="db4bb5bc1a416b49" providerId="Windows Live" clId="Web-{5E92D238-FBDD-49B1-A334-FD695E37C85F}" dt="2020-05-09T21:20:35.381" v="162"/>
+          <ac:spMkLst>
+            <pc:docMk/>
+            <pc:sldMk cId="3964110441" sldId="258"/>
+            <ac:spMk id="130" creationId="{6DCB66B2-3729-41B6-8A12-AB8550189D5E}"/>
+          </ac:spMkLst>
+        </pc:spChg>
+        <pc:spChg chg="add del">
+          <ac:chgData name="Bryan Khuu" userId="db4bb5bc1a416b49" providerId="Windows Live" clId="Web-{5E92D238-FBDD-49B1-A334-FD695E37C85F}" dt="2020-05-09T21:20:23.600" v="158"/>
+          <ac:spMkLst>
+            <pc:docMk/>
+            <pc:sldMk cId="3964110441" sldId="258"/>
+            <ac:spMk id="131" creationId="{2310D9BE-4AD2-4CC3-84FA-4E05790B5B9F}"/>
+          </ac:spMkLst>
+        </pc:spChg>
+        <pc:spChg chg="add del">
+          <ac:chgData name="Bryan Khuu" userId="db4bb5bc1a416b49" providerId="Windows Live" clId="Web-{5E92D238-FBDD-49B1-A334-FD695E37C85F}" dt="2020-05-09T21:20:35.381" v="162"/>
+          <ac:spMkLst>
+            <pc:docMk/>
+            <pc:sldMk cId="3964110441" sldId="258"/>
+            <ac:spMk id="132" creationId="{ABA662FB-3DC6-4E93-98AC-B84BA41F4859}"/>
+          </ac:spMkLst>
+        </pc:spChg>
+        <pc:spChg chg="add del">
+          <ac:chgData name="Bryan Khuu" userId="db4bb5bc1a416b49" providerId="Windows Live" clId="Web-{5E92D238-FBDD-49B1-A334-FD695E37C85F}" dt="2020-05-09T21:20:23.600" v="158"/>
+          <ac:spMkLst>
+            <pc:docMk/>
+            <pc:sldMk cId="3964110441" sldId="258"/>
+            <ac:spMk id="133" creationId="{5D7CC766-DF6B-4E3F-8101-8D5F35D4AFFB}"/>
+          </ac:spMkLst>
+        </pc:spChg>
+        <pc:spChg chg="add del">
+          <ac:chgData name="Bryan Khuu" userId="db4bb5bc1a416b49" providerId="Windows Live" clId="Web-{5E92D238-FBDD-49B1-A334-FD695E37C85F}" dt="2020-05-09T21:20:35.381" v="162"/>
+          <ac:spMkLst>
+            <pc:docMk/>
+            <pc:sldMk cId="3964110441" sldId="258"/>
+            <ac:spMk id="134" creationId="{FB9BE604-0CC0-41C8-9673-995F82DA0257}"/>
+          </ac:spMkLst>
+        </pc:spChg>
+        <pc:spChg chg="add del">
+          <ac:chgData name="Bryan Khuu" userId="db4bb5bc1a416b49" providerId="Windows Live" clId="Web-{5E92D238-FBDD-49B1-A334-FD695E37C85F}" dt="2020-05-09T21:20:35.381" v="162"/>
+          <ac:spMkLst>
+            <pc:docMk/>
+            <pc:sldMk cId="3964110441" sldId="258"/>
+            <ac:spMk id="135" creationId="{2036372A-822B-498E-AD05-6BE85743A094}"/>
+          </ac:spMkLst>
+        </pc:spChg>
+        <pc:spChg chg="add del">
+          <ac:chgData name="Bryan Khuu" userId="db4bb5bc1a416b49" providerId="Windows Live" clId="Web-{5E92D238-FBDD-49B1-A334-FD695E37C85F}" dt="2020-05-09T21:20:38.930" v="164"/>
+          <ac:spMkLst>
+            <pc:docMk/>
+            <pc:sldMk cId="3964110441" sldId="258"/>
+            <ac:spMk id="136" creationId="{1660E788-AFA9-4A1B-9991-6AA74632A15B}"/>
+          </ac:spMkLst>
+        </pc:spChg>
+        <pc:spChg chg="add del">
+          <ac:chgData name="Bryan Khuu" userId="db4bb5bc1a416b49" providerId="Windows Live" clId="Web-{5E92D238-FBDD-49B1-A334-FD695E37C85F}" dt="2020-05-09T21:20:38.930" v="164"/>
+          <ac:spMkLst>
+            <pc:docMk/>
+            <pc:sldMk cId="3964110441" sldId="258"/>
+            <ac:spMk id="137" creationId="{867D4867-5BA7-4462-B2F6-A23F4A622AA7}"/>
+          </ac:spMkLst>
+        </pc:spChg>
+        <pc:spChg chg="add del">
+          <ac:chgData name="Bryan Khuu" userId="db4bb5bc1a416b49" providerId="Windows Live" clId="Web-{5E92D238-FBDD-49B1-A334-FD695E37C85F}" dt="2020-05-09T21:21:04.881" v="170"/>
+          <ac:spMkLst>
+            <pc:docMk/>
+            <pc:sldMk cId="3964110441" sldId="258"/>
+            <ac:spMk id="138" creationId="{98D49316-27CF-4C3D-BE8C-042F06B89148}"/>
+          </ac:spMkLst>
+        </pc:spChg>
+        <pc:spChg chg="add del">
+          <ac:chgData name="Bryan Khuu" userId="db4bb5bc1a416b49" providerId="Windows Live" clId="Web-{5E92D238-FBDD-49B1-A334-FD695E37C85F}" dt="2020-05-09T21:21:14.991" v="172"/>
+          <ac:spMkLst>
+            <pc:docMk/>
+            <pc:sldMk cId="3964110441" sldId="258"/>
+            <ac:spMk id="139" creationId="{7B9607E2-1C76-424B-8FF0-580615846EC0}"/>
+          </ac:spMkLst>
+        </pc:spChg>
+        <pc:spChg chg="add del">
+          <ac:chgData name="Bryan Khuu" userId="db4bb5bc1a416b49" providerId="Windows Live" clId="Web-{5E92D238-FBDD-49B1-A334-FD695E37C85F}" dt="2020-05-09T21:21:14.991" v="172"/>
+          <ac:spMkLst>
+            <pc:docMk/>
+            <pc:sldMk cId="3964110441" sldId="258"/>
+            <ac:spMk id="140" creationId="{56A668AF-CC37-4641-8D2B-4C91B3ACBC81}"/>
+          </ac:spMkLst>
+        </pc:spChg>
+        <pc:spChg chg="add del">
+          <ac:chgData name="Bryan Khuu" userId="db4bb5bc1a416b49" providerId="Windows Live" clId="Web-{5E92D238-FBDD-49B1-A334-FD695E37C85F}" dt="2020-05-09T21:21:14.991" v="172"/>
+          <ac:spMkLst>
+            <pc:docMk/>
+            <pc:sldMk cId="3964110441" sldId="258"/>
+            <ac:spMk id="141" creationId="{5B3165DC-54F4-4EF5-8B97-5BE55AA3DBE9}"/>
+          </ac:spMkLst>
+        </pc:spChg>
+        <pc:spChg chg="add del">
+          <ac:chgData name="Bryan Khuu" userId="db4bb5bc1a416b49" providerId="Windows Live" clId="Web-{5E92D238-FBDD-49B1-A334-FD695E37C85F}" dt="2020-05-09T21:21:18.569" v="174"/>
+          <ac:spMkLst>
+            <pc:docMk/>
+            <pc:sldMk cId="3964110441" sldId="258"/>
+            <ac:spMk id="142" creationId="{1660E788-AFA9-4A1B-9991-6AA74632A15B}"/>
+          </ac:spMkLst>
+        </pc:spChg>
+        <pc:spChg chg="add del">
+          <ac:chgData name="Bryan Khuu" userId="db4bb5bc1a416b49" providerId="Windows Live" clId="Web-{5E92D238-FBDD-49B1-A334-FD695E37C85F}" dt="2020-05-09T21:21:18.569" v="174"/>
+          <ac:spMkLst>
+            <pc:docMk/>
+            <pc:sldMk cId="3964110441" sldId="258"/>
+            <ac:spMk id="143" creationId="{867D4867-5BA7-4462-B2F6-A23F4A622AA7}"/>
+          </ac:spMkLst>
+        </pc:spChg>
+        <pc:spChg chg="add del">
+          <ac:chgData name="Bryan Khuu" userId="db4bb5bc1a416b49" providerId="Windows Live" clId="Web-{5E92D238-FBDD-49B1-A334-FD695E37C85F}" dt="2020-05-09T21:23:06.803" v="192"/>
+          <ac:spMkLst>
+            <pc:docMk/>
+            <pc:sldMk cId="3964110441" sldId="258"/>
+            <ac:spMk id="144" creationId="{98D49316-27CF-4C3D-BE8C-042F06B89148}"/>
+          </ac:spMkLst>
+        </pc:spChg>
+        <pc:spChg chg="add del">
+          <ac:chgData name="Bryan Khuu" userId="db4bb5bc1a416b49" providerId="Windows Live" clId="Web-{5E92D238-FBDD-49B1-A334-FD695E37C85F}" dt="2020-05-09T21:22:56.585" v="189"/>
+          <ac:spMkLst>
+            <pc:docMk/>
+            <pc:sldMk cId="3964110441" sldId="258"/>
+            <ac:spMk id="146" creationId="{98D49316-27CF-4C3D-BE8C-042F06B89148}"/>
+          </ac:spMkLst>
+        </pc:spChg>
+        <pc:spChg chg="add del">
+          <ac:chgData name="Bryan Khuu" userId="db4bb5bc1a416b49" providerId="Windows Live" clId="Web-{5E92D238-FBDD-49B1-A334-FD695E37C85F}" dt="2020-05-09T21:23:39.960" v="204"/>
+          <ac:spMkLst>
+            <pc:docMk/>
+            <pc:sldMk cId="3964110441" sldId="258"/>
+            <ac:spMk id="148" creationId="{1660E788-AFA9-4A1B-9991-6AA74632A15B}"/>
+          </ac:spMkLst>
+        </pc:spChg>
+        <pc:spChg chg="add del">
+          <ac:chgData name="Bryan Khuu" userId="db4bb5bc1a416b49" providerId="Windows Live" clId="Web-{5E92D238-FBDD-49B1-A334-FD695E37C85F}" dt="2020-05-09T21:22:47.241" v="183"/>
+          <ac:spMkLst>
+            <pc:docMk/>
+            <pc:sldMk cId="3964110441" sldId="258"/>
+            <ac:spMk id="149" creationId="{98D49316-27CF-4C3D-BE8C-042F06B89148}"/>
+          </ac:spMkLst>
+        </pc:spChg>
+        <pc:spChg chg="add del">
+          <ac:chgData name="Bryan Khuu" userId="db4bb5bc1a416b49" providerId="Windows Live" clId="Web-{5E92D238-FBDD-49B1-A334-FD695E37C85F}" dt="2020-05-09T21:23:39.960" v="204"/>
+          <ac:spMkLst>
+            <pc:docMk/>
+            <pc:sldMk cId="3964110441" sldId="258"/>
+            <ac:spMk id="150" creationId="{867D4867-5BA7-4462-B2F6-A23F4A622AA7}"/>
+          </ac:spMkLst>
+        </pc:spChg>
+        <pc:spChg chg="add del">
+          <ac:chgData name="Bryan Khuu" userId="db4bb5bc1a416b49" providerId="Windows Live" clId="Web-{5E92D238-FBDD-49B1-A334-FD695E37C85F}" dt="2020-05-09T21:23:45.413" v="206"/>
+          <ac:spMkLst>
+            <pc:docMk/>
+            <pc:sldMk cId="3964110441" sldId="258"/>
+            <ac:spMk id="151" creationId="{1660E788-AFA9-4A1B-9991-6AA74632A15B}"/>
+          </ac:spMkLst>
+        </pc:spChg>
+        <pc:spChg chg="add del">
+          <ac:chgData name="Bryan Khuu" userId="db4bb5bc1a416b49" providerId="Windows Live" clId="Web-{5E92D238-FBDD-49B1-A334-FD695E37C85F}" dt="2020-05-09T21:23:45.413" v="206"/>
+          <ac:spMkLst>
+            <pc:docMk/>
+            <pc:sldMk cId="3964110441" sldId="258"/>
+            <ac:spMk id="152" creationId="{867D4867-5BA7-4462-B2F6-A23F4A622AA7}"/>
+          </ac:spMkLst>
+        </pc:spChg>
+        <pc:picChg chg="del mod ord">
+          <ac:chgData name="Bryan Khuu" userId="db4bb5bc1a416b49" providerId="Windows Live" clId="Web-{5E92D238-FBDD-49B1-A334-FD695E37C85F}" dt="2020-05-09T21:17:55.960" v="119"/>
+          <ac:picMkLst>
+            <pc:docMk/>
+            <pc:sldMk cId="3964110441" sldId="258"/>
+            <ac:picMk id="5" creationId="{A4958B17-BD18-4486-A553-006D964DC15F}"/>
+          </ac:picMkLst>
+        </pc:picChg>
+        <pc:picChg chg="del mod ord">
+          <ac:chgData name="Bryan Khuu" userId="db4bb5bc1a416b49" providerId="Windows Live" clId="Web-{5E92D238-FBDD-49B1-A334-FD695E37C85F}" dt="2020-05-09T21:17:54.131" v="118"/>
+          <ac:picMkLst>
+            <pc:docMk/>
+            <pc:sldMk cId="3964110441" sldId="258"/>
+            <ac:picMk id="8" creationId="{08A9CD7F-3765-4AAE-999A-38156C29B389}"/>
+          </ac:picMkLst>
+        </pc:picChg>
+        <pc:picChg chg="del mod ord">
+          <ac:chgData name="Bryan Khuu" userId="db4bb5bc1a416b49" providerId="Windows Live" clId="Web-{5E92D238-FBDD-49B1-A334-FD695E37C85F}" dt="2020-05-09T21:18:26.694" v="134"/>
+          <ac:picMkLst>
+            <pc:docMk/>
+            <pc:sldMk cId="3964110441" sldId="258"/>
+            <ac:picMk id="9" creationId="{F2F87F3E-3CE9-4392-A054-9B488E1066F8}"/>
+          </ac:picMkLst>
+        </pc:picChg>
+        <pc:picChg chg="add del mod">
+          <ac:chgData name="Bryan Khuu" userId="db4bb5bc1a416b49" providerId="Windows Live" clId="Web-{5E92D238-FBDD-49B1-A334-FD695E37C85F}" dt="2020-05-09T21:18:27.850" v="135"/>
+          <ac:picMkLst>
+            <pc:docMk/>
+            <pc:sldMk cId="3964110441" sldId="258"/>
+            <ac:picMk id="99" creationId="{95A42C80-418C-40FA-A646-5A29D097819E}"/>
+          </ac:picMkLst>
+        </pc:picChg>
+        <pc:picChg chg="add del mod">
+          <ac:chgData name="Bryan Khuu" userId="db4bb5bc1a416b49" providerId="Windows Live" clId="Web-{5E92D238-FBDD-49B1-A334-FD695E37C85F}" dt="2020-05-09T21:18:26.694" v="133"/>
+          <ac:picMkLst>
+            <pc:docMk/>
+            <pc:sldMk cId="3964110441" sldId="258"/>
+            <ac:picMk id="103" creationId="{B120DFB6-572B-4517-8F76-40D6E3220125}"/>
+          </ac:picMkLst>
+        </pc:picChg>
+        <pc:picChg chg="add del mod">
+          <ac:chgData name="Bryan Khuu" userId="db4bb5bc1a416b49" providerId="Windows Live" clId="Web-{5E92D238-FBDD-49B1-A334-FD695E37C85F}" dt="2020-05-09T21:18:26.694" v="132"/>
+          <ac:picMkLst>
+            <pc:docMk/>
+            <pc:sldMk cId="3964110441" sldId="258"/>
+            <ac:picMk id="107" creationId="{BC49460F-BD53-4D14-8183-4899D4E3687C}"/>
+          </ac:picMkLst>
+        </pc:picChg>
+        <pc:picChg chg="add del mod ord">
+          <ac:chgData name="Bryan Khuu" userId="db4bb5bc1a416b49" providerId="Windows Live" clId="Web-{5E92D238-FBDD-49B1-A334-FD695E37C85F}" dt="2020-05-09T22:01:58.833" v="550"/>
+          <ac:picMkLst>
+            <pc:docMk/>
+            <pc:sldMk cId="3964110441" sldId="258"/>
+            <ac:picMk id="118" creationId="{95A42C80-418C-40FA-A646-5A29D097819E}"/>
+          </ac:picMkLst>
+        </pc:picChg>
+        <pc:picChg chg="add del mod ord modCrop">
+          <ac:chgData name="Bryan Khuu" userId="db4bb5bc1a416b49" providerId="Windows Live" clId="Web-{5E92D238-FBDD-49B1-A334-FD695E37C85F}" dt="2020-05-09T22:02:00.474" v="551" actId="1076"/>
+          <ac:picMkLst>
+            <pc:docMk/>
+            <pc:sldMk cId="3964110441" sldId="258"/>
+            <ac:picMk id="120" creationId="{B120DFB6-572B-4517-8F76-40D6E3220125}"/>
+          </ac:picMkLst>
+        </pc:picChg>
+        <pc:picChg chg="add del mod ord modCrop">
+          <ac:chgData name="Bryan Khuu" userId="db4bb5bc1a416b49" providerId="Windows Live" clId="Web-{5E92D238-FBDD-49B1-A334-FD695E37C85F}" dt="2020-05-09T22:02:01.864" v="552" actId="1076"/>
+          <ac:picMkLst>
+            <pc:docMk/>
+            <pc:sldMk cId="3964110441" sldId="258"/>
+            <ac:picMk id="122" creationId="{BC49460F-BD53-4D14-8183-4899D4E3687C}"/>
+          </ac:picMkLst>
+        </pc:picChg>
+        <pc:picChg chg="add del mod">
+          <ac:chgData name="Bryan Khuu" userId="db4bb5bc1a416b49" providerId="Windows Live" clId="Web-{5E92D238-FBDD-49B1-A334-FD695E37C85F}" dt="2020-05-09T21:23:24.553" v="202"/>
+          <ac:picMkLst>
+            <pc:docMk/>
+            <pc:sldMk cId="3964110441" sldId="258"/>
+            <ac:picMk id="145" creationId="{71A3090E-2821-4DB7-A1FB-7B518579FF8A}"/>
+          </ac:picMkLst>
+        </pc:picChg>
+        <pc:picChg chg="add del mod">
+          <ac:chgData name="Bryan Khuu" userId="db4bb5bc1a416b49" providerId="Windows Live" clId="Web-{5E92D238-FBDD-49B1-A334-FD695E37C85F}" dt="2020-05-09T21:23:24.553" v="201"/>
+          <ac:picMkLst>
+            <pc:docMk/>
+            <pc:sldMk cId="3964110441" sldId="258"/>
+            <ac:picMk id="147" creationId="{5CD731E1-4CF8-4839-A05E-00E2AC11644B}"/>
+          </ac:picMkLst>
+        </pc:picChg>
+        <pc:picChg chg="add del">
+          <ac:chgData name="Bryan Khuu" userId="db4bb5bc1a416b49" providerId="Windows Live" clId="Web-{5E92D238-FBDD-49B1-A334-FD695E37C85F}" dt="2020-05-09T21:23:50.913" v="208"/>
+          <ac:picMkLst>
+            <pc:docMk/>
+            <pc:sldMk cId="3964110441" sldId="258"/>
+            <ac:picMk id="153" creationId="{48E20A91-1782-4B1D-B655-65530A6C3286}"/>
+          </ac:picMkLst>
+        </pc:picChg>
+      </pc:sldChg>
+      <pc:sldChg chg="addSp delSp modSp new mod setBg">
+        <pc:chgData name="Bryan Khuu" userId="db4bb5bc1a416b49" providerId="Windows Live" clId="Web-{5E92D238-FBDD-49B1-A334-FD695E37C85F}" dt="2020-05-09T22:12:28.294" v="683" actId="20577"/>
+        <pc:sldMkLst>
+          <pc:docMk/>
+          <pc:sldMk cId="865442861" sldId="259"/>
+        </pc:sldMkLst>
+        <pc:spChg chg="mod">
+          <ac:chgData name="Bryan Khuu" userId="db4bb5bc1a416b49" providerId="Windows Live" clId="Web-{5E92D238-FBDD-49B1-A334-FD695E37C85F}" dt="2020-05-09T22:10:58.243" v="670"/>
+          <ac:spMkLst>
+            <pc:docMk/>
+            <pc:sldMk cId="865442861" sldId="259"/>
+            <ac:spMk id="2" creationId="{69611A84-1B73-45B8-9EE1-200D3F0E0A31}"/>
+          </ac:spMkLst>
+        </pc:spChg>
+        <pc:spChg chg="add del mod">
+          <ac:chgData name="Bryan Khuu" userId="db4bb5bc1a416b49" providerId="Windows Live" clId="Web-{5E92D238-FBDD-49B1-A334-FD695E37C85F}" dt="2020-05-09T22:12:28.294" v="683" actId="20577"/>
+          <ac:spMkLst>
+            <pc:docMk/>
+            <pc:sldMk cId="865442861" sldId="259"/>
+            <ac:spMk id="3" creationId="{5E690586-63ED-43F1-8E09-6E19CB05937F}"/>
+          </ac:spMkLst>
+        </pc:spChg>
+        <pc:spChg chg="add">
+          <ac:chgData name="Bryan Khuu" userId="db4bb5bc1a416b49" providerId="Windows Live" clId="Web-{5E92D238-FBDD-49B1-A334-FD695E37C85F}" dt="2020-05-09T22:10:58.243" v="670"/>
+          <ac:spMkLst>
+            <pc:docMk/>
+            <pc:sldMk cId="865442861" sldId="259"/>
+            <ac:spMk id="8" creationId="{BAC87F6E-526A-49B5-995D-42DB656594C9}"/>
+          </ac:spMkLst>
+        </pc:spChg>
+        <pc:spChg chg="add">
+          <ac:chgData name="Bryan Khuu" userId="db4bb5bc1a416b49" providerId="Windows Live" clId="Web-{5E92D238-FBDD-49B1-A334-FD695E37C85F}" dt="2020-05-09T22:10:58.243" v="670"/>
+          <ac:spMkLst>
+            <pc:docMk/>
+            <pc:sldMk cId="865442861" sldId="259"/>
+            <ac:spMk id="10" creationId="{5E5436DB-4E8B-43A5-AE55-1C527B62E203}"/>
+          </ac:spMkLst>
+        </pc:spChg>
+        <pc:spChg chg="add">
+          <ac:chgData name="Bryan Khuu" userId="db4bb5bc1a416b49" providerId="Windows Live" clId="Web-{5E92D238-FBDD-49B1-A334-FD695E37C85F}" dt="2020-05-09T22:10:58.243" v="670"/>
+          <ac:spMkLst>
+            <pc:docMk/>
+            <pc:sldMk cId="865442861" sldId="259"/>
+            <ac:spMk id="12" creationId="{0D65299F-028F-4AFC-B46A-8DB33E20FE4A}"/>
+          </ac:spMkLst>
+        </pc:spChg>
+      </pc:sldChg>
+      <pc:sldChg chg="addSp delSp modSp new">
+        <pc:chgData name="Bryan Khuu" userId="db4bb5bc1a416b49" providerId="Windows Live" clId="Web-{5E92D238-FBDD-49B1-A334-FD695E37C85F}" dt="2020-05-09T22:09:25.630" v="633" actId="20577"/>
+        <pc:sldMkLst>
+          <pc:docMk/>
+          <pc:sldMk cId="3876366827" sldId="260"/>
+        </pc:sldMkLst>
+        <pc:spChg chg="mod">
+          <ac:chgData name="Bryan Khuu" userId="db4bb5bc1a416b49" providerId="Windows Live" clId="Web-{5E92D238-FBDD-49B1-A334-FD695E37C85F}" dt="2020-05-09T22:09:25.630" v="633" actId="20577"/>
+          <ac:spMkLst>
+            <pc:docMk/>
+            <pc:sldMk cId="3876366827" sldId="260"/>
+            <ac:spMk id="2" creationId="{7AA60957-65FD-4982-8D07-2A080F0DFBC4}"/>
+          </ac:spMkLst>
+        </pc:spChg>
+        <pc:spChg chg="del">
+          <ac:chgData name="Bryan Khuu" userId="db4bb5bc1a416b49" providerId="Windows Live" clId="Web-{5E92D238-FBDD-49B1-A334-FD695E37C85F}" dt="2020-05-09T22:04:06.150" v="573"/>
+          <ac:spMkLst>
+            <pc:docMk/>
+            <pc:sldMk cId="3876366827" sldId="260"/>
+            <ac:spMk id="3" creationId="{7866AB8E-4D2A-43E8-92AD-DDF5489DDB0B}"/>
+          </ac:spMkLst>
+        </pc:spChg>
+        <pc:picChg chg="add mod ord">
+          <ac:chgData name="Bryan Khuu" userId="db4bb5bc1a416b49" providerId="Windows Live" clId="Web-{5E92D238-FBDD-49B1-A334-FD695E37C85F}" dt="2020-05-09T22:05:08.183" v="587" actId="1076"/>
+          <ac:picMkLst>
+            <pc:docMk/>
+            <pc:sldMk cId="3876366827" sldId="260"/>
+            <ac:picMk id="4" creationId="{1C779644-2880-48A0-B7ED-BC65315AC221}"/>
+          </ac:picMkLst>
+        </pc:picChg>
+        <pc:picChg chg="add mod">
+          <ac:chgData name="Bryan Khuu" userId="db4bb5bc1a416b49" providerId="Windows Live" clId="Web-{5E92D238-FBDD-49B1-A334-FD695E37C85F}" dt="2020-05-09T22:05:14.575" v="588" actId="1076"/>
+          <ac:picMkLst>
+            <pc:docMk/>
+            <pc:sldMk cId="3876366827" sldId="260"/>
+            <ac:picMk id="6" creationId="{18FCD283-6F3B-46B1-ABD3-4B677E8895AF}"/>
+          </ac:picMkLst>
+        </pc:picChg>
+      </pc:sldChg>
+      <pc:sldChg chg="addSp delSp modSp new mod setBg">
+        <pc:chgData name="Bryan Khuu" userId="db4bb5bc1a416b49" providerId="Windows Live" clId="Web-{5E92D238-FBDD-49B1-A334-FD695E37C85F}" dt="2020-05-09T22:22:54.739" v="735"/>
+        <pc:sldMkLst>
+          <pc:docMk/>
+          <pc:sldMk cId="2127869669" sldId="261"/>
+        </pc:sldMkLst>
+        <pc:spChg chg="mod">
+          <ac:chgData name="Bryan Khuu" userId="db4bb5bc1a416b49" providerId="Windows Live" clId="Web-{5E92D238-FBDD-49B1-A334-FD695E37C85F}" dt="2020-05-09T22:19:27.700" v="722" actId="1076"/>
+          <ac:spMkLst>
+            <pc:docMk/>
+            <pc:sldMk cId="2127869669" sldId="261"/>
+            <ac:spMk id="2" creationId="{D168774E-B68F-4891-8DD8-A6AF537C5F93}"/>
+          </ac:spMkLst>
+        </pc:spChg>
+        <pc:spChg chg="del">
+          <ac:chgData name="Bryan Khuu" userId="db4bb5bc1a416b49" providerId="Windows Live" clId="Web-{5E92D238-FBDD-49B1-A334-FD695E37C85F}" dt="2020-05-09T22:15:30.941" v="694"/>
+          <ac:spMkLst>
+            <pc:docMk/>
+            <pc:sldMk cId="2127869669" sldId="261"/>
+            <ac:spMk id="3" creationId="{0FEA8D3C-5991-400C-8FB6-CF61EDF9DE83}"/>
+          </ac:spMkLst>
+        </pc:spChg>
+        <pc:spChg chg="add del mod">
+          <ac:chgData name="Bryan Khuu" userId="db4bb5bc1a416b49" providerId="Windows Live" clId="Web-{5E92D238-FBDD-49B1-A334-FD695E37C85F}" dt="2020-05-09T22:18:43.698" v="713"/>
+          <ac:spMkLst>
+            <pc:docMk/>
+            <pc:sldMk cId="2127869669" sldId="261"/>
+            <ac:spMk id="9" creationId="{3C25BF41-D46C-417D-BCBC-0AD3592F7296}"/>
+          </ac:spMkLst>
+        </pc:spChg>
+        <pc:picChg chg="add del mod ord">
+          <ac:chgData name="Bryan Khuu" userId="db4bb5bc1a416b49" providerId="Windows Live" clId="Web-{5E92D238-FBDD-49B1-A334-FD695E37C85F}" dt="2020-05-09T22:18:04.619" v="712"/>
+          <ac:picMkLst>
+            <pc:docMk/>
+            <pc:sldMk cId="2127869669" sldId="261"/>
+            <ac:picMk id="4" creationId="{98FECB70-1975-4501-80E5-1F9D6E7FB746}"/>
+          </ac:picMkLst>
+        </pc:picChg>
+        <pc:picChg chg="add mod">
+          <ac:chgData name="Bryan Khuu" userId="db4bb5bc1a416b49" providerId="Windows Live" clId="Web-{5E92D238-FBDD-49B1-A334-FD695E37C85F}" dt="2020-05-09T22:19:27.731" v="723" actId="1076"/>
+          <ac:picMkLst>
+            <pc:docMk/>
+            <pc:sldMk cId="2127869669" sldId="261"/>
+            <ac:picMk id="6" creationId="{B9457002-F5E2-401C-B7E6-0F02D7298594}"/>
+          </ac:picMkLst>
+        </pc:picChg>
+        <pc:picChg chg="add mod ord">
+          <ac:chgData name="Bryan Khuu" userId="db4bb5bc1a416b49" providerId="Windows Live" clId="Web-{5E92D238-FBDD-49B1-A334-FD695E37C85F}" dt="2020-05-09T22:21:57.408" v="734" actId="1076"/>
+          <ac:picMkLst>
+            <pc:docMk/>
+            <pc:sldMk cId="2127869669" sldId="261"/>
+            <ac:picMk id="10" creationId="{81337A89-EF35-4F29-BBA1-142B06FF1E82}"/>
           </ac:picMkLst>
         </pc:picChg>
       </pc:sldChg>
@@ -5446,7 +5534,7 @@
           <a:p>
             <a:fld id="{49B0B5E5-BA20-46CE-BF64-A5F8E51168E5}" type="slidenum">
               <a:rPr lang="en-US"/>
-              <a:t>‹#›</a:t>
+              <a:t>8</a:t>
             </a:fld>
             <a:endParaRPr lang="en-US"/>
           </a:p>
@@ -8766,6 +8854,86 @@
 </p:sld>
 </file>
 
+<file path=ppt/slides/slide10.xml><?xml version="1.0" encoding="utf-8"?>
+<p:sld xmlns:a="http://schemas.openxmlformats.org/drawingml/2006/main" xmlns:r="http://schemas.openxmlformats.org/officeDocument/2006/relationships" xmlns:p="http://schemas.openxmlformats.org/presentationml/2006/main">
+  <p:cSld>
+    <p:spTree>
+      <p:nvGrpSpPr>
+        <p:cNvPr id="1" name=""/>
+        <p:cNvGrpSpPr/>
+        <p:nvPr/>
+      </p:nvGrpSpPr>
+      <p:grpSpPr>
+        <a:xfrm>
+          <a:off x="0" y="0"/>
+          <a:ext cx="0" cy="0"/>
+          <a:chOff x="0" y="0"/>
+          <a:chExt cx="0" cy="0"/>
+        </a:xfrm>
+      </p:grpSpPr>
+      <p:sp>
+        <p:nvSpPr>
+          <p:cNvPr id="2" name="Title 1">
+            <a:extLst>
+              <a:ext uri="{FF2B5EF4-FFF2-40B4-BE49-F238E27FC236}">
+                <a16:creationId xmlns:a16="http://schemas.microsoft.com/office/drawing/2014/main" id="{5319C89A-A279-44E4-9C55-635A3C6FAB03}"/>
+              </a:ext>
+            </a:extLst>
+          </p:cNvPr>
+          <p:cNvSpPr>
+            <a:spLocks noGrp="1"/>
+          </p:cNvSpPr>
+          <p:nvPr>
+            <p:ph type="title"/>
+          </p:nvPr>
+        </p:nvSpPr>
+        <p:spPr/>
+        <p:txBody>
+          <a:bodyPr/>
+          <a:lstStyle/>
+          <a:p>
+            <a:endParaRPr lang="en-US"/>
+          </a:p>
+        </p:txBody>
+      </p:sp>
+      <p:sp>
+        <p:nvSpPr>
+          <p:cNvPr id="3" name="Content Placeholder 2">
+            <a:extLst>
+              <a:ext uri="{FF2B5EF4-FFF2-40B4-BE49-F238E27FC236}">
+                <a16:creationId xmlns:a16="http://schemas.microsoft.com/office/drawing/2014/main" id="{1E204170-A666-4879-8A5B-C539B5D4CDBA}"/>
+              </a:ext>
+            </a:extLst>
+          </p:cNvPr>
+          <p:cNvSpPr>
+            <a:spLocks noGrp="1"/>
+          </p:cNvSpPr>
+          <p:nvPr>
+            <p:ph idx="1"/>
+          </p:nvPr>
+        </p:nvSpPr>
+        <p:spPr/>
+        <p:txBody>
+          <a:bodyPr/>
+          <a:lstStyle/>
+          <a:p>
+            <a:endParaRPr lang="en-US"/>
+          </a:p>
+        </p:txBody>
+      </p:sp>
+    </p:spTree>
+    <p:extLst>
+      <p:ext uri="{BB962C8B-B14F-4D97-AF65-F5344CB8AC3E}">
+        <p14:creationId xmlns:p14="http://schemas.microsoft.com/office/powerpoint/2010/main" val="253110941"/>
+      </p:ext>
+    </p:extLst>
+  </p:cSld>
+  <p:clrMapOvr>
+    <a:masterClrMapping/>
+  </p:clrMapOvr>
+</p:sld>
+</file>
+
 <file path=ppt/slides/slide2.xml><?xml version="1.0" encoding="utf-8"?>
 <p:sld xmlns:a="http://schemas.openxmlformats.org/drawingml/2006/main" xmlns:r="http://schemas.openxmlformats.org/officeDocument/2006/relationships" xmlns:p="http://schemas.openxmlformats.org/presentationml/2006/main">
   <p:cSld>
@@ -9231,6 +9399,163 @@
 <file path=ppt/slides/slide4.xml><?xml version="1.0" encoding="utf-8"?>
 <p:sld xmlns:a="http://schemas.openxmlformats.org/drawingml/2006/main" xmlns:r="http://schemas.openxmlformats.org/officeDocument/2006/relationships" xmlns:p="http://schemas.openxmlformats.org/presentationml/2006/main">
   <p:cSld>
+    <p:spTree>
+      <p:nvGrpSpPr>
+        <p:cNvPr id="1" name=""/>
+        <p:cNvGrpSpPr/>
+        <p:nvPr/>
+      </p:nvGrpSpPr>
+      <p:grpSpPr>
+        <a:xfrm>
+          <a:off x="0" y="0"/>
+          <a:ext cx="0" cy="0"/>
+          <a:chOff x="0" y="0"/>
+          <a:chExt cx="0" cy="0"/>
+        </a:xfrm>
+      </p:grpSpPr>
+      <p:sp>
+        <p:nvSpPr>
+          <p:cNvPr id="2" name="Title 1">
+            <a:extLst>
+              <a:ext uri="{FF2B5EF4-FFF2-40B4-BE49-F238E27FC236}">
+                <a16:creationId xmlns:a16="http://schemas.microsoft.com/office/drawing/2014/main" id="{16C4DA88-18B7-4FF5-BA75-8EE2831DCCD0}"/>
+              </a:ext>
+            </a:extLst>
+          </p:cNvPr>
+          <p:cNvSpPr>
+            <a:spLocks noGrp="1"/>
+          </p:cNvSpPr>
+          <p:nvPr>
+            <p:ph type="title"/>
+          </p:nvPr>
+        </p:nvSpPr>
+        <p:spPr>
+          <a:xfrm>
+            <a:off x="2231136" y="260201"/>
+            <a:ext cx="7729728" cy="1188720"/>
+          </a:xfrm>
+        </p:spPr>
+        <p:txBody>
+          <a:bodyPr/>
+          <a:lstStyle/>
+          <a:p>
+            <a:r>
+              <a:rPr lang="en-US"/>
+              <a:t>Machine Supervised Learning</a:t>
+            </a:r>
+          </a:p>
+        </p:txBody>
+      </p:sp>
+      <p:pic>
+        <p:nvPicPr>
+          <p:cNvPr id="13" name="Picture 13" descr="A close up of a computer&#10;&#10;Description generated with high confidence">
+            <a:extLst>
+              <a:ext uri="{FF2B5EF4-FFF2-40B4-BE49-F238E27FC236}">
+                <a16:creationId xmlns:a16="http://schemas.microsoft.com/office/drawing/2014/main" id="{C5353CF5-556B-4850-8712-232318E33CA0}"/>
+              </a:ext>
+            </a:extLst>
+          </p:cNvPr>
+          <p:cNvPicPr>
+            <a:picLocks noGrp="1" noChangeAspect="1"/>
+          </p:cNvPicPr>
+          <p:nvPr>
+            <p:ph idx="1"/>
+          </p:nvPr>
+        </p:nvPicPr>
+        <p:blipFill>
+          <a:blip r:embed="rId2"/>
+          <a:stretch>
+            <a:fillRect/>
+          </a:stretch>
+        </p:blipFill>
+        <p:spPr>
+          <a:xfrm>
+            <a:off x="2229838" y="1710199"/>
+            <a:ext cx="3419115" cy="4698880"/>
+          </a:xfrm>
+        </p:spPr>
+      </p:pic>
+      <p:sp>
+        <p:nvSpPr>
+          <p:cNvPr id="12" name="TextBox 11">
+            <a:extLst>
+              <a:ext uri="{FF2B5EF4-FFF2-40B4-BE49-F238E27FC236}">
+                <a16:creationId xmlns:a16="http://schemas.microsoft.com/office/drawing/2014/main" id="{48ED2522-702A-4CE6-B734-AF775958B003}"/>
+              </a:ext>
+            </a:extLst>
+          </p:cNvPr>
+          <p:cNvSpPr txBox="1"/>
+          <p:nvPr/>
+        </p:nvSpPr>
+        <p:spPr>
+          <a:xfrm>
+            <a:off x="4724400" y="3200400"/>
+            <a:ext cx="2743200" cy="369332"/>
+          </a:xfrm>
+          <a:prstGeom prst="rect">
+            <a:avLst/>
+          </a:prstGeom>
+          <a:noFill/>
+        </p:spPr>
+        <p:txBody>
+          <a:bodyPr rot="0" spcFirstLastPara="0" vertOverflow="overflow" horzOverflow="overflow" vert="horz" wrap="square" lIns="91440" tIns="45720" rIns="91440" bIns="45720" numCol="1" spcCol="0" rtlCol="0" fromWordArt="0" anchor="t" anchorCtr="0" forceAA="0" compatLnSpc="1">
+            <a:prstTxWarp prst="textNoShape">
+              <a:avLst/>
+            </a:prstTxWarp>
+            <a:spAutoFit/>
+          </a:bodyPr>
+          <a:lstStyle/>
+          <a:p>
+            <a:endParaRPr lang="en-US"/>
+          </a:p>
+        </p:txBody>
+      </p:sp>
+      <p:pic>
+        <p:nvPicPr>
+          <p:cNvPr id="15" name="Picture 15" descr="A screenshot of a computer&#10;&#10;Description generated with high confidence">
+            <a:extLst>
+              <a:ext uri="{FF2B5EF4-FFF2-40B4-BE49-F238E27FC236}">
+                <a16:creationId xmlns:a16="http://schemas.microsoft.com/office/drawing/2014/main" id="{BCA5E616-F0F3-4494-8A81-F2A755EB2B91}"/>
+              </a:ext>
+            </a:extLst>
+          </p:cNvPr>
+          <p:cNvPicPr>
+            <a:picLocks noChangeAspect="1"/>
+          </p:cNvPicPr>
+          <p:nvPr/>
+        </p:nvPicPr>
+        <p:blipFill>
+          <a:blip r:embed="rId3"/>
+          <a:stretch>
+            <a:fillRect/>
+          </a:stretch>
+        </p:blipFill>
+        <p:spPr>
+          <a:xfrm>
+            <a:off x="6806242" y="1717016"/>
+            <a:ext cx="3151516" cy="4689175"/>
+          </a:xfrm>
+          <a:prstGeom prst="rect">
+            <a:avLst/>
+          </a:prstGeom>
+        </p:spPr>
+      </p:pic>
+    </p:spTree>
+    <p:extLst>
+      <p:ext uri="{BB962C8B-B14F-4D97-AF65-F5344CB8AC3E}">
+        <p14:creationId xmlns:p14="http://schemas.microsoft.com/office/powerpoint/2010/main" val="2909226165"/>
+      </p:ext>
+    </p:extLst>
+  </p:cSld>
+  <p:clrMapOvr>
+    <a:masterClrMapping/>
+  </p:clrMapOvr>
+</p:sld>
+</file>
+
+<file path=ppt/slides/slide5.xml><?xml version="1.0" encoding="utf-8"?>
+<p:sld xmlns:a="http://schemas.openxmlformats.org/drawingml/2006/main" xmlns:r="http://schemas.openxmlformats.org/officeDocument/2006/relationships" xmlns:p="http://schemas.openxmlformats.org/presentationml/2006/main">
+  <p:cSld>
     <p:bg>
       <p:bgPr>
         <a:solidFill>
@@ -9800,7 +10125,7 @@
 </p:sld>
 </file>
 
-<file path=ppt/slides/slide5.xml><?xml version="1.0" encoding="utf-8"?>
+<file path=ppt/slides/slide6.xml><?xml version="1.0" encoding="utf-8"?>
 <p:sld xmlns:a="http://schemas.openxmlformats.org/drawingml/2006/main" xmlns:r="http://schemas.openxmlformats.org/officeDocument/2006/relationships" xmlns:p="http://schemas.openxmlformats.org/presentationml/2006/main">
   <p:cSld>
     <p:bg>
@@ -9903,7 +10228,7 @@
 </p:sld>
 </file>
 
-<file path=ppt/slides/slide6.xml><?xml version="1.0" encoding="utf-8"?>
+<file path=ppt/slides/slide7.xml><?xml version="1.0" encoding="utf-8"?>
 <p:sld xmlns:a="http://schemas.openxmlformats.org/drawingml/2006/main" xmlns:r="http://schemas.openxmlformats.org/officeDocument/2006/relationships" xmlns:p="http://schemas.openxmlformats.org/presentationml/2006/main">
   <p:cSld>
     <p:bg>
@@ -10009,7 +10334,7 @@
 </p:sld>
 </file>
 
-<file path=ppt/slides/slide7.xml><?xml version="1.0" encoding="utf-8"?>
+<file path=ppt/slides/slide8.xml><?xml version="1.0" encoding="utf-8"?>
 <p:sld xmlns:a="http://schemas.openxmlformats.org/drawingml/2006/main" xmlns:r="http://schemas.openxmlformats.org/officeDocument/2006/relationships" xmlns:p="http://schemas.openxmlformats.org/presentationml/2006/main">
   <p:cSld>
     <p:bg>
@@ -10282,7 +10607,7 @@
 </p:sld>
 </file>
 
-<file path=ppt/slides/slide8.xml><?xml version="1.0" encoding="utf-8"?>
+<file path=ppt/slides/slide9.xml><?xml version="1.0" encoding="utf-8"?>
 <p:sld xmlns:a="http://schemas.openxmlformats.org/drawingml/2006/main" xmlns:r="http://schemas.openxmlformats.org/officeDocument/2006/relationships" xmlns:p="http://schemas.openxmlformats.org/presentationml/2006/main">
   <p:cSld>
     <p:spTree>
@@ -10396,86 +10721,6 @@
     <p:extLst>
       <p:ext uri="{BB962C8B-B14F-4D97-AF65-F5344CB8AC3E}">
         <p14:creationId xmlns:p14="http://schemas.microsoft.com/office/powerpoint/2010/main" val="1265264582"/>
-      </p:ext>
-    </p:extLst>
-  </p:cSld>
-  <p:clrMapOvr>
-    <a:masterClrMapping/>
-  </p:clrMapOvr>
-</p:sld>
-</file>
-
-<file path=ppt/slides/slide9.xml><?xml version="1.0" encoding="utf-8"?>
-<p:sld xmlns:a="http://schemas.openxmlformats.org/drawingml/2006/main" xmlns:r="http://schemas.openxmlformats.org/officeDocument/2006/relationships" xmlns:p="http://schemas.openxmlformats.org/presentationml/2006/main">
-  <p:cSld>
-    <p:spTree>
-      <p:nvGrpSpPr>
-        <p:cNvPr id="1" name=""/>
-        <p:cNvGrpSpPr/>
-        <p:nvPr/>
-      </p:nvGrpSpPr>
-      <p:grpSpPr>
-        <a:xfrm>
-          <a:off x="0" y="0"/>
-          <a:ext cx="0" cy="0"/>
-          <a:chOff x="0" y="0"/>
-          <a:chExt cx="0" cy="0"/>
-        </a:xfrm>
-      </p:grpSpPr>
-      <p:sp>
-        <p:nvSpPr>
-          <p:cNvPr id="2" name="Title 1">
-            <a:extLst>
-              <a:ext uri="{FF2B5EF4-FFF2-40B4-BE49-F238E27FC236}">
-                <a16:creationId xmlns:a16="http://schemas.microsoft.com/office/drawing/2014/main" id="{5319C89A-A279-44E4-9C55-635A3C6FAB03}"/>
-              </a:ext>
-            </a:extLst>
-          </p:cNvPr>
-          <p:cNvSpPr>
-            <a:spLocks noGrp="1"/>
-          </p:cNvSpPr>
-          <p:nvPr>
-            <p:ph type="title"/>
-          </p:nvPr>
-        </p:nvSpPr>
-        <p:spPr/>
-        <p:txBody>
-          <a:bodyPr/>
-          <a:lstStyle/>
-          <a:p>
-            <a:endParaRPr lang="en-US"/>
-          </a:p>
-        </p:txBody>
-      </p:sp>
-      <p:sp>
-        <p:nvSpPr>
-          <p:cNvPr id="3" name="Content Placeholder 2">
-            <a:extLst>
-              <a:ext uri="{FF2B5EF4-FFF2-40B4-BE49-F238E27FC236}">
-                <a16:creationId xmlns:a16="http://schemas.microsoft.com/office/drawing/2014/main" id="{1E204170-A666-4879-8A5B-C539B5D4CDBA}"/>
-              </a:ext>
-            </a:extLst>
-          </p:cNvPr>
-          <p:cNvSpPr>
-            <a:spLocks noGrp="1"/>
-          </p:cNvSpPr>
-          <p:nvPr>
-            <p:ph idx="1"/>
-          </p:nvPr>
-        </p:nvSpPr>
-        <p:spPr/>
-        <p:txBody>
-          <a:bodyPr/>
-          <a:lstStyle/>
-          <a:p>
-            <a:endParaRPr lang="en-US"/>
-          </a:p>
-        </p:txBody>
-      </p:sp>
-    </p:spTree>
-    <p:extLst>
-      <p:ext uri="{BB962C8B-B14F-4D97-AF65-F5344CB8AC3E}">
-        <p14:creationId xmlns:p14="http://schemas.microsoft.com/office/powerpoint/2010/main" val="253110941"/>
       </p:ext>
     </p:extLst>
   </p:cSld>

</xml_diff>